<commit_message>
added CNN graphs to ppt
</commit_message>
<xml_diff>
--- a/Compiled graphs.pptx
+++ b/Compiled graphs.pptx
@@ -8,6 +8,7 @@
     <p:sldId id="257" r:id="rId2"/>
     <p:sldId id="258" r:id="rId3"/>
     <p:sldId id="259" r:id="rId4"/>
+    <p:sldId id="260" r:id="rId5"/>
   </p:sldIdLst>
   <p:sldSz cx="12192000" cy="6858000"/>
   <p:notesSz cx="6858000" cy="9144000"/>
@@ -114,8 +115,57 @@
 </p:presentation>
 </file>
 
-<file path=ppt/revisionInfo.xml><?xml version="1.0" encoding="utf-8"?>
-<p1510:revInfo xmlns:a="http://schemas.openxmlformats.org/drawingml/2006/main" xmlns:r="http://schemas.openxmlformats.org/officeDocument/2006/relationships" xmlns:p1510="http://schemas.microsoft.com/office/powerpoint/2015/10/main"/>
+<file path=ppt/changesInfos/changesInfo1.xml><?xml version="1.0" encoding="utf-8"?>
+<pc:chgInfo xmlns:a="http://schemas.openxmlformats.org/drawingml/2006/main" xmlns:r="http://schemas.openxmlformats.org/officeDocument/2006/relationships" xmlns:ac="http://schemas.microsoft.com/office/drawing/2013/main/command" xmlns:pc="http://schemas.microsoft.com/office/powerpoint/2013/main/command">
+  <pc:docChgLst>
+    <pc:chgData name="elliot kerman" userId="e77916c079d5c398" providerId="LiveId" clId="{E9A59B98-73E9-46E2-9F2A-2B338CC86AD1}"/>
+    <pc:docChg chg="addSld modSld">
+      <pc:chgData name="elliot kerman" userId="e77916c079d5c398" providerId="LiveId" clId="{E9A59B98-73E9-46E2-9F2A-2B338CC86AD1}" dt="2018-03-06T12:41:36.784" v="148" actId="1076"/>
+      <pc:docMkLst>
+        <pc:docMk/>
+      </pc:docMkLst>
+      <pc:sldChg chg="addSp modSp add">
+        <pc:chgData name="elliot kerman" userId="e77916c079d5c398" providerId="LiveId" clId="{E9A59B98-73E9-46E2-9F2A-2B338CC86AD1}" dt="2018-03-06T12:41:36.784" v="148" actId="1076"/>
+        <pc:sldMkLst>
+          <pc:docMk/>
+          <pc:sldMk cId="3374592240" sldId="260"/>
+        </pc:sldMkLst>
+        <pc:spChg chg="add mod">
+          <ac:chgData name="elliot kerman" userId="e77916c079d5c398" providerId="LiveId" clId="{E9A59B98-73E9-46E2-9F2A-2B338CC86AD1}" dt="2018-03-06T12:40:04.450" v="132" actId="403"/>
+          <ac:spMkLst>
+            <pc:docMk/>
+            <pc:sldMk cId="3374592240" sldId="260"/>
+            <ac:spMk id="2" creationId="{298F0E77-77F8-43AC-87BE-EB664C61B6FA}"/>
+          </ac:spMkLst>
+        </pc:spChg>
+        <pc:picChg chg="add mod">
+          <ac:chgData name="elliot kerman" userId="e77916c079d5c398" providerId="LiveId" clId="{E9A59B98-73E9-46E2-9F2A-2B338CC86AD1}" dt="2018-03-06T12:41:16.566" v="146" actId="1076"/>
+          <ac:picMkLst>
+            <pc:docMk/>
+            <pc:sldMk cId="3374592240" sldId="260"/>
+            <ac:picMk id="4" creationId="{27F43D92-1267-4F21-9530-C22DFD18E373}"/>
+          </ac:picMkLst>
+        </pc:picChg>
+        <pc:picChg chg="add mod">
+          <ac:chgData name="elliot kerman" userId="e77916c079d5c398" providerId="LiveId" clId="{E9A59B98-73E9-46E2-9F2A-2B338CC86AD1}" dt="2018-03-06T12:41:36.784" v="148" actId="1076"/>
+          <ac:picMkLst>
+            <pc:docMk/>
+            <pc:sldMk cId="3374592240" sldId="260"/>
+            <ac:picMk id="6" creationId="{B2394BB3-2377-4684-A514-D367BE4DF616}"/>
+          </ac:picMkLst>
+        </pc:picChg>
+        <pc:picChg chg="add mod">
+          <ac:chgData name="elliot kerman" userId="e77916c079d5c398" providerId="LiveId" clId="{E9A59B98-73E9-46E2-9F2A-2B338CC86AD1}" dt="2018-03-06T12:41:19.356" v="147" actId="1076"/>
+          <ac:picMkLst>
+            <pc:docMk/>
+            <pc:sldMk cId="3374592240" sldId="260"/>
+            <ac:picMk id="8" creationId="{13CBC6F0-B9CD-4CED-A2FB-3F488CC0C250}"/>
+          </ac:picMkLst>
+        </pc:picChg>
+      </pc:sldChg>
+    </pc:docChg>
+  </pc:docChgLst>
+</pc:chgInfo>
 </file>
 
 <file path=ppt/slideLayouts/slideLayout1.xml><?xml version="1.0" encoding="utf-8"?>
@@ -267,7 +317,7 @@
           <a:p>
             <a:fld id="{F999EE6D-E52B-45B7-B943-4C650C77E21B}" type="datetimeFigureOut">
               <a:rPr lang="en-GB" smtClean="0"/>
-              <a:t>01/03/2018</a:t>
+              <a:t>06/03/2018</a:t>
             </a:fld>
             <a:endParaRPr lang="en-GB"/>
           </a:p>
@@ -467,7 +517,7 @@
           <a:p>
             <a:fld id="{F999EE6D-E52B-45B7-B943-4C650C77E21B}" type="datetimeFigureOut">
               <a:rPr lang="en-GB" smtClean="0"/>
-              <a:t>01/03/2018</a:t>
+              <a:t>06/03/2018</a:t>
             </a:fld>
             <a:endParaRPr lang="en-GB"/>
           </a:p>
@@ -677,7 +727,7 @@
           <a:p>
             <a:fld id="{F999EE6D-E52B-45B7-B943-4C650C77E21B}" type="datetimeFigureOut">
               <a:rPr lang="en-GB" smtClean="0"/>
-              <a:t>01/03/2018</a:t>
+              <a:t>06/03/2018</a:t>
             </a:fld>
             <a:endParaRPr lang="en-GB"/>
           </a:p>
@@ -877,7 +927,7 @@
           <a:p>
             <a:fld id="{F999EE6D-E52B-45B7-B943-4C650C77E21B}" type="datetimeFigureOut">
               <a:rPr lang="en-GB" smtClean="0"/>
-              <a:t>01/03/2018</a:t>
+              <a:t>06/03/2018</a:t>
             </a:fld>
             <a:endParaRPr lang="en-GB"/>
           </a:p>
@@ -1153,7 +1203,7 @@
           <a:p>
             <a:fld id="{F999EE6D-E52B-45B7-B943-4C650C77E21B}" type="datetimeFigureOut">
               <a:rPr lang="en-GB" smtClean="0"/>
-              <a:t>01/03/2018</a:t>
+              <a:t>06/03/2018</a:t>
             </a:fld>
             <a:endParaRPr lang="en-GB"/>
           </a:p>
@@ -1421,7 +1471,7 @@
           <a:p>
             <a:fld id="{F999EE6D-E52B-45B7-B943-4C650C77E21B}" type="datetimeFigureOut">
               <a:rPr lang="en-GB" smtClean="0"/>
-              <a:t>01/03/2018</a:t>
+              <a:t>06/03/2018</a:t>
             </a:fld>
             <a:endParaRPr lang="en-GB"/>
           </a:p>
@@ -1836,7 +1886,7 @@
           <a:p>
             <a:fld id="{F999EE6D-E52B-45B7-B943-4C650C77E21B}" type="datetimeFigureOut">
               <a:rPr lang="en-GB" smtClean="0"/>
-              <a:t>01/03/2018</a:t>
+              <a:t>06/03/2018</a:t>
             </a:fld>
             <a:endParaRPr lang="en-GB"/>
           </a:p>
@@ -1978,7 +2028,7 @@
           <a:p>
             <a:fld id="{F999EE6D-E52B-45B7-B943-4C650C77E21B}" type="datetimeFigureOut">
               <a:rPr lang="en-GB" smtClean="0"/>
-              <a:t>01/03/2018</a:t>
+              <a:t>06/03/2018</a:t>
             </a:fld>
             <a:endParaRPr lang="en-GB"/>
           </a:p>
@@ -2091,7 +2141,7 @@
           <a:p>
             <a:fld id="{F999EE6D-E52B-45B7-B943-4C650C77E21B}" type="datetimeFigureOut">
               <a:rPr lang="en-GB" smtClean="0"/>
-              <a:t>01/03/2018</a:t>
+              <a:t>06/03/2018</a:t>
             </a:fld>
             <a:endParaRPr lang="en-GB"/>
           </a:p>
@@ -2404,7 +2454,7 @@
           <a:p>
             <a:fld id="{F999EE6D-E52B-45B7-B943-4C650C77E21B}" type="datetimeFigureOut">
               <a:rPr lang="en-GB" smtClean="0"/>
-              <a:t>01/03/2018</a:t>
+              <a:t>06/03/2018</a:t>
             </a:fld>
             <a:endParaRPr lang="en-GB"/>
           </a:p>
@@ -2693,7 +2743,7 @@
           <a:p>
             <a:fld id="{F999EE6D-E52B-45B7-B943-4C650C77E21B}" type="datetimeFigureOut">
               <a:rPr lang="en-GB" smtClean="0"/>
-              <a:t>01/03/2018</a:t>
+              <a:t>06/03/2018</a:t>
             </a:fld>
             <a:endParaRPr lang="en-GB"/>
           </a:p>
@@ -2936,7 +2986,7 @@
           <a:p>
             <a:fld id="{F999EE6D-E52B-45B7-B943-4C650C77E21B}" type="datetimeFigureOut">
               <a:rPr lang="en-GB" smtClean="0"/>
-              <a:t>01/03/2018</a:t>
+              <a:t>06/03/2018</a:t>
             </a:fld>
             <a:endParaRPr lang="en-GB"/>
           </a:p>
@@ -4539,6 +4589,180 @@
 </p:sld>
 </file>
 
+<file path=ppt/slides/slide4.xml><?xml version="1.0" encoding="utf-8"?>
+<p:sld xmlns:a="http://schemas.openxmlformats.org/drawingml/2006/main" xmlns:r="http://schemas.openxmlformats.org/officeDocument/2006/relationships" xmlns:p="http://schemas.openxmlformats.org/presentationml/2006/main">
+  <p:cSld>
+    <p:spTree>
+      <p:nvGrpSpPr>
+        <p:cNvPr id="1" name=""/>
+        <p:cNvGrpSpPr/>
+        <p:nvPr/>
+      </p:nvGrpSpPr>
+      <p:grpSpPr>
+        <a:xfrm>
+          <a:off x="0" y="0"/>
+          <a:ext cx="0" cy="0"/>
+          <a:chOff x="0" y="0"/>
+          <a:chExt cx="0" cy="0"/>
+        </a:xfrm>
+      </p:grpSpPr>
+      <p:sp>
+        <p:nvSpPr>
+          <p:cNvPr id="2" name="TextBox 1">
+            <a:extLst>
+              <a:ext uri="{FF2B5EF4-FFF2-40B4-BE49-F238E27FC236}">
+                <a16:creationId xmlns:a16="http://schemas.microsoft.com/office/drawing/2014/main" id="{298F0E77-77F8-43AC-87BE-EB664C61B6FA}"/>
+              </a:ext>
+            </a:extLst>
+          </p:cNvPr>
+          <p:cNvSpPr txBox="1"/>
+          <p:nvPr/>
+        </p:nvSpPr>
+        <p:spPr>
+          <a:xfrm>
+            <a:off x="3260124" y="395416"/>
+            <a:ext cx="5671751" cy="954107"/>
+          </a:xfrm>
+          <a:prstGeom prst="rect">
+            <a:avLst/>
+          </a:prstGeom>
+          <a:noFill/>
+        </p:spPr>
+        <p:txBody>
+          <a:bodyPr wrap="square" rtlCol="0">
+            <a:spAutoFit/>
+          </a:bodyPr>
+          <a:lstStyle/>
+          <a:p>
+            <a:pPr algn="ctr"/>
+            <a:r>
+              <a:rPr lang="en-GB" sz="2800" dirty="0"/>
+              <a:t>CNN with 2 Convolutional layers and 2 fully connected layers</a:t>
+            </a:r>
+          </a:p>
+        </p:txBody>
+      </p:sp>
+      <p:pic>
+        <p:nvPicPr>
+          <p:cNvPr id="4" name="Picture 3">
+            <a:extLst>
+              <a:ext uri="{FF2B5EF4-FFF2-40B4-BE49-F238E27FC236}">
+                <a16:creationId xmlns:a16="http://schemas.microsoft.com/office/drawing/2014/main" id="{27F43D92-1267-4F21-9530-C22DFD18E373}"/>
+              </a:ext>
+            </a:extLst>
+          </p:cNvPr>
+          <p:cNvPicPr>
+            <a:picLocks noChangeAspect="1"/>
+          </p:cNvPicPr>
+          <p:nvPr/>
+        </p:nvPicPr>
+        <p:blipFill>
+          <a:blip r:embed="rId2">
+            <a:extLst>
+              <a:ext uri="{28A0092B-C50C-407E-A947-70E740481C1C}">
+                <a14:useLocalDpi xmlns:a14="http://schemas.microsoft.com/office/drawing/2010/main" val="0"/>
+              </a:ext>
+            </a:extLst>
+          </a:blip>
+          <a:stretch>
+            <a:fillRect/>
+          </a:stretch>
+        </p:blipFill>
+        <p:spPr>
+          <a:xfrm>
+            <a:off x="913291" y="1349522"/>
+            <a:ext cx="4009292" cy="2672861"/>
+          </a:xfrm>
+          <a:prstGeom prst="rect">
+            <a:avLst/>
+          </a:prstGeom>
+        </p:spPr>
+      </p:pic>
+      <p:pic>
+        <p:nvPicPr>
+          <p:cNvPr id="6" name="Picture 5">
+            <a:extLst>
+              <a:ext uri="{FF2B5EF4-FFF2-40B4-BE49-F238E27FC236}">
+                <a16:creationId xmlns:a16="http://schemas.microsoft.com/office/drawing/2014/main" id="{B2394BB3-2377-4684-A514-D367BE4DF616}"/>
+              </a:ext>
+            </a:extLst>
+          </p:cNvPr>
+          <p:cNvPicPr>
+            <a:picLocks noChangeAspect="1"/>
+          </p:cNvPicPr>
+          <p:nvPr/>
+        </p:nvPicPr>
+        <p:blipFill>
+          <a:blip r:embed="rId3">
+            <a:extLst>
+              <a:ext uri="{28A0092B-C50C-407E-A947-70E740481C1C}">
+                <a14:useLocalDpi xmlns:a14="http://schemas.microsoft.com/office/drawing/2010/main" val="0"/>
+              </a:ext>
+            </a:extLst>
+          </a:blip>
+          <a:stretch>
+            <a:fillRect/>
+          </a:stretch>
+        </p:blipFill>
+        <p:spPr>
+          <a:xfrm>
+            <a:off x="7269415" y="1349522"/>
+            <a:ext cx="4009292" cy="2672861"/>
+          </a:xfrm>
+          <a:prstGeom prst="rect">
+            <a:avLst/>
+          </a:prstGeom>
+        </p:spPr>
+      </p:pic>
+      <p:pic>
+        <p:nvPicPr>
+          <p:cNvPr id="8" name="Picture 7">
+            <a:extLst>
+              <a:ext uri="{FF2B5EF4-FFF2-40B4-BE49-F238E27FC236}">
+                <a16:creationId xmlns:a16="http://schemas.microsoft.com/office/drawing/2014/main" id="{13CBC6F0-B9CD-4CED-A2FB-3F488CC0C250}"/>
+              </a:ext>
+            </a:extLst>
+          </p:cNvPr>
+          <p:cNvPicPr>
+            <a:picLocks noChangeAspect="1"/>
+          </p:cNvPicPr>
+          <p:nvPr/>
+        </p:nvPicPr>
+        <p:blipFill>
+          <a:blip r:embed="rId4">
+            <a:extLst>
+              <a:ext uri="{28A0092B-C50C-407E-A947-70E740481C1C}">
+                <a14:useLocalDpi xmlns:a14="http://schemas.microsoft.com/office/drawing/2010/main" val="0"/>
+              </a:ext>
+            </a:extLst>
+          </a:blip>
+          <a:stretch>
+            <a:fillRect/>
+          </a:stretch>
+        </p:blipFill>
+        <p:spPr>
+          <a:xfrm>
+            <a:off x="4091353" y="4022383"/>
+            <a:ext cx="4009292" cy="2672861"/>
+          </a:xfrm>
+          <a:prstGeom prst="rect">
+            <a:avLst/>
+          </a:prstGeom>
+        </p:spPr>
+      </p:pic>
+    </p:spTree>
+    <p:extLst>
+      <p:ext uri="{BB962C8B-B14F-4D97-AF65-F5344CB8AC3E}">
+        <p14:creationId xmlns:p14="http://schemas.microsoft.com/office/powerpoint/2010/main" val="3374592240"/>
+      </p:ext>
+    </p:extLst>
+  </p:cSld>
+  <p:clrMapOvr>
+    <a:masterClrMapping/>
+  </p:clrMapOvr>
+</p:sld>
+</file>
+
 <file path=ppt/theme/theme1.xml><?xml version="1.0" encoding="utf-8"?>
 <a:theme xmlns:a="http://schemas.openxmlformats.org/drawingml/2006/main" name="Office Theme">
   <a:themeElements>

</xml_diff>

<commit_message>
adjusted grpah positions in ppt
</commit_message>
<xml_diff>
--- a/Compiled graphs.pptx
+++ b/Compiled graphs.pptx
@@ -120,18 +120,18 @@
   <pc:docChgLst>
     <pc:chgData name="elliot kerman" userId="e77916c079d5c398" providerId="LiveId" clId="{E9A59B98-73E9-46E2-9F2A-2B338CC86AD1}"/>
     <pc:docChg chg="addSld modSld">
-      <pc:chgData name="elliot kerman" userId="e77916c079d5c398" providerId="LiveId" clId="{E9A59B98-73E9-46E2-9F2A-2B338CC86AD1}" dt="2018-03-06T12:41:36.784" v="148" actId="1076"/>
+      <pc:chgData name="elliot kerman" userId="e77916c079d5c398" providerId="LiveId" clId="{E9A59B98-73E9-46E2-9F2A-2B338CC86AD1}" dt="2018-03-06T12:43:12.079" v="158" actId="1076"/>
       <pc:docMkLst>
         <pc:docMk/>
       </pc:docMkLst>
       <pc:sldChg chg="addSp modSp add">
-        <pc:chgData name="elliot kerman" userId="e77916c079d5c398" providerId="LiveId" clId="{E9A59B98-73E9-46E2-9F2A-2B338CC86AD1}" dt="2018-03-06T12:41:36.784" v="148" actId="1076"/>
+        <pc:chgData name="elliot kerman" userId="e77916c079d5c398" providerId="LiveId" clId="{E9A59B98-73E9-46E2-9F2A-2B338CC86AD1}" dt="2018-03-06T12:43:12.079" v="158" actId="1076"/>
         <pc:sldMkLst>
           <pc:docMk/>
           <pc:sldMk cId="3374592240" sldId="260"/>
         </pc:sldMkLst>
         <pc:spChg chg="add mod">
-          <ac:chgData name="elliot kerman" userId="e77916c079d5c398" providerId="LiveId" clId="{E9A59B98-73E9-46E2-9F2A-2B338CC86AD1}" dt="2018-03-06T12:40:04.450" v="132" actId="403"/>
+          <ac:chgData name="elliot kerman" userId="e77916c079d5c398" providerId="LiveId" clId="{E9A59B98-73E9-46E2-9F2A-2B338CC86AD1}" dt="2018-03-06T12:42:48.535" v="151" actId="1076"/>
           <ac:spMkLst>
             <pc:docMk/>
             <pc:sldMk cId="3374592240" sldId="260"/>
@@ -139,7 +139,7 @@
           </ac:spMkLst>
         </pc:spChg>
         <pc:picChg chg="add mod">
-          <ac:chgData name="elliot kerman" userId="e77916c079d5c398" providerId="LiveId" clId="{E9A59B98-73E9-46E2-9F2A-2B338CC86AD1}" dt="2018-03-06T12:41:16.566" v="146" actId="1076"/>
+          <ac:chgData name="elliot kerman" userId="e77916c079d5c398" providerId="LiveId" clId="{E9A59B98-73E9-46E2-9F2A-2B338CC86AD1}" dt="2018-03-06T12:42:51.523" v="152" actId="14100"/>
           <ac:picMkLst>
             <pc:docMk/>
             <pc:sldMk cId="3374592240" sldId="260"/>
@@ -147,7 +147,7 @@
           </ac:picMkLst>
         </pc:picChg>
         <pc:picChg chg="add mod">
-          <ac:chgData name="elliot kerman" userId="e77916c079d5c398" providerId="LiveId" clId="{E9A59B98-73E9-46E2-9F2A-2B338CC86AD1}" dt="2018-03-06T12:41:36.784" v="148" actId="1076"/>
+          <ac:chgData name="elliot kerman" userId="e77916c079d5c398" providerId="LiveId" clId="{E9A59B98-73E9-46E2-9F2A-2B338CC86AD1}" dt="2018-03-06T12:43:06.082" v="157" actId="1076"/>
           <ac:picMkLst>
             <pc:docMk/>
             <pc:sldMk cId="3374592240" sldId="260"/>
@@ -155,7 +155,7 @@
           </ac:picMkLst>
         </pc:picChg>
         <pc:picChg chg="add mod">
-          <ac:chgData name="elliot kerman" userId="e77916c079d5c398" providerId="LiveId" clId="{E9A59B98-73E9-46E2-9F2A-2B338CC86AD1}" dt="2018-03-06T12:41:19.356" v="147" actId="1076"/>
+          <ac:chgData name="elliot kerman" userId="e77916c079d5c398" providerId="LiveId" clId="{E9A59B98-73E9-46E2-9F2A-2B338CC86AD1}" dt="2018-03-06T12:43:12.079" v="158" actId="1076"/>
           <ac:picMkLst>
             <pc:docMk/>
             <pc:sldMk cId="3374592240" sldId="260"/>
@@ -4620,8 +4620,8 @@
         </p:nvSpPr>
         <p:spPr>
           <a:xfrm>
-            <a:off x="3260124" y="395416"/>
-            <a:ext cx="5671751" cy="954107"/>
+            <a:off x="362464" y="162756"/>
+            <a:ext cx="11467069" cy="523220"/>
           </a:xfrm>
           <a:prstGeom prst="rect">
             <a:avLst/>
@@ -4670,8 +4670,8 @@
         </p:blipFill>
         <p:spPr>
           <a:xfrm>
-            <a:off x="913291" y="1349522"/>
-            <a:ext cx="4009292" cy="2672861"/>
+            <a:off x="56722" y="778476"/>
+            <a:ext cx="4865861" cy="3243907"/>
           </a:xfrm>
           <a:prstGeom prst="rect">
             <a:avLst/>
@@ -4706,8 +4706,8 @@
         </p:blipFill>
         <p:spPr>
           <a:xfrm>
-            <a:off x="7269415" y="1349522"/>
-            <a:ext cx="4009292" cy="2672861"/>
+            <a:off x="7269416" y="778476"/>
+            <a:ext cx="4865861" cy="3243907"/>
           </a:xfrm>
           <a:prstGeom prst="rect">
             <a:avLst/>
@@ -4742,8 +4742,8 @@
         </p:blipFill>
         <p:spPr>
           <a:xfrm>
-            <a:off x="4091353" y="4022383"/>
-            <a:ext cx="4009292" cy="2672861"/>
+            <a:off x="3663067" y="3429000"/>
+            <a:ext cx="4865861" cy="3243907"/>
           </a:xfrm>
           <a:prstGeom prst="rect">
             <a:avLst/>

</xml_diff>

<commit_message>
added graph of transfer learn
</commit_message>
<xml_diff>
--- a/Compiled graphs.pptx
+++ b/Compiled graphs.pptx
@@ -120,26 +120,34 @@
   <pc:docChgLst>
     <pc:chgData name="elliot kerman" userId="e77916c079d5c398" providerId="LiveId" clId="{E9A59B98-73E9-46E2-9F2A-2B338CC86AD1}"/>
     <pc:docChg chg="addSld modSld">
-      <pc:chgData name="elliot kerman" userId="e77916c079d5c398" providerId="LiveId" clId="{E9A59B98-73E9-46E2-9F2A-2B338CC86AD1}" dt="2018-03-06T12:43:12.079" v="158" actId="1076"/>
+      <pc:chgData name="elliot kerman" userId="e77916c079d5c398" providerId="LiveId" clId="{E9A59B98-73E9-46E2-9F2A-2B338CC86AD1}" dt="2018-03-06T14:38:21.495" v="225"/>
       <pc:docMkLst>
         <pc:docMk/>
       </pc:docMkLst>
       <pc:sldChg chg="addSp modSp add">
-        <pc:chgData name="elliot kerman" userId="e77916c079d5c398" providerId="LiveId" clId="{E9A59B98-73E9-46E2-9F2A-2B338CC86AD1}" dt="2018-03-06T12:43:12.079" v="158" actId="1076"/>
+        <pc:chgData name="elliot kerman" userId="e77916c079d5c398" providerId="LiveId" clId="{E9A59B98-73E9-46E2-9F2A-2B338CC86AD1}" dt="2018-03-06T14:38:21.495" v="225"/>
         <pc:sldMkLst>
           <pc:docMk/>
           <pc:sldMk cId="3374592240" sldId="260"/>
         </pc:sldMkLst>
         <pc:spChg chg="add mod">
-          <ac:chgData name="elliot kerman" userId="e77916c079d5c398" providerId="LiveId" clId="{E9A59B98-73E9-46E2-9F2A-2B338CC86AD1}" dt="2018-03-06T12:42:48.535" v="151" actId="1076"/>
+          <ac:chgData name="elliot kerman" userId="e77916c079d5c398" providerId="LiveId" clId="{E9A59B98-73E9-46E2-9F2A-2B338CC86AD1}" dt="2018-03-06T14:37:29.479" v="203" actId="1076"/>
           <ac:spMkLst>
             <pc:docMk/>
             <pc:sldMk cId="3374592240" sldId="260"/>
             <ac:spMk id="2" creationId="{298F0E77-77F8-43AC-87BE-EB664C61B6FA}"/>
           </ac:spMkLst>
         </pc:spChg>
+        <pc:spChg chg="add mod">
+          <ac:chgData name="elliot kerman" userId="e77916c079d5c398" providerId="LiveId" clId="{E9A59B98-73E9-46E2-9F2A-2B338CC86AD1}" dt="2018-03-06T14:38:21.495" v="225"/>
+          <ac:spMkLst>
+            <pc:docMk/>
+            <pc:sldMk cId="3374592240" sldId="260"/>
+            <ac:spMk id="7" creationId="{3FE9D9B0-27F2-4D99-A7B1-E041DC140D69}"/>
+          </ac:spMkLst>
+        </pc:spChg>
         <pc:picChg chg="add mod">
-          <ac:chgData name="elliot kerman" userId="e77916c079d5c398" providerId="LiveId" clId="{E9A59B98-73E9-46E2-9F2A-2B338CC86AD1}" dt="2018-03-06T12:42:51.523" v="152" actId="14100"/>
+          <ac:chgData name="elliot kerman" userId="e77916c079d5c398" providerId="LiveId" clId="{E9A59B98-73E9-46E2-9F2A-2B338CC86AD1}" dt="2018-03-06T14:37:43.911" v="207" actId="14100"/>
           <ac:picMkLst>
             <pc:docMk/>
             <pc:sldMk cId="3374592240" sldId="260"/>
@@ -147,7 +155,15 @@
           </ac:picMkLst>
         </pc:picChg>
         <pc:picChg chg="add mod">
-          <ac:chgData name="elliot kerman" userId="e77916c079d5c398" providerId="LiveId" clId="{E9A59B98-73E9-46E2-9F2A-2B338CC86AD1}" dt="2018-03-06T12:43:06.082" v="157" actId="1076"/>
+          <ac:chgData name="elliot kerman" userId="e77916c079d5c398" providerId="LiveId" clId="{E9A59B98-73E9-46E2-9F2A-2B338CC86AD1}" dt="2018-03-06T14:38:01.356" v="213" actId="1076"/>
+          <ac:picMkLst>
+            <pc:docMk/>
+            <pc:sldMk cId="3374592240" sldId="260"/>
+            <ac:picMk id="5" creationId="{91AF04B8-629A-4B3B-8445-2C0B8E27985A}"/>
+          </ac:picMkLst>
+        </pc:picChg>
+        <pc:picChg chg="add mod">
+          <ac:chgData name="elliot kerman" userId="e77916c079d5c398" providerId="LiveId" clId="{E9A59B98-73E9-46E2-9F2A-2B338CC86AD1}" dt="2018-03-06T14:37:24.258" v="202" actId="14100"/>
           <ac:picMkLst>
             <pc:docMk/>
             <pc:sldMk cId="3374592240" sldId="260"/>
@@ -155,7 +171,7 @@
           </ac:picMkLst>
         </pc:picChg>
         <pc:picChg chg="add mod">
-          <ac:chgData name="elliot kerman" userId="e77916c079d5c398" providerId="LiveId" clId="{E9A59B98-73E9-46E2-9F2A-2B338CC86AD1}" dt="2018-03-06T12:43:12.079" v="158" actId="1076"/>
+          <ac:chgData name="elliot kerman" userId="e77916c079d5c398" providerId="LiveId" clId="{E9A59B98-73E9-46E2-9F2A-2B338CC86AD1}" dt="2018-03-06T14:37:58.235" v="212" actId="14100"/>
           <ac:picMkLst>
             <pc:docMk/>
             <pc:sldMk cId="3374592240" sldId="260"/>
@@ -4620,8 +4636,8 @@
         </p:nvSpPr>
         <p:spPr>
           <a:xfrm>
-            <a:off x="362464" y="162756"/>
-            <a:ext cx="11467069" cy="523220"/>
+            <a:off x="5051427" y="2090172"/>
+            <a:ext cx="2185180" cy="2677656"/>
           </a:xfrm>
           <a:prstGeom prst="rect">
             <a:avLst/>
@@ -4670,8 +4686,8 @@
         </p:blipFill>
         <p:spPr>
           <a:xfrm>
-            <a:off x="56722" y="778476"/>
-            <a:ext cx="4865861" cy="3243907"/>
+            <a:off x="7293334" y="3429000"/>
+            <a:ext cx="4773659" cy="3387330"/>
           </a:xfrm>
           <a:prstGeom prst="rect">
             <a:avLst/>
@@ -4706,8 +4722,8 @@
         </p:blipFill>
         <p:spPr>
           <a:xfrm>
-            <a:off x="7269416" y="778476"/>
-            <a:ext cx="4865861" cy="3243907"/>
+            <a:off x="7361615" y="150216"/>
+            <a:ext cx="4773660" cy="3159637"/>
           </a:xfrm>
           <a:prstGeom prst="rect">
             <a:avLst/>
@@ -4742,14 +4758,90 @@
         </p:blipFill>
         <p:spPr>
           <a:xfrm>
-            <a:off x="3663067" y="3429000"/>
-            <a:ext cx="4865861" cy="3243907"/>
+            <a:off x="0" y="5862"/>
+            <a:ext cx="4773660" cy="3159638"/>
           </a:xfrm>
           <a:prstGeom prst="rect">
             <a:avLst/>
           </a:prstGeom>
         </p:spPr>
       </p:pic>
+      <p:pic>
+        <p:nvPicPr>
+          <p:cNvPr id="5" name="Picture 4">
+            <a:extLst>
+              <a:ext uri="{FF2B5EF4-FFF2-40B4-BE49-F238E27FC236}">
+                <a16:creationId xmlns:a16="http://schemas.microsoft.com/office/drawing/2014/main" id="{91AF04B8-629A-4B3B-8445-2C0B8E27985A}"/>
+              </a:ext>
+            </a:extLst>
+          </p:cNvPr>
+          <p:cNvPicPr>
+            <a:picLocks noChangeAspect="1"/>
+          </p:cNvPicPr>
+          <p:nvPr/>
+        </p:nvPicPr>
+        <p:blipFill>
+          <a:blip r:embed="rId5">
+            <a:extLst>
+              <a:ext uri="{28A0092B-C50C-407E-A947-70E740481C1C}">
+                <a14:useLocalDpi xmlns:a14="http://schemas.microsoft.com/office/drawing/2010/main" val="0"/>
+              </a:ext>
+            </a:extLst>
+          </a:blip>
+          <a:stretch>
+            <a:fillRect/>
+          </a:stretch>
+        </p:blipFill>
+        <p:spPr>
+          <a:xfrm>
+            <a:off x="125007" y="3309853"/>
+            <a:ext cx="5080995" cy="3387330"/>
+          </a:xfrm>
+          <a:prstGeom prst="rect">
+            <a:avLst/>
+          </a:prstGeom>
+        </p:spPr>
+      </p:pic>
+      <p:sp>
+        <p:nvSpPr>
+          <p:cNvPr id="7" name="TextBox 6">
+            <a:extLst>
+              <a:ext uri="{FF2B5EF4-FFF2-40B4-BE49-F238E27FC236}">
+                <a16:creationId xmlns:a16="http://schemas.microsoft.com/office/drawing/2014/main" id="{3FE9D9B0-27F2-4D99-A7B1-E041DC140D69}"/>
+              </a:ext>
+            </a:extLst>
+          </p:cNvPr>
+          <p:cNvSpPr txBox="1"/>
+          <p:nvPr/>
+        </p:nvSpPr>
+        <p:spPr>
+          <a:xfrm>
+            <a:off x="5051427" y="5697415"/>
+            <a:ext cx="1934573" cy="369332"/>
+          </a:xfrm>
+          <a:prstGeom prst="rect">
+            <a:avLst/>
+          </a:prstGeom>
+          <a:noFill/>
+        </p:spPr>
+        <p:txBody>
+          <a:bodyPr wrap="square" rtlCol="0">
+            <a:spAutoFit/>
+          </a:bodyPr>
+          <a:lstStyle/>
+          <a:p>
+            <a:pPr algn="ctr"/>
+            <a:r>
+              <a:rPr lang="en-GB" dirty="0">
+                <a:solidFill>
+                  <a:srgbClr val="FF0000"/>
+                </a:solidFill>
+              </a:rPr>
+              <a:t>Transfer</a:t>
+            </a:r>
+          </a:p>
+        </p:txBody>
+      </p:sp>
     </p:spTree>
     <p:extLst>
       <p:ext uri="{BB962C8B-B14F-4D97-AF65-F5344CB8AC3E}">

</xml_diff>

<commit_message>
added feature maps 100 out
</commit_message>
<xml_diff>
--- a/Compiled graphs.pptx
+++ b/Compiled graphs.pptx
@@ -4,11 +4,15 @@
   <p:sldMasterIdLst>
     <p:sldMasterId id="2147483648" r:id="rId1"/>
   </p:sldMasterIdLst>
+  <p:notesMasterIdLst>
+    <p:notesMasterId r:id="rId7"/>
+  </p:notesMasterIdLst>
   <p:sldIdLst>
     <p:sldId id="257" r:id="rId2"/>
-    <p:sldId id="258" r:id="rId3"/>
-    <p:sldId id="259" r:id="rId4"/>
-    <p:sldId id="260" r:id="rId5"/>
+    <p:sldId id="261" r:id="rId3"/>
+    <p:sldId id="258" r:id="rId4"/>
+    <p:sldId id="259" r:id="rId5"/>
+    <p:sldId id="260" r:id="rId6"/>
   </p:sldIdLst>
   <p:sldSz cx="12192000" cy="6858000"/>
   <p:notesSz cx="6858000" cy="9144000"/>
@@ -181,7 +185,413 @@
       </pc:sldChg>
     </pc:docChg>
   </pc:docChgLst>
+  <pc:docChgLst>
+    <pc:chgData name="elliot kerman" userId="e77916c079d5c398" providerId="LiveId" clId="{8DA0BB2C-F3B6-45F5-81AB-27FD8BE22616}"/>
+    <pc:docChg chg="undo addSld modSld">
+      <pc:chgData name="elliot kerman" userId="e77916c079d5c398" providerId="LiveId" clId="{8DA0BB2C-F3B6-45F5-81AB-27FD8BE22616}" dt="2018-03-13T09:57:33.479" v="142" actId="1076"/>
+      <pc:docMkLst>
+        <pc:docMk/>
+      </pc:docMkLst>
+      <pc:sldChg chg="addSp modSp add">
+        <pc:chgData name="elliot kerman" userId="e77916c079d5c398" providerId="LiveId" clId="{8DA0BB2C-F3B6-45F5-81AB-27FD8BE22616}" dt="2018-03-13T09:57:33.479" v="142" actId="1076"/>
+        <pc:sldMkLst>
+          <pc:docMk/>
+          <pc:sldMk cId="2150774575" sldId="261"/>
+        </pc:sldMkLst>
+        <pc:spChg chg="add mod">
+          <ac:chgData name="elliot kerman" userId="e77916c079d5c398" providerId="LiveId" clId="{8DA0BB2C-F3B6-45F5-81AB-27FD8BE22616}" dt="2018-03-13T09:56:23.932" v="43" actId="20577"/>
+          <ac:spMkLst>
+            <pc:docMk/>
+            <pc:sldMk cId="2150774575" sldId="261"/>
+            <ac:spMk id="6" creationId="{7A8DEA36-A431-4E66-95D8-C203D32F97F5}"/>
+          </ac:spMkLst>
+        </pc:spChg>
+        <pc:spChg chg="add mod">
+          <ac:chgData name="elliot kerman" userId="e77916c079d5c398" providerId="LiveId" clId="{8DA0BB2C-F3B6-45F5-81AB-27FD8BE22616}" dt="2018-03-13T09:56:38.985" v="48" actId="20577"/>
+          <ac:spMkLst>
+            <pc:docMk/>
+            <pc:sldMk cId="2150774575" sldId="261"/>
+            <ac:spMk id="7" creationId="{63F0D41E-535C-4573-98B2-ED311E0E4637}"/>
+          </ac:spMkLst>
+        </pc:spChg>
+        <pc:spChg chg="add mod">
+          <ac:chgData name="elliot kerman" userId="e77916c079d5c398" providerId="LiveId" clId="{8DA0BB2C-F3B6-45F5-81AB-27FD8BE22616}" dt="2018-03-13T09:57:27.147" v="140" actId="122"/>
+          <ac:spMkLst>
+            <pc:docMk/>
+            <pc:sldMk cId="2150774575" sldId="261"/>
+            <ac:spMk id="8" creationId="{29E4150E-7532-4CDF-9D3B-F540C3B02DE7}"/>
+          </ac:spMkLst>
+        </pc:spChg>
+        <pc:picChg chg="add mod modCrop">
+          <ac:chgData name="elliot kerman" userId="e77916c079d5c398" providerId="LiveId" clId="{8DA0BB2C-F3B6-45F5-81AB-27FD8BE22616}" dt="2018-03-13T09:55:32.299" v="13" actId="1076"/>
+          <ac:picMkLst>
+            <pc:docMk/>
+            <pc:sldMk cId="2150774575" sldId="261"/>
+            <ac:picMk id="3" creationId="{DF153BF6-79B3-43B5-A0BF-049E9D9E54A7}"/>
+          </ac:picMkLst>
+        </pc:picChg>
+        <pc:picChg chg="add mod modCrop">
+          <ac:chgData name="elliot kerman" userId="e77916c079d5c398" providerId="LiveId" clId="{8DA0BB2C-F3B6-45F5-81AB-27FD8BE22616}" dt="2018-03-13T09:57:33.479" v="142" actId="1076"/>
+          <ac:picMkLst>
+            <pc:docMk/>
+            <pc:sldMk cId="2150774575" sldId="261"/>
+            <ac:picMk id="5" creationId="{CB45506E-26BD-4A06-8BCD-8A5177A378E2}"/>
+          </ac:picMkLst>
+        </pc:picChg>
+      </pc:sldChg>
+    </pc:docChg>
+  </pc:docChgLst>
 </pc:chgInfo>
+</file>
+
+<file path=ppt/notesMasters/notesMaster1.xml><?xml version="1.0" encoding="utf-8"?>
+<p:notesMaster xmlns:a="http://schemas.openxmlformats.org/drawingml/2006/main" xmlns:r="http://schemas.openxmlformats.org/officeDocument/2006/relationships" xmlns:p="http://schemas.openxmlformats.org/presentationml/2006/main">
+  <p:cSld>
+    <p:bg>
+      <p:bgRef idx="1001">
+        <a:schemeClr val="bg1"/>
+      </p:bgRef>
+    </p:bg>
+    <p:spTree>
+      <p:nvGrpSpPr>
+        <p:cNvPr id="1" name=""/>
+        <p:cNvGrpSpPr/>
+        <p:nvPr/>
+      </p:nvGrpSpPr>
+      <p:grpSpPr>
+        <a:xfrm>
+          <a:off x="0" y="0"/>
+          <a:ext cx="0" cy="0"/>
+          <a:chOff x="0" y="0"/>
+          <a:chExt cx="0" cy="0"/>
+        </a:xfrm>
+      </p:grpSpPr>
+      <p:sp>
+        <p:nvSpPr>
+          <p:cNvPr id="2" name="Header Placeholder 1"/>
+          <p:cNvSpPr>
+            <a:spLocks noGrp="1"/>
+          </p:cNvSpPr>
+          <p:nvPr>
+            <p:ph type="hdr" sz="quarter"/>
+          </p:nvPr>
+        </p:nvSpPr>
+        <p:spPr>
+          <a:xfrm>
+            <a:off x="0" y="0"/>
+            <a:ext cx="2971800" cy="458788"/>
+          </a:xfrm>
+          <a:prstGeom prst="rect">
+            <a:avLst/>
+          </a:prstGeom>
+        </p:spPr>
+        <p:txBody>
+          <a:bodyPr vert="horz" lIns="91440" tIns="45720" rIns="91440" bIns="45720" rtlCol="0"/>
+          <a:lstStyle>
+            <a:lvl1pPr algn="l">
+              <a:defRPr sz="1200"/>
+            </a:lvl1pPr>
+          </a:lstStyle>
+          <a:p>
+            <a:endParaRPr lang="en-GB"/>
+          </a:p>
+        </p:txBody>
+      </p:sp>
+      <p:sp>
+        <p:nvSpPr>
+          <p:cNvPr id="3" name="Date Placeholder 2"/>
+          <p:cNvSpPr>
+            <a:spLocks noGrp="1"/>
+          </p:cNvSpPr>
+          <p:nvPr>
+            <p:ph type="dt" idx="1"/>
+          </p:nvPr>
+        </p:nvSpPr>
+        <p:spPr>
+          <a:xfrm>
+            <a:off x="3884613" y="0"/>
+            <a:ext cx="2971800" cy="458788"/>
+          </a:xfrm>
+          <a:prstGeom prst="rect">
+            <a:avLst/>
+          </a:prstGeom>
+        </p:spPr>
+        <p:txBody>
+          <a:bodyPr vert="horz" lIns="91440" tIns="45720" rIns="91440" bIns="45720" rtlCol="0"/>
+          <a:lstStyle>
+            <a:lvl1pPr algn="r">
+              <a:defRPr sz="1200"/>
+            </a:lvl1pPr>
+          </a:lstStyle>
+          <a:p>
+            <a:fld id="{1312CFC0-6A39-4A2C-AC24-6061EBE48B82}" type="datetimeFigureOut">
+              <a:rPr lang="en-GB" smtClean="0"/>
+              <a:t>13/03/2018</a:t>
+            </a:fld>
+            <a:endParaRPr lang="en-GB"/>
+          </a:p>
+        </p:txBody>
+      </p:sp>
+      <p:sp>
+        <p:nvSpPr>
+          <p:cNvPr id="4" name="Slide Image Placeholder 3"/>
+          <p:cNvSpPr>
+            <a:spLocks noGrp="1" noRot="1" noChangeAspect="1"/>
+          </p:cNvSpPr>
+          <p:nvPr>
+            <p:ph type="sldImg" idx="2"/>
+          </p:nvPr>
+        </p:nvSpPr>
+        <p:spPr>
+          <a:xfrm>
+            <a:off x="685800" y="1143000"/>
+            <a:ext cx="5486400" cy="3086100"/>
+          </a:xfrm>
+          <a:prstGeom prst="rect">
+            <a:avLst/>
+          </a:prstGeom>
+          <a:noFill/>
+          <a:ln w="12700">
+            <a:solidFill>
+              <a:prstClr val="black"/>
+            </a:solidFill>
+          </a:ln>
+        </p:spPr>
+        <p:txBody>
+          <a:bodyPr vert="horz" lIns="91440" tIns="45720" rIns="91440" bIns="45720" rtlCol="0" anchor="ctr"/>
+          <a:lstStyle/>
+          <a:p>
+            <a:endParaRPr lang="en-GB"/>
+          </a:p>
+        </p:txBody>
+      </p:sp>
+      <p:sp>
+        <p:nvSpPr>
+          <p:cNvPr id="5" name="Notes Placeholder 4"/>
+          <p:cNvSpPr>
+            <a:spLocks noGrp="1"/>
+          </p:cNvSpPr>
+          <p:nvPr>
+            <p:ph type="body" sz="quarter" idx="3"/>
+          </p:nvPr>
+        </p:nvSpPr>
+        <p:spPr>
+          <a:xfrm>
+            <a:off x="685800" y="4400550"/>
+            <a:ext cx="5486400" cy="3600450"/>
+          </a:xfrm>
+          <a:prstGeom prst="rect">
+            <a:avLst/>
+          </a:prstGeom>
+        </p:spPr>
+        <p:txBody>
+          <a:bodyPr vert="horz" lIns="91440" tIns="45720" rIns="91440" bIns="45720" rtlCol="0"/>
+          <a:lstStyle/>
+          <a:p>
+            <a:pPr lvl="0"/>
+            <a:r>
+              <a:rPr lang="en-US"/>
+              <a:t>Edit Master text styles</a:t>
+            </a:r>
+          </a:p>
+          <a:p>
+            <a:pPr lvl="1"/>
+            <a:r>
+              <a:rPr lang="en-US"/>
+              <a:t>Second level</a:t>
+            </a:r>
+          </a:p>
+          <a:p>
+            <a:pPr lvl="2"/>
+            <a:r>
+              <a:rPr lang="en-US"/>
+              <a:t>Third level</a:t>
+            </a:r>
+          </a:p>
+          <a:p>
+            <a:pPr lvl="3"/>
+            <a:r>
+              <a:rPr lang="en-US"/>
+              <a:t>Fourth level</a:t>
+            </a:r>
+          </a:p>
+          <a:p>
+            <a:pPr lvl="4"/>
+            <a:r>
+              <a:rPr lang="en-US"/>
+              <a:t>Fifth level</a:t>
+            </a:r>
+            <a:endParaRPr lang="en-GB"/>
+          </a:p>
+        </p:txBody>
+      </p:sp>
+      <p:sp>
+        <p:nvSpPr>
+          <p:cNvPr id="6" name="Footer Placeholder 5"/>
+          <p:cNvSpPr>
+            <a:spLocks noGrp="1"/>
+          </p:cNvSpPr>
+          <p:nvPr>
+            <p:ph type="ftr" sz="quarter" idx="4"/>
+          </p:nvPr>
+        </p:nvSpPr>
+        <p:spPr>
+          <a:xfrm>
+            <a:off x="0" y="8685213"/>
+            <a:ext cx="2971800" cy="458787"/>
+          </a:xfrm>
+          <a:prstGeom prst="rect">
+            <a:avLst/>
+          </a:prstGeom>
+        </p:spPr>
+        <p:txBody>
+          <a:bodyPr vert="horz" lIns="91440" tIns="45720" rIns="91440" bIns="45720" rtlCol="0" anchor="b"/>
+          <a:lstStyle>
+            <a:lvl1pPr algn="l">
+              <a:defRPr sz="1200"/>
+            </a:lvl1pPr>
+          </a:lstStyle>
+          <a:p>
+            <a:endParaRPr lang="en-GB"/>
+          </a:p>
+        </p:txBody>
+      </p:sp>
+      <p:sp>
+        <p:nvSpPr>
+          <p:cNvPr id="7" name="Slide Number Placeholder 6"/>
+          <p:cNvSpPr>
+            <a:spLocks noGrp="1"/>
+          </p:cNvSpPr>
+          <p:nvPr>
+            <p:ph type="sldNum" sz="quarter" idx="5"/>
+          </p:nvPr>
+        </p:nvSpPr>
+        <p:spPr>
+          <a:xfrm>
+            <a:off x="3884613" y="8685213"/>
+            <a:ext cx="2971800" cy="458787"/>
+          </a:xfrm>
+          <a:prstGeom prst="rect">
+            <a:avLst/>
+          </a:prstGeom>
+        </p:spPr>
+        <p:txBody>
+          <a:bodyPr vert="horz" lIns="91440" tIns="45720" rIns="91440" bIns="45720" rtlCol="0" anchor="b"/>
+          <a:lstStyle>
+            <a:lvl1pPr algn="r">
+              <a:defRPr sz="1200"/>
+            </a:lvl1pPr>
+          </a:lstStyle>
+          <a:p>
+            <a:fld id="{1E7C51B7-0486-4EC3-8BF1-FEA854142D54}" type="slidenum">
+              <a:rPr lang="en-GB" smtClean="0"/>
+              <a:t>‹#›</a:t>
+            </a:fld>
+            <a:endParaRPr lang="en-GB"/>
+          </a:p>
+        </p:txBody>
+      </p:sp>
+    </p:spTree>
+    <p:extLst>
+      <p:ext uri="{BB962C8B-B14F-4D97-AF65-F5344CB8AC3E}">
+        <p14:creationId xmlns:p14="http://schemas.microsoft.com/office/powerpoint/2010/main" val="1615174194"/>
+      </p:ext>
+    </p:extLst>
+  </p:cSld>
+  <p:clrMap bg1="lt1" tx1="dk1" bg2="lt2" tx2="dk2" accent1="accent1" accent2="accent2" accent3="accent3" accent4="accent4" accent5="accent5" accent6="accent6" hlink="hlink" folHlink="folHlink"/>
+  <p:notesStyle>
+    <a:lvl1pPr marL="0" algn="l" defTabSz="914400" rtl="0" eaLnBrk="1" latinLnBrk="0" hangingPunct="1">
+      <a:defRPr sz="1200" kern="1200">
+        <a:solidFill>
+          <a:schemeClr val="tx1"/>
+        </a:solidFill>
+        <a:latin typeface="+mn-lt"/>
+        <a:ea typeface="+mn-ea"/>
+        <a:cs typeface="+mn-cs"/>
+      </a:defRPr>
+    </a:lvl1pPr>
+    <a:lvl2pPr marL="457200" algn="l" defTabSz="914400" rtl="0" eaLnBrk="1" latinLnBrk="0" hangingPunct="1">
+      <a:defRPr sz="1200" kern="1200">
+        <a:solidFill>
+          <a:schemeClr val="tx1"/>
+        </a:solidFill>
+        <a:latin typeface="+mn-lt"/>
+        <a:ea typeface="+mn-ea"/>
+        <a:cs typeface="+mn-cs"/>
+      </a:defRPr>
+    </a:lvl2pPr>
+    <a:lvl3pPr marL="914400" algn="l" defTabSz="914400" rtl="0" eaLnBrk="1" latinLnBrk="0" hangingPunct="1">
+      <a:defRPr sz="1200" kern="1200">
+        <a:solidFill>
+          <a:schemeClr val="tx1"/>
+        </a:solidFill>
+        <a:latin typeface="+mn-lt"/>
+        <a:ea typeface="+mn-ea"/>
+        <a:cs typeface="+mn-cs"/>
+      </a:defRPr>
+    </a:lvl3pPr>
+    <a:lvl4pPr marL="1371600" algn="l" defTabSz="914400" rtl="0" eaLnBrk="1" latinLnBrk="0" hangingPunct="1">
+      <a:defRPr sz="1200" kern="1200">
+        <a:solidFill>
+          <a:schemeClr val="tx1"/>
+        </a:solidFill>
+        <a:latin typeface="+mn-lt"/>
+        <a:ea typeface="+mn-ea"/>
+        <a:cs typeface="+mn-cs"/>
+      </a:defRPr>
+    </a:lvl4pPr>
+    <a:lvl5pPr marL="1828800" algn="l" defTabSz="914400" rtl="0" eaLnBrk="1" latinLnBrk="0" hangingPunct="1">
+      <a:defRPr sz="1200" kern="1200">
+        <a:solidFill>
+          <a:schemeClr val="tx1"/>
+        </a:solidFill>
+        <a:latin typeface="+mn-lt"/>
+        <a:ea typeface="+mn-ea"/>
+        <a:cs typeface="+mn-cs"/>
+      </a:defRPr>
+    </a:lvl5pPr>
+    <a:lvl6pPr marL="2286000" algn="l" defTabSz="914400" rtl="0" eaLnBrk="1" latinLnBrk="0" hangingPunct="1">
+      <a:defRPr sz="1200" kern="1200">
+        <a:solidFill>
+          <a:schemeClr val="tx1"/>
+        </a:solidFill>
+        <a:latin typeface="+mn-lt"/>
+        <a:ea typeface="+mn-ea"/>
+        <a:cs typeface="+mn-cs"/>
+      </a:defRPr>
+    </a:lvl6pPr>
+    <a:lvl7pPr marL="2743200" algn="l" defTabSz="914400" rtl="0" eaLnBrk="1" latinLnBrk="0" hangingPunct="1">
+      <a:defRPr sz="1200" kern="1200">
+        <a:solidFill>
+          <a:schemeClr val="tx1"/>
+        </a:solidFill>
+        <a:latin typeface="+mn-lt"/>
+        <a:ea typeface="+mn-ea"/>
+        <a:cs typeface="+mn-cs"/>
+      </a:defRPr>
+    </a:lvl7pPr>
+    <a:lvl8pPr marL="3200400" algn="l" defTabSz="914400" rtl="0" eaLnBrk="1" latinLnBrk="0" hangingPunct="1">
+      <a:defRPr sz="1200" kern="1200">
+        <a:solidFill>
+          <a:schemeClr val="tx1"/>
+        </a:solidFill>
+        <a:latin typeface="+mn-lt"/>
+        <a:ea typeface="+mn-ea"/>
+        <a:cs typeface="+mn-cs"/>
+      </a:defRPr>
+    </a:lvl8pPr>
+    <a:lvl9pPr marL="3657600" algn="l" defTabSz="914400" rtl="0" eaLnBrk="1" latinLnBrk="0" hangingPunct="1">
+      <a:defRPr sz="1200" kern="1200">
+        <a:solidFill>
+          <a:schemeClr val="tx1"/>
+        </a:solidFill>
+        <a:latin typeface="+mn-lt"/>
+        <a:ea typeface="+mn-ea"/>
+        <a:cs typeface="+mn-cs"/>
+      </a:defRPr>
+    </a:lvl9pPr>
+  </p:notesStyle>
+</p:notesMaster>
 </file>
 
 <file path=ppt/slideLayouts/slideLayout1.xml><?xml version="1.0" encoding="utf-8"?>
@@ -333,7 +743,7 @@
           <a:p>
             <a:fld id="{F999EE6D-E52B-45B7-B943-4C650C77E21B}" type="datetimeFigureOut">
               <a:rPr lang="en-GB" smtClean="0"/>
-              <a:t>06/03/2018</a:t>
+              <a:t>13/03/2018</a:t>
             </a:fld>
             <a:endParaRPr lang="en-GB"/>
           </a:p>
@@ -533,7 +943,7 @@
           <a:p>
             <a:fld id="{F999EE6D-E52B-45B7-B943-4C650C77E21B}" type="datetimeFigureOut">
               <a:rPr lang="en-GB" smtClean="0"/>
-              <a:t>06/03/2018</a:t>
+              <a:t>13/03/2018</a:t>
             </a:fld>
             <a:endParaRPr lang="en-GB"/>
           </a:p>
@@ -743,7 +1153,7 @@
           <a:p>
             <a:fld id="{F999EE6D-E52B-45B7-B943-4C650C77E21B}" type="datetimeFigureOut">
               <a:rPr lang="en-GB" smtClean="0"/>
-              <a:t>06/03/2018</a:t>
+              <a:t>13/03/2018</a:t>
             </a:fld>
             <a:endParaRPr lang="en-GB"/>
           </a:p>
@@ -943,7 +1353,7 @@
           <a:p>
             <a:fld id="{F999EE6D-E52B-45B7-B943-4C650C77E21B}" type="datetimeFigureOut">
               <a:rPr lang="en-GB" smtClean="0"/>
-              <a:t>06/03/2018</a:t>
+              <a:t>13/03/2018</a:t>
             </a:fld>
             <a:endParaRPr lang="en-GB"/>
           </a:p>
@@ -1219,7 +1629,7 @@
           <a:p>
             <a:fld id="{F999EE6D-E52B-45B7-B943-4C650C77E21B}" type="datetimeFigureOut">
               <a:rPr lang="en-GB" smtClean="0"/>
-              <a:t>06/03/2018</a:t>
+              <a:t>13/03/2018</a:t>
             </a:fld>
             <a:endParaRPr lang="en-GB"/>
           </a:p>
@@ -1487,7 +1897,7 @@
           <a:p>
             <a:fld id="{F999EE6D-E52B-45B7-B943-4C650C77E21B}" type="datetimeFigureOut">
               <a:rPr lang="en-GB" smtClean="0"/>
-              <a:t>06/03/2018</a:t>
+              <a:t>13/03/2018</a:t>
             </a:fld>
             <a:endParaRPr lang="en-GB"/>
           </a:p>
@@ -1902,7 +2312,7 @@
           <a:p>
             <a:fld id="{F999EE6D-E52B-45B7-B943-4C650C77E21B}" type="datetimeFigureOut">
               <a:rPr lang="en-GB" smtClean="0"/>
-              <a:t>06/03/2018</a:t>
+              <a:t>13/03/2018</a:t>
             </a:fld>
             <a:endParaRPr lang="en-GB"/>
           </a:p>
@@ -2044,7 +2454,7 @@
           <a:p>
             <a:fld id="{F999EE6D-E52B-45B7-B943-4C650C77E21B}" type="datetimeFigureOut">
               <a:rPr lang="en-GB" smtClean="0"/>
-              <a:t>06/03/2018</a:t>
+              <a:t>13/03/2018</a:t>
             </a:fld>
             <a:endParaRPr lang="en-GB"/>
           </a:p>
@@ -2157,7 +2567,7 @@
           <a:p>
             <a:fld id="{F999EE6D-E52B-45B7-B943-4C650C77E21B}" type="datetimeFigureOut">
               <a:rPr lang="en-GB" smtClean="0"/>
-              <a:t>06/03/2018</a:t>
+              <a:t>13/03/2018</a:t>
             </a:fld>
             <a:endParaRPr lang="en-GB"/>
           </a:p>
@@ -2470,7 +2880,7 @@
           <a:p>
             <a:fld id="{F999EE6D-E52B-45B7-B943-4C650C77E21B}" type="datetimeFigureOut">
               <a:rPr lang="en-GB" smtClean="0"/>
-              <a:t>06/03/2018</a:t>
+              <a:t>13/03/2018</a:t>
             </a:fld>
             <a:endParaRPr lang="en-GB"/>
           </a:p>
@@ -2759,7 +3169,7 @@
           <a:p>
             <a:fld id="{F999EE6D-E52B-45B7-B943-4C650C77E21B}" type="datetimeFigureOut">
               <a:rPr lang="en-GB" smtClean="0"/>
-              <a:t>06/03/2018</a:t>
+              <a:t>13/03/2018</a:t>
             </a:fld>
             <a:endParaRPr lang="en-GB"/>
           </a:p>
@@ -3002,7 +3412,7 @@
           <a:p>
             <a:fld id="{F999EE6D-E52B-45B7-B943-4C650C77E21B}" type="datetimeFigureOut">
               <a:rPr lang="en-GB" smtClean="0"/>
-              <a:t>06/03/2018</a:t>
+              <a:t>13/03/2018</a:t>
             </a:fld>
             <a:endParaRPr lang="en-GB"/>
           </a:p>
@@ -3771,6 +4181,220 @@
           <a:chExt cx="0" cy="0"/>
         </a:xfrm>
       </p:grpSpPr>
+      <p:pic>
+        <p:nvPicPr>
+          <p:cNvPr id="3" name="Picture 2">
+            <a:extLst>
+              <a:ext uri="{FF2B5EF4-FFF2-40B4-BE49-F238E27FC236}">
+                <a16:creationId xmlns:a16="http://schemas.microsoft.com/office/drawing/2014/main" id="{DF153BF6-79B3-43B5-A0BF-049E9D9E54A7}"/>
+              </a:ext>
+            </a:extLst>
+          </p:cNvPr>
+          <p:cNvPicPr>
+            <a:picLocks noChangeAspect="1"/>
+          </p:cNvPicPr>
+          <p:nvPr/>
+        </p:nvPicPr>
+        <p:blipFill rotWithShape="1">
+          <a:blip r:embed="rId2">
+            <a:extLst>
+              <a:ext uri="{28A0092B-C50C-407E-A947-70E740481C1C}">
+                <a14:useLocalDpi xmlns:a14="http://schemas.microsoft.com/office/drawing/2010/main" val="0"/>
+              </a:ext>
+            </a:extLst>
+          </a:blip>
+          <a:srcRect l="11776" t="10574" r="9306" b="11024"/>
+          <a:stretch/>
+        </p:blipFill>
+        <p:spPr>
+          <a:xfrm>
+            <a:off x="6260123" y="1266093"/>
+            <a:ext cx="5324251" cy="5289452"/>
+          </a:xfrm>
+          <a:prstGeom prst="rect">
+            <a:avLst/>
+          </a:prstGeom>
+        </p:spPr>
+      </p:pic>
+      <p:pic>
+        <p:nvPicPr>
+          <p:cNvPr id="5" name="Picture 4">
+            <a:extLst>
+              <a:ext uri="{FF2B5EF4-FFF2-40B4-BE49-F238E27FC236}">
+                <a16:creationId xmlns:a16="http://schemas.microsoft.com/office/drawing/2014/main" id="{CB45506E-26BD-4A06-8BCD-8A5177A378E2}"/>
+              </a:ext>
+            </a:extLst>
+          </p:cNvPr>
+          <p:cNvPicPr>
+            <a:picLocks noChangeAspect="1"/>
+          </p:cNvPicPr>
+          <p:nvPr/>
+        </p:nvPicPr>
+        <p:blipFill rotWithShape="1">
+          <a:blip r:embed="rId3">
+            <a:extLst>
+              <a:ext uri="{28A0092B-C50C-407E-A947-70E740481C1C}">
+                <a14:useLocalDpi xmlns:a14="http://schemas.microsoft.com/office/drawing/2010/main" val="0"/>
+              </a:ext>
+            </a:extLst>
+          </a:blip>
+          <a:srcRect l="11300" t="11077" r="8291" b="11796"/>
+          <a:stretch/>
+        </p:blipFill>
+        <p:spPr>
+          <a:xfrm>
+            <a:off x="858129" y="784273"/>
+            <a:ext cx="3024554" cy="5802205"/>
+          </a:xfrm>
+          <a:prstGeom prst="rect">
+            <a:avLst/>
+          </a:prstGeom>
+        </p:spPr>
+      </p:pic>
+      <p:sp>
+        <p:nvSpPr>
+          <p:cNvPr id="6" name="TextBox 5">
+            <a:extLst>
+              <a:ext uri="{FF2B5EF4-FFF2-40B4-BE49-F238E27FC236}">
+                <a16:creationId xmlns:a16="http://schemas.microsoft.com/office/drawing/2014/main" id="{7A8DEA36-A431-4E66-95D8-C203D32F97F5}"/>
+              </a:ext>
+            </a:extLst>
+          </p:cNvPr>
+          <p:cNvSpPr txBox="1"/>
+          <p:nvPr/>
+        </p:nvSpPr>
+        <p:spPr>
+          <a:xfrm>
+            <a:off x="1153551" y="342983"/>
+            <a:ext cx="2729132" cy="369332"/>
+          </a:xfrm>
+          <a:prstGeom prst="rect">
+            <a:avLst/>
+          </a:prstGeom>
+          <a:noFill/>
+        </p:spPr>
+        <p:txBody>
+          <a:bodyPr wrap="square" rtlCol="0">
+            <a:spAutoFit/>
+          </a:bodyPr>
+          <a:lstStyle/>
+          <a:p>
+            <a:r>
+              <a:rPr lang="en-GB" dirty="0"/>
+              <a:t>1</a:t>
+            </a:r>
+            <a:r>
+              <a:rPr lang="en-GB" baseline="30000" dirty="0"/>
+              <a:t>st</a:t>
+            </a:r>
+            <a:r>
+              <a:rPr lang="en-GB" dirty="0"/>
+              <a:t> layer activations</a:t>
+            </a:r>
+          </a:p>
+        </p:txBody>
+      </p:sp>
+      <p:sp>
+        <p:nvSpPr>
+          <p:cNvPr id="7" name="TextBox 6">
+            <a:extLst>
+              <a:ext uri="{FF2B5EF4-FFF2-40B4-BE49-F238E27FC236}">
+                <a16:creationId xmlns:a16="http://schemas.microsoft.com/office/drawing/2014/main" id="{63F0D41E-535C-4573-98B2-ED311E0E4637}"/>
+              </a:ext>
+            </a:extLst>
+          </p:cNvPr>
+          <p:cNvSpPr txBox="1"/>
+          <p:nvPr/>
+        </p:nvSpPr>
+        <p:spPr>
+          <a:xfrm>
+            <a:off x="7397262" y="342983"/>
+            <a:ext cx="2729132" cy="369332"/>
+          </a:xfrm>
+          <a:prstGeom prst="rect">
+            <a:avLst/>
+          </a:prstGeom>
+          <a:noFill/>
+        </p:spPr>
+        <p:txBody>
+          <a:bodyPr wrap="square" rtlCol="0">
+            <a:spAutoFit/>
+          </a:bodyPr>
+          <a:lstStyle/>
+          <a:p>
+            <a:r>
+              <a:rPr lang="en-GB" dirty="0"/>
+              <a:t>2nd layer activations</a:t>
+            </a:r>
+          </a:p>
+        </p:txBody>
+      </p:sp>
+      <p:sp>
+        <p:nvSpPr>
+          <p:cNvPr id="8" name="TextBox 7">
+            <a:extLst>
+              <a:ext uri="{FF2B5EF4-FFF2-40B4-BE49-F238E27FC236}">
+                <a16:creationId xmlns:a16="http://schemas.microsoft.com/office/drawing/2014/main" id="{29E4150E-7532-4CDF-9D3B-F540C3B02DE7}"/>
+              </a:ext>
+            </a:extLst>
+          </p:cNvPr>
+          <p:cNvSpPr txBox="1"/>
+          <p:nvPr/>
+        </p:nvSpPr>
+        <p:spPr>
+          <a:xfrm>
+            <a:off x="4346917" y="2274838"/>
+            <a:ext cx="1491175" cy="2308324"/>
+          </a:xfrm>
+          <a:prstGeom prst="rect">
+            <a:avLst/>
+          </a:prstGeom>
+          <a:noFill/>
+        </p:spPr>
+        <p:txBody>
+          <a:bodyPr wrap="square" rtlCol="0">
+            <a:spAutoFit/>
+          </a:bodyPr>
+          <a:lstStyle/>
+          <a:p>
+            <a:pPr algn="ctr"/>
+            <a:r>
+              <a:rPr lang="en-GB" dirty="0"/>
+              <a:t>Feature maps from convolutional layers from network trained on 100 classes from scratch</a:t>
+            </a:r>
+          </a:p>
+        </p:txBody>
+      </p:sp>
+    </p:spTree>
+    <p:extLst>
+      <p:ext uri="{BB962C8B-B14F-4D97-AF65-F5344CB8AC3E}">
+        <p14:creationId xmlns:p14="http://schemas.microsoft.com/office/powerpoint/2010/main" val="2150774575"/>
+      </p:ext>
+    </p:extLst>
+  </p:cSld>
+  <p:clrMapOvr>
+    <a:masterClrMapping/>
+  </p:clrMapOvr>
+</p:sld>
+</file>
+
+<file path=ppt/slides/slide3.xml><?xml version="1.0" encoding="utf-8"?>
+<p:sld xmlns:a="http://schemas.openxmlformats.org/drawingml/2006/main" xmlns:r="http://schemas.openxmlformats.org/officeDocument/2006/relationships" xmlns:p="http://schemas.openxmlformats.org/presentationml/2006/main">
+  <p:cSld>
+    <p:spTree>
+      <p:nvGrpSpPr>
+        <p:cNvPr id="1" name=""/>
+        <p:cNvGrpSpPr/>
+        <p:nvPr/>
+      </p:nvGrpSpPr>
+      <p:grpSpPr>
+        <a:xfrm>
+          <a:off x="0" y="0"/>
+          <a:ext cx="0" cy="0"/>
+          <a:chOff x="0" y="0"/>
+          <a:chExt cx="0" cy="0"/>
+        </a:xfrm>
+      </p:grpSpPr>
       <p:grpSp>
         <p:nvGrpSpPr>
           <p:cNvPr id="5" name="Group 4">
@@ -4188,7 +4812,7 @@
 </p:sld>
 </file>
 
-<file path=ppt/slides/slide3.xml><?xml version="1.0" encoding="utf-8"?>
+<file path=ppt/slides/slide4.xml><?xml version="1.0" encoding="utf-8"?>
 <p:sld xmlns:a="http://schemas.openxmlformats.org/drawingml/2006/main" xmlns:r="http://schemas.openxmlformats.org/officeDocument/2006/relationships" xmlns:p="http://schemas.openxmlformats.org/presentationml/2006/main">
   <p:cSld>
     <p:spTree>
@@ -4605,7 +5229,7 @@
 </p:sld>
 </file>
 
-<file path=ppt/slides/slide4.xml><?xml version="1.0" encoding="utf-8"?>
+<file path=ppt/slides/slide5.xml><?xml version="1.0" encoding="utf-8"?>
 <p:sld xmlns:a="http://schemas.openxmlformats.org/drawingml/2006/main" xmlns:r="http://schemas.openxmlformats.org/officeDocument/2006/relationships" xmlns:p="http://schemas.openxmlformats.org/presentationml/2006/main">
   <p:cSld>
     <p:spTree>
@@ -5148,4 +5772,299 @@
     </a:ext>
   </a:extLst>
 </a:theme>
+</file>
+
+<file path=ppt/theme/theme2.xml><?xml version="1.0" encoding="utf-8"?>
+<a:theme xmlns:a="http://schemas.openxmlformats.org/drawingml/2006/main" name="Office Theme">
+  <a:themeElements>
+    <a:clrScheme name="Office">
+      <a:dk1>
+        <a:sysClr val="windowText" lastClr="000000"/>
+      </a:dk1>
+      <a:lt1>
+        <a:sysClr val="window" lastClr="FFFFFF"/>
+      </a:lt1>
+      <a:dk2>
+        <a:srgbClr val="44546A"/>
+      </a:dk2>
+      <a:lt2>
+        <a:srgbClr val="E7E6E6"/>
+      </a:lt2>
+      <a:accent1>
+        <a:srgbClr val="4472C4"/>
+      </a:accent1>
+      <a:accent2>
+        <a:srgbClr val="ED7D31"/>
+      </a:accent2>
+      <a:accent3>
+        <a:srgbClr val="A5A5A5"/>
+      </a:accent3>
+      <a:accent4>
+        <a:srgbClr val="FFC000"/>
+      </a:accent4>
+      <a:accent5>
+        <a:srgbClr val="5B9BD5"/>
+      </a:accent5>
+      <a:accent6>
+        <a:srgbClr val="70AD47"/>
+      </a:accent6>
+      <a:hlink>
+        <a:srgbClr val="0563C1"/>
+      </a:hlink>
+      <a:folHlink>
+        <a:srgbClr val="954F72"/>
+      </a:folHlink>
+    </a:clrScheme>
+    <a:fontScheme name="Office">
+      <a:majorFont>
+        <a:latin typeface="Calibri Light" panose="020F0302020204030204"/>
+        <a:ea typeface=""/>
+        <a:cs typeface=""/>
+        <a:font script="Jpan" typeface="游ゴシック Light"/>
+        <a:font script="Hang" typeface="맑은 고딕"/>
+        <a:font script="Hans" typeface="等线 Light"/>
+        <a:font script="Hant" typeface="新細明體"/>
+        <a:font script="Arab" typeface="Times New Roman"/>
+        <a:font script="Hebr" typeface="Times New Roman"/>
+        <a:font script="Thai" typeface="Angsana New"/>
+        <a:font script="Ethi" typeface="Nyala"/>
+        <a:font script="Beng" typeface="Vrinda"/>
+        <a:font script="Gujr" typeface="Shruti"/>
+        <a:font script="Khmr" typeface="MoolBoran"/>
+        <a:font script="Knda" typeface="Tunga"/>
+        <a:font script="Guru" typeface="Raavi"/>
+        <a:font script="Cans" typeface="Euphemia"/>
+        <a:font script="Cher" typeface="Plantagenet Cherokee"/>
+        <a:font script="Yiii" typeface="Microsoft Yi Baiti"/>
+        <a:font script="Tibt" typeface="Microsoft Himalaya"/>
+        <a:font script="Thaa" typeface="MV Boli"/>
+        <a:font script="Deva" typeface="Mangal"/>
+        <a:font script="Telu" typeface="Gautami"/>
+        <a:font script="Taml" typeface="Latha"/>
+        <a:font script="Syrc" typeface="Estrangelo Edessa"/>
+        <a:font script="Orya" typeface="Kalinga"/>
+        <a:font script="Mlym" typeface="Kartika"/>
+        <a:font script="Laoo" typeface="DokChampa"/>
+        <a:font script="Sinh" typeface="Iskoola Pota"/>
+        <a:font script="Mong" typeface="Mongolian Baiti"/>
+        <a:font script="Viet" typeface="Times New Roman"/>
+        <a:font script="Uigh" typeface="Microsoft Uighur"/>
+        <a:font script="Geor" typeface="Sylfaen"/>
+        <a:font script="Armn" typeface="Arial"/>
+        <a:font script="Bugi" typeface="Leelawadee UI"/>
+        <a:font script="Bopo" typeface="Microsoft JhengHei"/>
+        <a:font script="Java" typeface="Javanese Text"/>
+        <a:font script="Lisu" typeface="Segoe UI"/>
+        <a:font script="Mymr" typeface="Myanmar Text"/>
+        <a:font script="Nkoo" typeface="Ebrima"/>
+        <a:font script="Olck" typeface="Nirmala UI"/>
+        <a:font script="Osma" typeface="Ebrima"/>
+        <a:font script="Phag" typeface="Phagspa"/>
+        <a:font script="Syrn" typeface="Estrangelo Edessa"/>
+        <a:font script="Syrj" typeface="Estrangelo Edessa"/>
+        <a:font script="Syre" typeface="Estrangelo Edessa"/>
+        <a:font script="Sora" typeface="Nirmala UI"/>
+        <a:font script="Tale" typeface="Microsoft Tai Le"/>
+        <a:font script="Talu" typeface="Microsoft New Tai Lue"/>
+        <a:font script="Tfng" typeface="Ebrima"/>
+      </a:majorFont>
+      <a:minorFont>
+        <a:latin typeface="Calibri" panose="020F0502020204030204"/>
+        <a:ea typeface=""/>
+        <a:cs typeface=""/>
+        <a:font script="Jpan" typeface="游ゴシック"/>
+        <a:font script="Hang" typeface="맑은 고딕"/>
+        <a:font script="Hans" typeface="等线"/>
+        <a:font script="Hant" typeface="新細明體"/>
+        <a:font script="Arab" typeface="Arial"/>
+        <a:font script="Hebr" typeface="Arial"/>
+        <a:font script="Thai" typeface="Cordia New"/>
+        <a:font script="Ethi" typeface="Nyala"/>
+        <a:font script="Beng" typeface="Vrinda"/>
+        <a:font script="Gujr" typeface="Shruti"/>
+        <a:font script="Khmr" typeface="DaunPenh"/>
+        <a:font script="Knda" typeface="Tunga"/>
+        <a:font script="Guru" typeface="Raavi"/>
+        <a:font script="Cans" typeface="Euphemia"/>
+        <a:font script="Cher" typeface="Plantagenet Cherokee"/>
+        <a:font script="Yiii" typeface="Microsoft Yi Baiti"/>
+        <a:font script="Tibt" typeface="Microsoft Himalaya"/>
+        <a:font script="Thaa" typeface="MV Boli"/>
+        <a:font script="Deva" typeface="Mangal"/>
+        <a:font script="Telu" typeface="Gautami"/>
+        <a:font script="Taml" typeface="Latha"/>
+        <a:font script="Syrc" typeface="Estrangelo Edessa"/>
+        <a:font script="Orya" typeface="Kalinga"/>
+        <a:font script="Mlym" typeface="Kartika"/>
+        <a:font script="Laoo" typeface="DokChampa"/>
+        <a:font script="Sinh" typeface="Iskoola Pota"/>
+        <a:font script="Mong" typeface="Mongolian Baiti"/>
+        <a:font script="Viet" typeface="Arial"/>
+        <a:font script="Uigh" typeface="Microsoft Uighur"/>
+        <a:font script="Geor" typeface="Sylfaen"/>
+        <a:font script="Armn" typeface="Arial"/>
+        <a:font script="Bugi" typeface="Leelawadee UI"/>
+        <a:font script="Bopo" typeface="Microsoft JhengHei"/>
+        <a:font script="Java" typeface="Javanese Text"/>
+        <a:font script="Lisu" typeface="Segoe UI"/>
+        <a:font script="Mymr" typeface="Myanmar Text"/>
+        <a:font script="Nkoo" typeface="Ebrima"/>
+        <a:font script="Olck" typeface="Nirmala UI"/>
+        <a:font script="Osma" typeface="Ebrima"/>
+        <a:font script="Phag" typeface="Phagspa"/>
+        <a:font script="Syrn" typeface="Estrangelo Edessa"/>
+        <a:font script="Syrj" typeface="Estrangelo Edessa"/>
+        <a:font script="Syre" typeface="Estrangelo Edessa"/>
+        <a:font script="Sora" typeface="Nirmala UI"/>
+        <a:font script="Tale" typeface="Microsoft Tai Le"/>
+        <a:font script="Talu" typeface="Microsoft New Tai Lue"/>
+        <a:font script="Tfng" typeface="Ebrima"/>
+      </a:minorFont>
+    </a:fontScheme>
+    <a:fmtScheme name="Office">
+      <a:fillStyleLst>
+        <a:solidFill>
+          <a:schemeClr val="phClr"/>
+        </a:solidFill>
+        <a:gradFill rotWithShape="1">
+          <a:gsLst>
+            <a:gs pos="0">
+              <a:schemeClr val="phClr">
+                <a:lumMod val="110000"/>
+                <a:satMod val="105000"/>
+                <a:tint val="67000"/>
+              </a:schemeClr>
+            </a:gs>
+            <a:gs pos="50000">
+              <a:schemeClr val="phClr">
+                <a:lumMod val="105000"/>
+                <a:satMod val="103000"/>
+                <a:tint val="73000"/>
+              </a:schemeClr>
+            </a:gs>
+            <a:gs pos="100000">
+              <a:schemeClr val="phClr">
+                <a:lumMod val="105000"/>
+                <a:satMod val="109000"/>
+                <a:tint val="81000"/>
+              </a:schemeClr>
+            </a:gs>
+          </a:gsLst>
+          <a:lin ang="5400000" scaled="0"/>
+        </a:gradFill>
+        <a:gradFill rotWithShape="1">
+          <a:gsLst>
+            <a:gs pos="0">
+              <a:schemeClr val="phClr">
+                <a:satMod val="103000"/>
+                <a:lumMod val="102000"/>
+                <a:tint val="94000"/>
+              </a:schemeClr>
+            </a:gs>
+            <a:gs pos="50000">
+              <a:schemeClr val="phClr">
+                <a:satMod val="110000"/>
+                <a:lumMod val="100000"/>
+                <a:shade val="100000"/>
+              </a:schemeClr>
+            </a:gs>
+            <a:gs pos="100000">
+              <a:schemeClr val="phClr">
+                <a:lumMod val="99000"/>
+                <a:satMod val="120000"/>
+                <a:shade val="78000"/>
+              </a:schemeClr>
+            </a:gs>
+          </a:gsLst>
+          <a:lin ang="5400000" scaled="0"/>
+        </a:gradFill>
+      </a:fillStyleLst>
+      <a:lnStyleLst>
+        <a:ln w="6350" cap="flat" cmpd="sng" algn="ctr">
+          <a:solidFill>
+            <a:schemeClr val="phClr"/>
+          </a:solidFill>
+          <a:prstDash val="solid"/>
+          <a:miter lim="800000"/>
+        </a:ln>
+        <a:ln w="12700" cap="flat" cmpd="sng" algn="ctr">
+          <a:solidFill>
+            <a:schemeClr val="phClr"/>
+          </a:solidFill>
+          <a:prstDash val="solid"/>
+          <a:miter lim="800000"/>
+        </a:ln>
+        <a:ln w="19050" cap="flat" cmpd="sng" algn="ctr">
+          <a:solidFill>
+            <a:schemeClr val="phClr"/>
+          </a:solidFill>
+          <a:prstDash val="solid"/>
+          <a:miter lim="800000"/>
+        </a:ln>
+      </a:lnStyleLst>
+      <a:effectStyleLst>
+        <a:effectStyle>
+          <a:effectLst/>
+        </a:effectStyle>
+        <a:effectStyle>
+          <a:effectLst/>
+        </a:effectStyle>
+        <a:effectStyle>
+          <a:effectLst>
+            <a:outerShdw blurRad="57150" dist="19050" dir="5400000" algn="ctr" rotWithShape="0">
+              <a:srgbClr val="000000">
+                <a:alpha val="63000"/>
+              </a:srgbClr>
+            </a:outerShdw>
+          </a:effectLst>
+        </a:effectStyle>
+      </a:effectStyleLst>
+      <a:bgFillStyleLst>
+        <a:solidFill>
+          <a:schemeClr val="phClr"/>
+        </a:solidFill>
+        <a:solidFill>
+          <a:schemeClr val="phClr">
+            <a:tint val="95000"/>
+            <a:satMod val="170000"/>
+          </a:schemeClr>
+        </a:solidFill>
+        <a:gradFill rotWithShape="1">
+          <a:gsLst>
+            <a:gs pos="0">
+              <a:schemeClr val="phClr">
+                <a:tint val="93000"/>
+                <a:satMod val="150000"/>
+                <a:shade val="98000"/>
+                <a:lumMod val="102000"/>
+              </a:schemeClr>
+            </a:gs>
+            <a:gs pos="50000">
+              <a:schemeClr val="phClr">
+                <a:tint val="98000"/>
+                <a:satMod val="130000"/>
+                <a:shade val="90000"/>
+                <a:lumMod val="103000"/>
+              </a:schemeClr>
+            </a:gs>
+            <a:gs pos="100000">
+              <a:schemeClr val="phClr">
+                <a:shade val="63000"/>
+                <a:satMod val="120000"/>
+              </a:schemeClr>
+            </a:gs>
+          </a:gsLst>
+          <a:lin ang="5400000" scaled="0"/>
+        </a:gradFill>
+      </a:bgFillStyleLst>
+    </a:fmtScheme>
+  </a:themeElements>
+  <a:objectDefaults/>
+  <a:extraClrSchemeLst/>
+  <a:extLst>
+    <a:ext uri="{05A4C25C-085E-4340-85A3-A5531E510DB2}">
+      <thm15:themeFamily xmlns:thm15="http://schemas.microsoft.com/office/thememl/2012/main" name="Office Theme" id="{62F939B6-93AF-4DB8-9C6B-D6C7DFDC589F}" vid="{4A3C46E8-61CC-4603-A589-7422A47A8E4A}"/>
+    </a:ext>
+  </a:extLst>
+</a:theme>
 </file>
</xml_diff>

<commit_message>
marked pages for printing
</commit_message>
<xml_diff>
--- a/Compiled graphs.pptx
+++ b/Compiled graphs.pptx
@@ -9,10 +9,10 @@
   </p:notesMasterIdLst>
   <p:sldIdLst>
     <p:sldId id="257" r:id="rId2"/>
-    <p:sldId id="261" r:id="rId3"/>
-    <p:sldId id="258" r:id="rId4"/>
-    <p:sldId id="259" r:id="rId5"/>
-    <p:sldId id="260" r:id="rId6"/>
+    <p:sldId id="258" r:id="rId3"/>
+    <p:sldId id="259" r:id="rId4"/>
+    <p:sldId id="260" r:id="rId5"/>
+    <p:sldId id="261" r:id="rId6"/>
   </p:sldIdLst>
   <p:sldSz cx="12192000" cy="6858000"/>
   <p:notesSz cx="6858000" cy="9144000"/>
@@ -187,17 +187,40 @@
   </pc:docChgLst>
   <pc:docChgLst>
     <pc:chgData name="elliot kerman" userId="e77916c079d5c398" providerId="LiveId" clId="{8DA0BB2C-F3B6-45F5-81AB-27FD8BE22616}"/>
-    <pc:docChg chg="undo addSld modSld">
-      <pc:chgData name="elliot kerman" userId="e77916c079d5c398" providerId="LiveId" clId="{8DA0BB2C-F3B6-45F5-81AB-27FD8BE22616}" dt="2018-03-13T09:57:33.479" v="142" actId="1076"/>
+    <pc:docChg chg="undo addSld modSld sldOrd">
+      <pc:chgData name="elliot kerman" userId="e77916c079d5c398" providerId="LiveId" clId="{8DA0BB2C-F3B6-45F5-81AB-27FD8BE22616}" dt="2018-03-13T10:00:16.227" v="159"/>
       <pc:docMkLst>
         <pc:docMk/>
       </pc:docMkLst>
-      <pc:sldChg chg="addSp modSp add">
-        <pc:chgData name="elliot kerman" userId="e77916c079d5c398" providerId="LiveId" clId="{8DA0BB2C-F3B6-45F5-81AB-27FD8BE22616}" dt="2018-03-13T09:57:33.479" v="142" actId="1076"/>
+      <pc:sldChg chg="addSp modSp">
+        <pc:chgData name="elliot kerman" userId="e77916c079d5c398" providerId="LiveId" clId="{8DA0BB2C-F3B6-45F5-81AB-27FD8BE22616}" dt="2018-03-13T09:59:52.480" v="158" actId="1076"/>
+        <pc:sldMkLst>
+          <pc:docMk/>
+          <pc:sldMk cId="3374592240" sldId="260"/>
+        </pc:sldMkLst>
+        <pc:spChg chg="add mod">
+          <ac:chgData name="elliot kerman" userId="e77916c079d5c398" providerId="LiveId" clId="{8DA0BB2C-F3B6-45F5-81AB-27FD8BE22616}" dt="2018-03-13T09:59:52.480" v="158" actId="1076"/>
+          <ac:spMkLst>
+            <pc:docMk/>
+            <pc:sldMk cId="3374592240" sldId="260"/>
+            <ac:spMk id="9" creationId="{882FF231-B88A-4470-9A61-B3ED576D47D7}"/>
+          </ac:spMkLst>
+        </pc:spChg>
+      </pc:sldChg>
+      <pc:sldChg chg="addSp modSp add ord">
+        <pc:chgData name="elliot kerman" userId="e77916c079d5c398" providerId="LiveId" clId="{8DA0BB2C-F3B6-45F5-81AB-27FD8BE22616}" dt="2018-03-13T10:00:16.227" v="159"/>
         <pc:sldMkLst>
           <pc:docMk/>
           <pc:sldMk cId="2150774575" sldId="261"/>
         </pc:sldMkLst>
+        <pc:spChg chg="add mod">
+          <ac:chgData name="elliot kerman" userId="e77916c079d5c398" providerId="LiveId" clId="{8DA0BB2C-F3B6-45F5-81AB-27FD8BE22616}" dt="2018-03-13T09:59:41.213" v="156"/>
+          <ac:spMkLst>
+            <pc:docMk/>
+            <pc:sldMk cId="2150774575" sldId="261"/>
+            <ac:spMk id="2" creationId="{20E7192E-8B00-4D8A-A9B6-D981E08321DC}"/>
+          </ac:spMkLst>
+        </pc:spChg>
         <pc:spChg chg="add mod">
           <ac:chgData name="elliot kerman" userId="e77916c079d5c398" providerId="LiveId" clId="{8DA0BB2C-F3B6-45F5-81AB-27FD8BE22616}" dt="2018-03-13T09:56:23.932" v="43" actId="20577"/>
           <ac:spMkLst>
@@ -4181,220 +4204,6 @@
           <a:chExt cx="0" cy="0"/>
         </a:xfrm>
       </p:grpSpPr>
-      <p:pic>
-        <p:nvPicPr>
-          <p:cNvPr id="3" name="Picture 2">
-            <a:extLst>
-              <a:ext uri="{FF2B5EF4-FFF2-40B4-BE49-F238E27FC236}">
-                <a16:creationId xmlns:a16="http://schemas.microsoft.com/office/drawing/2014/main" id="{DF153BF6-79B3-43B5-A0BF-049E9D9E54A7}"/>
-              </a:ext>
-            </a:extLst>
-          </p:cNvPr>
-          <p:cNvPicPr>
-            <a:picLocks noChangeAspect="1"/>
-          </p:cNvPicPr>
-          <p:nvPr/>
-        </p:nvPicPr>
-        <p:blipFill rotWithShape="1">
-          <a:blip r:embed="rId2">
-            <a:extLst>
-              <a:ext uri="{28A0092B-C50C-407E-A947-70E740481C1C}">
-                <a14:useLocalDpi xmlns:a14="http://schemas.microsoft.com/office/drawing/2010/main" val="0"/>
-              </a:ext>
-            </a:extLst>
-          </a:blip>
-          <a:srcRect l="11776" t="10574" r="9306" b="11024"/>
-          <a:stretch/>
-        </p:blipFill>
-        <p:spPr>
-          <a:xfrm>
-            <a:off x="6260123" y="1266093"/>
-            <a:ext cx="5324251" cy="5289452"/>
-          </a:xfrm>
-          <a:prstGeom prst="rect">
-            <a:avLst/>
-          </a:prstGeom>
-        </p:spPr>
-      </p:pic>
-      <p:pic>
-        <p:nvPicPr>
-          <p:cNvPr id="5" name="Picture 4">
-            <a:extLst>
-              <a:ext uri="{FF2B5EF4-FFF2-40B4-BE49-F238E27FC236}">
-                <a16:creationId xmlns:a16="http://schemas.microsoft.com/office/drawing/2014/main" id="{CB45506E-26BD-4A06-8BCD-8A5177A378E2}"/>
-              </a:ext>
-            </a:extLst>
-          </p:cNvPr>
-          <p:cNvPicPr>
-            <a:picLocks noChangeAspect="1"/>
-          </p:cNvPicPr>
-          <p:nvPr/>
-        </p:nvPicPr>
-        <p:blipFill rotWithShape="1">
-          <a:blip r:embed="rId3">
-            <a:extLst>
-              <a:ext uri="{28A0092B-C50C-407E-A947-70E740481C1C}">
-                <a14:useLocalDpi xmlns:a14="http://schemas.microsoft.com/office/drawing/2010/main" val="0"/>
-              </a:ext>
-            </a:extLst>
-          </a:blip>
-          <a:srcRect l="11300" t="11077" r="8291" b="11796"/>
-          <a:stretch/>
-        </p:blipFill>
-        <p:spPr>
-          <a:xfrm>
-            <a:off x="858129" y="784273"/>
-            <a:ext cx="3024554" cy="5802205"/>
-          </a:xfrm>
-          <a:prstGeom prst="rect">
-            <a:avLst/>
-          </a:prstGeom>
-        </p:spPr>
-      </p:pic>
-      <p:sp>
-        <p:nvSpPr>
-          <p:cNvPr id="6" name="TextBox 5">
-            <a:extLst>
-              <a:ext uri="{FF2B5EF4-FFF2-40B4-BE49-F238E27FC236}">
-                <a16:creationId xmlns:a16="http://schemas.microsoft.com/office/drawing/2014/main" id="{7A8DEA36-A431-4E66-95D8-C203D32F97F5}"/>
-              </a:ext>
-            </a:extLst>
-          </p:cNvPr>
-          <p:cNvSpPr txBox="1"/>
-          <p:nvPr/>
-        </p:nvSpPr>
-        <p:spPr>
-          <a:xfrm>
-            <a:off x="1153551" y="342983"/>
-            <a:ext cx="2729132" cy="369332"/>
-          </a:xfrm>
-          <a:prstGeom prst="rect">
-            <a:avLst/>
-          </a:prstGeom>
-          <a:noFill/>
-        </p:spPr>
-        <p:txBody>
-          <a:bodyPr wrap="square" rtlCol="0">
-            <a:spAutoFit/>
-          </a:bodyPr>
-          <a:lstStyle/>
-          <a:p>
-            <a:r>
-              <a:rPr lang="en-GB" dirty="0"/>
-              <a:t>1</a:t>
-            </a:r>
-            <a:r>
-              <a:rPr lang="en-GB" baseline="30000" dirty="0"/>
-              <a:t>st</a:t>
-            </a:r>
-            <a:r>
-              <a:rPr lang="en-GB" dirty="0"/>
-              <a:t> layer activations</a:t>
-            </a:r>
-          </a:p>
-        </p:txBody>
-      </p:sp>
-      <p:sp>
-        <p:nvSpPr>
-          <p:cNvPr id="7" name="TextBox 6">
-            <a:extLst>
-              <a:ext uri="{FF2B5EF4-FFF2-40B4-BE49-F238E27FC236}">
-                <a16:creationId xmlns:a16="http://schemas.microsoft.com/office/drawing/2014/main" id="{63F0D41E-535C-4573-98B2-ED311E0E4637}"/>
-              </a:ext>
-            </a:extLst>
-          </p:cNvPr>
-          <p:cNvSpPr txBox="1"/>
-          <p:nvPr/>
-        </p:nvSpPr>
-        <p:spPr>
-          <a:xfrm>
-            <a:off x="7397262" y="342983"/>
-            <a:ext cx="2729132" cy="369332"/>
-          </a:xfrm>
-          <a:prstGeom prst="rect">
-            <a:avLst/>
-          </a:prstGeom>
-          <a:noFill/>
-        </p:spPr>
-        <p:txBody>
-          <a:bodyPr wrap="square" rtlCol="0">
-            <a:spAutoFit/>
-          </a:bodyPr>
-          <a:lstStyle/>
-          <a:p>
-            <a:r>
-              <a:rPr lang="en-GB" dirty="0"/>
-              <a:t>2nd layer activations</a:t>
-            </a:r>
-          </a:p>
-        </p:txBody>
-      </p:sp>
-      <p:sp>
-        <p:nvSpPr>
-          <p:cNvPr id="8" name="TextBox 7">
-            <a:extLst>
-              <a:ext uri="{FF2B5EF4-FFF2-40B4-BE49-F238E27FC236}">
-                <a16:creationId xmlns:a16="http://schemas.microsoft.com/office/drawing/2014/main" id="{29E4150E-7532-4CDF-9D3B-F540C3B02DE7}"/>
-              </a:ext>
-            </a:extLst>
-          </p:cNvPr>
-          <p:cNvSpPr txBox="1"/>
-          <p:nvPr/>
-        </p:nvSpPr>
-        <p:spPr>
-          <a:xfrm>
-            <a:off x="4346917" y="2274838"/>
-            <a:ext cx="1491175" cy="2308324"/>
-          </a:xfrm>
-          <a:prstGeom prst="rect">
-            <a:avLst/>
-          </a:prstGeom>
-          <a:noFill/>
-        </p:spPr>
-        <p:txBody>
-          <a:bodyPr wrap="square" rtlCol="0">
-            <a:spAutoFit/>
-          </a:bodyPr>
-          <a:lstStyle/>
-          <a:p>
-            <a:pPr algn="ctr"/>
-            <a:r>
-              <a:rPr lang="en-GB" dirty="0"/>
-              <a:t>Feature maps from convolutional layers from network trained on 100 classes from scratch</a:t>
-            </a:r>
-          </a:p>
-        </p:txBody>
-      </p:sp>
-    </p:spTree>
-    <p:extLst>
-      <p:ext uri="{BB962C8B-B14F-4D97-AF65-F5344CB8AC3E}">
-        <p14:creationId xmlns:p14="http://schemas.microsoft.com/office/powerpoint/2010/main" val="2150774575"/>
-      </p:ext>
-    </p:extLst>
-  </p:cSld>
-  <p:clrMapOvr>
-    <a:masterClrMapping/>
-  </p:clrMapOvr>
-</p:sld>
-</file>
-
-<file path=ppt/slides/slide3.xml><?xml version="1.0" encoding="utf-8"?>
-<p:sld xmlns:a="http://schemas.openxmlformats.org/drawingml/2006/main" xmlns:r="http://schemas.openxmlformats.org/officeDocument/2006/relationships" xmlns:p="http://schemas.openxmlformats.org/presentationml/2006/main">
-  <p:cSld>
-    <p:spTree>
-      <p:nvGrpSpPr>
-        <p:cNvPr id="1" name=""/>
-        <p:cNvGrpSpPr/>
-        <p:nvPr/>
-      </p:nvGrpSpPr>
-      <p:grpSpPr>
-        <a:xfrm>
-          <a:off x="0" y="0"/>
-          <a:ext cx="0" cy="0"/>
-          <a:chOff x="0" y="0"/>
-          <a:chExt cx="0" cy="0"/>
-        </a:xfrm>
-      </p:grpSpPr>
       <p:grpSp>
         <p:nvGrpSpPr>
           <p:cNvPr id="5" name="Group 4">
@@ -4812,7 +4621,7 @@
 </p:sld>
 </file>
 
-<file path=ppt/slides/slide4.xml><?xml version="1.0" encoding="utf-8"?>
+<file path=ppt/slides/slide3.xml><?xml version="1.0" encoding="utf-8"?>
 <p:sld xmlns:a="http://schemas.openxmlformats.org/drawingml/2006/main" xmlns:r="http://schemas.openxmlformats.org/officeDocument/2006/relationships" xmlns:p="http://schemas.openxmlformats.org/presentationml/2006/main">
   <p:cSld>
     <p:spTree>
@@ -5229,7 +5038,7 @@
 </p:sld>
 </file>
 
-<file path=ppt/slides/slide5.xml><?xml version="1.0" encoding="utf-8"?>
+<file path=ppt/slides/slide4.xml><?xml version="1.0" encoding="utf-8"?>
 <p:sld xmlns:a="http://schemas.openxmlformats.org/drawingml/2006/main" xmlns:r="http://schemas.openxmlformats.org/officeDocument/2006/relationships" xmlns:p="http://schemas.openxmlformats.org/presentationml/2006/main">
   <p:cSld>
     <p:spTree>
@@ -5466,10 +5275,302 @@
           </a:p>
         </p:txBody>
       </p:sp>
+      <p:sp>
+        <p:nvSpPr>
+          <p:cNvPr id="9" name="TextBox 8">
+            <a:extLst>
+              <a:ext uri="{FF2B5EF4-FFF2-40B4-BE49-F238E27FC236}">
+                <a16:creationId xmlns:a16="http://schemas.microsoft.com/office/drawing/2014/main" id="{882FF231-B88A-4470-9A61-B3ED576D47D7}"/>
+              </a:ext>
+            </a:extLst>
+          </p:cNvPr>
+          <p:cNvSpPr txBox="1"/>
+          <p:nvPr/>
+        </p:nvSpPr>
+        <p:spPr>
+          <a:xfrm>
+            <a:off x="5750325" y="791253"/>
+            <a:ext cx="1235675" cy="369332"/>
+          </a:xfrm>
+          <a:prstGeom prst="rect">
+            <a:avLst/>
+          </a:prstGeom>
+          <a:noFill/>
+        </p:spPr>
+        <p:txBody>
+          <a:bodyPr wrap="square" rtlCol="0">
+            <a:spAutoFit/>
+          </a:bodyPr>
+          <a:lstStyle/>
+          <a:p>
+            <a:r>
+              <a:rPr lang="en-GB" dirty="0">
+                <a:solidFill>
+                  <a:srgbClr val="FF0000"/>
+                </a:solidFill>
+              </a:rPr>
+              <a:t>PRINT</a:t>
+            </a:r>
+          </a:p>
+        </p:txBody>
+      </p:sp>
     </p:spTree>
     <p:extLst>
       <p:ext uri="{BB962C8B-B14F-4D97-AF65-F5344CB8AC3E}">
         <p14:creationId xmlns:p14="http://schemas.microsoft.com/office/powerpoint/2010/main" val="3374592240"/>
+      </p:ext>
+    </p:extLst>
+  </p:cSld>
+  <p:clrMapOvr>
+    <a:masterClrMapping/>
+  </p:clrMapOvr>
+</p:sld>
+</file>
+
+<file path=ppt/slides/slide5.xml><?xml version="1.0" encoding="utf-8"?>
+<p:sld xmlns:a="http://schemas.openxmlformats.org/drawingml/2006/main" xmlns:r="http://schemas.openxmlformats.org/officeDocument/2006/relationships" xmlns:p="http://schemas.openxmlformats.org/presentationml/2006/main">
+  <p:cSld>
+    <p:spTree>
+      <p:nvGrpSpPr>
+        <p:cNvPr id="1" name=""/>
+        <p:cNvGrpSpPr/>
+        <p:nvPr/>
+      </p:nvGrpSpPr>
+      <p:grpSpPr>
+        <a:xfrm>
+          <a:off x="0" y="0"/>
+          <a:ext cx="0" cy="0"/>
+          <a:chOff x="0" y="0"/>
+          <a:chExt cx="0" cy="0"/>
+        </a:xfrm>
+      </p:grpSpPr>
+      <p:pic>
+        <p:nvPicPr>
+          <p:cNvPr id="3" name="Picture 2">
+            <a:extLst>
+              <a:ext uri="{FF2B5EF4-FFF2-40B4-BE49-F238E27FC236}">
+                <a16:creationId xmlns:a16="http://schemas.microsoft.com/office/drawing/2014/main" id="{DF153BF6-79B3-43B5-A0BF-049E9D9E54A7}"/>
+              </a:ext>
+            </a:extLst>
+          </p:cNvPr>
+          <p:cNvPicPr>
+            <a:picLocks noChangeAspect="1"/>
+          </p:cNvPicPr>
+          <p:nvPr/>
+        </p:nvPicPr>
+        <p:blipFill rotWithShape="1">
+          <a:blip r:embed="rId2">
+            <a:extLst>
+              <a:ext uri="{28A0092B-C50C-407E-A947-70E740481C1C}">
+                <a14:useLocalDpi xmlns:a14="http://schemas.microsoft.com/office/drawing/2010/main" val="0"/>
+              </a:ext>
+            </a:extLst>
+          </a:blip>
+          <a:srcRect l="11776" t="10574" r="9306" b="11024"/>
+          <a:stretch/>
+        </p:blipFill>
+        <p:spPr>
+          <a:xfrm>
+            <a:off x="6260123" y="1266093"/>
+            <a:ext cx="5324251" cy="5289452"/>
+          </a:xfrm>
+          <a:prstGeom prst="rect">
+            <a:avLst/>
+          </a:prstGeom>
+        </p:spPr>
+      </p:pic>
+      <p:pic>
+        <p:nvPicPr>
+          <p:cNvPr id="5" name="Picture 4">
+            <a:extLst>
+              <a:ext uri="{FF2B5EF4-FFF2-40B4-BE49-F238E27FC236}">
+                <a16:creationId xmlns:a16="http://schemas.microsoft.com/office/drawing/2014/main" id="{CB45506E-26BD-4A06-8BCD-8A5177A378E2}"/>
+              </a:ext>
+            </a:extLst>
+          </p:cNvPr>
+          <p:cNvPicPr>
+            <a:picLocks noChangeAspect="1"/>
+          </p:cNvPicPr>
+          <p:nvPr/>
+        </p:nvPicPr>
+        <p:blipFill rotWithShape="1">
+          <a:blip r:embed="rId3">
+            <a:extLst>
+              <a:ext uri="{28A0092B-C50C-407E-A947-70E740481C1C}">
+                <a14:useLocalDpi xmlns:a14="http://schemas.microsoft.com/office/drawing/2010/main" val="0"/>
+              </a:ext>
+            </a:extLst>
+          </a:blip>
+          <a:srcRect l="11300" t="11077" r="8291" b="11796"/>
+          <a:stretch/>
+        </p:blipFill>
+        <p:spPr>
+          <a:xfrm>
+            <a:off x="858129" y="784273"/>
+            <a:ext cx="3024554" cy="5802205"/>
+          </a:xfrm>
+          <a:prstGeom prst="rect">
+            <a:avLst/>
+          </a:prstGeom>
+        </p:spPr>
+      </p:pic>
+      <p:sp>
+        <p:nvSpPr>
+          <p:cNvPr id="6" name="TextBox 5">
+            <a:extLst>
+              <a:ext uri="{FF2B5EF4-FFF2-40B4-BE49-F238E27FC236}">
+                <a16:creationId xmlns:a16="http://schemas.microsoft.com/office/drawing/2014/main" id="{7A8DEA36-A431-4E66-95D8-C203D32F97F5}"/>
+              </a:ext>
+            </a:extLst>
+          </p:cNvPr>
+          <p:cNvSpPr txBox="1"/>
+          <p:nvPr/>
+        </p:nvSpPr>
+        <p:spPr>
+          <a:xfrm>
+            <a:off x="1153551" y="342983"/>
+            <a:ext cx="2729132" cy="369332"/>
+          </a:xfrm>
+          <a:prstGeom prst="rect">
+            <a:avLst/>
+          </a:prstGeom>
+          <a:noFill/>
+        </p:spPr>
+        <p:txBody>
+          <a:bodyPr wrap="square" rtlCol="0">
+            <a:spAutoFit/>
+          </a:bodyPr>
+          <a:lstStyle/>
+          <a:p>
+            <a:r>
+              <a:rPr lang="en-GB" dirty="0"/>
+              <a:t>1</a:t>
+            </a:r>
+            <a:r>
+              <a:rPr lang="en-GB" baseline="30000" dirty="0"/>
+              <a:t>st</a:t>
+            </a:r>
+            <a:r>
+              <a:rPr lang="en-GB" dirty="0"/>
+              <a:t> layer activations</a:t>
+            </a:r>
+          </a:p>
+        </p:txBody>
+      </p:sp>
+      <p:sp>
+        <p:nvSpPr>
+          <p:cNvPr id="7" name="TextBox 6">
+            <a:extLst>
+              <a:ext uri="{FF2B5EF4-FFF2-40B4-BE49-F238E27FC236}">
+                <a16:creationId xmlns:a16="http://schemas.microsoft.com/office/drawing/2014/main" id="{63F0D41E-535C-4573-98B2-ED311E0E4637}"/>
+              </a:ext>
+            </a:extLst>
+          </p:cNvPr>
+          <p:cNvSpPr txBox="1"/>
+          <p:nvPr/>
+        </p:nvSpPr>
+        <p:spPr>
+          <a:xfrm>
+            <a:off x="7397262" y="342983"/>
+            <a:ext cx="2729132" cy="369332"/>
+          </a:xfrm>
+          <a:prstGeom prst="rect">
+            <a:avLst/>
+          </a:prstGeom>
+          <a:noFill/>
+        </p:spPr>
+        <p:txBody>
+          <a:bodyPr wrap="square" rtlCol="0">
+            <a:spAutoFit/>
+          </a:bodyPr>
+          <a:lstStyle/>
+          <a:p>
+            <a:r>
+              <a:rPr lang="en-GB" dirty="0"/>
+              <a:t>2nd layer activations</a:t>
+            </a:r>
+          </a:p>
+        </p:txBody>
+      </p:sp>
+      <p:sp>
+        <p:nvSpPr>
+          <p:cNvPr id="8" name="TextBox 7">
+            <a:extLst>
+              <a:ext uri="{FF2B5EF4-FFF2-40B4-BE49-F238E27FC236}">
+                <a16:creationId xmlns:a16="http://schemas.microsoft.com/office/drawing/2014/main" id="{29E4150E-7532-4CDF-9D3B-F540C3B02DE7}"/>
+              </a:ext>
+            </a:extLst>
+          </p:cNvPr>
+          <p:cNvSpPr txBox="1"/>
+          <p:nvPr/>
+        </p:nvSpPr>
+        <p:spPr>
+          <a:xfrm>
+            <a:off x="4346917" y="2274838"/>
+            <a:ext cx="1491175" cy="2308324"/>
+          </a:xfrm>
+          <a:prstGeom prst="rect">
+            <a:avLst/>
+          </a:prstGeom>
+          <a:noFill/>
+        </p:spPr>
+        <p:txBody>
+          <a:bodyPr wrap="square" rtlCol="0">
+            <a:spAutoFit/>
+          </a:bodyPr>
+          <a:lstStyle/>
+          <a:p>
+            <a:pPr algn="ctr"/>
+            <a:r>
+              <a:rPr lang="en-GB" dirty="0"/>
+              <a:t>Feature maps from convolutional layers from network trained on 100 classes from scratch</a:t>
+            </a:r>
+          </a:p>
+        </p:txBody>
+      </p:sp>
+      <p:sp>
+        <p:nvSpPr>
+          <p:cNvPr id="2" name="TextBox 1">
+            <a:extLst>
+              <a:ext uri="{FF2B5EF4-FFF2-40B4-BE49-F238E27FC236}">
+                <a16:creationId xmlns:a16="http://schemas.microsoft.com/office/drawing/2014/main" id="{20E7192E-8B00-4D8A-A9B6-D981E08321DC}"/>
+              </a:ext>
+            </a:extLst>
+          </p:cNvPr>
+          <p:cNvSpPr txBox="1"/>
+          <p:nvPr/>
+        </p:nvSpPr>
+        <p:spPr>
+          <a:xfrm>
+            <a:off x="4195595" y="5189838"/>
+            <a:ext cx="1235675" cy="369332"/>
+          </a:xfrm>
+          <a:prstGeom prst="rect">
+            <a:avLst/>
+          </a:prstGeom>
+          <a:noFill/>
+        </p:spPr>
+        <p:txBody>
+          <a:bodyPr wrap="square" rtlCol="0">
+            <a:spAutoFit/>
+          </a:bodyPr>
+          <a:lstStyle/>
+          <a:p>
+            <a:r>
+              <a:rPr lang="en-GB" dirty="0">
+                <a:solidFill>
+                  <a:srgbClr val="FF0000"/>
+                </a:solidFill>
+              </a:rPr>
+              <a:t>PRINT</a:t>
+            </a:r>
+          </a:p>
+        </p:txBody>
+      </p:sp>
+    </p:spTree>
+    <p:extLst>
+      <p:ext uri="{BB962C8B-B14F-4D97-AF65-F5344CB8AC3E}">
+        <p14:creationId xmlns:p14="http://schemas.microsoft.com/office/powerpoint/2010/main" val="2150774575"/>
       </p:ext>
     </p:extLst>
   </p:cSld>

</xml_diff>

<commit_message>
added slide for references
</commit_message>
<xml_diff>
--- a/Compiled graphs.pptx
+++ b/Compiled graphs.pptx
@@ -5,7 +5,7 @@
     <p:sldMasterId id="2147483648" r:id="rId1"/>
   </p:sldMasterIdLst>
   <p:notesMasterIdLst>
-    <p:notesMasterId r:id="rId7"/>
+    <p:notesMasterId r:id="rId8"/>
   </p:notesMasterIdLst>
   <p:sldIdLst>
     <p:sldId id="257" r:id="rId2"/>
@@ -13,6 +13,7 @@
     <p:sldId id="259" r:id="rId4"/>
     <p:sldId id="260" r:id="rId5"/>
     <p:sldId id="261" r:id="rId6"/>
+    <p:sldId id="262" r:id="rId7"/>
   </p:sldIdLst>
   <p:sldSz cx="12192000" cy="6858000"/>
   <p:notesSz cx="6858000" cy="9144000"/>
@@ -188,7 +189,7 @@
   <pc:docChgLst>
     <pc:chgData name="elliot kerman" userId="e77916c079d5c398" providerId="LiveId" clId="{8DA0BB2C-F3B6-45F5-81AB-27FD8BE22616}"/>
     <pc:docChg chg="undo addSld modSld sldOrd">
-      <pc:chgData name="elliot kerman" userId="e77916c079d5c398" providerId="LiveId" clId="{8DA0BB2C-F3B6-45F5-81AB-27FD8BE22616}" dt="2018-03-13T10:00:16.227" v="159"/>
+      <pc:chgData name="elliot kerman" userId="e77916c079d5c398" providerId="LiveId" clId="{8DA0BB2C-F3B6-45F5-81AB-27FD8BE22616}" dt="2018-03-13T10:04:59.554" v="190" actId="20577"/>
       <pc:docMkLst>
         <pc:docMk/>
       </pc:docMkLst>
@@ -261,6 +262,29 @@
             <ac:picMk id="5" creationId="{CB45506E-26BD-4A06-8BCD-8A5177A378E2}"/>
           </ac:picMkLst>
         </pc:picChg>
+      </pc:sldChg>
+      <pc:sldChg chg="addSp modSp add ord">
+        <pc:chgData name="elliot kerman" userId="e77916c079d5c398" providerId="LiveId" clId="{8DA0BB2C-F3B6-45F5-81AB-27FD8BE22616}" dt="2018-03-13T10:04:59.554" v="190" actId="20577"/>
+        <pc:sldMkLst>
+          <pc:docMk/>
+          <pc:sldMk cId="1231363515" sldId="262"/>
+        </pc:sldMkLst>
+        <pc:spChg chg="add mod">
+          <ac:chgData name="elliot kerman" userId="e77916c079d5c398" providerId="LiveId" clId="{8DA0BB2C-F3B6-45F5-81AB-27FD8BE22616}" dt="2018-03-13T10:04:14.190" v="172" actId="20577"/>
+          <ac:spMkLst>
+            <pc:docMk/>
+            <pc:sldMk cId="1231363515" sldId="262"/>
+            <ac:spMk id="2" creationId="{3B6B9253-75BD-490E-AAE3-AA5A1A8EDCEC}"/>
+          </ac:spMkLst>
+        </pc:spChg>
+        <pc:spChg chg="add mod">
+          <ac:chgData name="elliot kerman" userId="e77916c079d5c398" providerId="LiveId" clId="{8DA0BB2C-F3B6-45F5-81AB-27FD8BE22616}" dt="2018-03-13T10:04:59.554" v="190" actId="20577"/>
+          <ac:spMkLst>
+            <pc:docMk/>
+            <pc:sldMk cId="1231363515" sldId="262"/>
+            <ac:spMk id="3" creationId="{D3DAF75E-1D02-47B6-B0DD-79C125EB3B45}"/>
+          </ac:spMkLst>
+        </pc:spChg>
       </pc:sldChg>
     </pc:docChg>
   </pc:docChgLst>
@@ -5571,6 +5595,124 @@
     <p:extLst>
       <p:ext uri="{BB962C8B-B14F-4D97-AF65-F5344CB8AC3E}">
         <p14:creationId xmlns:p14="http://schemas.microsoft.com/office/powerpoint/2010/main" val="2150774575"/>
+      </p:ext>
+    </p:extLst>
+  </p:cSld>
+  <p:clrMapOvr>
+    <a:masterClrMapping/>
+  </p:clrMapOvr>
+</p:sld>
+</file>
+
+<file path=ppt/slides/slide6.xml><?xml version="1.0" encoding="utf-8"?>
+<p:sld xmlns:a="http://schemas.openxmlformats.org/drawingml/2006/main" xmlns:r="http://schemas.openxmlformats.org/officeDocument/2006/relationships" xmlns:p="http://schemas.openxmlformats.org/presentationml/2006/main">
+  <p:cSld>
+    <p:spTree>
+      <p:nvGrpSpPr>
+        <p:cNvPr id="1" name=""/>
+        <p:cNvGrpSpPr/>
+        <p:nvPr/>
+      </p:nvGrpSpPr>
+      <p:grpSpPr>
+        <a:xfrm>
+          <a:off x="0" y="0"/>
+          <a:ext cx="0" cy="0"/>
+          <a:chOff x="0" y="0"/>
+          <a:chExt cx="0" cy="0"/>
+        </a:xfrm>
+      </p:grpSpPr>
+      <p:sp>
+        <p:nvSpPr>
+          <p:cNvPr id="2" name="TextBox 1">
+            <a:extLst>
+              <a:ext uri="{FF2B5EF4-FFF2-40B4-BE49-F238E27FC236}">
+                <a16:creationId xmlns:a16="http://schemas.microsoft.com/office/drawing/2014/main" id="{3B6B9253-75BD-490E-AAE3-AA5A1A8EDCEC}"/>
+              </a:ext>
+            </a:extLst>
+          </p:cNvPr>
+          <p:cNvSpPr txBox="1"/>
+          <p:nvPr/>
+        </p:nvSpPr>
+        <p:spPr>
+          <a:xfrm>
+            <a:off x="3941805" y="543697"/>
+            <a:ext cx="3323968" cy="369332"/>
+          </a:xfrm>
+          <a:prstGeom prst="rect">
+            <a:avLst/>
+          </a:prstGeom>
+          <a:noFill/>
+        </p:spPr>
+        <p:txBody>
+          <a:bodyPr wrap="square" rtlCol="0">
+            <a:spAutoFit/>
+          </a:bodyPr>
+          <a:lstStyle/>
+          <a:p>
+            <a:r>
+              <a:rPr lang="en-GB" dirty="0"/>
+              <a:t>References</a:t>
+            </a:r>
+          </a:p>
+        </p:txBody>
+      </p:sp>
+      <p:sp>
+        <p:nvSpPr>
+          <p:cNvPr id="3" name="TextBox 2">
+            <a:extLst>
+              <a:ext uri="{FF2B5EF4-FFF2-40B4-BE49-F238E27FC236}">
+                <a16:creationId xmlns:a16="http://schemas.microsoft.com/office/drawing/2014/main" id="{D3DAF75E-1D02-47B6-B0DD-79C125EB3B45}"/>
+              </a:ext>
+            </a:extLst>
+          </p:cNvPr>
+          <p:cNvSpPr txBox="1"/>
+          <p:nvPr/>
+        </p:nvSpPr>
+        <p:spPr>
+          <a:xfrm>
+            <a:off x="729049" y="1186249"/>
+            <a:ext cx="5474043" cy="923330"/>
+          </a:xfrm>
+          <a:prstGeom prst="rect">
+            <a:avLst/>
+          </a:prstGeom>
+          <a:noFill/>
+        </p:spPr>
+        <p:txBody>
+          <a:bodyPr wrap="square" rtlCol="0">
+            <a:spAutoFit/>
+          </a:bodyPr>
+          <a:lstStyle/>
+          <a:p>
+            <a:r>
+              <a:rPr lang="en-GB">
+                <a:hlinkClick r:id="rId2"/>
+              </a:rPr>
+              <a:t>Feature maps</a:t>
+            </a:r>
+          </a:p>
+          <a:p>
+            <a:pPr marL="285750" indent="-285750">
+              <a:buFont typeface="Arial" panose="020B0604020202020204" pitchFamily="34" charset="0"/>
+              <a:buChar char="•"/>
+            </a:pPr>
+            <a:r>
+              <a:rPr lang="en-GB" dirty="0">
+                <a:hlinkClick r:id="rId2"/>
+              </a:rPr>
+              <a:t>https://arxiv.org/pdf/1507.02313.pdf</a:t>
+            </a:r>
+            <a:endParaRPr lang="en-GB" dirty="0"/>
+          </a:p>
+          <a:p>
+            <a:endParaRPr lang="en-GB" dirty="0"/>
+          </a:p>
+        </p:txBody>
+      </p:sp>
+    </p:spTree>
+    <p:extLst>
+      <p:ext uri="{BB962C8B-B14F-4D97-AF65-F5344CB8AC3E}">
+        <p14:creationId xmlns:p14="http://schemas.microsoft.com/office/powerpoint/2010/main" val="1231363515"/>
       </p:ext>
     </p:extLst>
   </p:cSld>

</xml_diff>

<commit_message>
Small changes to compiled graphs
</commit_message>
<xml_diff>
--- a/Compiled graphs.pptx
+++ b/Compiled graphs.pptx
@@ -120,6 +120,10 @@
 </p:presentation>
 </file>
 
+<file path=ppt/revisionInfo.xml><?xml version="1.0" encoding="utf-8"?>
+<p1510:revInfo xmlns:a="http://schemas.openxmlformats.org/drawingml/2006/main" xmlns:r="http://schemas.openxmlformats.org/officeDocument/2006/relationships" xmlns:p1510="http://schemas.microsoft.com/office/powerpoint/2015/10/main"/>
+</file>
+
 <file path=ppt/changesInfos/changesInfo1.xml><?xml version="1.0" encoding="utf-8"?>
 <pc:chgInfo xmlns:a="http://schemas.openxmlformats.org/drawingml/2006/main" xmlns:r="http://schemas.openxmlformats.org/officeDocument/2006/relationships" xmlns:ac="http://schemas.microsoft.com/office/drawing/2013/main/command" xmlns:pc="http://schemas.microsoft.com/office/powerpoint/2013/main/command">
   <pc:docChgLst>
@@ -209,13 +213,13 @@
         </pc:spChg>
       </pc:sldChg>
       <pc:sldChg chg="addSp modSp add ord">
-        <pc:chgData name="elliot kerman" userId="e77916c079d5c398" providerId="LiveId" clId="{8DA0BB2C-F3B6-45F5-81AB-27FD8BE22616}" dt="2018-03-13T10:00:16.227" v="159"/>
+        <pc:chgData name="elliot kerman" userId="e77916c079d5c398" providerId="LiveId" clId="{8DA0BB2C-F3B6-45F5-81AB-27FD8BE22616}" dt="2018-03-13T10:00:16.227" v="159" actId="20577"/>
         <pc:sldMkLst>
           <pc:docMk/>
           <pc:sldMk cId="2150774575" sldId="261"/>
         </pc:sldMkLst>
         <pc:spChg chg="add mod">
-          <ac:chgData name="elliot kerman" userId="e77916c079d5c398" providerId="LiveId" clId="{8DA0BB2C-F3B6-45F5-81AB-27FD8BE22616}" dt="2018-03-13T09:59:41.213" v="156"/>
+          <ac:chgData name="elliot kerman" userId="e77916c079d5c398" providerId="LiveId" clId="{8DA0BB2C-F3B6-45F5-81AB-27FD8BE22616}" dt="2018-03-13T09:59:41.213" v="156" actId="20577"/>
           <ac:spMkLst>
             <pc:docMk/>
             <pc:sldMk cId="2150774575" sldId="261"/>
@@ -4558,80 +4562,101 @@
           </a:p>
         </p:txBody>
       </p:sp>
-      <p:pic>
-        <p:nvPicPr>
-          <p:cNvPr id="6" name="Picture 5">
-            <a:extLst>
-              <a:ext uri="{FF2B5EF4-FFF2-40B4-BE49-F238E27FC236}">
-                <a16:creationId xmlns:a16="http://schemas.microsoft.com/office/drawing/2014/main" id="{B55AF439-76D2-498B-826D-0279F0C6118D}"/>
-              </a:ext>
-            </a:extLst>
-          </p:cNvPr>
-          <p:cNvPicPr>
-            <a:picLocks noChangeAspect="1"/>
-          </p:cNvPicPr>
+      <p:grpSp>
+        <p:nvGrpSpPr>
+          <p:cNvPr id="2" name="Group 1">
+            <a:extLst>
+              <a:ext uri="{FF2B5EF4-FFF2-40B4-BE49-F238E27FC236}">
+                <a16:creationId xmlns:a16="http://schemas.microsoft.com/office/drawing/2014/main" id="{AA5091FF-E41A-4508-B7F6-CBA354AB2A7C}"/>
+              </a:ext>
+            </a:extLst>
+          </p:cNvPr>
+          <p:cNvGrpSpPr/>
           <p:nvPr/>
-        </p:nvPicPr>
-        <p:blipFill>
-          <a:blip r:embed="rId5">
-            <a:extLst>
-              <a:ext uri="{28A0092B-C50C-407E-A947-70E740481C1C}">
-                <a14:useLocalDpi xmlns:a14="http://schemas.microsoft.com/office/drawing/2010/main" val="0"/>
-              </a:ext>
-            </a:extLst>
-          </a:blip>
-          <a:stretch>
-            <a:fillRect/>
-          </a:stretch>
-        </p:blipFill>
-        <p:spPr>
-          <a:xfrm>
-            <a:off x="6187271" y="3436131"/>
-            <a:ext cx="5132804" cy="3421869"/>
-          </a:xfrm>
-          <a:prstGeom prst="rect">
-            <a:avLst/>
-          </a:prstGeom>
-        </p:spPr>
-      </p:pic>
-      <p:sp>
-        <p:nvSpPr>
-          <p:cNvPr id="15" name="TextBox 14">
-            <a:extLst>
-              <a:ext uri="{FF2B5EF4-FFF2-40B4-BE49-F238E27FC236}">
-                <a16:creationId xmlns:a16="http://schemas.microsoft.com/office/drawing/2014/main" id="{5156B7B3-92B6-46D0-B128-0F02A35B7C93}"/>
-              </a:ext>
-            </a:extLst>
-          </p:cNvPr>
-          <p:cNvSpPr txBox="1"/>
-          <p:nvPr/>
-        </p:nvSpPr>
-        <p:spPr>
+        </p:nvGrpSpPr>
+        <p:grpSpPr>
           <a:xfrm>
             <a:off x="6098163" y="3436131"/>
-            <a:ext cx="5311019" cy="369332"/>
+            <a:ext cx="5311019" cy="3421869"/>
+            <a:chOff x="6098163" y="3436131"/>
+            <a:chExt cx="5311019" cy="3421869"/>
           </a:xfrm>
-          <a:prstGeom prst="rect">
-            <a:avLst/>
-          </a:prstGeom>
-          <a:solidFill>
-            <a:schemeClr val="bg1"/>
-          </a:solidFill>
-        </p:spPr>
-        <p:txBody>
-          <a:bodyPr wrap="square" rtlCol="0">
-            <a:spAutoFit/>
-          </a:bodyPr>
-          <a:lstStyle/>
-          <a:p>
-            <a:pPr algn="ctr"/>
-            <a:r>
-              <a:rPr lang="en-GB" dirty="0"/>
-              <a:t>Advanced normalisation (and shuffled test data)</a:t>
-            </a:r>
-          </a:p>
-        </p:txBody>
-      </p:sp>
+        </p:grpSpPr>
+        <p:pic>
+          <p:nvPicPr>
+            <p:cNvPr id="6" name="Picture 5">
+              <a:extLst>
+                <a:ext uri="{FF2B5EF4-FFF2-40B4-BE49-F238E27FC236}">
+                  <a16:creationId xmlns:a16="http://schemas.microsoft.com/office/drawing/2014/main" id="{B55AF439-76D2-498B-826D-0279F0C6118D}"/>
+                </a:ext>
+              </a:extLst>
+            </p:cNvPr>
+            <p:cNvPicPr>
+              <a:picLocks noChangeAspect="1"/>
+            </p:cNvPicPr>
+            <p:nvPr/>
+          </p:nvPicPr>
+          <p:blipFill>
+            <a:blip r:embed="rId5">
+              <a:extLst>
+                <a:ext uri="{28A0092B-C50C-407E-A947-70E740481C1C}">
+                  <a14:useLocalDpi xmlns:a14="http://schemas.microsoft.com/office/drawing/2010/main" val="0"/>
+                </a:ext>
+              </a:extLst>
+            </a:blip>
+            <a:stretch>
+              <a:fillRect/>
+            </a:stretch>
+          </p:blipFill>
+          <p:spPr>
+            <a:xfrm>
+              <a:off x="6187271" y="3436131"/>
+              <a:ext cx="5132804" cy="3421869"/>
+            </a:xfrm>
+            <a:prstGeom prst="rect">
+              <a:avLst/>
+            </a:prstGeom>
+          </p:spPr>
+        </p:pic>
+        <p:sp>
+          <p:nvSpPr>
+            <p:cNvPr id="15" name="TextBox 14">
+              <a:extLst>
+                <a:ext uri="{FF2B5EF4-FFF2-40B4-BE49-F238E27FC236}">
+                  <a16:creationId xmlns:a16="http://schemas.microsoft.com/office/drawing/2014/main" id="{5156B7B3-92B6-46D0-B128-0F02A35B7C93}"/>
+                </a:ext>
+              </a:extLst>
+            </p:cNvPr>
+            <p:cNvSpPr txBox="1"/>
+            <p:nvPr/>
+          </p:nvSpPr>
+          <p:spPr>
+            <a:xfrm>
+              <a:off x="6098163" y="3436131"/>
+              <a:ext cx="5311019" cy="369332"/>
+            </a:xfrm>
+            <a:prstGeom prst="rect">
+              <a:avLst/>
+            </a:prstGeom>
+            <a:solidFill>
+              <a:schemeClr val="bg1"/>
+            </a:solidFill>
+          </p:spPr>
+          <p:txBody>
+            <a:bodyPr wrap="square" rtlCol="0">
+              <a:spAutoFit/>
+            </a:bodyPr>
+            <a:lstStyle/>
+            <a:p>
+              <a:pPr algn="ctr"/>
+              <a:r>
+                <a:rPr lang="en-GB" dirty="0"/>
+                <a:t>Advanced normalisation (and shuffled test data)</a:t>
+              </a:r>
+            </a:p>
+          </p:txBody>
+        </p:sp>
+      </p:grpSp>
     </p:spTree>
     <p:extLst>
       <p:ext uri="{BB962C8B-B14F-4D97-AF65-F5344CB8AC3E}">
@@ -5635,8 +5660,8 @@
         </p:nvSpPr>
         <p:spPr>
           <a:xfrm>
-            <a:off x="3941805" y="543697"/>
-            <a:ext cx="3323968" cy="369332"/>
+            <a:off x="5016842" y="284005"/>
+            <a:ext cx="3323968" cy="461665"/>
           </a:xfrm>
           <a:prstGeom prst="rect">
             <a:avLst/>
@@ -5650,7 +5675,7 @@
           <a:lstStyle/>
           <a:p>
             <a:r>
-              <a:rPr lang="en-GB" dirty="0"/>
+              <a:rPr lang="en-GB" sz="2400" b="1" dirty="0"/>
               <a:t>References</a:t>
             </a:r>
           </a:p>
@@ -5685,11 +5710,262 @@
           <a:lstStyle/>
           <a:p>
             <a:r>
-              <a:rPr lang="en-GB">
+              <a:rPr lang="en-GB" dirty="0"/>
+              <a:t>Feature maps</a:t>
+            </a:r>
+            <a:endParaRPr lang="en-GB" dirty="0">
+              <a:hlinkClick r:id="rId2"/>
+            </a:endParaRPr>
+          </a:p>
+          <a:p>
+            <a:pPr marL="285750" indent="-285750">
+              <a:buFont typeface="Arial" panose="020B0604020202020204" pitchFamily="34" charset="0"/>
+              <a:buChar char="•"/>
+            </a:pPr>
+            <a:r>
+              <a:rPr lang="en-GB" dirty="0">
                 <a:hlinkClick r:id="rId2"/>
               </a:rPr>
-              <a:t>Feature maps</a:t>
-            </a:r>
+              <a:t>https://arxiv.org/pdf/1507.02313.pdf</a:t>
+            </a:r>
+            <a:endParaRPr lang="en-GB" dirty="0"/>
+          </a:p>
+          <a:p>
+            <a:endParaRPr lang="en-GB" dirty="0"/>
+          </a:p>
+        </p:txBody>
+      </p:sp>
+      <p:sp>
+        <p:nvSpPr>
+          <p:cNvPr id="4" name="TextBox 3">
+            <a:extLst>
+              <a:ext uri="{FF2B5EF4-FFF2-40B4-BE49-F238E27FC236}">
+                <a16:creationId xmlns:a16="http://schemas.microsoft.com/office/drawing/2014/main" id="{4325F775-FCB3-417E-A2D5-C3695AE14043}"/>
+              </a:ext>
+            </a:extLst>
+          </p:cNvPr>
+          <p:cNvSpPr txBox="1"/>
+          <p:nvPr/>
+        </p:nvSpPr>
+        <p:spPr>
+          <a:xfrm>
+            <a:off x="5603789" y="1046418"/>
+            <a:ext cx="5474043" cy="4801314"/>
+          </a:xfrm>
+          <a:prstGeom prst="rect">
+            <a:avLst/>
+          </a:prstGeom>
+          <a:noFill/>
+        </p:spPr>
+        <p:txBody>
+          <a:bodyPr wrap="square" rtlCol="0">
+            <a:spAutoFit/>
+          </a:bodyPr>
+          <a:lstStyle/>
+          <a:p>
+            <a:r>
+              <a:rPr lang="en-GB" dirty="0"/>
+              <a:t>GANs:</a:t>
+            </a:r>
+          </a:p>
+          <a:p>
+            <a:pPr marL="285750" indent="-285750">
+              <a:buFont typeface="Arial" panose="020B0604020202020204" pitchFamily="34" charset="0"/>
+              <a:buChar char="•"/>
+            </a:pPr>
+            <a:r>
+              <a:rPr lang="en-GB" dirty="0"/>
+              <a:t>Overview of GANs: </a:t>
+            </a:r>
+            <a:r>
+              <a:rPr lang="en-GB" dirty="0">
+                <a:hlinkClick r:id="rId3"/>
+              </a:rPr>
+              <a:t>https://arxiv.org/pdf/1710.07035.pdf</a:t>
+            </a:r>
+            <a:endParaRPr lang="en-GB" dirty="0"/>
+          </a:p>
+          <a:p>
+            <a:pPr marL="285750" indent="-285750">
+              <a:buFont typeface="Arial" panose="020B0604020202020204" pitchFamily="34" charset="0"/>
+              <a:buChar char="•"/>
+            </a:pPr>
+            <a:r>
+              <a:rPr lang="en-GB" dirty="0"/>
+              <a:t>Face aging with </a:t>
+            </a:r>
+            <a:r>
+              <a:rPr lang="en-GB" dirty="0" err="1"/>
+              <a:t>cGAN</a:t>
+            </a:r>
+            <a:r>
+              <a:rPr lang="en-GB" dirty="0"/>
+              <a:t>: </a:t>
+            </a:r>
+            <a:r>
+              <a:rPr lang="en-GB" dirty="0">
+                <a:hlinkClick r:id="rId4"/>
+              </a:rPr>
+              <a:t>https://arxiv.org/pdf/1702.01983.pdf</a:t>
+            </a:r>
+            <a:endParaRPr lang="en-GB" dirty="0"/>
+          </a:p>
+          <a:p>
+            <a:pPr marL="285750" indent="-285750">
+              <a:buFont typeface="Arial" panose="020B0604020202020204" pitchFamily="34" charset="0"/>
+              <a:buChar char="•"/>
+            </a:pPr>
+            <a:r>
+              <a:rPr lang="en-GB" dirty="0"/>
+              <a:t>Image de-raining with </a:t>
+            </a:r>
+            <a:r>
+              <a:rPr lang="en-GB" dirty="0" err="1"/>
+              <a:t>cGAN</a:t>
+            </a:r>
+            <a:r>
+              <a:rPr lang="en-GB" dirty="0"/>
+              <a:t>: </a:t>
+            </a:r>
+            <a:r>
+              <a:rPr lang="en-GB" dirty="0">
+                <a:hlinkClick r:id="rId5"/>
+              </a:rPr>
+              <a:t>https://arxiv.org/pdf/1701.05957.pdf</a:t>
+            </a:r>
+            <a:endParaRPr lang="en-GB" dirty="0"/>
+          </a:p>
+          <a:p>
+            <a:pPr marL="285750" indent="-285750">
+              <a:buFont typeface="Arial" panose="020B0604020202020204" pitchFamily="34" charset="0"/>
+              <a:buChar char="•"/>
+            </a:pPr>
+            <a:r>
+              <a:rPr lang="en-GB" dirty="0"/>
+              <a:t>Original GAN paper: </a:t>
+            </a:r>
+            <a:r>
+              <a:rPr lang="en-GB" dirty="0">
+                <a:hlinkClick r:id="rId6"/>
+              </a:rPr>
+              <a:t>http://papers.nips.cc/paper/5423-generative-adversarial-nets.pdf</a:t>
+            </a:r>
+            <a:endParaRPr lang="en-GB" dirty="0"/>
+          </a:p>
+          <a:p>
+            <a:pPr marL="285750" indent="-285750">
+              <a:buFont typeface="Arial" panose="020B0604020202020204" pitchFamily="34" charset="0"/>
+              <a:buChar char="•"/>
+            </a:pPr>
+            <a:r>
+              <a:rPr lang="en-GB" dirty="0"/>
+              <a:t>DC-GAN paper: </a:t>
+            </a:r>
+            <a:r>
+              <a:rPr lang="en-GB" dirty="0">
+                <a:hlinkClick r:id="rId7"/>
+              </a:rPr>
+              <a:t>https://arxiv.org/pdf/1511.06434.pdf</a:t>
+            </a:r>
+            <a:endParaRPr lang="en-GB" dirty="0"/>
+          </a:p>
+          <a:p>
+            <a:pPr marL="285750" indent="-285750">
+              <a:buFont typeface="Arial" panose="020B0604020202020204" pitchFamily="34" charset="0"/>
+              <a:buChar char="•"/>
+            </a:pPr>
+            <a:r>
+              <a:rPr lang="en-GB" dirty="0"/>
+              <a:t>ALI (</a:t>
+            </a:r>
+            <a:r>
+              <a:rPr lang="en-GB" dirty="0" err="1"/>
+              <a:t>Adversarially</a:t>
+            </a:r>
+            <a:r>
+              <a:rPr lang="en-GB" dirty="0"/>
+              <a:t> learned inference) model: </a:t>
+            </a:r>
+            <a:r>
+              <a:rPr lang="en-GB" dirty="0">
+                <a:hlinkClick r:id="rId8"/>
+              </a:rPr>
+              <a:t>https://arxiv.org/pdf/1606.00704.pdf</a:t>
+            </a:r>
+            <a:endParaRPr lang="en-GB" dirty="0"/>
+          </a:p>
+          <a:p>
+            <a:pPr marL="285750" indent="-285750">
+              <a:buFont typeface="Arial" panose="020B0604020202020204" pitchFamily="34" charset="0"/>
+              <a:buChar char="•"/>
+            </a:pPr>
+            <a:r>
+              <a:rPr lang="en-GB" dirty="0" err="1"/>
+              <a:t>BiGAN</a:t>
+            </a:r>
+            <a:r>
+              <a:rPr lang="en-GB" dirty="0"/>
+              <a:t> (same as ALI): </a:t>
+            </a:r>
+            <a:r>
+              <a:rPr lang="en-GB" dirty="0">
+                <a:hlinkClick r:id="rId9"/>
+              </a:rPr>
+              <a:t>https://arxiv.org/pdf/1605.09782.pdf</a:t>
+            </a:r>
+            <a:endParaRPr lang="en-GB" dirty="0"/>
+          </a:p>
+          <a:p>
+            <a:pPr marL="285750" indent="-285750">
+              <a:buFont typeface="Arial" panose="020B0604020202020204" pitchFamily="34" charset="0"/>
+              <a:buChar char="•"/>
+            </a:pPr>
+            <a:endParaRPr lang="en-GB" dirty="0"/>
+          </a:p>
+          <a:p>
+            <a:pPr marL="285750" indent="-285750">
+              <a:buFont typeface="Arial" panose="020B0604020202020204" pitchFamily="34" charset="0"/>
+              <a:buChar char="•"/>
+            </a:pPr>
+            <a:endParaRPr lang="en-GB" dirty="0"/>
+          </a:p>
+        </p:txBody>
+      </p:sp>
+      <p:sp>
+        <p:nvSpPr>
+          <p:cNvPr id="5" name="TextBox 4">
+            <a:extLst>
+              <a:ext uri="{FF2B5EF4-FFF2-40B4-BE49-F238E27FC236}">
+                <a16:creationId xmlns:a16="http://schemas.microsoft.com/office/drawing/2014/main" id="{9A69B8FE-CD02-4A70-B110-CAAD16C3D7F4}"/>
+              </a:ext>
+            </a:extLst>
+          </p:cNvPr>
+          <p:cNvSpPr txBox="1"/>
+          <p:nvPr/>
+        </p:nvSpPr>
+        <p:spPr>
+          <a:xfrm>
+            <a:off x="476097" y="5439308"/>
+            <a:ext cx="5474043" cy="923330"/>
+          </a:xfrm>
+          <a:prstGeom prst="rect">
+            <a:avLst/>
+          </a:prstGeom>
+          <a:noFill/>
+        </p:spPr>
+        <p:txBody>
+          <a:bodyPr wrap="square" rtlCol="0">
+            <a:spAutoFit/>
+          </a:bodyPr>
+          <a:lstStyle/>
+          <a:p>
+            <a:r>
+              <a:rPr lang="en-GB" dirty="0"/>
+              <a:t>Notes on online deep learning course</a:t>
+            </a:r>
+            <a:endParaRPr lang="en-GB" dirty="0">
+              <a:hlinkClick r:id="rId2"/>
+            </a:endParaRPr>
           </a:p>
           <a:p>
             <a:pPr marL="285750" indent="-285750">

</xml_diff>

<commit_message>
added feature maps to compiled graphs
</commit_message>
<xml_diff>
--- a/Compiled graphs.pptx
+++ b/Compiled graphs.pptx
@@ -3,17 +3,19 @@
 <p:presentation xmlns:a="http://schemas.openxmlformats.org/drawingml/2006/main" xmlns:r="http://schemas.openxmlformats.org/officeDocument/2006/relationships" xmlns:p="http://schemas.openxmlformats.org/presentationml/2006/main" saveSubsetFonts="1">
   <p:sldMasterIdLst>
     <p:sldMasterId id="2147483648" r:id="rId1"/>
+    <p:sldMasterId id="2147483660" r:id="rId2"/>
   </p:sldMasterIdLst>
   <p:notesMasterIdLst>
-    <p:notesMasterId r:id="rId8"/>
+    <p:notesMasterId r:id="rId10"/>
   </p:notesMasterIdLst>
   <p:sldIdLst>
-    <p:sldId id="257" r:id="rId2"/>
-    <p:sldId id="258" r:id="rId3"/>
-    <p:sldId id="259" r:id="rId4"/>
-    <p:sldId id="260" r:id="rId5"/>
-    <p:sldId id="261" r:id="rId6"/>
-    <p:sldId id="262" r:id="rId7"/>
+    <p:sldId id="257" r:id="rId3"/>
+    <p:sldId id="258" r:id="rId4"/>
+    <p:sldId id="259" r:id="rId5"/>
+    <p:sldId id="260" r:id="rId6"/>
+    <p:sldId id="261" r:id="rId7"/>
+    <p:sldId id="264" r:id="rId8"/>
+    <p:sldId id="262" r:id="rId9"/>
   </p:sldIdLst>
   <p:sldSz cx="12192000" cy="6858000"/>
   <p:notesSz cx="6858000" cy="9144000"/>
@@ -118,10 +120,6 @@
     </p:ext>
   </p:extLst>
 </p:presentation>
-</file>
-
-<file path=ppt/revisionInfo.xml><?xml version="1.0" encoding="utf-8"?>
-<p1510:revInfo xmlns:a="http://schemas.openxmlformats.org/drawingml/2006/main" xmlns:r="http://schemas.openxmlformats.org/officeDocument/2006/relationships" xmlns:p1510="http://schemas.microsoft.com/office/powerpoint/2015/10/main"/>
 </file>
 
 <file path=ppt/changesInfos/changesInfo1.xml><?xml version="1.0" encoding="utf-8"?>
@@ -377,7 +375,7 @@
           <a:p>
             <a:fld id="{1312CFC0-6A39-4A2C-AC24-6061EBE48B82}" type="datetimeFigureOut">
               <a:rPr lang="en-GB" smtClean="0"/>
-              <a:t>13/03/2018</a:t>
+              <a:t>20/03/2018</a:t>
             </a:fld>
             <a:endParaRPr lang="en-GB"/>
           </a:p>
@@ -794,7 +792,7 @@
           <a:p>
             <a:fld id="{F999EE6D-E52B-45B7-B943-4C650C77E21B}" type="datetimeFigureOut">
               <a:rPr lang="en-GB" smtClean="0"/>
-              <a:t>13/03/2018</a:t>
+              <a:t>20/03/2018</a:t>
             </a:fld>
             <a:endParaRPr lang="en-GB"/>
           </a:p>
@@ -994,7 +992,7 @@
           <a:p>
             <a:fld id="{F999EE6D-E52B-45B7-B943-4C650C77E21B}" type="datetimeFigureOut">
               <a:rPr lang="en-GB" smtClean="0"/>
-              <a:t>13/03/2018</a:t>
+              <a:t>20/03/2018</a:t>
             </a:fld>
             <a:endParaRPr lang="en-GB"/>
           </a:p>
@@ -1204,7 +1202,7 @@
           <a:p>
             <a:fld id="{F999EE6D-E52B-45B7-B943-4C650C77E21B}" type="datetimeFigureOut">
               <a:rPr lang="en-GB" smtClean="0"/>
-              <a:t>13/03/2018</a:t>
+              <a:t>20/03/2018</a:t>
             </a:fld>
             <a:endParaRPr lang="en-GB"/>
           </a:p>
@@ -1268,6 +1266,1955 @@
     <p:extLst>
       <p:ext uri="{BB962C8B-B14F-4D97-AF65-F5344CB8AC3E}">
         <p14:creationId xmlns:p14="http://schemas.microsoft.com/office/powerpoint/2010/main" val="1979493009"/>
+      </p:ext>
+    </p:extLst>
+  </p:cSld>
+  <p:clrMapOvr>
+    <a:masterClrMapping/>
+  </p:clrMapOvr>
+</p:sldLayout>
+</file>
+
+<file path=ppt/slideLayouts/slideLayout12.xml><?xml version="1.0" encoding="utf-8"?>
+<p:sldLayout xmlns:a="http://schemas.openxmlformats.org/drawingml/2006/main" xmlns:r="http://schemas.openxmlformats.org/officeDocument/2006/relationships" xmlns:p="http://schemas.openxmlformats.org/presentationml/2006/main" type="title" preserve="1">
+  <p:cSld name="Title Slide">
+    <p:spTree>
+      <p:nvGrpSpPr>
+        <p:cNvPr id="1" name=""/>
+        <p:cNvGrpSpPr/>
+        <p:nvPr/>
+      </p:nvGrpSpPr>
+      <p:grpSpPr>
+        <a:xfrm>
+          <a:off x="0" y="0"/>
+          <a:ext cx="0" cy="0"/>
+          <a:chOff x="0" y="0"/>
+          <a:chExt cx="0" cy="0"/>
+        </a:xfrm>
+      </p:grpSpPr>
+      <p:sp>
+        <p:nvSpPr>
+          <p:cNvPr id="2" name="Title 1">
+            <a:extLst>
+              <a:ext uri="{FF2B5EF4-FFF2-40B4-BE49-F238E27FC236}">
+                <a16:creationId xmlns:a16="http://schemas.microsoft.com/office/drawing/2014/main" id="{56374C8B-A17C-4E31-AB80-9020CD82A20F}"/>
+              </a:ext>
+            </a:extLst>
+          </p:cNvPr>
+          <p:cNvSpPr>
+            <a:spLocks noGrp="1"/>
+          </p:cNvSpPr>
+          <p:nvPr>
+            <p:ph type="ctrTitle"/>
+          </p:nvPr>
+        </p:nvSpPr>
+        <p:spPr>
+          <a:xfrm>
+            <a:off x="1524000" y="1122363"/>
+            <a:ext cx="9144000" cy="2387600"/>
+          </a:xfrm>
+        </p:spPr>
+        <p:txBody>
+          <a:bodyPr anchor="b"/>
+          <a:lstStyle>
+            <a:lvl1pPr algn="ctr">
+              <a:defRPr sz="6000"/>
+            </a:lvl1pPr>
+          </a:lstStyle>
+          <a:p>
+            <a:r>
+              <a:rPr lang="en-US"/>
+              <a:t>Click to edit Master title style</a:t>
+            </a:r>
+            <a:endParaRPr lang="en-GB"/>
+          </a:p>
+        </p:txBody>
+      </p:sp>
+      <p:sp>
+        <p:nvSpPr>
+          <p:cNvPr id="3" name="Subtitle 2">
+            <a:extLst>
+              <a:ext uri="{FF2B5EF4-FFF2-40B4-BE49-F238E27FC236}">
+                <a16:creationId xmlns:a16="http://schemas.microsoft.com/office/drawing/2014/main" id="{4B63A064-FD13-4B88-9424-552815AEFED3}"/>
+              </a:ext>
+            </a:extLst>
+          </p:cNvPr>
+          <p:cNvSpPr>
+            <a:spLocks noGrp="1"/>
+          </p:cNvSpPr>
+          <p:nvPr>
+            <p:ph type="subTitle" idx="1"/>
+          </p:nvPr>
+        </p:nvSpPr>
+        <p:spPr>
+          <a:xfrm>
+            <a:off x="1524000" y="3602038"/>
+            <a:ext cx="9144000" cy="1655762"/>
+          </a:xfrm>
+        </p:spPr>
+        <p:txBody>
+          <a:bodyPr/>
+          <a:lstStyle>
+            <a:lvl1pPr marL="0" indent="0" algn="ctr">
+              <a:buNone/>
+              <a:defRPr sz="2400"/>
+            </a:lvl1pPr>
+            <a:lvl2pPr marL="457200" indent="0" algn="ctr">
+              <a:buNone/>
+              <a:defRPr sz="2000"/>
+            </a:lvl2pPr>
+            <a:lvl3pPr marL="914400" indent="0" algn="ctr">
+              <a:buNone/>
+              <a:defRPr sz="1800"/>
+            </a:lvl3pPr>
+            <a:lvl4pPr marL="1371600" indent="0" algn="ctr">
+              <a:buNone/>
+              <a:defRPr sz="1600"/>
+            </a:lvl4pPr>
+            <a:lvl5pPr marL="1828800" indent="0" algn="ctr">
+              <a:buNone/>
+              <a:defRPr sz="1600"/>
+            </a:lvl5pPr>
+            <a:lvl6pPr marL="2286000" indent="0" algn="ctr">
+              <a:buNone/>
+              <a:defRPr sz="1600"/>
+            </a:lvl6pPr>
+            <a:lvl7pPr marL="2743200" indent="0" algn="ctr">
+              <a:buNone/>
+              <a:defRPr sz="1600"/>
+            </a:lvl7pPr>
+            <a:lvl8pPr marL="3200400" indent="0" algn="ctr">
+              <a:buNone/>
+              <a:defRPr sz="1600"/>
+            </a:lvl8pPr>
+            <a:lvl9pPr marL="3657600" indent="0" algn="ctr">
+              <a:buNone/>
+              <a:defRPr sz="1600"/>
+            </a:lvl9pPr>
+          </a:lstStyle>
+          <a:p>
+            <a:r>
+              <a:rPr lang="en-US"/>
+              <a:t>Click to edit Master subtitle style</a:t>
+            </a:r>
+            <a:endParaRPr lang="en-GB"/>
+          </a:p>
+        </p:txBody>
+      </p:sp>
+      <p:sp>
+        <p:nvSpPr>
+          <p:cNvPr id="4" name="Date Placeholder 3">
+            <a:extLst>
+              <a:ext uri="{FF2B5EF4-FFF2-40B4-BE49-F238E27FC236}">
+                <a16:creationId xmlns:a16="http://schemas.microsoft.com/office/drawing/2014/main" id="{BC59A3DC-D5AB-41D4-BD89-D295D5D4A06F}"/>
+              </a:ext>
+            </a:extLst>
+          </p:cNvPr>
+          <p:cNvSpPr>
+            <a:spLocks noGrp="1"/>
+          </p:cNvSpPr>
+          <p:nvPr>
+            <p:ph type="dt" sz="half" idx="10"/>
+          </p:nvPr>
+        </p:nvSpPr>
+        <p:spPr/>
+        <p:txBody>
+          <a:bodyPr/>
+          <a:lstStyle/>
+          <a:p>
+            <a:fld id="{9C24F874-02A1-48BF-AE54-4A07EBAF6EA2}" type="datetimeFigureOut">
+              <a:rPr lang="en-GB" smtClean="0"/>
+              <a:t>20/03/2018</a:t>
+            </a:fld>
+            <a:endParaRPr lang="en-GB"/>
+          </a:p>
+        </p:txBody>
+      </p:sp>
+      <p:sp>
+        <p:nvSpPr>
+          <p:cNvPr id="5" name="Footer Placeholder 4">
+            <a:extLst>
+              <a:ext uri="{FF2B5EF4-FFF2-40B4-BE49-F238E27FC236}">
+                <a16:creationId xmlns:a16="http://schemas.microsoft.com/office/drawing/2014/main" id="{12BB95E6-B267-4D29-B3BF-746EF570C980}"/>
+              </a:ext>
+            </a:extLst>
+          </p:cNvPr>
+          <p:cNvSpPr>
+            <a:spLocks noGrp="1"/>
+          </p:cNvSpPr>
+          <p:nvPr>
+            <p:ph type="ftr" sz="quarter" idx="11"/>
+          </p:nvPr>
+        </p:nvSpPr>
+        <p:spPr/>
+        <p:txBody>
+          <a:bodyPr/>
+          <a:lstStyle/>
+          <a:p>
+            <a:endParaRPr lang="en-GB"/>
+          </a:p>
+        </p:txBody>
+      </p:sp>
+      <p:sp>
+        <p:nvSpPr>
+          <p:cNvPr id="6" name="Slide Number Placeholder 5">
+            <a:extLst>
+              <a:ext uri="{FF2B5EF4-FFF2-40B4-BE49-F238E27FC236}">
+                <a16:creationId xmlns:a16="http://schemas.microsoft.com/office/drawing/2014/main" id="{28F59548-8F39-45F2-AEDB-2041AFF72270}"/>
+              </a:ext>
+            </a:extLst>
+          </p:cNvPr>
+          <p:cNvSpPr>
+            <a:spLocks noGrp="1"/>
+          </p:cNvSpPr>
+          <p:nvPr>
+            <p:ph type="sldNum" sz="quarter" idx="12"/>
+          </p:nvPr>
+        </p:nvSpPr>
+        <p:spPr/>
+        <p:txBody>
+          <a:bodyPr/>
+          <a:lstStyle/>
+          <a:p>
+            <a:fld id="{9C7D1916-3AD3-4FEC-AEB3-D0E6DB5A64D5}" type="slidenum">
+              <a:rPr lang="en-GB" smtClean="0"/>
+              <a:t>‹#›</a:t>
+            </a:fld>
+            <a:endParaRPr lang="en-GB"/>
+          </a:p>
+        </p:txBody>
+      </p:sp>
+    </p:spTree>
+    <p:extLst>
+      <p:ext uri="{BB962C8B-B14F-4D97-AF65-F5344CB8AC3E}">
+        <p14:creationId xmlns:p14="http://schemas.microsoft.com/office/powerpoint/2010/main" val="4078363842"/>
+      </p:ext>
+    </p:extLst>
+  </p:cSld>
+  <p:clrMapOvr>
+    <a:masterClrMapping/>
+  </p:clrMapOvr>
+</p:sldLayout>
+</file>
+
+<file path=ppt/slideLayouts/slideLayout13.xml><?xml version="1.0" encoding="utf-8"?>
+<p:sldLayout xmlns:a="http://schemas.openxmlformats.org/drawingml/2006/main" xmlns:r="http://schemas.openxmlformats.org/officeDocument/2006/relationships" xmlns:p="http://schemas.openxmlformats.org/presentationml/2006/main" type="obj" preserve="1">
+  <p:cSld name="Title and Content">
+    <p:spTree>
+      <p:nvGrpSpPr>
+        <p:cNvPr id="1" name=""/>
+        <p:cNvGrpSpPr/>
+        <p:nvPr/>
+      </p:nvGrpSpPr>
+      <p:grpSpPr>
+        <a:xfrm>
+          <a:off x="0" y="0"/>
+          <a:ext cx="0" cy="0"/>
+          <a:chOff x="0" y="0"/>
+          <a:chExt cx="0" cy="0"/>
+        </a:xfrm>
+      </p:grpSpPr>
+      <p:sp>
+        <p:nvSpPr>
+          <p:cNvPr id="2" name="Title 1">
+            <a:extLst>
+              <a:ext uri="{FF2B5EF4-FFF2-40B4-BE49-F238E27FC236}">
+                <a16:creationId xmlns:a16="http://schemas.microsoft.com/office/drawing/2014/main" id="{08014273-4F3D-4EE4-9B58-2769BE71FD13}"/>
+              </a:ext>
+            </a:extLst>
+          </p:cNvPr>
+          <p:cNvSpPr>
+            <a:spLocks noGrp="1"/>
+          </p:cNvSpPr>
+          <p:nvPr>
+            <p:ph type="title"/>
+          </p:nvPr>
+        </p:nvSpPr>
+        <p:spPr/>
+        <p:txBody>
+          <a:bodyPr/>
+          <a:lstStyle/>
+          <a:p>
+            <a:r>
+              <a:rPr lang="en-US"/>
+              <a:t>Click to edit Master title style</a:t>
+            </a:r>
+            <a:endParaRPr lang="en-GB"/>
+          </a:p>
+        </p:txBody>
+      </p:sp>
+      <p:sp>
+        <p:nvSpPr>
+          <p:cNvPr id="3" name="Content Placeholder 2">
+            <a:extLst>
+              <a:ext uri="{FF2B5EF4-FFF2-40B4-BE49-F238E27FC236}">
+                <a16:creationId xmlns:a16="http://schemas.microsoft.com/office/drawing/2014/main" id="{7EFC0F42-2515-488E-B1F7-251EBF716B93}"/>
+              </a:ext>
+            </a:extLst>
+          </p:cNvPr>
+          <p:cNvSpPr>
+            <a:spLocks noGrp="1"/>
+          </p:cNvSpPr>
+          <p:nvPr>
+            <p:ph idx="1"/>
+          </p:nvPr>
+        </p:nvSpPr>
+        <p:spPr/>
+        <p:txBody>
+          <a:bodyPr/>
+          <a:lstStyle/>
+          <a:p>
+            <a:pPr lvl="0"/>
+            <a:r>
+              <a:rPr lang="en-US"/>
+              <a:t>Edit Master text styles</a:t>
+            </a:r>
+          </a:p>
+          <a:p>
+            <a:pPr lvl="1"/>
+            <a:r>
+              <a:rPr lang="en-US"/>
+              <a:t>Second level</a:t>
+            </a:r>
+          </a:p>
+          <a:p>
+            <a:pPr lvl="2"/>
+            <a:r>
+              <a:rPr lang="en-US"/>
+              <a:t>Third level</a:t>
+            </a:r>
+          </a:p>
+          <a:p>
+            <a:pPr lvl="3"/>
+            <a:r>
+              <a:rPr lang="en-US"/>
+              <a:t>Fourth level</a:t>
+            </a:r>
+          </a:p>
+          <a:p>
+            <a:pPr lvl="4"/>
+            <a:r>
+              <a:rPr lang="en-US"/>
+              <a:t>Fifth level</a:t>
+            </a:r>
+            <a:endParaRPr lang="en-GB"/>
+          </a:p>
+        </p:txBody>
+      </p:sp>
+      <p:sp>
+        <p:nvSpPr>
+          <p:cNvPr id="4" name="Date Placeholder 3">
+            <a:extLst>
+              <a:ext uri="{FF2B5EF4-FFF2-40B4-BE49-F238E27FC236}">
+                <a16:creationId xmlns:a16="http://schemas.microsoft.com/office/drawing/2014/main" id="{EB704120-10CB-4723-97EA-755B18486C05}"/>
+              </a:ext>
+            </a:extLst>
+          </p:cNvPr>
+          <p:cNvSpPr>
+            <a:spLocks noGrp="1"/>
+          </p:cNvSpPr>
+          <p:nvPr>
+            <p:ph type="dt" sz="half" idx="10"/>
+          </p:nvPr>
+        </p:nvSpPr>
+        <p:spPr/>
+        <p:txBody>
+          <a:bodyPr/>
+          <a:lstStyle/>
+          <a:p>
+            <a:fld id="{9C24F874-02A1-48BF-AE54-4A07EBAF6EA2}" type="datetimeFigureOut">
+              <a:rPr lang="en-GB" smtClean="0"/>
+              <a:t>20/03/2018</a:t>
+            </a:fld>
+            <a:endParaRPr lang="en-GB"/>
+          </a:p>
+        </p:txBody>
+      </p:sp>
+      <p:sp>
+        <p:nvSpPr>
+          <p:cNvPr id="5" name="Footer Placeholder 4">
+            <a:extLst>
+              <a:ext uri="{FF2B5EF4-FFF2-40B4-BE49-F238E27FC236}">
+                <a16:creationId xmlns:a16="http://schemas.microsoft.com/office/drawing/2014/main" id="{1280DE06-979B-4E7B-B4AB-9B4D6FE2647B}"/>
+              </a:ext>
+            </a:extLst>
+          </p:cNvPr>
+          <p:cNvSpPr>
+            <a:spLocks noGrp="1"/>
+          </p:cNvSpPr>
+          <p:nvPr>
+            <p:ph type="ftr" sz="quarter" idx="11"/>
+          </p:nvPr>
+        </p:nvSpPr>
+        <p:spPr/>
+        <p:txBody>
+          <a:bodyPr/>
+          <a:lstStyle/>
+          <a:p>
+            <a:endParaRPr lang="en-GB"/>
+          </a:p>
+        </p:txBody>
+      </p:sp>
+      <p:sp>
+        <p:nvSpPr>
+          <p:cNvPr id="6" name="Slide Number Placeholder 5">
+            <a:extLst>
+              <a:ext uri="{FF2B5EF4-FFF2-40B4-BE49-F238E27FC236}">
+                <a16:creationId xmlns:a16="http://schemas.microsoft.com/office/drawing/2014/main" id="{10DDAC91-D187-46B2-8BE9-C6A574D019F1}"/>
+              </a:ext>
+            </a:extLst>
+          </p:cNvPr>
+          <p:cNvSpPr>
+            <a:spLocks noGrp="1"/>
+          </p:cNvSpPr>
+          <p:nvPr>
+            <p:ph type="sldNum" sz="quarter" idx="12"/>
+          </p:nvPr>
+        </p:nvSpPr>
+        <p:spPr/>
+        <p:txBody>
+          <a:bodyPr/>
+          <a:lstStyle/>
+          <a:p>
+            <a:fld id="{9C7D1916-3AD3-4FEC-AEB3-D0E6DB5A64D5}" type="slidenum">
+              <a:rPr lang="en-GB" smtClean="0"/>
+              <a:t>‹#›</a:t>
+            </a:fld>
+            <a:endParaRPr lang="en-GB"/>
+          </a:p>
+        </p:txBody>
+      </p:sp>
+    </p:spTree>
+    <p:extLst>
+      <p:ext uri="{BB962C8B-B14F-4D97-AF65-F5344CB8AC3E}">
+        <p14:creationId xmlns:p14="http://schemas.microsoft.com/office/powerpoint/2010/main" val="4187686326"/>
+      </p:ext>
+    </p:extLst>
+  </p:cSld>
+  <p:clrMapOvr>
+    <a:masterClrMapping/>
+  </p:clrMapOvr>
+</p:sldLayout>
+</file>
+
+<file path=ppt/slideLayouts/slideLayout14.xml><?xml version="1.0" encoding="utf-8"?>
+<p:sldLayout xmlns:a="http://schemas.openxmlformats.org/drawingml/2006/main" xmlns:r="http://schemas.openxmlformats.org/officeDocument/2006/relationships" xmlns:p="http://schemas.openxmlformats.org/presentationml/2006/main" type="secHead" preserve="1">
+  <p:cSld name="Section Header">
+    <p:spTree>
+      <p:nvGrpSpPr>
+        <p:cNvPr id="1" name=""/>
+        <p:cNvGrpSpPr/>
+        <p:nvPr/>
+      </p:nvGrpSpPr>
+      <p:grpSpPr>
+        <a:xfrm>
+          <a:off x="0" y="0"/>
+          <a:ext cx="0" cy="0"/>
+          <a:chOff x="0" y="0"/>
+          <a:chExt cx="0" cy="0"/>
+        </a:xfrm>
+      </p:grpSpPr>
+      <p:sp>
+        <p:nvSpPr>
+          <p:cNvPr id="2" name="Title 1">
+            <a:extLst>
+              <a:ext uri="{FF2B5EF4-FFF2-40B4-BE49-F238E27FC236}">
+                <a16:creationId xmlns:a16="http://schemas.microsoft.com/office/drawing/2014/main" id="{4376D59D-9CC6-41A6-A21E-D975DA663EF1}"/>
+              </a:ext>
+            </a:extLst>
+          </p:cNvPr>
+          <p:cNvSpPr>
+            <a:spLocks noGrp="1"/>
+          </p:cNvSpPr>
+          <p:nvPr>
+            <p:ph type="title"/>
+          </p:nvPr>
+        </p:nvSpPr>
+        <p:spPr>
+          <a:xfrm>
+            <a:off x="831850" y="1709738"/>
+            <a:ext cx="10515600" cy="2852737"/>
+          </a:xfrm>
+        </p:spPr>
+        <p:txBody>
+          <a:bodyPr anchor="b"/>
+          <a:lstStyle>
+            <a:lvl1pPr>
+              <a:defRPr sz="6000"/>
+            </a:lvl1pPr>
+          </a:lstStyle>
+          <a:p>
+            <a:r>
+              <a:rPr lang="en-US"/>
+              <a:t>Click to edit Master title style</a:t>
+            </a:r>
+            <a:endParaRPr lang="en-GB"/>
+          </a:p>
+        </p:txBody>
+      </p:sp>
+      <p:sp>
+        <p:nvSpPr>
+          <p:cNvPr id="3" name="Text Placeholder 2">
+            <a:extLst>
+              <a:ext uri="{FF2B5EF4-FFF2-40B4-BE49-F238E27FC236}">
+                <a16:creationId xmlns:a16="http://schemas.microsoft.com/office/drawing/2014/main" id="{4217D9F7-BEEB-4967-BDE5-DCB7B8303C42}"/>
+              </a:ext>
+            </a:extLst>
+          </p:cNvPr>
+          <p:cNvSpPr>
+            <a:spLocks noGrp="1"/>
+          </p:cNvSpPr>
+          <p:nvPr>
+            <p:ph type="body" idx="1"/>
+          </p:nvPr>
+        </p:nvSpPr>
+        <p:spPr>
+          <a:xfrm>
+            <a:off x="831850" y="4589463"/>
+            <a:ext cx="10515600" cy="1500187"/>
+          </a:xfrm>
+        </p:spPr>
+        <p:txBody>
+          <a:bodyPr/>
+          <a:lstStyle>
+            <a:lvl1pPr marL="0" indent="0">
+              <a:buNone/>
+              <a:defRPr sz="2400">
+                <a:solidFill>
+                  <a:schemeClr val="tx1">
+                    <a:tint val="75000"/>
+                  </a:schemeClr>
+                </a:solidFill>
+              </a:defRPr>
+            </a:lvl1pPr>
+            <a:lvl2pPr marL="457200" indent="0">
+              <a:buNone/>
+              <a:defRPr sz="2000">
+                <a:solidFill>
+                  <a:schemeClr val="tx1">
+                    <a:tint val="75000"/>
+                  </a:schemeClr>
+                </a:solidFill>
+              </a:defRPr>
+            </a:lvl2pPr>
+            <a:lvl3pPr marL="914400" indent="0">
+              <a:buNone/>
+              <a:defRPr sz="1800">
+                <a:solidFill>
+                  <a:schemeClr val="tx1">
+                    <a:tint val="75000"/>
+                  </a:schemeClr>
+                </a:solidFill>
+              </a:defRPr>
+            </a:lvl3pPr>
+            <a:lvl4pPr marL="1371600" indent="0">
+              <a:buNone/>
+              <a:defRPr sz="1600">
+                <a:solidFill>
+                  <a:schemeClr val="tx1">
+                    <a:tint val="75000"/>
+                  </a:schemeClr>
+                </a:solidFill>
+              </a:defRPr>
+            </a:lvl4pPr>
+            <a:lvl5pPr marL="1828800" indent="0">
+              <a:buNone/>
+              <a:defRPr sz="1600">
+                <a:solidFill>
+                  <a:schemeClr val="tx1">
+                    <a:tint val="75000"/>
+                  </a:schemeClr>
+                </a:solidFill>
+              </a:defRPr>
+            </a:lvl5pPr>
+            <a:lvl6pPr marL="2286000" indent="0">
+              <a:buNone/>
+              <a:defRPr sz="1600">
+                <a:solidFill>
+                  <a:schemeClr val="tx1">
+                    <a:tint val="75000"/>
+                  </a:schemeClr>
+                </a:solidFill>
+              </a:defRPr>
+            </a:lvl6pPr>
+            <a:lvl7pPr marL="2743200" indent="0">
+              <a:buNone/>
+              <a:defRPr sz="1600">
+                <a:solidFill>
+                  <a:schemeClr val="tx1">
+                    <a:tint val="75000"/>
+                  </a:schemeClr>
+                </a:solidFill>
+              </a:defRPr>
+            </a:lvl7pPr>
+            <a:lvl8pPr marL="3200400" indent="0">
+              <a:buNone/>
+              <a:defRPr sz="1600">
+                <a:solidFill>
+                  <a:schemeClr val="tx1">
+                    <a:tint val="75000"/>
+                  </a:schemeClr>
+                </a:solidFill>
+              </a:defRPr>
+            </a:lvl8pPr>
+            <a:lvl9pPr marL="3657600" indent="0">
+              <a:buNone/>
+              <a:defRPr sz="1600">
+                <a:solidFill>
+                  <a:schemeClr val="tx1">
+                    <a:tint val="75000"/>
+                  </a:schemeClr>
+                </a:solidFill>
+              </a:defRPr>
+            </a:lvl9pPr>
+          </a:lstStyle>
+          <a:p>
+            <a:pPr lvl="0"/>
+            <a:r>
+              <a:rPr lang="en-US"/>
+              <a:t>Edit Master text styles</a:t>
+            </a:r>
+          </a:p>
+        </p:txBody>
+      </p:sp>
+      <p:sp>
+        <p:nvSpPr>
+          <p:cNvPr id="4" name="Date Placeholder 3">
+            <a:extLst>
+              <a:ext uri="{FF2B5EF4-FFF2-40B4-BE49-F238E27FC236}">
+                <a16:creationId xmlns:a16="http://schemas.microsoft.com/office/drawing/2014/main" id="{3435BE15-9957-44E8-B446-00E0F504DBA4}"/>
+              </a:ext>
+            </a:extLst>
+          </p:cNvPr>
+          <p:cNvSpPr>
+            <a:spLocks noGrp="1"/>
+          </p:cNvSpPr>
+          <p:nvPr>
+            <p:ph type="dt" sz="half" idx="10"/>
+          </p:nvPr>
+        </p:nvSpPr>
+        <p:spPr/>
+        <p:txBody>
+          <a:bodyPr/>
+          <a:lstStyle/>
+          <a:p>
+            <a:fld id="{9C24F874-02A1-48BF-AE54-4A07EBAF6EA2}" type="datetimeFigureOut">
+              <a:rPr lang="en-GB" smtClean="0"/>
+              <a:t>20/03/2018</a:t>
+            </a:fld>
+            <a:endParaRPr lang="en-GB"/>
+          </a:p>
+        </p:txBody>
+      </p:sp>
+      <p:sp>
+        <p:nvSpPr>
+          <p:cNvPr id="5" name="Footer Placeholder 4">
+            <a:extLst>
+              <a:ext uri="{FF2B5EF4-FFF2-40B4-BE49-F238E27FC236}">
+                <a16:creationId xmlns:a16="http://schemas.microsoft.com/office/drawing/2014/main" id="{A7DAFCC6-CB6C-4D32-9693-71DCCB7F6AEC}"/>
+              </a:ext>
+            </a:extLst>
+          </p:cNvPr>
+          <p:cNvSpPr>
+            <a:spLocks noGrp="1"/>
+          </p:cNvSpPr>
+          <p:nvPr>
+            <p:ph type="ftr" sz="quarter" idx="11"/>
+          </p:nvPr>
+        </p:nvSpPr>
+        <p:spPr/>
+        <p:txBody>
+          <a:bodyPr/>
+          <a:lstStyle/>
+          <a:p>
+            <a:endParaRPr lang="en-GB"/>
+          </a:p>
+        </p:txBody>
+      </p:sp>
+      <p:sp>
+        <p:nvSpPr>
+          <p:cNvPr id="6" name="Slide Number Placeholder 5">
+            <a:extLst>
+              <a:ext uri="{FF2B5EF4-FFF2-40B4-BE49-F238E27FC236}">
+                <a16:creationId xmlns:a16="http://schemas.microsoft.com/office/drawing/2014/main" id="{1FBD2804-29F3-4162-804C-3B9C70E53412}"/>
+              </a:ext>
+            </a:extLst>
+          </p:cNvPr>
+          <p:cNvSpPr>
+            <a:spLocks noGrp="1"/>
+          </p:cNvSpPr>
+          <p:nvPr>
+            <p:ph type="sldNum" sz="quarter" idx="12"/>
+          </p:nvPr>
+        </p:nvSpPr>
+        <p:spPr/>
+        <p:txBody>
+          <a:bodyPr/>
+          <a:lstStyle/>
+          <a:p>
+            <a:fld id="{9C7D1916-3AD3-4FEC-AEB3-D0E6DB5A64D5}" type="slidenum">
+              <a:rPr lang="en-GB" smtClean="0"/>
+              <a:t>‹#›</a:t>
+            </a:fld>
+            <a:endParaRPr lang="en-GB"/>
+          </a:p>
+        </p:txBody>
+      </p:sp>
+    </p:spTree>
+    <p:extLst>
+      <p:ext uri="{BB962C8B-B14F-4D97-AF65-F5344CB8AC3E}">
+        <p14:creationId xmlns:p14="http://schemas.microsoft.com/office/powerpoint/2010/main" val="1248479678"/>
+      </p:ext>
+    </p:extLst>
+  </p:cSld>
+  <p:clrMapOvr>
+    <a:masterClrMapping/>
+  </p:clrMapOvr>
+</p:sldLayout>
+</file>
+
+<file path=ppt/slideLayouts/slideLayout15.xml><?xml version="1.0" encoding="utf-8"?>
+<p:sldLayout xmlns:a="http://schemas.openxmlformats.org/drawingml/2006/main" xmlns:r="http://schemas.openxmlformats.org/officeDocument/2006/relationships" xmlns:p="http://schemas.openxmlformats.org/presentationml/2006/main" type="twoObj" preserve="1">
+  <p:cSld name="Two Content">
+    <p:spTree>
+      <p:nvGrpSpPr>
+        <p:cNvPr id="1" name=""/>
+        <p:cNvGrpSpPr/>
+        <p:nvPr/>
+      </p:nvGrpSpPr>
+      <p:grpSpPr>
+        <a:xfrm>
+          <a:off x="0" y="0"/>
+          <a:ext cx="0" cy="0"/>
+          <a:chOff x="0" y="0"/>
+          <a:chExt cx="0" cy="0"/>
+        </a:xfrm>
+      </p:grpSpPr>
+      <p:sp>
+        <p:nvSpPr>
+          <p:cNvPr id="2" name="Title 1">
+            <a:extLst>
+              <a:ext uri="{FF2B5EF4-FFF2-40B4-BE49-F238E27FC236}">
+                <a16:creationId xmlns:a16="http://schemas.microsoft.com/office/drawing/2014/main" id="{0A955F64-5F43-41AF-B15A-0751000D88E2}"/>
+              </a:ext>
+            </a:extLst>
+          </p:cNvPr>
+          <p:cNvSpPr>
+            <a:spLocks noGrp="1"/>
+          </p:cNvSpPr>
+          <p:nvPr>
+            <p:ph type="title"/>
+          </p:nvPr>
+        </p:nvSpPr>
+        <p:spPr/>
+        <p:txBody>
+          <a:bodyPr/>
+          <a:lstStyle/>
+          <a:p>
+            <a:r>
+              <a:rPr lang="en-US"/>
+              <a:t>Click to edit Master title style</a:t>
+            </a:r>
+            <a:endParaRPr lang="en-GB"/>
+          </a:p>
+        </p:txBody>
+      </p:sp>
+      <p:sp>
+        <p:nvSpPr>
+          <p:cNvPr id="3" name="Content Placeholder 2">
+            <a:extLst>
+              <a:ext uri="{FF2B5EF4-FFF2-40B4-BE49-F238E27FC236}">
+                <a16:creationId xmlns:a16="http://schemas.microsoft.com/office/drawing/2014/main" id="{63219744-EBDB-4212-A966-DDFE05CF409A}"/>
+              </a:ext>
+            </a:extLst>
+          </p:cNvPr>
+          <p:cNvSpPr>
+            <a:spLocks noGrp="1"/>
+          </p:cNvSpPr>
+          <p:nvPr>
+            <p:ph sz="half" idx="1"/>
+          </p:nvPr>
+        </p:nvSpPr>
+        <p:spPr>
+          <a:xfrm>
+            <a:off x="838200" y="1825625"/>
+            <a:ext cx="5181600" cy="4351338"/>
+          </a:xfrm>
+        </p:spPr>
+        <p:txBody>
+          <a:bodyPr/>
+          <a:lstStyle/>
+          <a:p>
+            <a:pPr lvl="0"/>
+            <a:r>
+              <a:rPr lang="en-US"/>
+              <a:t>Edit Master text styles</a:t>
+            </a:r>
+          </a:p>
+          <a:p>
+            <a:pPr lvl="1"/>
+            <a:r>
+              <a:rPr lang="en-US"/>
+              <a:t>Second level</a:t>
+            </a:r>
+          </a:p>
+          <a:p>
+            <a:pPr lvl="2"/>
+            <a:r>
+              <a:rPr lang="en-US"/>
+              <a:t>Third level</a:t>
+            </a:r>
+          </a:p>
+          <a:p>
+            <a:pPr lvl="3"/>
+            <a:r>
+              <a:rPr lang="en-US"/>
+              <a:t>Fourth level</a:t>
+            </a:r>
+          </a:p>
+          <a:p>
+            <a:pPr lvl="4"/>
+            <a:r>
+              <a:rPr lang="en-US"/>
+              <a:t>Fifth level</a:t>
+            </a:r>
+            <a:endParaRPr lang="en-GB"/>
+          </a:p>
+        </p:txBody>
+      </p:sp>
+      <p:sp>
+        <p:nvSpPr>
+          <p:cNvPr id="4" name="Content Placeholder 3">
+            <a:extLst>
+              <a:ext uri="{FF2B5EF4-FFF2-40B4-BE49-F238E27FC236}">
+                <a16:creationId xmlns:a16="http://schemas.microsoft.com/office/drawing/2014/main" id="{65DF55AD-D32E-4DBF-AF8A-C3ECB55CC7F0}"/>
+              </a:ext>
+            </a:extLst>
+          </p:cNvPr>
+          <p:cNvSpPr>
+            <a:spLocks noGrp="1"/>
+          </p:cNvSpPr>
+          <p:nvPr>
+            <p:ph sz="half" idx="2"/>
+          </p:nvPr>
+        </p:nvSpPr>
+        <p:spPr>
+          <a:xfrm>
+            <a:off x="6172200" y="1825625"/>
+            <a:ext cx="5181600" cy="4351338"/>
+          </a:xfrm>
+        </p:spPr>
+        <p:txBody>
+          <a:bodyPr/>
+          <a:lstStyle/>
+          <a:p>
+            <a:pPr lvl="0"/>
+            <a:r>
+              <a:rPr lang="en-US"/>
+              <a:t>Edit Master text styles</a:t>
+            </a:r>
+          </a:p>
+          <a:p>
+            <a:pPr lvl="1"/>
+            <a:r>
+              <a:rPr lang="en-US"/>
+              <a:t>Second level</a:t>
+            </a:r>
+          </a:p>
+          <a:p>
+            <a:pPr lvl="2"/>
+            <a:r>
+              <a:rPr lang="en-US"/>
+              <a:t>Third level</a:t>
+            </a:r>
+          </a:p>
+          <a:p>
+            <a:pPr lvl="3"/>
+            <a:r>
+              <a:rPr lang="en-US"/>
+              <a:t>Fourth level</a:t>
+            </a:r>
+          </a:p>
+          <a:p>
+            <a:pPr lvl="4"/>
+            <a:r>
+              <a:rPr lang="en-US"/>
+              <a:t>Fifth level</a:t>
+            </a:r>
+            <a:endParaRPr lang="en-GB"/>
+          </a:p>
+        </p:txBody>
+      </p:sp>
+      <p:sp>
+        <p:nvSpPr>
+          <p:cNvPr id="5" name="Date Placeholder 4">
+            <a:extLst>
+              <a:ext uri="{FF2B5EF4-FFF2-40B4-BE49-F238E27FC236}">
+                <a16:creationId xmlns:a16="http://schemas.microsoft.com/office/drawing/2014/main" id="{5A18F8F5-31D7-4D9A-8567-8C1024AC868E}"/>
+              </a:ext>
+            </a:extLst>
+          </p:cNvPr>
+          <p:cNvSpPr>
+            <a:spLocks noGrp="1"/>
+          </p:cNvSpPr>
+          <p:nvPr>
+            <p:ph type="dt" sz="half" idx="10"/>
+          </p:nvPr>
+        </p:nvSpPr>
+        <p:spPr/>
+        <p:txBody>
+          <a:bodyPr/>
+          <a:lstStyle/>
+          <a:p>
+            <a:fld id="{9C24F874-02A1-48BF-AE54-4A07EBAF6EA2}" type="datetimeFigureOut">
+              <a:rPr lang="en-GB" smtClean="0"/>
+              <a:t>20/03/2018</a:t>
+            </a:fld>
+            <a:endParaRPr lang="en-GB"/>
+          </a:p>
+        </p:txBody>
+      </p:sp>
+      <p:sp>
+        <p:nvSpPr>
+          <p:cNvPr id="6" name="Footer Placeholder 5">
+            <a:extLst>
+              <a:ext uri="{FF2B5EF4-FFF2-40B4-BE49-F238E27FC236}">
+                <a16:creationId xmlns:a16="http://schemas.microsoft.com/office/drawing/2014/main" id="{91A6E0E1-CE22-4C74-AC8B-939386C71B1A}"/>
+              </a:ext>
+            </a:extLst>
+          </p:cNvPr>
+          <p:cNvSpPr>
+            <a:spLocks noGrp="1"/>
+          </p:cNvSpPr>
+          <p:nvPr>
+            <p:ph type="ftr" sz="quarter" idx="11"/>
+          </p:nvPr>
+        </p:nvSpPr>
+        <p:spPr/>
+        <p:txBody>
+          <a:bodyPr/>
+          <a:lstStyle/>
+          <a:p>
+            <a:endParaRPr lang="en-GB"/>
+          </a:p>
+        </p:txBody>
+      </p:sp>
+      <p:sp>
+        <p:nvSpPr>
+          <p:cNvPr id="7" name="Slide Number Placeholder 6">
+            <a:extLst>
+              <a:ext uri="{FF2B5EF4-FFF2-40B4-BE49-F238E27FC236}">
+                <a16:creationId xmlns:a16="http://schemas.microsoft.com/office/drawing/2014/main" id="{939ED5D0-D600-4A1C-AE96-D57E0FDFFD2F}"/>
+              </a:ext>
+            </a:extLst>
+          </p:cNvPr>
+          <p:cNvSpPr>
+            <a:spLocks noGrp="1"/>
+          </p:cNvSpPr>
+          <p:nvPr>
+            <p:ph type="sldNum" sz="quarter" idx="12"/>
+          </p:nvPr>
+        </p:nvSpPr>
+        <p:spPr/>
+        <p:txBody>
+          <a:bodyPr/>
+          <a:lstStyle/>
+          <a:p>
+            <a:fld id="{9C7D1916-3AD3-4FEC-AEB3-D0E6DB5A64D5}" type="slidenum">
+              <a:rPr lang="en-GB" smtClean="0"/>
+              <a:t>‹#›</a:t>
+            </a:fld>
+            <a:endParaRPr lang="en-GB"/>
+          </a:p>
+        </p:txBody>
+      </p:sp>
+    </p:spTree>
+    <p:extLst>
+      <p:ext uri="{BB962C8B-B14F-4D97-AF65-F5344CB8AC3E}">
+        <p14:creationId xmlns:p14="http://schemas.microsoft.com/office/powerpoint/2010/main" val="553355799"/>
+      </p:ext>
+    </p:extLst>
+  </p:cSld>
+  <p:clrMapOvr>
+    <a:masterClrMapping/>
+  </p:clrMapOvr>
+</p:sldLayout>
+</file>
+
+<file path=ppt/slideLayouts/slideLayout16.xml><?xml version="1.0" encoding="utf-8"?>
+<p:sldLayout xmlns:a="http://schemas.openxmlformats.org/drawingml/2006/main" xmlns:r="http://schemas.openxmlformats.org/officeDocument/2006/relationships" xmlns:p="http://schemas.openxmlformats.org/presentationml/2006/main" type="twoTxTwoObj" preserve="1">
+  <p:cSld name="Comparison">
+    <p:spTree>
+      <p:nvGrpSpPr>
+        <p:cNvPr id="1" name=""/>
+        <p:cNvGrpSpPr/>
+        <p:nvPr/>
+      </p:nvGrpSpPr>
+      <p:grpSpPr>
+        <a:xfrm>
+          <a:off x="0" y="0"/>
+          <a:ext cx="0" cy="0"/>
+          <a:chOff x="0" y="0"/>
+          <a:chExt cx="0" cy="0"/>
+        </a:xfrm>
+      </p:grpSpPr>
+      <p:sp>
+        <p:nvSpPr>
+          <p:cNvPr id="2" name="Title 1">
+            <a:extLst>
+              <a:ext uri="{FF2B5EF4-FFF2-40B4-BE49-F238E27FC236}">
+                <a16:creationId xmlns:a16="http://schemas.microsoft.com/office/drawing/2014/main" id="{E60EF56A-AD96-43F4-8C9D-0BC1F0893424}"/>
+              </a:ext>
+            </a:extLst>
+          </p:cNvPr>
+          <p:cNvSpPr>
+            <a:spLocks noGrp="1"/>
+          </p:cNvSpPr>
+          <p:nvPr>
+            <p:ph type="title"/>
+          </p:nvPr>
+        </p:nvSpPr>
+        <p:spPr>
+          <a:xfrm>
+            <a:off x="839788" y="365125"/>
+            <a:ext cx="10515600" cy="1325563"/>
+          </a:xfrm>
+        </p:spPr>
+        <p:txBody>
+          <a:bodyPr/>
+          <a:lstStyle/>
+          <a:p>
+            <a:r>
+              <a:rPr lang="en-US"/>
+              <a:t>Click to edit Master title style</a:t>
+            </a:r>
+            <a:endParaRPr lang="en-GB"/>
+          </a:p>
+        </p:txBody>
+      </p:sp>
+      <p:sp>
+        <p:nvSpPr>
+          <p:cNvPr id="3" name="Text Placeholder 2">
+            <a:extLst>
+              <a:ext uri="{FF2B5EF4-FFF2-40B4-BE49-F238E27FC236}">
+                <a16:creationId xmlns:a16="http://schemas.microsoft.com/office/drawing/2014/main" id="{EF38C103-CEFB-41FD-B406-024D23D4A3D4}"/>
+              </a:ext>
+            </a:extLst>
+          </p:cNvPr>
+          <p:cNvSpPr>
+            <a:spLocks noGrp="1"/>
+          </p:cNvSpPr>
+          <p:nvPr>
+            <p:ph type="body" idx="1"/>
+          </p:nvPr>
+        </p:nvSpPr>
+        <p:spPr>
+          <a:xfrm>
+            <a:off x="839788" y="1681163"/>
+            <a:ext cx="5157787" cy="823912"/>
+          </a:xfrm>
+        </p:spPr>
+        <p:txBody>
+          <a:bodyPr anchor="b"/>
+          <a:lstStyle>
+            <a:lvl1pPr marL="0" indent="0">
+              <a:buNone/>
+              <a:defRPr sz="2400" b="1"/>
+            </a:lvl1pPr>
+            <a:lvl2pPr marL="457200" indent="0">
+              <a:buNone/>
+              <a:defRPr sz="2000" b="1"/>
+            </a:lvl2pPr>
+            <a:lvl3pPr marL="914400" indent="0">
+              <a:buNone/>
+              <a:defRPr sz="1800" b="1"/>
+            </a:lvl3pPr>
+            <a:lvl4pPr marL="1371600" indent="0">
+              <a:buNone/>
+              <a:defRPr sz="1600" b="1"/>
+            </a:lvl4pPr>
+            <a:lvl5pPr marL="1828800" indent="0">
+              <a:buNone/>
+              <a:defRPr sz="1600" b="1"/>
+            </a:lvl5pPr>
+            <a:lvl6pPr marL="2286000" indent="0">
+              <a:buNone/>
+              <a:defRPr sz="1600" b="1"/>
+            </a:lvl6pPr>
+            <a:lvl7pPr marL="2743200" indent="0">
+              <a:buNone/>
+              <a:defRPr sz="1600" b="1"/>
+            </a:lvl7pPr>
+            <a:lvl8pPr marL="3200400" indent="0">
+              <a:buNone/>
+              <a:defRPr sz="1600" b="1"/>
+            </a:lvl8pPr>
+            <a:lvl9pPr marL="3657600" indent="0">
+              <a:buNone/>
+              <a:defRPr sz="1600" b="1"/>
+            </a:lvl9pPr>
+          </a:lstStyle>
+          <a:p>
+            <a:pPr lvl="0"/>
+            <a:r>
+              <a:rPr lang="en-US"/>
+              <a:t>Edit Master text styles</a:t>
+            </a:r>
+          </a:p>
+        </p:txBody>
+      </p:sp>
+      <p:sp>
+        <p:nvSpPr>
+          <p:cNvPr id="4" name="Content Placeholder 3">
+            <a:extLst>
+              <a:ext uri="{FF2B5EF4-FFF2-40B4-BE49-F238E27FC236}">
+                <a16:creationId xmlns:a16="http://schemas.microsoft.com/office/drawing/2014/main" id="{C9F62E4D-F934-4B10-A230-AB04308C9D8D}"/>
+              </a:ext>
+            </a:extLst>
+          </p:cNvPr>
+          <p:cNvSpPr>
+            <a:spLocks noGrp="1"/>
+          </p:cNvSpPr>
+          <p:nvPr>
+            <p:ph sz="half" idx="2"/>
+          </p:nvPr>
+        </p:nvSpPr>
+        <p:spPr>
+          <a:xfrm>
+            <a:off x="839788" y="2505075"/>
+            <a:ext cx="5157787" cy="3684588"/>
+          </a:xfrm>
+        </p:spPr>
+        <p:txBody>
+          <a:bodyPr/>
+          <a:lstStyle/>
+          <a:p>
+            <a:pPr lvl="0"/>
+            <a:r>
+              <a:rPr lang="en-US"/>
+              <a:t>Edit Master text styles</a:t>
+            </a:r>
+          </a:p>
+          <a:p>
+            <a:pPr lvl="1"/>
+            <a:r>
+              <a:rPr lang="en-US"/>
+              <a:t>Second level</a:t>
+            </a:r>
+          </a:p>
+          <a:p>
+            <a:pPr lvl="2"/>
+            <a:r>
+              <a:rPr lang="en-US"/>
+              <a:t>Third level</a:t>
+            </a:r>
+          </a:p>
+          <a:p>
+            <a:pPr lvl="3"/>
+            <a:r>
+              <a:rPr lang="en-US"/>
+              <a:t>Fourth level</a:t>
+            </a:r>
+          </a:p>
+          <a:p>
+            <a:pPr lvl="4"/>
+            <a:r>
+              <a:rPr lang="en-US"/>
+              <a:t>Fifth level</a:t>
+            </a:r>
+            <a:endParaRPr lang="en-GB"/>
+          </a:p>
+        </p:txBody>
+      </p:sp>
+      <p:sp>
+        <p:nvSpPr>
+          <p:cNvPr id="5" name="Text Placeholder 4">
+            <a:extLst>
+              <a:ext uri="{FF2B5EF4-FFF2-40B4-BE49-F238E27FC236}">
+                <a16:creationId xmlns:a16="http://schemas.microsoft.com/office/drawing/2014/main" id="{DC1EEE72-86EC-492D-BF4A-A2C046C62A5B}"/>
+              </a:ext>
+            </a:extLst>
+          </p:cNvPr>
+          <p:cNvSpPr>
+            <a:spLocks noGrp="1"/>
+          </p:cNvSpPr>
+          <p:nvPr>
+            <p:ph type="body" sz="quarter" idx="3"/>
+          </p:nvPr>
+        </p:nvSpPr>
+        <p:spPr>
+          <a:xfrm>
+            <a:off x="6172200" y="1681163"/>
+            <a:ext cx="5183188" cy="823912"/>
+          </a:xfrm>
+        </p:spPr>
+        <p:txBody>
+          <a:bodyPr anchor="b"/>
+          <a:lstStyle>
+            <a:lvl1pPr marL="0" indent="0">
+              <a:buNone/>
+              <a:defRPr sz="2400" b="1"/>
+            </a:lvl1pPr>
+            <a:lvl2pPr marL="457200" indent="0">
+              <a:buNone/>
+              <a:defRPr sz="2000" b="1"/>
+            </a:lvl2pPr>
+            <a:lvl3pPr marL="914400" indent="0">
+              <a:buNone/>
+              <a:defRPr sz="1800" b="1"/>
+            </a:lvl3pPr>
+            <a:lvl4pPr marL="1371600" indent="0">
+              <a:buNone/>
+              <a:defRPr sz="1600" b="1"/>
+            </a:lvl4pPr>
+            <a:lvl5pPr marL="1828800" indent="0">
+              <a:buNone/>
+              <a:defRPr sz="1600" b="1"/>
+            </a:lvl5pPr>
+            <a:lvl6pPr marL="2286000" indent="0">
+              <a:buNone/>
+              <a:defRPr sz="1600" b="1"/>
+            </a:lvl6pPr>
+            <a:lvl7pPr marL="2743200" indent="0">
+              <a:buNone/>
+              <a:defRPr sz="1600" b="1"/>
+            </a:lvl7pPr>
+            <a:lvl8pPr marL="3200400" indent="0">
+              <a:buNone/>
+              <a:defRPr sz="1600" b="1"/>
+            </a:lvl8pPr>
+            <a:lvl9pPr marL="3657600" indent="0">
+              <a:buNone/>
+              <a:defRPr sz="1600" b="1"/>
+            </a:lvl9pPr>
+          </a:lstStyle>
+          <a:p>
+            <a:pPr lvl="0"/>
+            <a:r>
+              <a:rPr lang="en-US"/>
+              <a:t>Edit Master text styles</a:t>
+            </a:r>
+          </a:p>
+        </p:txBody>
+      </p:sp>
+      <p:sp>
+        <p:nvSpPr>
+          <p:cNvPr id="6" name="Content Placeholder 5">
+            <a:extLst>
+              <a:ext uri="{FF2B5EF4-FFF2-40B4-BE49-F238E27FC236}">
+                <a16:creationId xmlns:a16="http://schemas.microsoft.com/office/drawing/2014/main" id="{314AAF85-AE79-4BF0-8325-CA41ED7F9EB4}"/>
+              </a:ext>
+            </a:extLst>
+          </p:cNvPr>
+          <p:cNvSpPr>
+            <a:spLocks noGrp="1"/>
+          </p:cNvSpPr>
+          <p:nvPr>
+            <p:ph sz="quarter" idx="4"/>
+          </p:nvPr>
+        </p:nvSpPr>
+        <p:spPr>
+          <a:xfrm>
+            <a:off x="6172200" y="2505075"/>
+            <a:ext cx="5183188" cy="3684588"/>
+          </a:xfrm>
+        </p:spPr>
+        <p:txBody>
+          <a:bodyPr/>
+          <a:lstStyle/>
+          <a:p>
+            <a:pPr lvl="0"/>
+            <a:r>
+              <a:rPr lang="en-US"/>
+              <a:t>Edit Master text styles</a:t>
+            </a:r>
+          </a:p>
+          <a:p>
+            <a:pPr lvl="1"/>
+            <a:r>
+              <a:rPr lang="en-US"/>
+              <a:t>Second level</a:t>
+            </a:r>
+          </a:p>
+          <a:p>
+            <a:pPr lvl="2"/>
+            <a:r>
+              <a:rPr lang="en-US"/>
+              <a:t>Third level</a:t>
+            </a:r>
+          </a:p>
+          <a:p>
+            <a:pPr lvl="3"/>
+            <a:r>
+              <a:rPr lang="en-US"/>
+              <a:t>Fourth level</a:t>
+            </a:r>
+          </a:p>
+          <a:p>
+            <a:pPr lvl="4"/>
+            <a:r>
+              <a:rPr lang="en-US"/>
+              <a:t>Fifth level</a:t>
+            </a:r>
+            <a:endParaRPr lang="en-GB"/>
+          </a:p>
+        </p:txBody>
+      </p:sp>
+      <p:sp>
+        <p:nvSpPr>
+          <p:cNvPr id="7" name="Date Placeholder 6">
+            <a:extLst>
+              <a:ext uri="{FF2B5EF4-FFF2-40B4-BE49-F238E27FC236}">
+                <a16:creationId xmlns:a16="http://schemas.microsoft.com/office/drawing/2014/main" id="{B20576AD-28F2-4F7A-93CC-8A8F83736E68}"/>
+              </a:ext>
+            </a:extLst>
+          </p:cNvPr>
+          <p:cNvSpPr>
+            <a:spLocks noGrp="1"/>
+          </p:cNvSpPr>
+          <p:nvPr>
+            <p:ph type="dt" sz="half" idx="10"/>
+          </p:nvPr>
+        </p:nvSpPr>
+        <p:spPr/>
+        <p:txBody>
+          <a:bodyPr/>
+          <a:lstStyle/>
+          <a:p>
+            <a:fld id="{9C24F874-02A1-48BF-AE54-4A07EBAF6EA2}" type="datetimeFigureOut">
+              <a:rPr lang="en-GB" smtClean="0"/>
+              <a:t>20/03/2018</a:t>
+            </a:fld>
+            <a:endParaRPr lang="en-GB"/>
+          </a:p>
+        </p:txBody>
+      </p:sp>
+      <p:sp>
+        <p:nvSpPr>
+          <p:cNvPr id="8" name="Footer Placeholder 7">
+            <a:extLst>
+              <a:ext uri="{FF2B5EF4-FFF2-40B4-BE49-F238E27FC236}">
+                <a16:creationId xmlns:a16="http://schemas.microsoft.com/office/drawing/2014/main" id="{5CB017B9-1D5D-400D-A70A-014C49A11813}"/>
+              </a:ext>
+            </a:extLst>
+          </p:cNvPr>
+          <p:cNvSpPr>
+            <a:spLocks noGrp="1"/>
+          </p:cNvSpPr>
+          <p:nvPr>
+            <p:ph type="ftr" sz="quarter" idx="11"/>
+          </p:nvPr>
+        </p:nvSpPr>
+        <p:spPr/>
+        <p:txBody>
+          <a:bodyPr/>
+          <a:lstStyle/>
+          <a:p>
+            <a:endParaRPr lang="en-GB"/>
+          </a:p>
+        </p:txBody>
+      </p:sp>
+      <p:sp>
+        <p:nvSpPr>
+          <p:cNvPr id="9" name="Slide Number Placeholder 8">
+            <a:extLst>
+              <a:ext uri="{FF2B5EF4-FFF2-40B4-BE49-F238E27FC236}">
+                <a16:creationId xmlns:a16="http://schemas.microsoft.com/office/drawing/2014/main" id="{F3961309-6F01-4F1B-9605-F40DF3B66B09}"/>
+              </a:ext>
+            </a:extLst>
+          </p:cNvPr>
+          <p:cNvSpPr>
+            <a:spLocks noGrp="1"/>
+          </p:cNvSpPr>
+          <p:nvPr>
+            <p:ph type="sldNum" sz="quarter" idx="12"/>
+          </p:nvPr>
+        </p:nvSpPr>
+        <p:spPr/>
+        <p:txBody>
+          <a:bodyPr/>
+          <a:lstStyle/>
+          <a:p>
+            <a:fld id="{9C7D1916-3AD3-4FEC-AEB3-D0E6DB5A64D5}" type="slidenum">
+              <a:rPr lang="en-GB" smtClean="0"/>
+              <a:t>‹#›</a:t>
+            </a:fld>
+            <a:endParaRPr lang="en-GB"/>
+          </a:p>
+        </p:txBody>
+      </p:sp>
+    </p:spTree>
+    <p:extLst>
+      <p:ext uri="{BB962C8B-B14F-4D97-AF65-F5344CB8AC3E}">
+        <p14:creationId xmlns:p14="http://schemas.microsoft.com/office/powerpoint/2010/main" val="479645543"/>
+      </p:ext>
+    </p:extLst>
+  </p:cSld>
+  <p:clrMapOvr>
+    <a:masterClrMapping/>
+  </p:clrMapOvr>
+</p:sldLayout>
+</file>
+
+<file path=ppt/slideLayouts/slideLayout17.xml><?xml version="1.0" encoding="utf-8"?>
+<p:sldLayout xmlns:a="http://schemas.openxmlformats.org/drawingml/2006/main" xmlns:r="http://schemas.openxmlformats.org/officeDocument/2006/relationships" xmlns:p="http://schemas.openxmlformats.org/presentationml/2006/main" type="titleOnly" preserve="1">
+  <p:cSld name="Title Only">
+    <p:spTree>
+      <p:nvGrpSpPr>
+        <p:cNvPr id="1" name=""/>
+        <p:cNvGrpSpPr/>
+        <p:nvPr/>
+      </p:nvGrpSpPr>
+      <p:grpSpPr>
+        <a:xfrm>
+          <a:off x="0" y="0"/>
+          <a:ext cx="0" cy="0"/>
+          <a:chOff x="0" y="0"/>
+          <a:chExt cx="0" cy="0"/>
+        </a:xfrm>
+      </p:grpSpPr>
+      <p:sp>
+        <p:nvSpPr>
+          <p:cNvPr id="2" name="Title 1">
+            <a:extLst>
+              <a:ext uri="{FF2B5EF4-FFF2-40B4-BE49-F238E27FC236}">
+                <a16:creationId xmlns:a16="http://schemas.microsoft.com/office/drawing/2014/main" id="{8985C816-68C3-4E16-8DB4-64620CF1C80A}"/>
+              </a:ext>
+            </a:extLst>
+          </p:cNvPr>
+          <p:cNvSpPr>
+            <a:spLocks noGrp="1"/>
+          </p:cNvSpPr>
+          <p:nvPr>
+            <p:ph type="title"/>
+          </p:nvPr>
+        </p:nvSpPr>
+        <p:spPr/>
+        <p:txBody>
+          <a:bodyPr/>
+          <a:lstStyle/>
+          <a:p>
+            <a:r>
+              <a:rPr lang="en-US"/>
+              <a:t>Click to edit Master title style</a:t>
+            </a:r>
+            <a:endParaRPr lang="en-GB"/>
+          </a:p>
+        </p:txBody>
+      </p:sp>
+      <p:sp>
+        <p:nvSpPr>
+          <p:cNvPr id="3" name="Date Placeholder 2">
+            <a:extLst>
+              <a:ext uri="{FF2B5EF4-FFF2-40B4-BE49-F238E27FC236}">
+                <a16:creationId xmlns:a16="http://schemas.microsoft.com/office/drawing/2014/main" id="{3615920A-08D2-46F6-8865-5C9480135981}"/>
+              </a:ext>
+            </a:extLst>
+          </p:cNvPr>
+          <p:cNvSpPr>
+            <a:spLocks noGrp="1"/>
+          </p:cNvSpPr>
+          <p:nvPr>
+            <p:ph type="dt" sz="half" idx="10"/>
+          </p:nvPr>
+        </p:nvSpPr>
+        <p:spPr/>
+        <p:txBody>
+          <a:bodyPr/>
+          <a:lstStyle/>
+          <a:p>
+            <a:fld id="{9C24F874-02A1-48BF-AE54-4A07EBAF6EA2}" type="datetimeFigureOut">
+              <a:rPr lang="en-GB" smtClean="0"/>
+              <a:t>20/03/2018</a:t>
+            </a:fld>
+            <a:endParaRPr lang="en-GB"/>
+          </a:p>
+        </p:txBody>
+      </p:sp>
+      <p:sp>
+        <p:nvSpPr>
+          <p:cNvPr id="4" name="Footer Placeholder 3">
+            <a:extLst>
+              <a:ext uri="{FF2B5EF4-FFF2-40B4-BE49-F238E27FC236}">
+                <a16:creationId xmlns:a16="http://schemas.microsoft.com/office/drawing/2014/main" id="{6EDC9628-A315-440F-8B71-F70531CAF485}"/>
+              </a:ext>
+            </a:extLst>
+          </p:cNvPr>
+          <p:cNvSpPr>
+            <a:spLocks noGrp="1"/>
+          </p:cNvSpPr>
+          <p:nvPr>
+            <p:ph type="ftr" sz="quarter" idx="11"/>
+          </p:nvPr>
+        </p:nvSpPr>
+        <p:spPr/>
+        <p:txBody>
+          <a:bodyPr/>
+          <a:lstStyle/>
+          <a:p>
+            <a:endParaRPr lang="en-GB"/>
+          </a:p>
+        </p:txBody>
+      </p:sp>
+      <p:sp>
+        <p:nvSpPr>
+          <p:cNvPr id="5" name="Slide Number Placeholder 4">
+            <a:extLst>
+              <a:ext uri="{FF2B5EF4-FFF2-40B4-BE49-F238E27FC236}">
+                <a16:creationId xmlns:a16="http://schemas.microsoft.com/office/drawing/2014/main" id="{68C29F2C-E6EC-4AB0-81E3-091CD5D479BE}"/>
+              </a:ext>
+            </a:extLst>
+          </p:cNvPr>
+          <p:cNvSpPr>
+            <a:spLocks noGrp="1"/>
+          </p:cNvSpPr>
+          <p:nvPr>
+            <p:ph type="sldNum" sz="quarter" idx="12"/>
+          </p:nvPr>
+        </p:nvSpPr>
+        <p:spPr/>
+        <p:txBody>
+          <a:bodyPr/>
+          <a:lstStyle/>
+          <a:p>
+            <a:fld id="{9C7D1916-3AD3-4FEC-AEB3-D0E6DB5A64D5}" type="slidenum">
+              <a:rPr lang="en-GB" smtClean="0"/>
+              <a:t>‹#›</a:t>
+            </a:fld>
+            <a:endParaRPr lang="en-GB"/>
+          </a:p>
+        </p:txBody>
+      </p:sp>
+    </p:spTree>
+    <p:extLst>
+      <p:ext uri="{BB962C8B-B14F-4D97-AF65-F5344CB8AC3E}">
+        <p14:creationId xmlns:p14="http://schemas.microsoft.com/office/powerpoint/2010/main" val="1979020232"/>
+      </p:ext>
+    </p:extLst>
+  </p:cSld>
+  <p:clrMapOvr>
+    <a:masterClrMapping/>
+  </p:clrMapOvr>
+</p:sldLayout>
+</file>
+
+<file path=ppt/slideLayouts/slideLayout18.xml><?xml version="1.0" encoding="utf-8"?>
+<p:sldLayout xmlns:a="http://schemas.openxmlformats.org/drawingml/2006/main" xmlns:r="http://schemas.openxmlformats.org/officeDocument/2006/relationships" xmlns:p="http://schemas.openxmlformats.org/presentationml/2006/main" type="blank" preserve="1">
+  <p:cSld name="Blank">
+    <p:spTree>
+      <p:nvGrpSpPr>
+        <p:cNvPr id="1" name=""/>
+        <p:cNvGrpSpPr/>
+        <p:nvPr/>
+      </p:nvGrpSpPr>
+      <p:grpSpPr>
+        <a:xfrm>
+          <a:off x="0" y="0"/>
+          <a:ext cx="0" cy="0"/>
+          <a:chOff x="0" y="0"/>
+          <a:chExt cx="0" cy="0"/>
+        </a:xfrm>
+      </p:grpSpPr>
+      <p:sp>
+        <p:nvSpPr>
+          <p:cNvPr id="2" name="Date Placeholder 1">
+            <a:extLst>
+              <a:ext uri="{FF2B5EF4-FFF2-40B4-BE49-F238E27FC236}">
+                <a16:creationId xmlns:a16="http://schemas.microsoft.com/office/drawing/2014/main" id="{0C9B0261-43EE-47BF-8831-8E176B3AA641}"/>
+              </a:ext>
+            </a:extLst>
+          </p:cNvPr>
+          <p:cNvSpPr>
+            <a:spLocks noGrp="1"/>
+          </p:cNvSpPr>
+          <p:nvPr>
+            <p:ph type="dt" sz="half" idx="10"/>
+          </p:nvPr>
+        </p:nvSpPr>
+        <p:spPr/>
+        <p:txBody>
+          <a:bodyPr/>
+          <a:lstStyle/>
+          <a:p>
+            <a:fld id="{9C24F874-02A1-48BF-AE54-4A07EBAF6EA2}" type="datetimeFigureOut">
+              <a:rPr lang="en-GB" smtClean="0"/>
+              <a:t>20/03/2018</a:t>
+            </a:fld>
+            <a:endParaRPr lang="en-GB"/>
+          </a:p>
+        </p:txBody>
+      </p:sp>
+      <p:sp>
+        <p:nvSpPr>
+          <p:cNvPr id="3" name="Footer Placeholder 2">
+            <a:extLst>
+              <a:ext uri="{FF2B5EF4-FFF2-40B4-BE49-F238E27FC236}">
+                <a16:creationId xmlns:a16="http://schemas.microsoft.com/office/drawing/2014/main" id="{5B342CFC-8AF7-47F6-B52F-73097FBC01CB}"/>
+              </a:ext>
+            </a:extLst>
+          </p:cNvPr>
+          <p:cNvSpPr>
+            <a:spLocks noGrp="1"/>
+          </p:cNvSpPr>
+          <p:nvPr>
+            <p:ph type="ftr" sz="quarter" idx="11"/>
+          </p:nvPr>
+        </p:nvSpPr>
+        <p:spPr/>
+        <p:txBody>
+          <a:bodyPr/>
+          <a:lstStyle/>
+          <a:p>
+            <a:endParaRPr lang="en-GB"/>
+          </a:p>
+        </p:txBody>
+      </p:sp>
+      <p:sp>
+        <p:nvSpPr>
+          <p:cNvPr id="4" name="Slide Number Placeholder 3">
+            <a:extLst>
+              <a:ext uri="{FF2B5EF4-FFF2-40B4-BE49-F238E27FC236}">
+                <a16:creationId xmlns:a16="http://schemas.microsoft.com/office/drawing/2014/main" id="{1F5474FF-644B-42F0-A2C5-31CA8F9240BE}"/>
+              </a:ext>
+            </a:extLst>
+          </p:cNvPr>
+          <p:cNvSpPr>
+            <a:spLocks noGrp="1"/>
+          </p:cNvSpPr>
+          <p:nvPr>
+            <p:ph type="sldNum" sz="quarter" idx="12"/>
+          </p:nvPr>
+        </p:nvSpPr>
+        <p:spPr/>
+        <p:txBody>
+          <a:bodyPr/>
+          <a:lstStyle/>
+          <a:p>
+            <a:fld id="{9C7D1916-3AD3-4FEC-AEB3-D0E6DB5A64D5}" type="slidenum">
+              <a:rPr lang="en-GB" smtClean="0"/>
+              <a:t>‹#›</a:t>
+            </a:fld>
+            <a:endParaRPr lang="en-GB"/>
+          </a:p>
+        </p:txBody>
+      </p:sp>
+    </p:spTree>
+    <p:extLst>
+      <p:ext uri="{BB962C8B-B14F-4D97-AF65-F5344CB8AC3E}">
+        <p14:creationId xmlns:p14="http://schemas.microsoft.com/office/powerpoint/2010/main" val="3608333928"/>
+      </p:ext>
+    </p:extLst>
+  </p:cSld>
+  <p:clrMapOvr>
+    <a:masterClrMapping/>
+  </p:clrMapOvr>
+</p:sldLayout>
+</file>
+
+<file path=ppt/slideLayouts/slideLayout19.xml><?xml version="1.0" encoding="utf-8"?>
+<p:sldLayout xmlns:a="http://schemas.openxmlformats.org/drawingml/2006/main" xmlns:r="http://schemas.openxmlformats.org/officeDocument/2006/relationships" xmlns:p="http://schemas.openxmlformats.org/presentationml/2006/main" type="objTx" preserve="1">
+  <p:cSld name="Content with Caption">
+    <p:spTree>
+      <p:nvGrpSpPr>
+        <p:cNvPr id="1" name=""/>
+        <p:cNvGrpSpPr/>
+        <p:nvPr/>
+      </p:nvGrpSpPr>
+      <p:grpSpPr>
+        <a:xfrm>
+          <a:off x="0" y="0"/>
+          <a:ext cx="0" cy="0"/>
+          <a:chOff x="0" y="0"/>
+          <a:chExt cx="0" cy="0"/>
+        </a:xfrm>
+      </p:grpSpPr>
+      <p:sp>
+        <p:nvSpPr>
+          <p:cNvPr id="2" name="Title 1">
+            <a:extLst>
+              <a:ext uri="{FF2B5EF4-FFF2-40B4-BE49-F238E27FC236}">
+                <a16:creationId xmlns:a16="http://schemas.microsoft.com/office/drawing/2014/main" id="{A8835ADA-1CD1-489A-85AF-01CAD3E5BE7C}"/>
+              </a:ext>
+            </a:extLst>
+          </p:cNvPr>
+          <p:cNvSpPr>
+            <a:spLocks noGrp="1"/>
+          </p:cNvSpPr>
+          <p:nvPr>
+            <p:ph type="title"/>
+          </p:nvPr>
+        </p:nvSpPr>
+        <p:spPr>
+          <a:xfrm>
+            <a:off x="839788" y="457200"/>
+            <a:ext cx="3932237" cy="1600200"/>
+          </a:xfrm>
+        </p:spPr>
+        <p:txBody>
+          <a:bodyPr anchor="b"/>
+          <a:lstStyle>
+            <a:lvl1pPr>
+              <a:defRPr sz="3200"/>
+            </a:lvl1pPr>
+          </a:lstStyle>
+          <a:p>
+            <a:r>
+              <a:rPr lang="en-US"/>
+              <a:t>Click to edit Master title style</a:t>
+            </a:r>
+            <a:endParaRPr lang="en-GB"/>
+          </a:p>
+        </p:txBody>
+      </p:sp>
+      <p:sp>
+        <p:nvSpPr>
+          <p:cNvPr id="3" name="Content Placeholder 2">
+            <a:extLst>
+              <a:ext uri="{FF2B5EF4-FFF2-40B4-BE49-F238E27FC236}">
+                <a16:creationId xmlns:a16="http://schemas.microsoft.com/office/drawing/2014/main" id="{CC6E079B-E1BE-42CB-8941-50E87679994A}"/>
+              </a:ext>
+            </a:extLst>
+          </p:cNvPr>
+          <p:cNvSpPr>
+            <a:spLocks noGrp="1"/>
+          </p:cNvSpPr>
+          <p:nvPr>
+            <p:ph idx="1"/>
+          </p:nvPr>
+        </p:nvSpPr>
+        <p:spPr>
+          <a:xfrm>
+            <a:off x="5183188" y="987425"/>
+            <a:ext cx="6172200" cy="4873625"/>
+          </a:xfrm>
+        </p:spPr>
+        <p:txBody>
+          <a:bodyPr/>
+          <a:lstStyle>
+            <a:lvl1pPr>
+              <a:defRPr sz="3200"/>
+            </a:lvl1pPr>
+            <a:lvl2pPr>
+              <a:defRPr sz="2800"/>
+            </a:lvl2pPr>
+            <a:lvl3pPr>
+              <a:defRPr sz="2400"/>
+            </a:lvl3pPr>
+            <a:lvl4pPr>
+              <a:defRPr sz="2000"/>
+            </a:lvl4pPr>
+            <a:lvl5pPr>
+              <a:defRPr sz="2000"/>
+            </a:lvl5pPr>
+            <a:lvl6pPr>
+              <a:defRPr sz="2000"/>
+            </a:lvl6pPr>
+            <a:lvl7pPr>
+              <a:defRPr sz="2000"/>
+            </a:lvl7pPr>
+            <a:lvl8pPr>
+              <a:defRPr sz="2000"/>
+            </a:lvl8pPr>
+            <a:lvl9pPr>
+              <a:defRPr sz="2000"/>
+            </a:lvl9pPr>
+          </a:lstStyle>
+          <a:p>
+            <a:pPr lvl="0"/>
+            <a:r>
+              <a:rPr lang="en-US"/>
+              <a:t>Edit Master text styles</a:t>
+            </a:r>
+          </a:p>
+          <a:p>
+            <a:pPr lvl="1"/>
+            <a:r>
+              <a:rPr lang="en-US"/>
+              <a:t>Second level</a:t>
+            </a:r>
+          </a:p>
+          <a:p>
+            <a:pPr lvl="2"/>
+            <a:r>
+              <a:rPr lang="en-US"/>
+              <a:t>Third level</a:t>
+            </a:r>
+          </a:p>
+          <a:p>
+            <a:pPr lvl="3"/>
+            <a:r>
+              <a:rPr lang="en-US"/>
+              <a:t>Fourth level</a:t>
+            </a:r>
+          </a:p>
+          <a:p>
+            <a:pPr lvl="4"/>
+            <a:r>
+              <a:rPr lang="en-US"/>
+              <a:t>Fifth level</a:t>
+            </a:r>
+            <a:endParaRPr lang="en-GB"/>
+          </a:p>
+        </p:txBody>
+      </p:sp>
+      <p:sp>
+        <p:nvSpPr>
+          <p:cNvPr id="4" name="Text Placeholder 3">
+            <a:extLst>
+              <a:ext uri="{FF2B5EF4-FFF2-40B4-BE49-F238E27FC236}">
+                <a16:creationId xmlns:a16="http://schemas.microsoft.com/office/drawing/2014/main" id="{A51DA364-C48D-4094-9AA5-E4E71D3F6881}"/>
+              </a:ext>
+            </a:extLst>
+          </p:cNvPr>
+          <p:cNvSpPr>
+            <a:spLocks noGrp="1"/>
+          </p:cNvSpPr>
+          <p:nvPr>
+            <p:ph type="body" sz="half" idx="2"/>
+          </p:nvPr>
+        </p:nvSpPr>
+        <p:spPr>
+          <a:xfrm>
+            <a:off x="839788" y="2057400"/>
+            <a:ext cx="3932237" cy="3811588"/>
+          </a:xfrm>
+        </p:spPr>
+        <p:txBody>
+          <a:bodyPr/>
+          <a:lstStyle>
+            <a:lvl1pPr marL="0" indent="0">
+              <a:buNone/>
+              <a:defRPr sz="1600"/>
+            </a:lvl1pPr>
+            <a:lvl2pPr marL="457200" indent="0">
+              <a:buNone/>
+              <a:defRPr sz="1400"/>
+            </a:lvl2pPr>
+            <a:lvl3pPr marL="914400" indent="0">
+              <a:buNone/>
+              <a:defRPr sz="1200"/>
+            </a:lvl3pPr>
+            <a:lvl4pPr marL="1371600" indent="0">
+              <a:buNone/>
+              <a:defRPr sz="1000"/>
+            </a:lvl4pPr>
+            <a:lvl5pPr marL="1828800" indent="0">
+              <a:buNone/>
+              <a:defRPr sz="1000"/>
+            </a:lvl5pPr>
+            <a:lvl6pPr marL="2286000" indent="0">
+              <a:buNone/>
+              <a:defRPr sz="1000"/>
+            </a:lvl6pPr>
+            <a:lvl7pPr marL="2743200" indent="0">
+              <a:buNone/>
+              <a:defRPr sz="1000"/>
+            </a:lvl7pPr>
+            <a:lvl8pPr marL="3200400" indent="0">
+              <a:buNone/>
+              <a:defRPr sz="1000"/>
+            </a:lvl8pPr>
+            <a:lvl9pPr marL="3657600" indent="0">
+              <a:buNone/>
+              <a:defRPr sz="1000"/>
+            </a:lvl9pPr>
+          </a:lstStyle>
+          <a:p>
+            <a:pPr lvl="0"/>
+            <a:r>
+              <a:rPr lang="en-US"/>
+              <a:t>Edit Master text styles</a:t>
+            </a:r>
+          </a:p>
+        </p:txBody>
+      </p:sp>
+      <p:sp>
+        <p:nvSpPr>
+          <p:cNvPr id="5" name="Date Placeholder 4">
+            <a:extLst>
+              <a:ext uri="{FF2B5EF4-FFF2-40B4-BE49-F238E27FC236}">
+                <a16:creationId xmlns:a16="http://schemas.microsoft.com/office/drawing/2014/main" id="{6068FBED-E736-4C83-842D-5A3A7EC007C1}"/>
+              </a:ext>
+            </a:extLst>
+          </p:cNvPr>
+          <p:cNvSpPr>
+            <a:spLocks noGrp="1"/>
+          </p:cNvSpPr>
+          <p:nvPr>
+            <p:ph type="dt" sz="half" idx="10"/>
+          </p:nvPr>
+        </p:nvSpPr>
+        <p:spPr/>
+        <p:txBody>
+          <a:bodyPr/>
+          <a:lstStyle/>
+          <a:p>
+            <a:fld id="{9C24F874-02A1-48BF-AE54-4A07EBAF6EA2}" type="datetimeFigureOut">
+              <a:rPr lang="en-GB" smtClean="0"/>
+              <a:t>20/03/2018</a:t>
+            </a:fld>
+            <a:endParaRPr lang="en-GB"/>
+          </a:p>
+        </p:txBody>
+      </p:sp>
+      <p:sp>
+        <p:nvSpPr>
+          <p:cNvPr id="6" name="Footer Placeholder 5">
+            <a:extLst>
+              <a:ext uri="{FF2B5EF4-FFF2-40B4-BE49-F238E27FC236}">
+                <a16:creationId xmlns:a16="http://schemas.microsoft.com/office/drawing/2014/main" id="{97FB011C-DAB5-43AB-8067-52FD08AC3B90}"/>
+              </a:ext>
+            </a:extLst>
+          </p:cNvPr>
+          <p:cNvSpPr>
+            <a:spLocks noGrp="1"/>
+          </p:cNvSpPr>
+          <p:nvPr>
+            <p:ph type="ftr" sz="quarter" idx="11"/>
+          </p:nvPr>
+        </p:nvSpPr>
+        <p:spPr/>
+        <p:txBody>
+          <a:bodyPr/>
+          <a:lstStyle/>
+          <a:p>
+            <a:endParaRPr lang="en-GB"/>
+          </a:p>
+        </p:txBody>
+      </p:sp>
+      <p:sp>
+        <p:nvSpPr>
+          <p:cNvPr id="7" name="Slide Number Placeholder 6">
+            <a:extLst>
+              <a:ext uri="{FF2B5EF4-FFF2-40B4-BE49-F238E27FC236}">
+                <a16:creationId xmlns:a16="http://schemas.microsoft.com/office/drawing/2014/main" id="{7CCE5707-A3E2-4F40-8791-D7805FD070D0}"/>
+              </a:ext>
+            </a:extLst>
+          </p:cNvPr>
+          <p:cNvSpPr>
+            <a:spLocks noGrp="1"/>
+          </p:cNvSpPr>
+          <p:nvPr>
+            <p:ph type="sldNum" sz="quarter" idx="12"/>
+          </p:nvPr>
+        </p:nvSpPr>
+        <p:spPr/>
+        <p:txBody>
+          <a:bodyPr/>
+          <a:lstStyle/>
+          <a:p>
+            <a:fld id="{9C7D1916-3AD3-4FEC-AEB3-D0E6DB5A64D5}" type="slidenum">
+              <a:rPr lang="en-GB" smtClean="0"/>
+              <a:t>‹#›</a:t>
+            </a:fld>
+            <a:endParaRPr lang="en-GB"/>
+          </a:p>
+        </p:txBody>
+      </p:sp>
+    </p:spTree>
+    <p:extLst>
+      <p:ext uri="{BB962C8B-B14F-4D97-AF65-F5344CB8AC3E}">
+        <p14:creationId xmlns:p14="http://schemas.microsoft.com/office/powerpoint/2010/main" val="1514029806"/>
       </p:ext>
     </p:extLst>
   </p:cSld>
@@ -1404,7 +3351,7 @@
           <a:p>
             <a:fld id="{F999EE6D-E52B-45B7-B943-4C650C77E21B}" type="datetimeFigureOut">
               <a:rPr lang="en-GB" smtClean="0"/>
-              <a:t>13/03/2018</a:t>
+              <a:t>20/03/2018</a:t>
             </a:fld>
             <a:endParaRPr lang="en-GB"/>
           </a:p>
@@ -1468,6 +3415,705 @@
     <p:extLst>
       <p:ext uri="{BB962C8B-B14F-4D97-AF65-F5344CB8AC3E}">
         <p14:creationId xmlns:p14="http://schemas.microsoft.com/office/powerpoint/2010/main" val="1032662362"/>
+      </p:ext>
+    </p:extLst>
+  </p:cSld>
+  <p:clrMapOvr>
+    <a:masterClrMapping/>
+  </p:clrMapOvr>
+</p:sldLayout>
+</file>
+
+<file path=ppt/slideLayouts/slideLayout20.xml><?xml version="1.0" encoding="utf-8"?>
+<p:sldLayout xmlns:a="http://schemas.openxmlformats.org/drawingml/2006/main" xmlns:r="http://schemas.openxmlformats.org/officeDocument/2006/relationships" xmlns:p="http://schemas.openxmlformats.org/presentationml/2006/main" type="picTx" preserve="1">
+  <p:cSld name="Picture with Caption">
+    <p:spTree>
+      <p:nvGrpSpPr>
+        <p:cNvPr id="1" name=""/>
+        <p:cNvGrpSpPr/>
+        <p:nvPr/>
+      </p:nvGrpSpPr>
+      <p:grpSpPr>
+        <a:xfrm>
+          <a:off x="0" y="0"/>
+          <a:ext cx="0" cy="0"/>
+          <a:chOff x="0" y="0"/>
+          <a:chExt cx="0" cy="0"/>
+        </a:xfrm>
+      </p:grpSpPr>
+      <p:sp>
+        <p:nvSpPr>
+          <p:cNvPr id="2" name="Title 1">
+            <a:extLst>
+              <a:ext uri="{FF2B5EF4-FFF2-40B4-BE49-F238E27FC236}">
+                <a16:creationId xmlns:a16="http://schemas.microsoft.com/office/drawing/2014/main" id="{63789D0B-CBC2-4D37-9D81-7AEFF12E5D1D}"/>
+              </a:ext>
+            </a:extLst>
+          </p:cNvPr>
+          <p:cNvSpPr>
+            <a:spLocks noGrp="1"/>
+          </p:cNvSpPr>
+          <p:nvPr>
+            <p:ph type="title"/>
+          </p:nvPr>
+        </p:nvSpPr>
+        <p:spPr>
+          <a:xfrm>
+            <a:off x="839788" y="457200"/>
+            <a:ext cx="3932237" cy="1600200"/>
+          </a:xfrm>
+        </p:spPr>
+        <p:txBody>
+          <a:bodyPr anchor="b"/>
+          <a:lstStyle>
+            <a:lvl1pPr>
+              <a:defRPr sz="3200"/>
+            </a:lvl1pPr>
+          </a:lstStyle>
+          <a:p>
+            <a:r>
+              <a:rPr lang="en-US"/>
+              <a:t>Click to edit Master title style</a:t>
+            </a:r>
+            <a:endParaRPr lang="en-GB"/>
+          </a:p>
+        </p:txBody>
+      </p:sp>
+      <p:sp>
+        <p:nvSpPr>
+          <p:cNvPr id="3" name="Picture Placeholder 2">
+            <a:extLst>
+              <a:ext uri="{FF2B5EF4-FFF2-40B4-BE49-F238E27FC236}">
+                <a16:creationId xmlns:a16="http://schemas.microsoft.com/office/drawing/2014/main" id="{53D7C785-F078-4BAB-973C-BC0456DCF033}"/>
+              </a:ext>
+            </a:extLst>
+          </p:cNvPr>
+          <p:cNvSpPr>
+            <a:spLocks noGrp="1"/>
+          </p:cNvSpPr>
+          <p:nvPr>
+            <p:ph type="pic" idx="1"/>
+          </p:nvPr>
+        </p:nvSpPr>
+        <p:spPr>
+          <a:xfrm>
+            <a:off x="5183188" y="987425"/>
+            <a:ext cx="6172200" cy="4873625"/>
+          </a:xfrm>
+        </p:spPr>
+        <p:txBody>
+          <a:bodyPr/>
+          <a:lstStyle>
+            <a:lvl1pPr marL="0" indent="0">
+              <a:buNone/>
+              <a:defRPr sz="3200"/>
+            </a:lvl1pPr>
+            <a:lvl2pPr marL="457200" indent="0">
+              <a:buNone/>
+              <a:defRPr sz="2800"/>
+            </a:lvl2pPr>
+            <a:lvl3pPr marL="914400" indent="0">
+              <a:buNone/>
+              <a:defRPr sz="2400"/>
+            </a:lvl3pPr>
+            <a:lvl4pPr marL="1371600" indent="0">
+              <a:buNone/>
+              <a:defRPr sz="2000"/>
+            </a:lvl4pPr>
+            <a:lvl5pPr marL="1828800" indent="0">
+              <a:buNone/>
+              <a:defRPr sz="2000"/>
+            </a:lvl5pPr>
+            <a:lvl6pPr marL="2286000" indent="0">
+              <a:buNone/>
+              <a:defRPr sz="2000"/>
+            </a:lvl6pPr>
+            <a:lvl7pPr marL="2743200" indent="0">
+              <a:buNone/>
+              <a:defRPr sz="2000"/>
+            </a:lvl7pPr>
+            <a:lvl8pPr marL="3200400" indent="0">
+              <a:buNone/>
+              <a:defRPr sz="2000"/>
+            </a:lvl8pPr>
+            <a:lvl9pPr marL="3657600" indent="0">
+              <a:buNone/>
+              <a:defRPr sz="2000"/>
+            </a:lvl9pPr>
+          </a:lstStyle>
+          <a:p>
+            <a:endParaRPr lang="en-GB"/>
+          </a:p>
+        </p:txBody>
+      </p:sp>
+      <p:sp>
+        <p:nvSpPr>
+          <p:cNvPr id="4" name="Text Placeholder 3">
+            <a:extLst>
+              <a:ext uri="{FF2B5EF4-FFF2-40B4-BE49-F238E27FC236}">
+                <a16:creationId xmlns:a16="http://schemas.microsoft.com/office/drawing/2014/main" id="{5A06EE2E-B07E-4048-9FBB-9E3877603677}"/>
+              </a:ext>
+            </a:extLst>
+          </p:cNvPr>
+          <p:cNvSpPr>
+            <a:spLocks noGrp="1"/>
+          </p:cNvSpPr>
+          <p:nvPr>
+            <p:ph type="body" sz="half" idx="2"/>
+          </p:nvPr>
+        </p:nvSpPr>
+        <p:spPr>
+          <a:xfrm>
+            <a:off x="839788" y="2057400"/>
+            <a:ext cx="3932237" cy="3811588"/>
+          </a:xfrm>
+        </p:spPr>
+        <p:txBody>
+          <a:bodyPr/>
+          <a:lstStyle>
+            <a:lvl1pPr marL="0" indent="0">
+              <a:buNone/>
+              <a:defRPr sz="1600"/>
+            </a:lvl1pPr>
+            <a:lvl2pPr marL="457200" indent="0">
+              <a:buNone/>
+              <a:defRPr sz="1400"/>
+            </a:lvl2pPr>
+            <a:lvl3pPr marL="914400" indent="0">
+              <a:buNone/>
+              <a:defRPr sz="1200"/>
+            </a:lvl3pPr>
+            <a:lvl4pPr marL="1371600" indent="0">
+              <a:buNone/>
+              <a:defRPr sz="1000"/>
+            </a:lvl4pPr>
+            <a:lvl5pPr marL="1828800" indent="0">
+              <a:buNone/>
+              <a:defRPr sz="1000"/>
+            </a:lvl5pPr>
+            <a:lvl6pPr marL="2286000" indent="0">
+              <a:buNone/>
+              <a:defRPr sz="1000"/>
+            </a:lvl6pPr>
+            <a:lvl7pPr marL="2743200" indent="0">
+              <a:buNone/>
+              <a:defRPr sz="1000"/>
+            </a:lvl7pPr>
+            <a:lvl8pPr marL="3200400" indent="0">
+              <a:buNone/>
+              <a:defRPr sz="1000"/>
+            </a:lvl8pPr>
+            <a:lvl9pPr marL="3657600" indent="0">
+              <a:buNone/>
+              <a:defRPr sz="1000"/>
+            </a:lvl9pPr>
+          </a:lstStyle>
+          <a:p>
+            <a:pPr lvl="0"/>
+            <a:r>
+              <a:rPr lang="en-US"/>
+              <a:t>Edit Master text styles</a:t>
+            </a:r>
+          </a:p>
+        </p:txBody>
+      </p:sp>
+      <p:sp>
+        <p:nvSpPr>
+          <p:cNvPr id="5" name="Date Placeholder 4">
+            <a:extLst>
+              <a:ext uri="{FF2B5EF4-FFF2-40B4-BE49-F238E27FC236}">
+                <a16:creationId xmlns:a16="http://schemas.microsoft.com/office/drawing/2014/main" id="{2F19C16C-5F2A-4EEF-873D-CFCF9707D8D3}"/>
+              </a:ext>
+            </a:extLst>
+          </p:cNvPr>
+          <p:cNvSpPr>
+            <a:spLocks noGrp="1"/>
+          </p:cNvSpPr>
+          <p:nvPr>
+            <p:ph type="dt" sz="half" idx="10"/>
+          </p:nvPr>
+        </p:nvSpPr>
+        <p:spPr/>
+        <p:txBody>
+          <a:bodyPr/>
+          <a:lstStyle/>
+          <a:p>
+            <a:fld id="{9C24F874-02A1-48BF-AE54-4A07EBAF6EA2}" type="datetimeFigureOut">
+              <a:rPr lang="en-GB" smtClean="0"/>
+              <a:t>20/03/2018</a:t>
+            </a:fld>
+            <a:endParaRPr lang="en-GB"/>
+          </a:p>
+        </p:txBody>
+      </p:sp>
+      <p:sp>
+        <p:nvSpPr>
+          <p:cNvPr id="6" name="Footer Placeholder 5">
+            <a:extLst>
+              <a:ext uri="{FF2B5EF4-FFF2-40B4-BE49-F238E27FC236}">
+                <a16:creationId xmlns:a16="http://schemas.microsoft.com/office/drawing/2014/main" id="{FF89BE0D-F613-49E5-A5E9-DEF8F4128FE5}"/>
+              </a:ext>
+            </a:extLst>
+          </p:cNvPr>
+          <p:cNvSpPr>
+            <a:spLocks noGrp="1"/>
+          </p:cNvSpPr>
+          <p:nvPr>
+            <p:ph type="ftr" sz="quarter" idx="11"/>
+          </p:nvPr>
+        </p:nvSpPr>
+        <p:spPr/>
+        <p:txBody>
+          <a:bodyPr/>
+          <a:lstStyle/>
+          <a:p>
+            <a:endParaRPr lang="en-GB"/>
+          </a:p>
+        </p:txBody>
+      </p:sp>
+      <p:sp>
+        <p:nvSpPr>
+          <p:cNvPr id="7" name="Slide Number Placeholder 6">
+            <a:extLst>
+              <a:ext uri="{FF2B5EF4-FFF2-40B4-BE49-F238E27FC236}">
+                <a16:creationId xmlns:a16="http://schemas.microsoft.com/office/drawing/2014/main" id="{F1D20E1D-69E2-463F-AB44-84EDCA9FB974}"/>
+              </a:ext>
+            </a:extLst>
+          </p:cNvPr>
+          <p:cNvSpPr>
+            <a:spLocks noGrp="1"/>
+          </p:cNvSpPr>
+          <p:nvPr>
+            <p:ph type="sldNum" sz="quarter" idx="12"/>
+          </p:nvPr>
+        </p:nvSpPr>
+        <p:spPr/>
+        <p:txBody>
+          <a:bodyPr/>
+          <a:lstStyle/>
+          <a:p>
+            <a:fld id="{9C7D1916-3AD3-4FEC-AEB3-D0E6DB5A64D5}" type="slidenum">
+              <a:rPr lang="en-GB" smtClean="0"/>
+              <a:t>‹#›</a:t>
+            </a:fld>
+            <a:endParaRPr lang="en-GB"/>
+          </a:p>
+        </p:txBody>
+      </p:sp>
+    </p:spTree>
+    <p:extLst>
+      <p:ext uri="{BB962C8B-B14F-4D97-AF65-F5344CB8AC3E}">
+        <p14:creationId xmlns:p14="http://schemas.microsoft.com/office/powerpoint/2010/main" val="3529492853"/>
+      </p:ext>
+    </p:extLst>
+  </p:cSld>
+  <p:clrMapOvr>
+    <a:masterClrMapping/>
+  </p:clrMapOvr>
+</p:sldLayout>
+</file>
+
+<file path=ppt/slideLayouts/slideLayout21.xml><?xml version="1.0" encoding="utf-8"?>
+<p:sldLayout xmlns:a="http://schemas.openxmlformats.org/drawingml/2006/main" xmlns:r="http://schemas.openxmlformats.org/officeDocument/2006/relationships" xmlns:p="http://schemas.openxmlformats.org/presentationml/2006/main" type="vertTx" preserve="1">
+  <p:cSld name="Title and Vertical Text">
+    <p:spTree>
+      <p:nvGrpSpPr>
+        <p:cNvPr id="1" name=""/>
+        <p:cNvGrpSpPr/>
+        <p:nvPr/>
+      </p:nvGrpSpPr>
+      <p:grpSpPr>
+        <a:xfrm>
+          <a:off x="0" y="0"/>
+          <a:ext cx="0" cy="0"/>
+          <a:chOff x="0" y="0"/>
+          <a:chExt cx="0" cy="0"/>
+        </a:xfrm>
+      </p:grpSpPr>
+      <p:sp>
+        <p:nvSpPr>
+          <p:cNvPr id="2" name="Title 1">
+            <a:extLst>
+              <a:ext uri="{FF2B5EF4-FFF2-40B4-BE49-F238E27FC236}">
+                <a16:creationId xmlns:a16="http://schemas.microsoft.com/office/drawing/2014/main" id="{CC03EB89-6F3F-44AC-9685-3251A8D221C1}"/>
+              </a:ext>
+            </a:extLst>
+          </p:cNvPr>
+          <p:cNvSpPr>
+            <a:spLocks noGrp="1"/>
+          </p:cNvSpPr>
+          <p:nvPr>
+            <p:ph type="title"/>
+          </p:nvPr>
+        </p:nvSpPr>
+        <p:spPr/>
+        <p:txBody>
+          <a:bodyPr/>
+          <a:lstStyle/>
+          <a:p>
+            <a:r>
+              <a:rPr lang="en-US"/>
+              <a:t>Click to edit Master title style</a:t>
+            </a:r>
+            <a:endParaRPr lang="en-GB"/>
+          </a:p>
+        </p:txBody>
+      </p:sp>
+      <p:sp>
+        <p:nvSpPr>
+          <p:cNvPr id="3" name="Vertical Text Placeholder 2">
+            <a:extLst>
+              <a:ext uri="{FF2B5EF4-FFF2-40B4-BE49-F238E27FC236}">
+                <a16:creationId xmlns:a16="http://schemas.microsoft.com/office/drawing/2014/main" id="{BFA23489-9012-467A-9C25-E788456CDA61}"/>
+              </a:ext>
+            </a:extLst>
+          </p:cNvPr>
+          <p:cNvSpPr>
+            <a:spLocks noGrp="1"/>
+          </p:cNvSpPr>
+          <p:nvPr>
+            <p:ph type="body" orient="vert" idx="1"/>
+          </p:nvPr>
+        </p:nvSpPr>
+        <p:spPr/>
+        <p:txBody>
+          <a:bodyPr vert="eaVert"/>
+          <a:lstStyle/>
+          <a:p>
+            <a:pPr lvl="0"/>
+            <a:r>
+              <a:rPr lang="en-US"/>
+              <a:t>Edit Master text styles</a:t>
+            </a:r>
+          </a:p>
+          <a:p>
+            <a:pPr lvl="1"/>
+            <a:r>
+              <a:rPr lang="en-US"/>
+              <a:t>Second level</a:t>
+            </a:r>
+          </a:p>
+          <a:p>
+            <a:pPr lvl="2"/>
+            <a:r>
+              <a:rPr lang="en-US"/>
+              <a:t>Third level</a:t>
+            </a:r>
+          </a:p>
+          <a:p>
+            <a:pPr lvl="3"/>
+            <a:r>
+              <a:rPr lang="en-US"/>
+              <a:t>Fourth level</a:t>
+            </a:r>
+          </a:p>
+          <a:p>
+            <a:pPr lvl="4"/>
+            <a:r>
+              <a:rPr lang="en-US"/>
+              <a:t>Fifth level</a:t>
+            </a:r>
+            <a:endParaRPr lang="en-GB"/>
+          </a:p>
+        </p:txBody>
+      </p:sp>
+      <p:sp>
+        <p:nvSpPr>
+          <p:cNvPr id="4" name="Date Placeholder 3">
+            <a:extLst>
+              <a:ext uri="{FF2B5EF4-FFF2-40B4-BE49-F238E27FC236}">
+                <a16:creationId xmlns:a16="http://schemas.microsoft.com/office/drawing/2014/main" id="{0F562833-360C-4877-9449-08951F5FE127}"/>
+              </a:ext>
+            </a:extLst>
+          </p:cNvPr>
+          <p:cNvSpPr>
+            <a:spLocks noGrp="1"/>
+          </p:cNvSpPr>
+          <p:nvPr>
+            <p:ph type="dt" sz="half" idx="10"/>
+          </p:nvPr>
+        </p:nvSpPr>
+        <p:spPr/>
+        <p:txBody>
+          <a:bodyPr/>
+          <a:lstStyle/>
+          <a:p>
+            <a:fld id="{9C24F874-02A1-48BF-AE54-4A07EBAF6EA2}" type="datetimeFigureOut">
+              <a:rPr lang="en-GB" smtClean="0"/>
+              <a:t>20/03/2018</a:t>
+            </a:fld>
+            <a:endParaRPr lang="en-GB"/>
+          </a:p>
+        </p:txBody>
+      </p:sp>
+      <p:sp>
+        <p:nvSpPr>
+          <p:cNvPr id="5" name="Footer Placeholder 4">
+            <a:extLst>
+              <a:ext uri="{FF2B5EF4-FFF2-40B4-BE49-F238E27FC236}">
+                <a16:creationId xmlns:a16="http://schemas.microsoft.com/office/drawing/2014/main" id="{14364642-3ECE-4038-AE02-46F9F5033E14}"/>
+              </a:ext>
+            </a:extLst>
+          </p:cNvPr>
+          <p:cNvSpPr>
+            <a:spLocks noGrp="1"/>
+          </p:cNvSpPr>
+          <p:nvPr>
+            <p:ph type="ftr" sz="quarter" idx="11"/>
+          </p:nvPr>
+        </p:nvSpPr>
+        <p:spPr/>
+        <p:txBody>
+          <a:bodyPr/>
+          <a:lstStyle/>
+          <a:p>
+            <a:endParaRPr lang="en-GB"/>
+          </a:p>
+        </p:txBody>
+      </p:sp>
+      <p:sp>
+        <p:nvSpPr>
+          <p:cNvPr id="6" name="Slide Number Placeholder 5">
+            <a:extLst>
+              <a:ext uri="{FF2B5EF4-FFF2-40B4-BE49-F238E27FC236}">
+                <a16:creationId xmlns:a16="http://schemas.microsoft.com/office/drawing/2014/main" id="{D1506BEA-ACE5-4A4C-B4D8-188FC8D3471A}"/>
+              </a:ext>
+            </a:extLst>
+          </p:cNvPr>
+          <p:cNvSpPr>
+            <a:spLocks noGrp="1"/>
+          </p:cNvSpPr>
+          <p:nvPr>
+            <p:ph type="sldNum" sz="quarter" idx="12"/>
+          </p:nvPr>
+        </p:nvSpPr>
+        <p:spPr/>
+        <p:txBody>
+          <a:bodyPr/>
+          <a:lstStyle/>
+          <a:p>
+            <a:fld id="{9C7D1916-3AD3-4FEC-AEB3-D0E6DB5A64D5}" type="slidenum">
+              <a:rPr lang="en-GB" smtClean="0"/>
+              <a:t>‹#›</a:t>
+            </a:fld>
+            <a:endParaRPr lang="en-GB"/>
+          </a:p>
+        </p:txBody>
+      </p:sp>
+    </p:spTree>
+    <p:extLst>
+      <p:ext uri="{BB962C8B-B14F-4D97-AF65-F5344CB8AC3E}">
+        <p14:creationId xmlns:p14="http://schemas.microsoft.com/office/powerpoint/2010/main" val="1863711696"/>
+      </p:ext>
+    </p:extLst>
+  </p:cSld>
+  <p:clrMapOvr>
+    <a:masterClrMapping/>
+  </p:clrMapOvr>
+</p:sldLayout>
+</file>
+
+<file path=ppt/slideLayouts/slideLayout22.xml><?xml version="1.0" encoding="utf-8"?>
+<p:sldLayout xmlns:a="http://schemas.openxmlformats.org/drawingml/2006/main" xmlns:r="http://schemas.openxmlformats.org/officeDocument/2006/relationships" xmlns:p="http://schemas.openxmlformats.org/presentationml/2006/main" type="vertTitleAndTx" preserve="1">
+  <p:cSld name="Vertical Title and Text">
+    <p:spTree>
+      <p:nvGrpSpPr>
+        <p:cNvPr id="1" name=""/>
+        <p:cNvGrpSpPr/>
+        <p:nvPr/>
+      </p:nvGrpSpPr>
+      <p:grpSpPr>
+        <a:xfrm>
+          <a:off x="0" y="0"/>
+          <a:ext cx="0" cy="0"/>
+          <a:chOff x="0" y="0"/>
+          <a:chExt cx="0" cy="0"/>
+        </a:xfrm>
+      </p:grpSpPr>
+      <p:sp>
+        <p:nvSpPr>
+          <p:cNvPr id="2" name="Vertical Title 1">
+            <a:extLst>
+              <a:ext uri="{FF2B5EF4-FFF2-40B4-BE49-F238E27FC236}">
+                <a16:creationId xmlns:a16="http://schemas.microsoft.com/office/drawing/2014/main" id="{016350FA-2BEC-455D-9889-358869CB398B}"/>
+              </a:ext>
+            </a:extLst>
+          </p:cNvPr>
+          <p:cNvSpPr>
+            <a:spLocks noGrp="1"/>
+          </p:cNvSpPr>
+          <p:nvPr>
+            <p:ph type="title" orient="vert"/>
+          </p:nvPr>
+        </p:nvSpPr>
+        <p:spPr>
+          <a:xfrm>
+            <a:off x="8724900" y="365125"/>
+            <a:ext cx="2628900" cy="5811838"/>
+          </a:xfrm>
+        </p:spPr>
+        <p:txBody>
+          <a:bodyPr vert="eaVert"/>
+          <a:lstStyle/>
+          <a:p>
+            <a:r>
+              <a:rPr lang="en-US"/>
+              <a:t>Click to edit Master title style</a:t>
+            </a:r>
+            <a:endParaRPr lang="en-GB"/>
+          </a:p>
+        </p:txBody>
+      </p:sp>
+      <p:sp>
+        <p:nvSpPr>
+          <p:cNvPr id="3" name="Vertical Text Placeholder 2">
+            <a:extLst>
+              <a:ext uri="{FF2B5EF4-FFF2-40B4-BE49-F238E27FC236}">
+                <a16:creationId xmlns:a16="http://schemas.microsoft.com/office/drawing/2014/main" id="{450FA255-E488-4FC7-B4B8-CB6BF4CFDDD2}"/>
+              </a:ext>
+            </a:extLst>
+          </p:cNvPr>
+          <p:cNvSpPr>
+            <a:spLocks noGrp="1"/>
+          </p:cNvSpPr>
+          <p:nvPr>
+            <p:ph type="body" orient="vert" idx="1"/>
+          </p:nvPr>
+        </p:nvSpPr>
+        <p:spPr>
+          <a:xfrm>
+            <a:off x="838200" y="365125"/>
+            <a:ext cx="7734300" cy="5811838"/>
+          </a:xfrm>
+        </p:spPr>
+        <p:txBody>
+          <a:bodyPr vert="eaVert"/>
+          <a:lstStyle/>
+          <a:p>
+            <a:pPr lvl="0"/>
+            <a:r>
+              <a:rPr lang="en-US"/>
+              <a:t>Edit Master text styles</a:t>
+            </a:r>
+          </a:p>
+          <a:p>
+            <a:pPr lvl="1"/>
+            <a:r>
+              <a:rPr lang="en-US"/>
+              <a:t>Second level</a:t>
+            </a:r>
+          </a:p>
+          <a:p>
+            <a:pPr lvl="2"/>
+            <a:r>
+              <a:rPr lang="en-US"/>
+              <a:t>Third level</a:t>
+            </a:r>
+          </a:p>
+          <a:p>
+            <a:pPr lvl="3"/>
+            <a:r>
+              <a:rPr lang="en-US"/>
+              <a:t>Fourth level</a:t>
+            </a:r>
+          </a:p>
+          <a:p>
+            <a:pPr lvl="4"/>
+            <a:r>
+              <a:rPr lang="en-US"/>
+              <a:t>Fifth level</a:t>
+            </a:r>
+            <a:endParaRPr lang="en-GB"/>
+          </a:p>
+        </p:txBody>
+      </p:sp>
+      <p:sp>
+        <p:nvSpPr>
+          <p:cNvPr id="4" name="Date Placeholder 3">
+            <a:extLst>
+              <a:ext uri="{FF2B5EF4-FFF2-40B4-BE49-F238E27FC236}">
+                <a16:creationId xmlns:a16="http://schemas.microsoft.com/office/drawing/2014/main" id="{96AB9114-D3F3-4368-BD41-FDF3F4676A73}"/>
+              </a:ext>
+            </a:extLst>
+          </p:cNvPr>
+          <p:cNvSpPr>
+            <a:spLocks noGrp="1"/>
+          </p:cNvSpPr>
+          <p:nvPr>
+            <p:ph type="dt" sz="half" idx="10"/>
+          </p:nvPr>
+        </p:nvSpPr>
+        <p:spPr/>
+        <p:txBody>
+          <a:bodyPr/>
+          <a:lstStyle/>
+          <a:p>
+            <a:fld id="{9C24F874-02A1-48BF-AE54-4A07EBAF6EA2}" type="datetimeFigureOut">
+              <a:rPr lang="en-GB" smtClean="0"/>
+              <a:t>20/03/2018</a:t>
+            </a:fld>
+            <a:endParaRPr lang="en-GB"/>
+          </a:p>
+        </p:txBody>
+      </p:sp>
+      <p:sp>
+        <p:nvSpPr>
+          <p:cNvPr id="5" name="Footer Placeholder 4">
+            <a:extLst>
+              <a:ext uri="{FF2B5EF4-FFF2-40B4-BE49-F238E27FC236}">
+                <a16:creationId xmlns:a16="http://schemas.microsoft.com/office/drawing/2014/main" id="{EA571B5A-4B3D-4771-8572-DC6CA3208CF0}"/>
+              </a:ext>
+            </a:extLst>
+          </p:cNvPr>
+          <p:cNvSpPr>
+            <a:spLocks noGrp="1"/>
+          </p:cNvSpPr>
+          <p:nvPr>
+            <p:ph type="ftr" sz="quarter" idx="11"/>
+          </p:nvPr>
+        </p:nvSpPr>
+        <p:spPr/>
+        <p:txBody>
+          <a:bodyPr/>
+          <a:lstStyle/>
+          <a:p>
+            <a:endParaRPr lang="en-GB"/>
+          </a:p>
+        </p:txBody>
+      </p:sp>
+      <p:sp>
+        <p:nvSpPr>
+          <p:cNvPr id="6" name="Slide Number Placeholder 5">
+            <a:extLst>
+              <a:ext uri="{FF2B5EF4-FFF2-40B4-BE49-F238E27FC236}">
+                <a16:creationId xmlns:a16="http://schemas.microsoft.com/office/drawing/2014/main" id="{CAB0DCA1-D8D5-45FF-A0E6-B6D2F76694EA}"/>
+              </a:ext>
+            </a:extLst>
+          </p:cNvPr>
+          <p:cNvSpPr>
+            <a:spLocks noGrp="1"/>
+          </p:cNvSpPr>
+          <p:nvPr>
+            <p:ph type="sldNum" sz="quarter" idx="12"/>
+          </p:nvPr>
+        </p:nvSpPr>
+        <p:spPr/>
+        <p:txBody>
+          <a:bodyPr/>
+          <a:lstStyle/>
+          <a:p>
+            <a:fld id="{9C7D1916-3AD3-4FEC-AEB3-D0E6DB5A64D5}" type="slidenum">
+              <a:rPr lang="en-GB" smtClean="0"/>
+              <a:t>‹#›</a:t>
+            </a:fld>
+            <a:endParaRPr lang="en-GB"/>
+          </a:p>
+        </p:txBody>
+      </p:sp>
+    </p:spTree>
+    <p:extLst>
+      <p:ext uri="{BB962C8B-B14F-4D97-AF65-F5344CB8AC3E}">
+        <p14:creationId xmlns:p14="http://schemas.microsoft.com/office/powerpoint/2010/main" val="2469861496"/>
       </p:ext>
     </p:extLst>
   </p:cSld>
@@ -1680,7 +4326,7 @@
           <a:p>
             <a:fld id="{F999EE6D-E52B-45B7-B943-4C650C77E21B}" type="datetimeFigureOut">
               <a:rPr lang="en-GB" smtClean="0"/>
-              <a:t>13/03/2018</a:t>
+              <a:t>20/03/2018</a:t>
             </a:fld>
             <a:endParaRPr lang="en-GB"/>
           </a:p>
@@ -1948,7 +4594,7 @@
           <a:p>
             <a:fld id="{F999EE6D-E52B-45B7-B943-4C650C77E21B}" type="datetimeFigureOut">
               <a:rPr lang="en-GB" smtClean="0"/>
-              <a:t>13/03/2018</a:t>
+              <a:t>20/03/2018</a:t>
             </a:fld>
             <a:endParaRPr lang="en-GB"/>
           </a:p>
@@ -2363,7 +5009,7 @@
           <a:p>
             <a:fld id="{F999EE6D-E52B-45B7-B943-4C650C77E21B}" type="datetimeFigureOut">
               <a:rPr lang="en-GB" smtClean="0"/>
-              <a:t>13/03/2018</a:t>
+              <a:t>20/03/2018</a:t>
             </a:fld>
             <a:endParaRPr lang="en-GB"/>
           </a:p>
@@ -2505,7 +5151,7 @@
           <a:p>
             <a:fld id="{F999EE6D-E52B-45B7-B943-4C650C77E21B}" type="datetimeFigureOut">
               <a:rPr lang="en-GB" smtClean="0"/>
-              <a:t>13/03/2018</a:t>
+              <a:t>20/03/2018</a:t>
             </a:fld>
             <a:endParaRPr lang="en-GB"/>
           </a:p>
@@ -2618,7 +5264,7 @@
           <a:p>
             <a:fld id="{F999EE6D-E52B-45B7-B943-4C650C77E21B}" type="datetimeFigureOut">
               <a:rPr lang="en-GB" smtClean="0"/>
-              <a:t>13/03/2018</a:t>
+              <a:t>20/03/2018</a:t>
             </a:fld>
             <a:endParaRPr lang="en-GB"/>
           </a:p>
@@ -2931,7 +5577,7 @@
           <a:p>
             <a:fld id="{F999EE6D-E52B-45B7-B943-4C650C77E21B}" type="datetimeFigureOut">
               <a:rPr lang="en-GB" smtClean="0"/>
-              <a:t>13/03/2018</a:t>
+              <a:t>20/03/2018</a:t>
             </a:fld>
             <a:endParaRPr lang="en-GB"/>
           </a:p>
@@ -3220,7 +5866,7 @@
           <a:p>
             <a:fld id="{F999EE6D-E52B-45B7-B943-4C650C77E21B}" type="datetimeFigureOut">
               <a:rPr lang="en-GB" smtClean="0"/>
-              <a:t>13/03/2018</a:t>
+              <a:t>20/03/2018</a:t>
             </a:fld>
             <a:endParaRPr lang="en-GB"/>
           </a:p>
@@ -3463,7 +6109,7 @@
           <a:p>
             <a:fld id="{F999EE6D-E52B-45B7-B943-4C650C77E21B}" type="datetimeFigureOut">
               <a:rPr lang="en-GB" smtClean="0"/>
-              <a:t>13/03/2018</a:t>
+              <a:t>20/03/2018</a:t>
             </a:fld>
             <a:endParaRPr lang="en-GB"/>
           </a:p>
@@ -3863,6 +6509,576 @@
 </p:sldMaster>
 </file>
 
+<file path=ppt/slideMasters/slideMaster2.xml><?xml version="1.0" encoding="utf-8"?>
+<p:sldMaster xmlns:a="http://schemas.openxmlformats.org/drawingml/2006/main" xmlns:r="http://schemas.openxmlformats.org/officeDocument/2006/relationships" xmlns:p="http://schemas.openxmlformats.org/presentationml/2006/main">
+  <p:cSld>
+    <p:bg>
+      <p:bgRef idx="1001">
+        <a:schemeClr val="bg1"/>
+      </p:bgRef>
+    </p:bg>
+    <p:spTree>
+      <p:nvGrpSpPr>
+        <p:cNvPr id="1" name=""/>
+        <p:cNvGrpSpPr/>
+        <p:nvPr/>
+      </p:nvGrpSpPr>
+      <p:grpSpPr>
+        <a:xfrm>
+          <a:off x="0" y="0"/>
+          <a:ext cx="0" cy="0"/>
+          <a:chOff x="0" y="0"/>
+          <a:chExt cx="0" cy="0"/>
+        </a:xfrm>
+      </p:grpSpPr>
+      <p:sp>
+        <p:nvSpPr>
+          <p:cNvPr id="2" name="Title Placeholder 1">
+            <a:extLst>
+              <a:ext uri="{FF2B5EF4-FFF2-40B4-BE49-F238E27FC236}">
+                <a16:creationId xmlns:a16="http://schemas.microsoft.com/office/drawing/2014/main" id="{EC535ED7-C7B8-407D-9246-0FC9DF9ECE05}"/>
+              </a:ext>
+            </a:extLst>
+          </p:cNvPr>
+          <p:cNvSpPr>
+            <a:spLocks noGrp="1"/>
+          </p:cNvSpPr>
+          <p:nvPr>
+            <p:ph type="title"/>
+          </p:nvPr>
+        </p:nvSpPr>
+        <p:spPr>
+          <a:xfrm>
+            <a:off x="838200" y="365125"/>
+            <a:ext cx="10515600" cy="1325563"/>
+          </a:xfrm>
+          <a:prstGeom prst="rect">
+            <a:avLst/>
+          </a:prstGeom>
+        </p:spPr>
+        <p:txBody>
+          <a:bodyPr vert="horz" lIns="91440" tIns="45720" rIns="91440" bIns="45720" rtlCol="0" anchor="ctr">
+            <a:normAutofit/>
+          </a:bodyPr>
+          <a:lstStyle/>
+          <a:p>
+            <a:r>
+              <a:rPr lang="en-US"/>
+              <a:t>Click to edit Master title style</a:t>
+            </a:r>
+            <a:endParaRPr lang="en-GB"/>
+          </a:p>
+        </p:txBody>
+      </p:sp>
+      <p:sp>
+        <p:nvSpPr>
+          <p:cNvPr id="3" name="Text Placeholder 2">
+            <a:extLst>
+              <a:ext uri="{FF2B5EF4-FFF2-40B4-BE49-F238E27FC236}">
+                <a16:creationId xmlns:a16="http://schemas.microsoft.com/office/drawing/2014/main" id="{2665FAFD-1788-4751-84FF-DA3ECBCDC4E3}"/>
+              </a:ext>
+            </a:extLst>
+          </p:cNvPr>
+          <p:cNvSpPr>
+            <a:spLocks noGrp="1"/>
+          </p:cNvSpPr>
+          <p:nvPr>
+            <p:ph type="body" idx="1"/>
+          </p:nvPr>
+        </p:nvSpPr>
+        <p:spPr>
+          <a:xfrm>
+            <a:off x="838200" y="1825625"/>
+            <a:ext cx="10515600" cy="4351338"/>
+          </a:xfrm>
+          <a:prstGeom prst="rect">
+            <a:avLst/>
+          </a:prstGeom>
+        </p:spPr>
+        <p:txBody>
+          <a:bodyPr vert="horz" lIns="91440" tIns="45720" rIns="91440" bIns="45720" rtlCol="0">
+            <a:normAutofit/>
+          </a:bodyPr>
+          <a:lstStyle/>
+          <a:p>
+            <a:pPr lvl="0"/>
+            <a:r>
+              <a:rPr lang="en-US"/>
+              <a:t>Edit Master text styles</a:t>
+            </a:r>
+          </a:p>
+          <a:p>
+            <a:pPr lvl="1"/>
+            <a:r>
+              <a:rPr lang="en-US"/>
+              <a:t>Second level</a:t>
+            </a:r>
+          </a:p>
+          <a:p>
+            <a:pPr lvl="2"/>
+            <a:r>
+              <a:rPr lang="en-US"/>
+              <a:t>Third level</a:t>
+            </a:r>
+          </a:p>
+          <a:p>
+            <a:pPr lvl="3"/>
+            <a:r>
+              <a:rPr lang="en-US"/>
+              <a:t>Fourth level</a:t>
+            </a:r>
+          </a:p>
+          <a:p>
+            <a:pPr lvl="4"/>
+            <a:r>
+              <a:rPr lang="en-US"/>
+              <a:t>Fifth level</a:t>
+            </a:r>
+            <a:endParaRPr lang="en-GB"/>
+          </a:p>
+        </p:txBody>
+      </p:sp>
+      <p:sp>
+        <p:nvSpPr>
+          <p:cNvPr id="4" name="Date Placeholder 3">
+            <a:extLst>
+              <a:ext uri="{FF2B5EF4-FFF2-40B4-BE49-F238E27FC236}">
+                <a16:creationId xmlns:a16="http://schemas.microsoft.com/office/drawing/2014/main" id="{52365336-5579-4C13-8B3D-98B5A3B120D0}"/>
+              </a:ext>
+            </a:extLst>
+          </p:cNvPr>
+          <p:cNvSpPr>
+            <a:spLocks noGrp="1"/>
+          </p:cNvSpPr>
+          <p:nvPr>
+            <p:ph type="dt" sz="half" idx="2"/>
+          </p:nvPr>
+        </p:nvSpPr>
+        <p:spPr>
+          <a:xfrm>
+            <a:off x="838200" y="6356350"/>
+            <a:ext cx="2743200" cy="365125"/>
+          </a:xfrm>
+          <a:prstGeom prst="rect">
+            <a:avLst/>
+          </a:prstGeom>
+        </p:spPr>
+        <p:txBody>
+          <a:bodyPr vert="horz" lIns="91440" tIns="45720" rIns="91440" bIns="45720" rtlCol="0" anchor="ctr"/>
+          <a:lstStyle>
+            <a:lvl1pPr algn="l">
+              <a:defRPr sz="1200">
+                <a:solidFill>
+                  <a:schemeClr val="tx1">
+                    <a:tint val="75000"/>
+                  </a:schemeClr>
+                </a:solidFill>
+              </a:defRPr>
+            </a:lvl1pPr>
+          </a:lstStyle>
+          <a:p>
+            <a:fld id="{9C24F874-02A1-48BF-AE54-4A07EBAF6EA2}" type="datetimeFigureOut">
+              <a:rPr lang="en-GB" smtClean="0"/>
+              <a:t>20/03/2018</a:t>
+            </a:fld>
+            <a:endParaRPr lang="en-GB"/>
+          </a:p>
+        </p:txBody>
+      </p:sp>
+      <p:sp>
+        <p:nvSpPr>
+          <p:cNvPr id="5" name="Footer Placeholder 4">
+            <a:extLst>
+              <a:ext uri="{FF2B5EF4-FFF2-40B4-BE49-F238E27FC236}">
+                <a16:creationId xmlns:a16="http://schemas.microsoft.com/office/drawing/2014/main" id="{883D9F1F-0948-442D-82E0-CEE01D6F15CB}"/>
+              </a:ext>
+            </a:extLst>
+          </p:cNvPr>
+          <p:cNvSpPr>
+            <a:spLocks noGrp="1"/>
+          </p:cNvSpPr>
+          <p:nvPr>
+            <p:ph type="ftr" sz="quarter" idx="3"/>
+          </p:nvPr>
+        </p:nvSpPr>
+        <p:spPr>
+          <a:xfrm>
+            <a:off x="4038600" y="6356350"/>
+            <a:ext cx="4114800" cy="365125"/>
+          </a:xfrm>
+          <a:prstGeom prst="rect">
+            <a:avLst/>
+          </a:prstGeom>
+        </p:spPr>
+        <p:txBody>
+          <a:bodyPr vert="horz" lIns="91440" tIns="45720" rIns="91440" bIns="45720" rtlCol="0" anchor="ctr"/>
+          <a:lstStyle>
+            <a:lvl1pPr algn="ctr">
+              <a:defRPr sz="1200">
+                <a:solidFill>
+                  <a:schemeClr val="tx1">
+                    <a:tint val="75000"/>
+                  </a:schemeClr>
+                </a:solidFill>
+              </a:defRPr>
+            </a:lvl1pPr>
+          </a:lstStyle>
+          <a:p>
+            <a:endParaRPr lang="en-GB"/>
+          </a:p>
+        </p:txBody>
+      </p:sp>
+      <p:sp>
+        <p:nvSpPr>
+          <p:cNvPr id="6" name="Slide Number Placeholder 5">
+            <a:extLst>
+              <a:ext uri="{FF2B5EF4-FFF2-40B4-BE49-F238E27FC236}">
+                <a16:creationId xmlns:a16="http://schemas.microsoft.com/office/drawing/2014/main" id="{24C60991-82BF-4770-B406-335445615505}"/>
+              </a:ext>
+            </a:extLst>
+          </p:cNvPr>
+          <p:cNvSpPr>
+            <a:spLocks noGrp="1"/>
+          </p:cNvSpPr>
+          <p:nvPr>
+            <p:ph type="sldNum" sz="quarter" idx="4"/>
+          </p:nvPr>
+        </p:nvSpPr>
+        <p:spPr>
+          <a:xfrm>
+            <a:off x="8610600" y="6356350"/>
+            <a:ext cx="2743200" cy="365125"/>
+          </a:xfrm>
+          <a:prstGeom prst="rect">
+            <a:avLst/>
+          </a:prstGeom>
+        </p:spPr>
+        <p:txBody>
+          <a:bodyPr vert="horz" lIns="91440" tIns="45720" rIns="91440" bIns="45720" rtlCol="0" anchor="ctr"/>
+          <a:lstStyle>
+            <a:lvl1pPr algn="r">
+              <a:defRPr sz="1200">
+                <a:solidFill>
+                  <a:schemeClr val="tx1">
+                    <a:tint val="75000"/>
+                  </a:schemeClr>
+                </a:solidFill>
+              </a:defRPr>
+            </a:lvl1pPr>
+          </a:lstStyle>
+          <a:p>
+            <a:fld id="{9C7D1916-3AD3-4FEC-AEB3-D0E6DB5A64D5}" type="slidenum">
+              <a:rPr lang="en-GB" smtClean="0"/>
+              <a:t>‹#›</a:t>
+            </a:fld>
+            <a:endParaRPr lang="en-GB"/>
+          </a:p>
+        </p:txBody>
+      </p:sp>
+    </p:spTree>
+    <p:extLst>
+      <p:ext uri="{BB962C8B-B14F-4D97-AF65-F5344CB8AC3E}">
+        <p14:creationId xmlns:p14="http://schemas.microsoft.com/office/powerpoint/2010/main" val="4155326003"/>
+      </p:ext>
+    </p:extLst>
+  </p:cSld>
+  <p:clrMap bg1="lt1" tx1="dk1" bg2="lt2" tx2="dk2" accent1="accent1" accent2="accent2" accent3="accent3" accent4="accent4" accent5="accent5" accent6="accent6" hlink="hlink" folHlink="folHlink"/>
+  <p:sldLayoutIdLst>
+    <p:sldLayoutId id="2147483661" r:id="rId1"/>
+    <p:sldLayoutId id="2147483662" r:id="rId2"/>
+    <p:sldLayoutId id="2147483663" r:id="rId3"/>
+    <p:sldLayoutId id="2147483664" r:id="rId4"/>
+    <p:sldLayoutId id="2147483665" r:id="rId5"/>
+    <p:sldLayoutId id="2147483666" r:id="rId6"/>
+    <p:sldLayoutId id="2147483667" r:id="rId7"/>
+    <p:sldLayoutId id="2147483668" r:id="rId8"/>
+    <p:sldLayoutId id="2147483669" r:id="rId9"/>
+    <p:sldLayoutId id="2147483670" r:id="rId10"/>
+    <p:sldLayoutId id="2147483671" r:id="rId11"/>
+  </p:sldLayoutIdLst>
+  <p:txStyles>
+    <p:titleStyle>
+      <a:lvl1pPr algn="l" defTabSz="914400" rtl="0" eaLnBrk="1" latinLnBrk="0" hangingPunct="1">
+        <a:lnSpc>
+          <a:spcPct val="90000"/>
+        </a:lnSpc>
+        <a:spcBef>
+          <a:spcPct val="0"/>
+        </a:spcBef>
+        <a:buNone/>
+        <a:defRPr sz="4400" kern="1200">
+          <a:solidFill>
+            <a:schemeClr val="tx1"/>
+          </a:solidFill>
+          <a:latin typeface="+mj-lt"/>
+          <a:ea typeface="+mj-ea"/>
+          <a:cs typeface="+mj-cs"/>
+        </a:defRPr>
+      </a:lvl1pPr>
+    </p:titleStyle>
+    <p:bodyStyle>
+      <a:lvl1pPr marL="228600" indent="-228600" algn="l" defTabSz="914400" rtl="0" eaLnBrk="1" latinLnBrk="0" hangingPunct="1">
+        <a:lnSpc>
+          <a:spcPct val="90000"/>
+        </a:lnSpc>
+        <a:spcBef>
+          <a:spcPts val="1000"/>
+        </a:spcBef>
+        <a:buFont typeface="Arial" panose="020B0604020202020204" pitchFamily="34" charset="0"/>
+        <a:buChar char="•"/>
+        <a:defRPr sz="2800" kern="1200">
+          <a:solidFill>
+            <a:schemeClr val="tx1"/>
+          </a:solidFill>
+          <a:latin typeface="+mn-lt"/>
+          <a:ea typeface="+mn-ea"/>
+          <a:cs typeface="+mn-cs"/>
+        </a:defRPr>
+      </a:lvl1pPr>
+      <a:lvl2pPr marL="685800" indent="-228600" algn="l" defTabSz="914400" rtl="0" eaLnBrk="1" latinLnBrk="0" hangingPunct="1">
+        <a:lnSpc>
+          <a:spcPct val="90000"/>
+        </a:lnSpc>
+        <a:spcBef>
+          <a:spcPts val="500"/>
+        </a:spcBef>
+        <a:buFont typeface="Arial" panose="020B0604020202020204" pitchFamily="34" charset="0"/>
+        <a:buChar char="•"/>
+        <a:defRPr sz="2400" kern="1200">
+          <a:solidFill>
+            <a:schemeClr val="tx1"/>
+          </a:solidFill>
+          <a:latin typeface="+mn-lt"/>
+          <a:ea typeface="+mn-ea"/>
+          <a:cs typeface="+mn-cs"/>
+        </a:defRPr>
+      </a:lvl2pPr>
+      <a:lvl3pPr marL="1143000" indent="-228600" algn="l" defTabSz="914400" rtl="0" eaLnBrk="1" latinLnBrk="0" hangingPunct="1">
+        <a:lnSpc>
+          <a:spcPct val="90000"/>
+        </a:lnSpc>
+        <a:spcBef>
+          <a:spcPts val="500"/>
+        </a:spcBef>
+        <a:buFont typeface="Arial" panose="020B0604020202020204" pitchFamily="34" charset="0"/>
+        <a:buChar char="•"/>
+        <a:defRPr sz="2000" kern="1200">
+          <a:solidFill>
+            <a:schemeClr val="tx1"/>
+          </a:solidFill>
+          <a:latin typeface="+mn-lt"/>
+          <a:ea typeface="+mn-ea"/>
+          <a:cs typeface="+mn-cs"/>
+        </a:defRPr>
+      </a:lvl3pPr>
+      <a:lvl4pPr marL="1600200" indent="-228600" algn="l" defTabSz="914400" rtl="0" eaLnBrk="1" latinLnBrk="0" hangingPunct="1">
+        <a:lnSpc>
+          <a:spcPct val="90000"/>
+        </a:lnSpc>
+        <a:spcBef>
+          <a:spcPts val="500"/>
+        </a:spcBef>
+        <a:buFont typeface="Arial" panose="020B0604020202020204" pitchFamily="34" charset="0"/>
+        <a:buChar char="•"/>
+        <a:defRPr sz="1800" kern="1200">
+          <a:solidFill>
+            <a:schemeClr val="tx1"/>
+          </a:solidFill>
+          <a:latin typeface="+mn-lt"/>
+          <a:ea typeface="+mn-ea"/>
+          <a:cs typeface="+mn-cs"/>
+        </a:defRPr>
+      </a:lvl4pPr>
+      <a:lvl5pPr marL="2057400" indent="-228600" algn="l" defTabSz="914400" rtl="0" eaLnBrk="1" latinLnBrk="0" hangingPunct="1">
+        <a:lnSpc>
+          <a:spcPct val="90000"/>
+        </a:lnSpc>
+        <a:spcBef>
+          <a:spcPts val="500"/>
+        </a:spcBef>
+        <a:buFont typeface="Arial" panose="020B0604020202020204" pitchFamily="34" charset="0"/>
+        <a:buChar char="•"/>
+        <a:defRPr sz="1800" kern="1200">
+          <a:solidFill>
+            <a:schemeClr val="tx1"/>
+          </a:solidFill>
+          <a:latin typeface="+mn-lt"/>
+          <a:ea typeface="+mn-ea"/>
+          <a:cs typeface="+mn-cs"/>
+        </a:defRPr>
+      </a:lvl5pPr>
+      <a:lvl6pPr marL="2514600" indent="-228600" algn="l" defTabSz="914400" rtl="0" eaLnBrk="1" latinLnBrk="0" hangingPunct="1">
+        <a:lnSpc>
+          <a:spcPct val="90000"/>
+        </a:lnSpc>
+        <a:spcBef>
+          <a:spcPts val="500"/>
+        </a:spcBef>
+        <a:buFont typeface="Arial" panose="020B0604020202020204" pitchFamily="34" charset="0"/>
+        <a:buChar char="•"/>
+        <a:defRPr sz="1800" kern="1200">
+          <a:solidFill>
+            <a:schemeClr val="tx1"/>
+          </a:solidFill>
+          <a:latin typeface="+mn-lt"/>
+          <a:ea typeface="+mn-ea"/>
+          <a:cs typeface="+mn-cs"/>
+        </a:defRPr>
+      </a:lvl6pPr>
+      <a:lvl7pPr marL="2971800" indent="-228600" algn="l" defTabSz="914400" rtl="0" eaLnBrk="1" latinLnBrk="0" hangingPunct="1">
+        <a:lnSpc>
+          <a:spcPct val="90000"/>
+        </a:lnSpc>
+        <a:spcBef>
+          <a:spcPts val="500"/>
+        </a:spcBef>
+        <a:buFont typeface="Arial" panose="020B0604020202020204" pitchFamily="34" charset="0"/>
+        <a:buChar char="•"/>
+        <a:defRPr sz="1800" kern="1200">
+          <a:solidFill>
+            <a:schemeClr val="tx1"/>
+          </a:solidFill>
+          <a:latin typeface="+mn-lt"/>
+          <a:ea typeface="+mn-ea"/>
+          <a:cs typeface="+mn-cs"/>
+        </a:defRPr>
+      </a:lvl7pPr>
+      <a:lvl8pPr marL="3429000" indent="-228600" algn="l" defTabSz="914400" rtl="0" eaLnBrk="1" latinLnBrk="0" hangingPunct="1">
+        <a:lnSpc>
+          <a:spcPct val="90000"/>
+        </a:lnSpc>
+        <a:spcBef>
+          <a:spcPts val="500"/>
+        </a:spcBef>
+        <a:buFont typeface="Arial" panose="020B0604020202020204" pitchFamily="34" charset="0"/>
+        <a:buChar char="•"/>
+        <a:defRPr sz="1800" kern="1200">
+          <a:solidFill>
+            <a:schemeClr val="tx1"/>
+          </a:solidFill>
+          <a:latin typeface="+mn-lt"/>
+          <a:ea typeface="+mn-ea"/>
+          <a:cs typeface="+mn-cs"/>
+        </a:defRPr>
+      </a:lvl8pPr>
+      <a:lvl9pPr marL="3886200" indent="-228600" algn="l" defTabSz="914400" rtl="0" eaLnBrk="1" latinLnBrk="0" hangingPunct="1">
+        <a:lnSpc>
+          <a:spcPct val="90000"/>
+        </a:lnSpc>
+        <a:spcBef>
+          <a:spcPts val="500"/>
+        </a:spcBef>
+        <a:buFont typeface="Arial" panose="020B0604020202020204" pitchFamily="34" charset="0"/>
+        <a:buChar char="•"/>
+        <a:defRPr sz="1800" kern="1200">
+          <a:solidFill>
+            <a:schemeClr val="tx1"/>
+          </a:solidFill>
+          <a:latin typeface="+mn-lt"/>
+          <a:ea typeface="+mn-ea"/>
+          <a:cs typeface="+mn-cs"/>
+        </a:defRPr>
+      </a:lvl9pPr>
+    </p:bodyStyle>
+    <p:otherStyle>
+      <a:defPPr>
+        <a:defRPr lang="en-US"/>
+      </a:defPPr>
+      <a:lvl1pPr marL="0" algn="l" defTabSz="914400" rtl="0" eaLnBrk="1" latinLnBrk="0" hangingPunct="1">
+        <a:defRPr sz="1800" kern="1200">
+          <a:solidFill>
+            <a:schemeClr val="tx1"/>
+          </a:solidFill>
+          <a:latin typeface="+mn-lt"/>
+          <a:ea typeface="+mn-ea"/>
+          <a:cs typeface="+mn-cs"/>
+        </a:defRPr>
+      </a:lvl1pPr>
+      <a:lvl2pPr marL="457200" algn="l" defTabSz="914400" rtl="0" eaLnBrk="1" latinLnBrk="0" hangingPunct="1">
+        <a:defRPr sz="1800" kern="1200">
+          <a:solidFill>
+            <a:schemeClr val="tx1"/>
+          </a:solidFill>
+          <a:latin typeface="+mn-lt"/>
+          <a:ea typeface="+mn-ea"/>
+          <a:cs typeface="+mn-cs"/>
+        </a:defRPr>
+      </a:lvl2pPr>
+      <a:lvl3pPr marL="914400" algn="l" defTabSz="914400" rtl="0" eaLnBrk="1" latinLnBrk="0" hangingPunct="1">
+        <a:defRPr sz="1800" kern="1200">
+          <a:solidFill>
+            <a:schemeClr val="tx1"/>
+          </a:solidFill>
+          <a:latin typeface="+mn-lt"/>
+          <a:ea typeface="+mn-ea"/>
+          <a:cs typeface="+mn-cs"/>
+        </a:defRPr>
+      </a:lvl3pPr>
+      <a:lvl4pPr marL="1371600" algn="l" defTabSz="914400" rtl="0" eaLnBrk="1" latinLnBrk="0" hangingPunct="1">
+        <a:defRPr sz="1800" kern="1200">
+          <a:solidFill>
+            <a:schemeClr val="tx1"/>
+          </a:solidFill>
+          <a:latin typeface="+mn-lt"/>
+          <a:ea typeface="+mn-ea"/>
+          <a:cs typeface="+mn-cs"/>
+        </a:defRPr>
+      </a:lvl4pPr>
+      <a:lvl5pPr marL="1828800" algn="l" defTabSz="914400" rtl="0" eaLnBrk="1" latinLnBrk="0" hangingPunct="1">
+        <a:defRPr sz="1800" kern="1200">
+          <a:solidFill>
+            <a:schemeClr val="tx1"/>
+          </a:solidFill>
+          <a:latin typeface="+mn-lt"/>
+          <a:ea typeface="+mn-ea"/>
+          <a:cs typeface="+mn-cs"/>
+        </a:defRPr>
+      </a:lvl5pPr>
+      <a:lvl6pPr marL="2286000" algn="l" defTabSz="914400" rtl="0" eaLnBrk="1" latinLnBrk="0" hangingPunct="1">
+        <a:defRPr sz="1800" kern="1200">
+          <a:solidFill>
+            <a:schemeClr val="tx1"/>
+          </a:solidFill>
+          <a:latin typeface="+mn-lt"/>
+          <a:ea typeface="+mn-ea"/>
+          <a:cs typeface="+mn-cs"/>
+        </a:defRPr>
+      </a:lvl6pPr>
+      <a:lvl7pPr marL="2743200" algn="l" defTabSz="914400" rtl="0" eaLnBrk="1" latinLnBrk="0" hangingPunct="1">
+        <a:defRPr sz="1800" kern="1200">
+          <a:solidFill>
+            <a:schemeClr val="tx1"/>
+          </a:solidFill>
+          <a:latin typeface="+mn-lt"/>
+          <a:ea typeface="+mn-ea"/>
+          <a:cs typeface="+mn-cs"/>
+        </a:defRPr>
+      </a:lvl7pPr>
+      <a:lvl8pPr marL="3200400" algn="l" defTabSz="914400" rtl="0" eaLnBrk="1" latinLnBrk="0" hangingPunct="1">
+        <a:defRPr sz="1800" kern="1200">
+          <a:solidFill>
+            <a:schemeClr val="tx1"/>
+          </a:solidFill>
+          <a:latin typeface="+mn-lt"/>
+          <a:ea typeface="+mn-ea"/>
+          <a:cs typeface="+mn-cs"/>
+        </a:defRPr>
+      </a:lvl8pPr>
+      <a:lvl9pPr marL="3657600" algn="l" defTabSz="914400" rtl="0" eaLnBrk="1" latinLnBrk="0" hangingPunct="1">
+        <a:defRPr sz="1800" kern="1200">
+          <a:solidFill>
+            <a:schemeClr val="tx1"/>
+          </a:solidFill>
+          <a:latin typeface="+mn-lt"/>
+          <a:ea typeface="+mn-ea"/>
+          <a:cs typeface="+mn-cs"/>
+        </a:defRPr>
+      </a:lvl9pPr>
+    </p:otherStyle>
+  </p:txStyles>
+</p:sldMaster>
+</file>
+
 <file path=ppt/slides/slide1.xml><?xml version="1.0" encoding="utf-8"?>
 <p:sld xmlns:a="http://schemas.openxmlformats.org/drawingml/2006/main" xmlns:r="http://schemas.openxmlformats.org/officeDocument/2006/relationships" xmlns:p="http://schemas.openxmlformats.org/presentationml/2006/main">
   <p:cSld>
@@ -5630,6 +8846,419 @@
 </file>
 
 <file path=ppt/slides/slide6.xml><?xml version="1.0" encoding="utf-8"?>
+<p:sld xmlns:a="http://schemas.openxmlformats.org/drawingml/2006/main" xmlns:r="http://schemas.openxmlformats.org/officeDocument/2006/relationships" xmlns:p="http://schemas.openxmlformats.org/presentationml/2006/main">
+  <p:cSld>
+    <p:spTree>
+      <p:nvGrpSpPr>
+        <p:cNvPr id="1" name=""/>
+        <p:cNvGrpSpPr/>
+        <p:nvPr/>
+      </p:nvGrpSpPr>
+      <p:grpSpPr>
+        <a:xfrm>
+          <a:off x="0" y="0"/>
+          <a:ext cx="0" cy="0"/>
+          <a:chOff x="0" y="0"/>
+          <a:chExt cx="0" cy="0"/>
+        </a:xfrm>
+      </p:grpSpPr>
+      <p:sp>
+        <p:nvSpPr>
+          <p:cNvPr id="6" name="TextBox 5">
+            <a:extLst>
+              <a:ext uri="{FF2B5EF4-FFF2-40B4-BE49-F238E27FC236}">
+                <a16:creationId xmlns:a16="http://schemas.microsoft.com/office/drawing/2014/main" id="{7A8DEA36-A431-4E66-95D8-C203D32F97F5}"/>
+              </a:ext>
+            </a:extLst>
+          </p:cNvPr>
+          <p:cNvSpPr txBox="1"/>
+          <p:nvPr/>
+        </p:nvSpPr>
+        <p:spPr>
+          <a:xfrm>
+            <a:off x="1420831" y="896761"/>
+            <a:ext cx="2729132" cy="369332"/>
+          </a:xfrm>
+          <a:prstGeom prst="rect">
+            <a:avLst/>
+          </a:prstGeom>
+          <a:noFill/>
+        </p:spPr>
+        <p:txBody>
+          <a:bodyPr wrap="square" rtlCol="0">
+            <a:spAutoFit/>
+          </a:bodyPr>
+          <a:lstStyle/>
+          <a:p>
+            <a:pPr marL="0" marR="0" lvl="0" indent="0" algn="l" defTabSz="914400" rtl="0" eaLnBrk="1" fontAlgn="auto" latinLnBrk="0" hangingPunct="1">
+              <a:lnSpc>
+                <a:spcPct val="100000"/>
+              </a:lnSpc>
+              <a:spcBef>
+                <a:spcPts val="0"/>
+              </a:spcBef>
+              <a:spcAft>
+                <a:spcPts val="0"/>
+              </a:spcAft>
+              <a:buClrTx/>
+              <a:buSzTx/>
+              <a:buFontTx/>
+              <a:buNone/>
+              <a:tabLst/>
+              <a:defRPr/>
+            </a:pPr>
+            <a:r>
+              <a:rPr kumimoji="0" lang="en-GB" sz="1800" b="0" i="0" u="none" strike="noStrike" kern="1200" cap="none" spc="0" normalizeH="0" baseline="0" noProof="0" dirty="0">
+                <a:ln>
+                  <a:noFill/>
+                </a:ln>
+                <a:solidFill>
+                  <a:prstClr val="black"/>
+                </a:solidFill>
+                <a:effectLst/>
+                <a:uLnTx/>
+                <a:uFillTx/>
+                <a:latin typeface="Calibri" panose="020F0502020204030204"/>
+                <a:ea typeface="+mn-ea"/>
+                <a:cs typeface="+mn-cs"/>
+              </a:rPr>
+              <a:t>1</a:t>
+            </a:r>
+            <a:r>
+              <a:rPr kumimoji="0" lang="en-GB" sz="1800" b="0" i="0" u="none" strike="noStrike" kern="1200" cap="none" spc="0" normalizeH="0" baseline="30000" noProof="0" dirty="0">
+                <a:ln>
+                  <a:noFill/>
+                </a:ln>
+                <a:solidFill>
+                  <a:prstClr val="black"/>
+                </a:solidFill>
+                <a:effectLst/>
+                <a:uLnTx/>
+                <a:uFillTx/>
+                <a:latin typeface="Calibri" panose="020F0502020204030204"/>
+                <a:ea typeface="+mn-ea"/>
+                <a:cs typeface="+mn-cs"/>
+              </a:rPr>
+              <a:t>st</a:t>
+            </a:r>
+            <a:r>
+              <a:rPr kumimoji="0" lang="en-GB" sz="1800" b="0" i="0" u="none" strike="noStrike" kern="1200" cap="none" spc="0" normalizeH="0" baseline="0" noProof="0" dirty="0">
+                <a:ln>
+                  <a:noFill/>
+                </a:ln>
+                <a:solidFill>
+                  <a:prstClr val="black"/>
+                </a:solidFill>
+                <a:effectLst/>
+                <a:uLnTx/>
+                <a:uFillTx/>
+                <a:latin typeface="Calibri" panose="020F0502020204030204"/>
+                <a:ea typeface="+mn-ea"/>
+                <a:cs typeface="+mn-cs"/>
+              </a:rPr>
+              <a:t> layer activations</a:t>
+            </a:r>
+          </a:p>
+        </p:txBody>
+      </p:sp>
+      <p:sp>
+        <p:nvSpPr>
+          <p:cNvPr id="7" name="TextBox 6">
+            <a:extLst>
+              <a:ext uri="{FF2B5EF4-FFF2-40B4-BE49-F238E27FC236}">
+                <a16:creationId xmlns:a16="http://schemas.microsoft.com/office/drawing/2014/main" id="{63F0D41E-535C-4573-98B2-ED311E0E4637}"/>
+              </a:ext>
+            </a:extLst>
+          </p:cNvPr>
+          <p:cNvSpPr txBox="1"/>
+          <p:nvPr/>
+        </p:nvSpPr>
+        <p:spPr>
+          <a:xfrm>
+            <a:off x="7970291" y="896761"/>
+            <a:ext cx="2729132" cy="369332"/>
+          </a:xfrm>
+          <a:prstGeom prst="rect">
+            <a:avLst/>
+          </a:prstGeom>
+          <a:noFill/>
+        </p:spPr>
+        <p:txBody>
+          <a:bodyPr wrap="square" rtlCol="0">
+            <a:spAutoFit/>
+          </a:bodyPr>
+          <a:lstStyle/>
+          <a:p>
+            <a:pPr marL="0" marR="0" lvl="0" indent="0" algn="l" defTabSz="914400" rtl="0" eaLnBrk="1" fontAlgn="auto" latinLnBrk="0" hangingPunct="1">
+              <a:lnSpc>
+                <a:spcPct val="100000"/>
+              </a:lnSpc>
+              <a:spcBef>
+                <a:spcPts val="0"/>
+              </a:spcBef>
+              <a:spcAft>
+                <a:spcPts val="0"/>
+              </a:spcAft>
+              <a:buClrTx/>
+              <a:buSzTx/>
+              <a:buFontTx/>
+              <a:buNone/>
+              <a:tabLst/>
+              <a:defRPr/>
+            </a:pPr>
+            <a:r>
+              <a:rPr kumimoji="0" lang="en-GB" sz="1800" b="0" i="0" u="none" strike="noStrike" kern="1200" cap="none" spc="0" normalizeH="0" baseline="0" noProof="0" dirty="0">
+                <a:ln>
+                  <a:noFill/>
+                </a:ln>
+                <a:solidFill>
+                  <a:prstClr val="black"/>
+                </a:solidFill>
+                <a:effectLst/>
+                <a:uLnTx/>
+                <a:uFillTx/>
+                <a:latin typeface="Calibri" panose="020F0502020204030204"/>
+                <a:ea typeface="+mn-ea"/>
+                <a:cs typeface="+mn-cs"/>
+              </a:rPr>
+              <a:t>2nd layer activations</a:t>
+            </a:r>
+          </a:p>
+        </p:txBody>
+      </p:sp>
+      <p:sp>
+        <p:nvSpPr>
+          <p:cNvPr id="8" name="TextBox 7">
+            <a:extLst>
+              <a:ext uri="{FF2B5EF4-FFF2-40B4-BE49-F238E27FC236}">
+                <a16:creationId xmlns:a16="http://schemas.microsoft.com/office/drawing/2014/main" id="{29E4150E-7532-4CDF-9D3B-F540C3B02DE7}"/>
+              </a:ext>
+            </a:extLst>
+          </p:cNvPr>
+          <p:cNvSpPr txBox="1"/>
+          <p:nvPr/>
+        </p:nvSpPr>
+        <p:spPr>
+          <a:xfrm>
+            <a:off x="4346917" y="2274838"/>
+            <a:ext cx="1491175" cy="2308324"/>
+          </a:xfrm>
+          <a:prstGeom prst="rect">
+            <a:avLst/>
+          </a:prstGeom>
+          <a:noFill/>
+        </p:spPr>
+        <p:txBody>
+          <a:bodyPr wrap="square" rtlCol="0">
+            <a:spAutoFit/>
+          </a:bodyPr>
+          <a:lstStyle/>
+          <a:p>
+            <a:pPr marL="0" marR="0" lvl="0" indent="0" algn="ctr" defTabSz="914400" rtl="0" eaLnBrk="1" fontAlgn="auto" latinLnBrk="0" hangingPunct="1">
+              <a:lnSpc>
+                <a:spcPct val="100000"/>
+              </a:lnSpc>
+              <a:spcBef>
+                <a:spcPts val="0"/>
+              </a:spcBef>
+              <a:spcAft>
+                <a:spcPts val="0"/>
+              </a:spcAft>
+              <a:buClrTx/>
+              <a:buSzTx/>
+              <a:buFontTx/>
+              <a:buNone/>
+              <a:tabLst/>
+              <a:defRPr/>
+            </a:pPr>
+            <a:r>
+              <a:rPr kumimoji="0" lang="en-GB" sz="1800" b="0" i="0" u="none" strike="noStrike" kern="1200" cap="none" spc="0" normalizeH="0" baseline="0" noProof="0" dirty="0">
+                <a:ln>
+                  <a:noFill/>
+                </a:ln>
+                <a:solidFill>
+                  <a:prstClr val="black"/>
+                </a:solidFill>
+                <a:effectLst/>
+                <a:uLnTx/>
+                <a:uFillTx/>
+                <a:latin typeface="Calibri" panose="020F0502020204030204"/>
+                <a:ea typeface="+mn-ea"/>
+                <a:cs typeface="+mn-cs"/>
+              </a:rPr>
+              <a:t>Feature maps from convolutional layers from network trained on 100 classes from scratch</a:t>
+            </a:r>
+          </a:p>
+        </p:txBody>
+      </p:sp>
+      <p:sp>
+        <p:nvSpPr>
+          <p:cNvPr id="9" name="Title 1">
+            <a:extLst>
+              <a:ext uri="{FF2B5EF4-FFF2-40B4-BE49-F238E27FC236}">
+                <a16:creationId xmlns:a16="http://schemas.microsoft.com/office/drawing/2014/main" id="{27FD6720-7A05-4822-8A8D-181AE7BCC6E1}"/>
+              </a:ext>
+            </a:extLst>
+          </p:cNvPr>
+          <p:cNvSpPr txBox="1">
+            <a:spLocks/>
+          </p:cNvSpPr>
+          <p:nvPr/>
+        </p:nvSpPr>
+        <p:spPr>
+          <a:xfrm>
+            <a:off x="183823" y="-59081"/>
+            <a:ext cx="10515600" cy="1325563"/>
+          </a:xfrm>
+          <a:prstGeom prst="rect">
+            <a:avLst/>
+          </a:prstGeom>
+        </p:spPr>
+        <p:txBody>
+          <a:bodyPr vert="horz" lIns="91440" tIns="45720" rIns="91440" bIns="45720" rtlCol="0" anchor="ctr">
+            <a:normAutofit/>
+          </a:bodyPr>
+          <a:lstStyle>
+            <a:lvl1pPr algn="l" defTabSz="914400" rtl="0" eaLnBrk="1" latinLnBrk="0" hangingPunct="1">
+              <a:lnSpc>
+                <a:spcPct val="90000"/>
+              </a:lnSpc>
+              <a:spcBef>
+                <a:spcPct val="0"/>
+              </a:spcBef>
+              <a:buNone/>
+              <a:defRPr sz="4400" kern="1200">
+                <a:solidFill>
+                  <a:schemeClr val="tx1"/>
+                </a:solidFill>
+                <a:latin typeface="+mj-lt"/>
+                <a:ea typeface="+mj-ea"/>
+                <a:cs typeface="+mj-cs"/>
+              </a:defRPr>
+            </a:lvl1pPr>
+          </a:lstStyle>
+          <a:p>
+            <a:pPr marL="0" marR="0" lvl="0" indent="0" algn="l" defTabSz="914400" rtl="0" eaLnBrk="1" fontAlgn="auto" latinLnBrk="0" hangingPunct="1">
+              <a:lnSpc>
+                <a:spcPct val="90000"/>
+              </a:lnSpc>
+              <a:spcBef>
+                <a:spcPct val="0"/>
+              </a:spcBef>
+              <a:spcAft>
+                <a:spcPts val="0"/>
+              </a:spcAft>
+              <a:buClrTx/>
+              <a:buSzTx/>
+              <a:buFontTx/>
+              <a:buNone/>
+              <a:tabLst/>
+              <a:defRPr/>
+            </a:pPr>
+            <a:r>
+              <a:rPr kumimoji="0" lang="en-GB" sz="4000" b="0" i="0" u="none" strike="noStrike" kern="1200" cap="none" spc="0" normalizeH="0" baseline="0" noProof="0" dirty="0">
+                <a:ln>
+                  <a:noFill/>
+                </a:ln>
+                <a:solidFill>
+                  <a:prstClr val="black"/>
+                </a:solidFill>
+                <a:effectLst/>
+                <a:uLnTx/>
+                <a:uFillTx/>
+                <a:latin typeface="Calibri Light" panose="020F0302020204030204"/>
+                <a:ea typeface="+mj-ea"/>
+                <a:cs typeface="+mj-cs"/>
+              </a:rPr>
+              <a:t>Feature maps – maximum activation</a:t>
+            </a:r>
+          </a:p>
+        </p:txBody>
+      </p:sp>
+      <p:pic>
+        <p:nvPicPr>
+          <p:cNvPr id="4" name="Picture 3">
+            <a:extLst>
+              <a:ext uri="{FF2B5EF4-FFF2-40B4-BE49-F238E27FC236}">
+                <a16:creationId xmlns:a16="http://schemas.microsoft.com/office/drawing/2014/main" id="{6F43E460-1A09-42C9-985E-D974E8888B5E}"/>
+              </a:ext>
+            </a:extLst>
+          </p:cNvPr>
+          <p:cNvPicPr>
+            <a:picLocks noChangeAspect="1"/>
+          </p:cNvPicPr>
+          <p:nvPr/>
+        </p:nvPicPr>
+        <p:blipFill rotWithShape="1">
+          <a:blip r:embed="rId2">
+            <a:extLst>
+              <a:ext uri="{28A0092B-C50C-407E-A947-70E740481C1C}">
+                <a14:useLocalDpi xmlns:a14="http://schemas.microsoft.com/office/drawing/2010/main" val="0"/>
+              </a:ext>
+            </a:extLst>
+          </a:blip>
+          <a:srcRect l="12222" t="11680" r="8572" b="11806"/>
+          <a:stretch/>
+        </p:blipFill>
+        <p:spPr>
+          <a:xfrm>
+            <a:off x="6481135" y="1353454"/>
+            <a:ext cx="5281374" cy="5101991"/>
+          </a:xfrm>
+          <a:prstGeom prst="rect">
+            <a:avLst/>
+          </a:prstGeom>
+        </p:spPr>
+      </p:pic>
+      <p:pic>
+        <p:nvPicPr>
+          <p:cNvPr id="11" name="Picture 10">
+            <a:extLst>
+              <a:ext uri="{FF2B5EF4-FFF2-40B4-BE49-F238E27FC236}">
+                <a16:creationId xmlns:a16="http://schemas.microsoft.com/office/drawing/2014/main" id="{374C3B5D-D3CD-441B-8946-404151EF2E64}"/>
+              </a:ext>
+            </a:extLst>
+          </p:cNvPr>
+          <p:cNvPicPr>
+            <a:picLocks noChangeAspect="1"/>
+          </p:cNvPicPr>
+          <p:nvPr/>
+        </p:nvPicPr>
+        <p:blipFill rotWithShape="1">
+          <a:blip r:embed="rId3">
+            <a:extLst>
+              <a:ext uri="{28A0092B-C50C-407E-A947-70E740481C1C}">
+                <a14:useLocalDpi xmlns:a14="http://schemas.microsoft.com/office/drawing/2010/main" val="0"/>
+              </a:ext>
+            </a:extLst>
+          </a:blip>
+          <a:srcRect l="12478" t="11633" r="7932" b="10311"/>
+          <a:stretch/>
+        </p:blipFill>
+        <p:spPr>
+          <a:xfrm>
+            <a:off x="1022250" y="1353455"/>
+            <a:ext cx="2729132" cy="5353050"/>
+          </a:xfrm>
+          <a:prstGeom prst="rect">
+            <a:avLst/>
+          </a:prstGeom>
+        </p:spPr>
+      </p:pic>
+    </p:spTree>
+    <p:extLst>
+      <p:ext uri="{BB962C8B-B14F-4D97-AF65-F5344CB8AC3E}">
+        <p14:creationId xmlns:p14="http://schemas.microsoft.com/office/powerpoint/2010/main" val="4284362155"/>
+      </p:ext>
+    </p:extLst>
+  </p:cSld>
+  <p:clrMapOvr>
+    <a:masterClrMapping/>
+  </p:clrMapOvr>
+</p:sld>
+</file>
+
+<file path=ppt/slides/slide7.xml><?xml version="1.0" encoding="utf-8"?>
 <p:sld xmlns:a="http://schemas.openxmlformats.org/drawingml/2006/main" xmlns:r="http://schemas.openxmlformats.org/officeDocument/2006/relationships" xmlns:p="http://schemas.openxmlformats.org/presentationml/2006/main">
   <p:cSld>
     <p:spTree>
@@ -6309,6 +9938,301 @@
 </file>
 
 <file path=ppt/theme/theme2.xml><?xml version="1.0" encoding="utf-8"?>
+<a:theme xmlns:a="http://schemas.openxmlformats.org/drawingml/2006/main" name="1_Office Theme">
+  <a:themeElements>
+    <a:clrScheme name="Office">
+      <a:dk1>
+        <a:sysClr val="windowText" lastClr="000000"/>
+      </a:dk1>
+      <a:lt1>
+        <a:sysClr val="window" lastClr="FFFFFF"/>
+      </a:lt1>
+      <a:dk2>
+        <a:srgbClr val="44546A"/>
+      </a:dk2>
+      <a:lt2>
+        <a:srgbClr val="E7E6E6"/>
+      </a:lt2>
+      <a:accent1>
+        <a:srgbClr val="4472C4"/>
+      </a:accent1>
+      <a:accent2>
+        <a:srgbClr val="ED7D31"/>
+      </a:accent2>
+      <a:accent3>
+        <a:srgbClr val="A5A5A5"/>
+      </a:accent3>
+      <a:accent4>
+        <a:srgbClr val="FFC000"/>
+      </a:accent4>
+      <a:accent5>
+        <a:srgbClr val="5B9BD5"/>
+      </a:accent5>
+      <a:accent6>
+        <a:srgbClr val="70AD47"/>
+      </a:accent6>
+      <a:hlink>
+        <a:srgbClr val="0563C1"/>
+      </a:hlink>
+      <a:folHlink>
+        <a:srgbClr val="954F72"/>
+      </a:folHlink>
+    </a:clrScheme>
+    <a:fontScheme name="Office">
+      <a:majorFont>
+        <a:latin typeface="Calibri Light" panose="020F0302020204030204"/>
+        <a:ea typeface=""/>
+        <a:cs typeface=""/>
+        <a:font script="Jpan" typeface="游ゴシック Light"/>
+        <a:font script="Hang" typeface="맑은 고딕"/>
+        <a:font script="Hans" typeface="等线 Light"/>
+        <a:font script="Hant" typeface="新細明體"/>
+        <a:font script="Arab" typeface="Times New Roman"/>
+        <a:font script="Hebr" typeface="Times New Roman"/>
+        <a:font script="Thai" typeface="Angsana New"/>
+        <a:font script="Ethi" typeface="Nyala"/>
+        <a:font script="Beng" typeface="Vrinda"/>
+        <a:font script="Gujr" typeface="Shruti"/>
+        <a:font script="Khmr" typeface="MoolBoran"/>
+        <a:font script="Knda" typeface="Tunga"/>
+        <a:font script="Guru" typeface="Raavi"/>
+        <a:font script="Cans" typeface="Euphemia"/>
+        <a:font script="Cher" typeface="Plantagenet Cherokee"/>
+        <a:font script="Yiii" typeface="Microsoft Yi Baiti"/>
+        <a:font script="Tibt" typeface="Microsoft Himalaya"/>
+        <a:font script="Thaa" typeface="MV Boli"/>
+        <a:font script="Deva" typeface="Mangal"/>
+        <a:font script="Telu" typeface="Gautami"/>
+        <a:font script="Taml" typeface="Latha"/>
+        <a:font script="Syrc" typeface="Estrangelo Edessa"/>
+        <a:font script="Orya" typeface="Kalinga"/>
+        <a:font script="Mlym" typeface="Kartika"/>
+        <a:font script="Laoo" typeface="DokChampa"/>
+        <a:font script="Sinh" typeface="Iskoola Pota"/>
+        <a:font script="Mong" typeface="Mongolian Baiti"/>
+        <a:font script="Viet" typeface="Times New Roman"/>
+        <a:font script="Uigh" typeface="Microsoft Uighur"/>
+        <a:font script="Geor" typeface="Sylfaen"/>
+        <a:font script="Armn" typeface="Arial"/>
+        <a:font script="Bugi" typeface="Leelawadee UI"/>
+        <a:font script="Bopo" typeface="Microsoft JhengHei"/>
+        <a:font script="Java" typeface="Javanese Text"/>
+        <a:font script="Lisu" typeface="Segoe UI"/>
+        <a:font script="Mymr" typeface="Myanmar Text"/>
+        <a:font script="Nkoo" typeface="Ebrima"/>
+        <a:font script="Olck" typeface="Nirmala UI"/>
+        <a:font script="Osma" typeface="Ebrima"/>
+        <a:font script="Phag" typeface="Phagspa"/>
+        <a:font script="Syrn" typeface="Estrangelo Edessa"/>
+        <a:font script="Syrj" typeface="Estrangelo Edessa"/>
+        <a:font script="Syre" typeface="Estrangelo Edessa"/>
+        <a:font script="Sora" typeface="Nirmala UI"/>
+        <a:font script="Tale" typeface="Microsoft Tai Le"/>
+        <a:font script="Talu" typeface="Microsoft New Tai Lue"/>
+        <a:font script="Tfng" typeface="Ebrima"/>
+      </a:majorFont>
+      <a:minorFont>
+        <a:latin typeface="Calibri" panose="020F0502020204030204"/>
+        <a:ea typeface=""/>
+        <a:cs typeface=""/>
+        <a:font script="Jpan" typeface="游ゴシック"/>
+        <a:font script="Hang" typeface="맑은 고딕"/>
+        <a:font script="Hans" typeface="等线"/>
+        <a:font script="Hant" typeface="新細明體"/>
+        <a:font script="Arab" typeface="Arial"/>
+        <a:font script="Hebr" typeface="Arial"/>
+        <a:font script="Thai" typeface="Cordia New"/>
+        <a:font script="Ethi" typeface="Nyala"/>
+        <a:font script="Beng" typeface="Vrinda"/>
+        <a:font script="Gujr" typeface="Shruti"/>
+        <a:font script="Khmr" typeface="DaunPenh"/>
+        <a:font script="Knda" typeface="Tunga"/>
+        <a:font script="Guru" typeface="Raavi"/>
+        <a:font script="Cans" typeface="Euphemia"/>
+        <a:font script="Cher" typeface="Plantagenet Cherokee"/>
+        <a:font script="Yiii" typeface="Microsoft Yi Baiti"/>
+        <a:font script="Tibt" typeface="Microsoft Himalaya"/>
+        <a:font script="Thaa" typeface="MV Boli"/>
+        <a:font script="Deva" typeface="Mangal"/>
+        <a:font script="Telu" typeface="Gautami"/>
+        <a:font script="Taml" typeface="Latha"/>
+        <a:font script="Syrc" typeface="Estrangelo Edessa"/>
+        <a:font script="Orya" typeface="Kalinga"/>
+        <a:font script="Mlym" typeface="Kartika"/>
+        <a:font script="Laoo" typeface="DokChampa"/>
+        <a:font script="Sinh" typeface="Iskoola Pota"/>
+        <a:font script="Mong" typeface="Mongolian Baiti"/>
+        <a:font script="Viet" typeface="Arial"/>
+        <a:font script="Uigh" typeface="Microsoft Uighur"/>
+        <a:font script="Geor" typeface="Sylfaen"/>
+        <a:font script="Armn" typeface="Arial"/>
+        <a:font script="Bugi" typeface="Leelawadee UI"/>
+        <a:font script="Bopo" typeface="Microsoft JhengHei"/>
+        <a:font script="Java" typeface="Javanese Text"/>
+        <a:font script="Lisu" typeface="Segoe UI"/>
+        <a:font script="Mymr" typeface="Myanmar Text"/>
+        <a:font script="Nkoo" typeface="Ebrima"/>
+        <a:font script="Olck" typeface="Nirmala UI"/>
+        <a:font script="Osma" typeface="Ebrima"/>
+        <a:font script="Phag" typeface="Phagspa"/>
+        <a:font script="Syrn" typeface="Estrangelo Edessa"/>
+        <a:font script="Syrj" typeface="Estrangelo Edessa"/>
+        <a:font script="Syre" typeface="Estrangelo Edessa"/>
+        <a:font script="Sora" typeface="Nirmala UI"/>
+        <a:font script="Tale" typeface="Microsoft Tai Le"/>
+        <a:font script="Talu" typeface="Microsoft New Tai Lue"/>
+        <a:font script="Tfng" typeface="Ebrima"/>
+      </a:minorFont>
+    </a:fontScheme>
+    <a:fmtScheme name="Office">
+      <a:fillStyleLst>
+        <a:solidFill>
+          <a:schemeClr val="phClr"/>
+        </a:solidFill>
+        <a:gradFill rotWithShape="1">
+          <a:gsLst>
+            <a:gs pos="0">
+              <a:schemeClr val="phClr">
+                <a:lumMod val="110000"/>
+                <a:satMod val="105000"/>
+                <a:tint val="67000"/>
+              </a:schemeClr>
+            </a:gs>
+            <a:gs pos="50000">
+              <a:schemeClr val="phClr">
+                <a:lumMod val="105000"/>
+                <a:satMod val="103000"/>
+                <a:tint val="73000"/>
+              </a:schemeClr>
+            </a:gs>
+            <a:gs pos="100000">
+              <a:schemeClr val="phClr">
+                <a:lumMod val="105000"/>
+                <a:satMod val="109000"/>
+                <a:tint val="81000"/>
+              </a:schemeClr>
+            </a:gs>
+          </a:gsLst>
+          <a:lin ang="5400000" scaled="0"/>
+        </a:gradFill>
+        <a:gradFill rotWithShape="1">
+          <a:gsLst>
+            <a:gs pos="0">
+              <a:schemeClr val="phClr">
+                <a:satMod val="103000"/>
+                <a:lumMod val="102000"/>
+                <a:tint val="94000"/>
+              </a:schemeClr>
+            </a:gs>
+            <a:gs pos="50000">
+              <a:schemeClr val="phClr">
+                <a:satMod val="110000"/>
+                <a:lumMod val="100000"/>
+                <a:shade val="100000"/>
+              </a:schemeClr>
+            </a:gs>
+            <a:gs pos="100000">
+              <a:schemeClr val="phClr">
+                <a:lumMod val="99000"/>
+                <a:satMod val="120000"/>
+                <a:shade val="78000"/>
+              </a:schemeClr>
+            </a:gs>
+          </a:gsLst>
+          <a:lin ang="5400000" scaled="0"/>
+        </a:gradFill>
+      </a:fillStyleLst>
+      <a:lnStyleLst>
+        <a:ln w="6350" cap="flat" cmpd="sng" algn="ctr">
+          <a:solidFill>
+            <a:schemeClr val="phClr"/>
+          </a:solidFill>
+          <a:prstDash val="solid"/>
+          <a:miter lim="800000"/>
+        </a:ln>
+        <a:ln w="12700" cap="flat" cmpd="sng" algn="ctr">
+          <a:solidFill>
+            <a:schemeClr val="phClr"/>
+          </a:solidFill>
+          <a:prstDash val="solid"/>
+          <a:miter lim="800000"/>
+        </a:ln>
+        <a:ln w="19050" cap="flat" cmpd="sng" algn="ctr">
+          <a:solidFill>
+            <a:schemeClr val="phClr"/>
+          </a:solidFill>
+          <a:prstDash val="solid"/>
+          <a:miter lim="800000"/>
+        </a:ln>
+      </a:lnStyleLst>
+      <a:effectStyleLst>
+        <a:effectStyle>
+          <a:effectLst/>
+        </a:effectStyle>
+        <a:effectStyle>
+          <a:effectLst/>
+        </a:effectStyle>
+        <a:effectStyle>
+          <a:effectLst>
+            <a:outerShdw blurRad="57150" dist="19050" dir="5400000" algn="ctr" rotWithShape="0">
+              <a:srgbClr val="000000">
+                <a:alpha val="63000"/>
+              </a:srgbClr>
+            </a:outerShdw>
+          </a:effectLst>
+        </a:effectStyle>
+      </a:effectStyleLst>
+      <a:bgFillStyleLst>
+        <a:solidFill>
+          <a:schemeClr val="phClr"/>
+        </a:solidFill>
+        <a:solidFill>
+          <a:schemeClr val="phClr">
+            <a:tint val="95000"/>
+            <a:satMod val="170000"/>
+          </a:schemeClr>
+        </a:solidFill>
+        <a:gradFill rotWithShape="1">
+          <a:gsLst>
+            <a:gs pos="0">
+              <a:schemeClr val="phClr">
+                <a:tint val="93000"/>
+                <a:satMod val="150000"/>
+                <a:shade val="98000"/>
+                <a:lumMod val="102000"/>
+              </a:schemeClr>
+            </a:gs>
+            <a:gs pos="50000">
+              <a:schemeClr val="phClr">
+                <a:tint val="98000"/>
+                <a:satMod val="130000"/>
+                <a:shade val="90000"/>
+                <a:lumMod val="103000"/>
+              </a:schemeClr>
+            </a:gs>
+            <a:gs pos="100000">
+              <a:schemeClr val="phClr">
+                <a:shade val="63000"/>
+                <a:satMod val="120000"/>
+              </a:schemeClr>
+            </a:gs>
+          </a:gsLst>
+          <a:lin ang="5400000" scaled="0"/>
+        </a:gradFill>
+      </a:bgFillStyleLst>
+    </a:fmtScheme>
+  </a:themeElements>
+  <a:objectDefaults/>
+  <a:extraClrSchemeLst/>
+  <a:extLst>
+    <a:ext uri="{05A4C25C-085E-4340-85A3-A5531E510DB2}">
+      <thm15:themeFamily xmlns:thm15="http://schemas.microsoft.com/office/thememl/2012/main" name="Office Theme" id="{62F939B6-93AF-4DB8-9C6B-D6C7DFDC589F}" vid="{4A3C46E8-61CC-4603-A589-7422A47A8E4A}"/>
+    </a:ext>
+  </a:extLst>
+</a:theme>
+</file>
+
+<file path=ppt/theme/theme3.xml><?xml version="1.0" encoding="utf-8"?>
 <a:theme xmlns:a="http://schemas.openxmlformats.org/drawingml/2006/main" name="Office Theme">
   <a:themeElements>
     <a:clrScheme name="Office">

</xml_diff>

<commit_message>
changed presentations a bit
</commit_message>
<xml_diff>
--- a/Compiled graphs.pptx
+++ b/Compiled graphs.pptx
@@ -6,8 +6,11 @@
     <p:sldMasterId id="2147483660" r:id="rId2"/>
   </p:sldMasterIdLst>
   <p:notesMasterIdLst>
-    <p:notesMasterId r:id="rId10"/>
+    <p:notesMasterId r:id="rId11"/>
   </p:notesMasterIdLst>
+  <p:handoutMasterIdLst>
+    <p:handoutMasterId r:id="rId12"/>
+  </p:handoutMasterIdLst>
   <p:sldIdLst>
     <p:sldId id="257" r:id="rId3"/>
     <p:sldId id="258" r:id="rId4"/>
@@ -15,7 +18,8 @@
     <p:sldId id="260" r:id="rId6"/>
     <p:sldId id="261" r:id="rId7"/>
     <p:sldId id="264" r:id="rId8"/>
-    <p:sldId id="262" r:id="rId9"/>
+    <p:sldId id="265" r:id="rId9"/>
+    <p:sldId id="262" r:id="rId10"/>
   </p:sldIdLst>
   <p:sldSz cx="12192000" cy="6858000"/>
   <p:notesSz cx="6858000" cy="9144000"/>
@@ -291,6 +295,195 @@
     </pc:docChg>
   </pc:docChgLst>
 </pc:chgInfo>
+</file>
+
+<file path=ppt/handoutMasters/handoutMaster1.xml><?xml version="1.0" encoding="utf-8"?>
+<p:handoutMaster xmlns:a="http://schemas.openxmlformats.org/drawingml/2006/main" xmlns:r="http://schemas.openxmlformats.org/officeDocument/2006/relationships" xmlns:p="http://schemas.openxmlformats.org/presentationml/2006/main">
+  <p:cSld>
+    <p:bg>
+      <p:bgRef idx="1001">
+        <a:schemeClr val="bg1"/>
+      </p:bgRef>
+    </p:bg>
+    <p:spTree>
+      <p:nvGrpSpPr>
+        <p:cNvPr id="1" name=""/>
+        <p:cNvGrpSpPr/>
+        <p:nvPr/>
+      </p:nvGrpSpPr>
+      <p:grpSpPr>
+        <a:xfrm>
+          <a:off x="0" y="0"/>
+          <a:ext cx="0" cy="0"/>
+          <a:chOff x="0" y="0"/>
+          <a:chExt cx="0" cy="0"/>
+        </a:xfrm>
+      </p:grpSpPr>
+      <p:sp>
+        <p:nvSpPr>
+          <p:cNvPr id="2" name="Header Placeholder 1">
+            <a:extLst>
+              <a:ext uri="{FF2B5EF4-FFF2-40B4-BE49-F238E27FC236}">
+                <a16:creationId xmlns:a16="http://schemas.microsoft.com/office/drawing/2014/main" id="{5A31939A-1E1C-43C6-87D9-4707F4ECE4BF}"/>
+              </a:ext>
+            </a:extLst>
+          </p:cNvPr>
+          <p:cNvSpPr>
+            <a:spLocks noGrp="1"/>
+          </p:cNvSpPr>
+          <p:nvPr>
+            <p:ph type="hdr" sz="quarter"/>
+          </p:nvPr>
+        </p:nvSpPr>
+        <p:spPr>
+          <a:xfrm>
+            <a:off x="0" y="0"/>
+            <a:ext cx="2971800" cy="458788"/>
+          </a:xfrm>
+          <a:prstGeom prst="rect">
+            <a:avLst/>
+          </a:prstGeom>
+        </p:spPr>
+        <p:txBody>
+          <a:bodyPr vert="horz" lIns="91440" tIns="45720" rIns="91440" bIns="45720" rtlCol="0"/>
+          <a:lstStyle>
+            <a:lvl1pPr algn="l">
+              <a:defRPr sz="1200"/>
+            </a:lvl1pPr>
+          </a:lstStyle>
+          <a:p>
+            <a:endParaRPr lang="en-GB"/>
+          </a:p>
+        </p:txBody>
+      </p:sp>
+      <p:sp>
+        <p:nvSpPr>
+          <p:cNvPr id="3" name="Date Placeholder 2">
+            <a:extLst>
+              <a:ext uri="{FF2B5EF4-FFF2-40B4-BE49-F238E27FC236}">
+                <a16:creationId xmlns:a16="http://schemas.microsoft.com/office/drawing/2014/main" id="{D30A2096-24D5-4C83-B320-3BA033617CAB}"/>
+              </a:ext>
+            </a:extLst>
+          </p:cNvPr>
+          <p:cNvSpPr>
+            <a:spLocks noGrp="1"/>
+          </p:cNvSpPr>
+          <p:nvPr>
+            <p:ph type="dt" sz="quarter" idx="1"/>
+          </p:nvPr>
+        </p:nvSpPr>
+        <p:spPr>
+          <a:xfrm>
+            <a:off x="3884613" y="0"/>
+            <a:ext cx="2971800" cy="458788"/>
+          </a:xfrm>
+          <a:prstGeom prst="rect">
+            <a:avLst/>
+          </a:prstGeom>
+        </p:spPr>
+        <p:txBody>
+          <a:bodyPr vert="horz" lIns="91440" tIns="45720" rIns="91440" bIns="45720" rtlCol="0"/>
+          <a:lstStyle>
+            <a:lvl1pPr algn="r">
+              <a:defRPr sz="1200"/>
+            </a:lvl1pPr>
+          </a:lstStyle>
+          <a:p>
+            <a:fld id="{D34097AA-F62E-482D-8D58-1B8F77A2395C}" type="datetimeFigureOut">
+              <a:rPr lang="en-GB" smtClean="0"/>
+              <a:t>20/03/2018</a:t>
+            </a:fld>
+            <a:endParaRPr lang="en-GB"/>
+          </a:p>
+        </p:txBody>
+      </p:sp>
+      <p:sp>
+        <p:nvSpPr>
+          <p:cNvPr id="4" name="Footer Placeholder 3">
+            <a:extLst>
+              <a:ext uri="{FF2B5EF4-FFF2-40B4-BE49-F238E27FC236}">
+                <a16:creationId xmlns:a16="http://schemas.microsoft.com/office/drawing/2014/main" id="{2FF57497-991D-4934-BA2F-0A0E489B6527}"/>
+              </a:ext>
+            </a:extLst>
+          </p:cNvPr>
+          <p:cNvSpPr>
+            <a:spLocks noGrp="1"/>
+          </p:cNvSpPr>
+          <p:nvPr>
+            <p:ph type="ftr" sz="quarter" idx="2"/>
+          </p:nvPr>
+        </p:nvSpPr>
+        <p:spPr>
+          <a:xfrm>
+            <a:off x="0" y="8685213"/>
+            <a:ext cx="2971800" cy="458787"/>
+          </a:xfrm>
+          <a:prstGeom prst="rect">
+            <a:avLst/>
+          </a:prstGeom>
+        </p:spPr>
+        <p:txBody>
+          <a:bodyPr vert="horz" lIns="91440" tIns="45720" rIns="91440" bIns="45720" rtlCol="0" anchor="b"/>
+          <a:lstStyle>
+            <a:lvl1pPr algn="l">
+              <a:defRPr sz="1200"/>
+            </a:lvl1pPr>
+          </a:lstStyle>
+          <a:p>
+            <a:endParaRPr lang="en-GB"/>
+          </a:p>
+        </p:txBody>
+      </p:sp>
+      <p:sp>
+        <p:nvSpPr>
+          <p:cNvPr id="5" name="Slide Number Placeholder 4">
+            <a:extLst>
+              <a:ext uri="{FF2B5EF4-FFF2-40B4-BE49-F238E27FC236}">
+                <a16:creationId xmlns:a16="http://schemas.microsoft.com/office/drawing/2014/main" id="{99628FAF-8BE9-41A5-BE33-5CFA166F71C6}"/>
+              </a:ext>
+            </a:extLst>
+          </p:cNvPr>
+          <p:cNvSpPr>
+            <a:spLocks noGrp="1"/>
+          </p:cNvSpPr>
+          <p:nvPr>
+            <p:ph type="sldNum" sz="quarter" idx="3"/>
+          </p:nvPr>
+        </p:nvSpPr>
+        <p:spPr>
+          <a:xfrm>
+            <a:off x="3884613" y="8685213"/>
+            <a:ext cx="2971800" cy="458787"/>
+          </a:xfrm>
+          <a:prstGeom prst="rect">
+            <a:avLst/>
+          </a:prstGeom>
+        </p:spPr>
+        <p:txBody>
+          <a:bodyPr vert="horz" lIns="91440" tIns="45720" rIns="91440" bIns="45720" rtlCol="0" anchor="b"/>
+          <a:lstStyle>
+            <a:lvl1pPr algn="r">
+              <a:defRPr sz="1200"/>
+            </a:lvl1pPr>
+          </a:lstStyle>
+          <a:p>
+            <a:fld id="{29792A4E-ED01-4A18-B484-C3FE7E29D803}" type="slidenum">
+              <a:rPr lang="en-GB" smtClean="0"/>
+              <a:t>‹#›</a:t>
+            </a:fld>
+            <a:endParaRPr lang="en-GB"/>
+          </a:p>
+        </p:txBody>
+      </p:sp>
+    </p:spTree>
+    <p:extLst>
+      <p:ext uri="{BB962C8B-B14F-4D97-AF65-F5344CB8AC3E}">
+        <p14:creationId xmlns:p14="http://schemas.microsoft.com/office/powerpoint/2010/main" val="2860586962"/>
+      </p:ext>
+    </p:extLst>
+  </p:cSld>
+  <p:clrMap bg1="lt1" tx1="dk1" bg2="lt2" tx2="dk2" accent1="accent1" accent2="accent2" accent3="accent3" accent4="accent4" accent5="accent5" accent6="accent6" hlink="hlink" folHlink="folHlink"/>
+</p:handoutMaster>
 </file>
 
 <file path=ppt/notesMasters/notesMaster1.xml><?xml version="1.0" encoding="utf-8"?>
@@ -9259,6 +9452,287 @@
 </file>
 
 <file path=ppt/slides/slide7.xml><?xml version="1.0" encoding="utf-8"?>
+<p:sld xmlns:a="http://schemas.openxmlformats.org/drawingml/2006/main" xmlns:r="http://schemas.openxmlformats.org/officeDocument/2006/relationships" xmlns:p="http://schemas.openxmlformats.org/presentationml/2006/main">
+  <p:cSld>
+    <p:spTree>
+      <p:nvGrpSpPr>
+        <p:cNvPr id="1" name=""/>
+        <p:cNvGrpSpPr/>
+        <p:nvPr/>
+      </p:nvGrpSpPr>
+      <p:grpSpPr>
+        <a:xfrm>
+          <a:off x="0" y="0"/>
+          <a:ext cx="0" cy="0"/>
+          <a:chOff x="0" y="0"/>
+          <a:chExt cx="0" cy="0"/>
+        </a:xfrm>
+      </p:grpSpPr>
+      <p:sp>
+        <p:nvSpPr>
+          <p:cNvPr id="26" name="TextBox 25">
+            <a:extLst>
+              <a:ext uri="{FF2B5EF4-FFF2-40B4-BE49-F238E27FC236}">
+                <a16:creationId xmlns:a16="http://schemas.microsoft.com/office/drawing/2014/main" id="{1E123B2E-4739-4D65-A68E-E31211E9C4FD}"/>
+              </a:ext>
+            </a:extLst>
+          </p:cNvPr>
+          <p:cNvSpPr txBox="1"/>
+          <p:nvPr/>
+        </p:nvSpPr>
+        <p:spPr>
+          <a:xfrm>
+            <a:off x="5676346" y="454162"/>
+            <a:ext cx="5523470" cy="369332"/>
+          </a:xfrm>
+          <a:prstGeom prst="rect">
+            <a:avLst/>
+          </a:prstGeom>
+          <a:noFill/>
+        </p:spPr>
+        <p:txBody>
+          <a:bodyPr wrap="square" rtlCol="0">
+            <a:spAutoFit/>
+          </a:bodyPr>
+          <a:lstStyle/>
+          <a:p>
+            <a:r>
+              <a:rPr lang="en-GB" dirty="0"/>
+              <a:t>GAN</a:t>
+            </a:r>
+          </a:p>
+        </p:txBody>
+      </p:sp>
+      <p:pic>
+        <p:nvPicPr>
+          <p:cNvPr id="28" name="Picture 27">
+            <a:extLst>
+              <a:ext uri="{FF2B5EF4-FFF2-40B4-BE49-F238E27FC236}">
+                <a16:creationId xmlns:a16="http://schemas.microsoft.com/office/drawing/2014/main" id="{2EF0C535-78A4-4A0F-83A1-8DBF589DE3CD}"/>
+              </a:ext>
+            </a:extLst>
+          </p:cNvPr>
+          <p:cNvPicPr>
+            <a:picLocks noChangeAspect="1"/>
+          </p:cNvPicPr>
+          <p:nvPr/>
+        </p:nvPicPr>
+        <p:blipFill>
+          <a:blip r:embed="rId2">
+            <a:extLst>
+              <a:ext uri="{28A0092B-C50C-407E-A947-70E740481C1C}">
+                <a14:useLocalDpi xmlns:a14="http://schemas.microsoft.com/office/drawing/2010/main" val="0"/>
+              </a:ext>
+            </a:extLst>
+          </a:blip>
+          <a:stretch>
+            <a:fillRect/>
+          </a:stretch>
+        </p:blipFill>
+        <p:spPr>
+          <a:xfrm>
+            <a:off x="7066170" y="3699569"/>
+            <a:ext cx="2743825" cy="2743825"/>
+          </a:xfrm>
+          <a:prstGeom prst="rect">
+            <a:avLst/>
+          </a:prstGeom>
+        </p:spPr>
+      </p:pic>
+      <p:pic>
+        <p:nvPicPr>
+          <p:cNvPr id="30" name="Picture 29">
+            <a:extLst>
+              <a:ext uri="{FF2B5EF4-FFF2-40B4-BE49-F238E27FC236}">
+                <a16:creationId xmlns:a16="http://schemas.microsoft.com/office/drawing/2014/main" id="{1B2789E2-26B1-483B-BD74-4C2F0C28869C}"/>
+              </a:ext>
+            </a:extLst>
+          </p:cNvPr>
+          <p:cNvPicPr>
+            <a:picLocks noChangeAspect="1"/>
+          </p:cNvPicPr>
+          <p:nvPr/>
+        </p:nvPicPr>
+        <p:blipFill>
+          <a:blip r:embed="rId3">
+            <a:extLst>
+              <a:ext uri="{28A0092B-C50C-407E-A947-70E740481C1C}">
+                <a14:useLocalDpi xmlns:a14="http://schemas.microsoft.com/office/drawing/2010/main" val="0"/>
+              </a:ext>
+            </a:extLst>
+          </a:blip>
+          <a:stretch>
+            <a:fillRect/>
+          </a:stretch>
+        </p:blipFill>
+        <p:spPr>
+          <a:xfrm>
+            <a:off x="4590905" y="3699571"/>
+            <a:ext cx="2743825" cy="2743825"/>
+          </a:xfrm>
+          <a:prstGeom prst="rect">
+            <a:avLst/>
+          </a:prstGeom>
+        </p:spPr>
+      </p:pic>
+      <p:pic>
+        <p:nvPicPr>
+          <p:cNvPr id="32" name="Picture 31">
+            <a:extLst>
+              <a:ext uri="{FF2B5EF4-FFF2-40B4-BE49-F238E27FC236}">
+                <a16:creationId xmlns:a16="http://schemas.microsoft.com/office/drawing/2014/main" id="{1B3921C4-0CD4-4BC8-A078-4F85F24CB333}"/>
+              </a:ext>
+            </a:extLst>
+          </p:cNvPr>
+          <p:cNvPicPr>
+            <a:picLocks noChangeAspect="1"/>
+          </p:cNvPicPr>
+          <p:nvPr/>
+        </p:nvPicPr>
+        <p:blipFill>
+          <a:blip r:embed="rId4">
+            <a:extLst>
+              <a:ext uri="{28A0092B-C50C-407E-A947-70E740481C1C}">
+                <a14:useLocalDpi xmlns:a14="http://schemas.microsoft.com/office/drawing/2010/main" val="0"/>
+              </a:ext>
+            </a:extLst>
+          </a:blip>
+          <a:stretch>
+            <a:fillRect/>
+          </a:stretch>
+        </p:blipFill>
+        <p:spPr>
+          <a:xfrm>
+            <a:off x="2115639" y="3699570"/>
+            <a:ext cx="2743825" cy="2743825"/>
+          </a:xfrm>
+          <a:prstGeom prst="rect">
+            <a:avLst/>
+          </a:prstGeom>
+        </p:spPr>
+      </p:pic>
+      <p:pic>
+        <p:nvPicPr>
+          <p:cNvPr id="34" name="Picture 33">
+            <a:extLst>
+              <a:ext uri="{FF2B5EF4-FFF2-40B4-BE49-F238E27FC236}">
+                <a16:creationId xmlns:a16="http://schemas.microsoft.com/office/drawing/2014/main" id="{45D6D687-F164-4EE2-9BD8-6A0247C33C58}"/>
+              </a:ext>
+            </a:extLst>
+          </p:cNvPr>
+          <p:cNvPicPr>
+            <a:picLocks noChangeAspect="1"/>
+          </p:cNvPicPr>
+          <p:nvPr/>
+        </p:nvPicPr>
+        <p:blipFill>
+          <a:blip r:embed="rId5">
+            <a:extLst>
+              <a:ext uri="{28A0092B-C50C-407E-A947-70E740481C1C}">
+                <a14:useLocalDpi xmlns:a14="http://schemas.microsoft.com/office/drawing/2010/main" val="0"/>
+              </a:ext>
+            </a:extLst>
+          </a:blip>
+          <a:stretch>
+            <a:fillRect/>
+          </a:stretch>
+        </p:blipFill>
+        <p:spPr>
+          <a:xfrm>
+            <a:off x="7066169" y="955745"/>
+            <a:ext cx="2743825" cy="2743825"/>
+          </a:xfrm>
+          <a:prstGeom prst="rect">
+            <a:avLst/>
+          </a:prstGeom>
+        </p:spPr>
+      </p:pic>
+      <p:pic>
+        <p:nvPicPr>
+          <p:cNvPr id="36" name="Picture 35">
+            <a:extLst>
+              <a:ext uri="{FF2B5EF4-FFF2-40B4-BE49-F238E27FC236}">
+                <a16:creationId xmlns:a16="http://schemas.microsoft.com/office/drawing/2014/main" id="{8211DED6-1CE3-4CD7-B775-98C448351BBE}"/>
+              </a:ext>
+            </a:extLst>
+          </p:cNvPr>
+          <p:cNvPicPr>
+            <a:picLocks noChangeAspect="1"/>
+          </p:cNvPicPr>
+          <p:nvPr/>
+        </p:nvPicPr>
+        <p:blipFill>
+          <a:blip r:embed="rId6">
+            <a:extLst>
+              <a:ext uri="{28A0092B-C50C-407E-A947-70E740481C1C}">
+                <a14:useLocalDpi xmlns:a14="http://schemas.microsoft.com/office/drawing/2010/main" val="0"/>
+              </a:ext>
+            </a:extLst>
+          </a:blip>
+          <a:stretch>
+            <a:fillRect/>
+          </a:stretch>
+        </p:blipFill>
+        <p:spPr>
+          <a:xfrm>
+            <a:off x="4590909" y="955747"/>
+            <a:ext cx="2743825" cy="2743825"/>
+          </a:xfrm>
+          <a:prstGeom prst="rect">
+            <a:avLst/>
+          </a:prstGeom>
+        </p:spPr>
+      </p:pic>
+      <p:pic>
+        <p:nvPicPr>
+          <p:cNvPr id="38" name="Picture 37">
+            <a:extLst>
+              <a:ext uri="{FF2B5EF4-FFF2-40B4-BE49-F238E27FC236}">
+                <a16:creationId xmlns:a16="http://schemas.microsoft.com/office/drawing/2014/main" id="{5A4F9160-7F29-45F1-B4BC-D8A4CA9CA7BA}"/>
+              </a:ext>
+            </a:extLst>
+          </p:cNvPr>
+          <p:cNvPicPr>
+            <a:picLocks noChangeAspect="1"/>
+          </p:cNvPicPr>
+          <p:nvPr/>
+        </p:nvPicPr>
+        <p:blipFill>
+          <a:blip r:embed="rId7">
+            <a:extLst>
+              <a:ext uri="{28A0092B-C50C-407E-A947-70E740481C1C}">
+                <a14:useLocalDpi xmlns:a14="http://schemas.microsoft.com/office/drawing/2010/main" val="0"/>
+              </a:ext>
+            </a:extLst>
+          </a:blip>
+          <a:stretch>
+            <a:fillRect/>
+          </a:stretch>
+        </p:blipFill>
+        <p:spPr>
+          <a:xfrm>
+            <a:off x="2115640" y="955746"/>
+            <a:ext cx="2743825" cy="2743825"/>
+          </a:xfrm>
+          <a:prstGeom prst="rect">
+            <a:avLst/>
+          </a:prstGeom>
+        </p:spPr>
+      </p:pic>
+    </p:spTree>
+    <p:extLst>
+      <p:ext uri="{BB962C8B-B14F-4D97-AF65-F5344CB8AC3E}">
+        <p14:creationId xmlns:p14="http://schemas.microsoft.com/office/powerpoint/2010/main" val="378443896"/>
+      </p:ext>
+    </p:extLst>
+  </p:cSld>
+  <p:clrMapOvr>
+    <a:masterClrMapping/>
+  </p:clrMapOvr>
+</p:sld>
+</file>
+
+<file path=ppt/slides/slide8.xml><?xml version="1.0" encoding="utf-8"?>
 <p:sld xmlns:a="http://schemas.openxmlformats.org/drawingml/2006/main" xmlns:r="http://schemas.openxmlformats.org/officeDocument/2006/relationships" xmlns:p="http://schemas.openxmlformats.org/presentationml/2006/main">
   <p:cSld>
     <p:spTree>
@@ -10525,4 +10999,299 @@
     </a:ext>
   </a:extLst>
 </a:theme>
+</file>
+
+<file path=ppt/theme/theme4.xml><?xml version="1.0" encoding="utf-8"?>
+<a:theme xmlns:a="http://schemas.openxmlformats.org/drawingml/2006/main" name="Office Theme">
+  <a:themeElements>
+    <a:clrScheme name="Office">
+      <a:dk1>
+        <a:sysClr val="windowText" lastClr="000000"/>
+      </a:dk1>
+      <a:lt1>
+        <a:sysClr val="window" lastClr="FFFFFF"/>
+      </a:lt1>
+      <a:dk2>
+        <a:srgbClr val="44546A"/>
+      </a:dk2>
+      <a:lt2>
+        <a:srgbClr val="E7E6E6"/>
+      </a:lt2>
+      <a:accent1>
+        <a:srgbClr val="4472C4"/>
+      </a:accent1>
+      <a:accent2>
+        <a:srgbClr val="ED7D31"/>
+      </a:accent2>
+      <a:accent3>
+        <a:srgbClr val="A5A5A5"/>
+      </a:accent3>
+      <a:accent4>
+        <a:srgbClr val="FFC000"/>
+      </a:accent4>
+      <a:accent5>
+        <a:srgbClr val="5B9BD5"/>
+      </a:accent5>
+      <a:accent6>
+        <a:srgbClr val="70AD47"/>
+      </a:accent6>
+      <a:hlink>
+        <a:srgbClr val="0563C1"/>
+      </a:hlink>
+      <a:folHlink>
+        <a:srgbClr val="954F72"/>
+      </a:folHlink>
+    </a:clrScheme>
+    <a:fontScheme name="Office">
+      <a:majorFont>
+        <a:latin typeface="Calibri Light" panose="020F0302020204030204"/>
+        <a:ea typeface=""/>
+        <a:cs typeface=""/>
+        <a:font script="Jpan" typeface="游ゴシック Light"/>
+        <a:font script="Hang" typeface="맑은 고딕"/>
+        <a:font script="Hans" typeface="等线 Light"/>
+        <a:font script="Hant" typeface="新細明體"/>
+        <a:font script="Arab" typeface="Times New Roman"/>
+        <a:font script="Hebr" typeface="Times New Roman"/>
+        <a:font script="Thai" typeface="Angsana New"/>
+        <a:font script="Ethi" typeface="Nyala"/>
+        <a:font script="Beng" typeface="Vrinda"/>
+        <a:font script="Gujr" typeface="Shruti"/>
+        <a:font script="Khmr" typeface="MoolBoran"/>
+        <a:font script="Knda" typeface="Tunga"/>
+        <a:font script="Guru" typeface="Raavi"/>
+        <a:font script="Cans" typeface="Euphemia"/>
+        <a:font script="Cher" typeface="Plantagenet Cherokee"/>
+        <a:font script="Yiii" typeface="Microsoft Yi Baiti"/>
+        <a:font script="Tibt" typeface="Microsoft Himalaya"/>
+        <a:font script="Thaa" typeface="MV Boli"/>
+        <a:font script="Deva" typeface="Mangal"/>
+        <a:font script="Telu" typeface="Gautami"/>
+        <a:font script="Taml" typeface="Latha"/>
+        <a:font script="Syrc" typeface="Estrangelo Edessa"/>
+        <a:font script="Orya" typeface="Kalinga"/>
+        <a:font script="Mlym" typeface="Kartika"/>
+        <a:font script="Laoo" typeface="DokChampa"/>
+        <a:font script="Sinh" typeface="Iskoola Pota"/>
+        <a:font script="Mong" typeface="Mongolian Baiti"/>
+        <a:font script="Viet" typeface="Times New Roman"/>
+        <a:font script="Uigh" typeface="Microsoft Uighur"/>
+        <a:font script="Geor" typeface="Sylfaen"/>
+        <a:font script="Armn" typeface="Arial"/>
+        <a:font script="Bugi" typeface="Leelawadee UI"/>
+        <a:font script="Bopo" typeface="Microsoft JhengHei"/>
+        <a:font script="Java" typeface="Javanese Text"/>
+        <a:font script="Lisu" typeface="Segoe UI"/>
+        <a:font script="Mymr" typeface="Myanmar Text"/>
+        <a:font script="Nkoo" typeface="Ebrima"/>
+        <a:font script="Olck" typeface="Nirmala UI"/>
+        <a:font script="Osma" typeface="Ebrima"/>
+        <a:font script="Phag" typeface="Phagspa"/>
+        <a:font script="Syrn" typeface="Estrangelo Edessa"/>
+        <a:font script="Syrj" typeface="Estrangelo Edessa"/>
+        <a:font script="Syre" typeface="Estrangelo Edessa"/>
+        <a:font script="Sora" typeface="Nirmala UI"/>
+        <a:font script="Tale" typeface="Microsoft Tai Le"/>
+        <a:font script="Talu" typeface="Microsoft New Tai Lue"/>
+        <a:font script="Tfng" typeface="Ebrima"/>
+      </a:majorFont>
+      <a:minorFont>
+        <a:latin typeface="Calibri" panose="020F0502020204030204"/>
+        <a:ea typeface=""/>
+        <a:cs typeface=""/>
+        <a:font script="Jpan" typeface="游ゴシック"/>
+        <a:font script="Hang" typeface="맑은 고딕"/>
+        <a:font script="Hans" typeface="等线"/>
+        <a:font script="Hant" typeface="新細明體"/>
+        <a:font script="Arab" typeface="Arial"/>
+        <a:font script="Hebr" typeface="Arial"/>
+        <a:font script="Thai" typeface="Cordia New"/>
+        <a:font script="Ethi" typeface="Nyala"/>
+        <a:font script="Beng" typeface="Vrinda"/>
+        <a:font script="Gujr" typeface="Shruti"/>
+        <a:font script="Khmr" typeface="DaunPenh"/>
+        <a:font script="Knda" typeface="Tunga"/>
+        <a:font script="Guru" typeface="Raavi"/>
+        <a:font script="Cans" typeface="Euphemia"/>
+        <a:font script="Cher" typeface="Plantagenet Cherokee"/>
+        <a:font script="Yiii" typeface="Microsoft Yi Baiti"/>
+        <a:font script="Tibt" typeface="Microsoft Himalaya"/>
+        <a:font script="Thaa" typeface="MV Boli"/>
+        <a:font script="Deva" typeface="Mangal"/>
+        <a:font script="Telu" typeface="Gautami"/>
+        <a:font script="Taml" typeface="Latha"/>
+        <a:font script="Syrc" typeface="Estrangelo Edessa"/>
+        <a:font script="Orya" typeface="Kalinga"/>
+        <a:font script="Mlym" typeface="Kartika"/>
+        <a:font script="Laoo" typeface="DokChampa"/>
+        <a:font script="Sinh" typeface="Iskoola Pota"/>
+        <a:font script="Mong" typeface="Mongolian Baiti"/>
+        <a:font script="Viet" typeface="Arial"/>
+        <a:font script="Uigh" typeface="Microsoft Uighur"/>
+        <a:font script="Geor" typeface="Sylfaen"/>
+        <a:font script="Armn" typeface="Arial"/>
+        <a:font script="Bugi" typeface="Leelawadee UI"/>
+        <a:font script="Bopo" typeface="Microsoft JhengHei"/>
+        <a:font script="Java" typeface="Javanese Text"/>
+        <a:font script="Lisu" typeface="Segoe UI"/>
+        <a:font script="Mymr" typeface="Myanmar Text"/>
+        <a:font script="Nkoo" typeface="Ebrima"/>
+        <a:font script="Olck" typeface="Nirmala UI"/>
+        <a:font script="Osma" typeface="Ebrima"/>
+        <a:font script="Phag" typeface="Phagspa"/>
+        <a:font script="Syrn" typeface="Estrangelo Edessa"/>
+        <a:font script="Syrj" typeface="Estrangelo Edessa"/>
+        <a:font script="Syre" typeface="Estrangelo Edessa"/>
+        <a:font script="Sora" typeface="Nirmala UI"/>
+        <a:font script="Tale" typeface="Microsoft Tai Le"/>
+        <a:font script="Talu" typeface="Microsoft New Tai Lue"/>
+        <a:font script="Tfng" typeface="Ebrima"/>
+      </a:minorFont>
+    </a:fontScheme>
+    <a:fmtScheme name="Office">
+      <a:fillStyleLst>
+        <a:solidFill>
+          <a:schemeClr val="phClr"/>
+        </a:solidFill>
+        <a:gradFill rotWithShape="1">
+          <a:gsLst>
+            <a:gs pos="0">
+              <a:schemeClr val="phClr">
+                <a:lumMod val="110000"/>
+                <a:satMod val="105000"/>
+                <a:tint val="67000"/>
+              </a:schemeClr>
+            </a:gs>
+            <a:gs pos="50000">
+              <a:schemeClr val="phClr">
+                <a:lumMod val="105000"/>
+                <a:satMod val="103000"/>
+                <a:tint val="73000"/>
+              </a:schemeClr>
+            </a:gs>
+            <a:gs pos="100000">
+              <a:schemeClr val="phClr">
+                <a:lumMod val="105000"/>
+                <a:satMod val="109000"/>
+                <a:tint val="81000"/>
+              </a:schemeClr>
+            </a:gs>
+          </a:gsLst>
+          <a:lin ang="5400000" scaled="0"/>
+        </a:gradFill>
+        <a:gradFill rotWithShape="1">
+          <a:gsLst>
+            <a:gs pos="0">
+              <a:schemeClr val="phClr">
+                <a:satMod val="103000"/>
+                <a:lumMod val="102000"/>
+                <a:tint val="94000"/>
+              </a:schemeClr>
+            </a:gs>
+            <a:gs pos="50000">
+              <a:schemeClr val="phClr">
+                <a:satMod val="110000"/>
+                <a:lumMod val="100000"/>
+                <a:shade val="100000"/>
+              </a:schemeClr>
+            </a:gs>
+            <a:gs pos="100000">
+              <a:schemeClr val="phClr">
+                <a:lumMod val="99000"/>
+                <a:satMod val="120000"/>
+                <a:shade val="78000"/>
+              </a:schemeClr>
+            </a:gs>
+          </a:gsLst>
+          <a:lin ang="5400000" scaled="0"/>
+        </a:gradFill>
+      </a:fillStyleLst>
+      <a:lnStyleLst>
+        <a:ln w="6350" cap="flat" cmpd="sng" algn="ctr">
+          <a:solidFill>
+            <a:schemeClr val="phClr"/>
+          </a:solidFill>
+          <a:prstDash val="solid"/>
+          <a:miter lim="800000"/>
+        </a:ln>
+        <a:ln w="12700" cap="flat" cmpd="sng" algn="ctr">
+          <a:solidFill>
+            <a:schemeClr val="phClr"/>
+          </a:solidFill>
+          <a:prstDash val="solid"/>
+          <a:miter lim="800000"/>
+        </a:ln>
+        <a:ln w="19050" cap="flat" cmpd="sng" algn="ctr">
+          <a:solidFill>
+            <a:schemeClr val="phClr"/>
+          </a:solidFill>
+          <a:prstDash val="solid"/>
+          <a:miter lim="800000"/>
+        </a:ln>
+      </a:lnStyleLst>
+      <a:effectStyleLst>
+        <a:effectStyle>
+          <a:effectLst/>
+        </a:effectStyle>
+        <a:effectStyle>
+          <a:effectLst/>
+        </a:effectStyle>
+        <a:effectStyle>
+          <a:effectLst>
+            <a:outerShdw blurRad="57150" dist="19050" dir="5400000" algn="ctr" rotWithShape="0">
+              <a:srgbClr val="000000">
+                <a:alpha val="63000"/>
+              </a:srgbClr>
+            </a:outerShdw>
+          </a:effectLst>
+        </a:effectStyle>
+      </a:effectStyleLst>
+      <a:bgFillStyleLst>
+        <a:solidFill>
+          <a:schemeClr val="phClr"/>
+        </a:solidFill>
+        <a:solidFill>
+          <a:schemeClr val="phClr">
+            <a:tint val="95000"/>
+            <a:satMod val="170000"/>
+          </a:schemeClr>
+        </a:solidFill>
+        <a:gradFill rotWithShape="1">
+          <a:gsLst>
+            <a:gs pos="0">
+              <a:schemeClr val="phClr">
+                <a:tint val="93000"/>
+                <a:satMod val="150000"/>
+                <a:shade val="98000"/>
+                <a:lumMod val="102000"/>
+              </a:schemeClr>
+            </a:gs>
+            <a:gs pos="50000">
+              <a:schemeClr val="phClr">
+                <a:tint val="98000"/>
+                <a:satMod val="130000"/>
+                <a:shade val="90000"/>
+                <a:lumMod val="103000"/>
+              </a:schemeClr>
+            </a:gs>
+            <a:gs pos="100000">
+              <a:schemeClr val="phClr">
+                <a:shade val="63000"/>
+                <a:satMod val="120000"/>
+              </a:schemeClr>
+            </a:gs>
+          </a:gsLst>
+          <a:lin ang="5400000" scaled="0"/>
+        </a:gradFill>
+      </a:bgFillStyleLst>
+    </a:fmtScheme>
+  </a:themeElements>
+  <a:objectDefaults/>
+  <a:extraClrSchemeLst/>
+  <a:extLst>
+    <a:ext uri="{05A4C25C-085E-4340-85A3-A5531E510DB2}">
+      <thm15:themeFamily xmlns:thm15="http://schemas.microsoft.com/office/thememl/2012/main" name="Office Theme" id="{62F939B6-93AF-4DB8-9C6B-D6C7DFDC589F}" vid="{4A3C46E8-61CC-4603-A589-7422A47A8E4A}"/>
+    </a:ext>
+  </a:extLst>
+</a:theme>
 </file>
</xml_diff>

<commit_message>
Report, and calligraphy tfrecords
</commit_message>
<xml_diff>
--- a/Compiled graphs.pptx
+++ b/Compiled graphs.pptx
@@ -394,7 +394,7 @@
           <a:p>
             <a:fld id="{D34097AA-F62E-482D-8D58-1B8F77A2395C}" type="datetimeFigureOut">
               <a:rPr lang="en-GB" smtClean="0"/>
-              <a:t>17/04/2018</a:t>
+              <a:t>22/04/2018</a:t>
             </a:fld>
             <a:endParaRPr lang="en-GB"/>
           </a:p>
@@ -571,7 +571,7 @@
           <a:p>
             <a:fld id="{1312CFC0-6A39-4A2C-AC24-6061EBE48B82}" type="datetimeFigureOut">
               <a:rPr lang="en-GB" smtClean="0"/>
-              <a:t>17/04/2018</a:t>
+              <a:t>22/04/2018</a:t>
             </a:fld>
             <a:endParaRPr lang="en-GB"/>
           </a:p>
@@ -988,7 +988,7 @@
           <a:p>
             <a:fld id="{F999EE6D-E52B-45B7-B943-4C650C77E21B}" type="datetimeFigureOut">
               <a:rPr lang="en-GB" smtClean="0"/>
-              <a:t>17/04/2018</a:t>
+              <a:t>22/04/2018</a:t>
             </a:fld>
             <a:endParaRPr lang="en-GB"/>
           </a:p>
@@ -1188,7 +1188,7 @@
           <a:p>
             <a:fld id="{F999EE6D-E52B-45B7-B943-4C650C77E21B}" type="datetimeFigureOut">
               <a:rPr lang="en-GB" smtClean="0"/>
-              <a:t>17/04/2018</a:t>
+              <a:t>22/04/2018</a:t>
             </a:fld>
             <a:endParaRPr lang="en-GB"/>
           </a:p>
@@ -1398,7 +1398,7 @@
           <a:p>
             <a:fld id="{F999EE6D-E52B-45B7-B943-4C650C77E21B}" type="datetimeFigureOut">
               <a:rPr lang="en-GB" smtClean="0"/>
-              <a:t>17/04/2018</a:t>
+              <a:t>22/04/2018</a:t>
             </a:fld>
             <a:endParaRPr lang="en-GB"/>
           </a:p>
@@ -1620,7 +1620,7 @@
           <a:p>
             <a:fld id="{9C24F874-02A1-48BF-AE54-4A07EBAF6EA2}" type="datetimeFigureOut">
               <a:rPr lang="en-GB" smtClean="0"/>
-              <a:t>17/04/2018</a:t>
+              <a:t>22/04/2018</a:t>
             </a:fld>
             <a:endParaRPr lang="en-GB"/>
           </a:p>
@@ -1820,7 +1820,7 @@
           <a:p>
             <a:fld id="{9C24F874-02A1-48BF-AE54-4A07EBAF6EA2}" type="datetimeFigureOut">
               <a:rPr lang="en-GB" smtClean="0"/>
-              <a:t>17/04/2018</a:t>
+              <a:t>22/04/2018</a:t>
             </a:fld>
             <a:endParaRPr lang="en-GB"/>
           </a:p>
@@ -2096,7 +2096,7 @@
           <a:p>
             <a:fld id="{9C24F874-02A1-48BF-AE54-4A07EBAF6EA2}" type="datetimeFigureOut">
               <a:rPr lang="en-GB" smtClean="0"/>
-              <a:t>17/04/2018</a:t>
+              <a:t>22/04/2018</a:t>
             </a:fld>
             <a:endParaRPr lang="en-GB"/>
           </a:p>
@@ -2364,7 +2364,7 @@
           <a:p>
             <a:fld id="{9C24F874-02A1-48BF-AE54-4A07EBAF6EA2}" type="datetimeFigureOut">
               <a:rPr lang="en-GB" smtClean="0"/>
-              <a:t>17/04/2018</a:t>
+              <a:t>22/04/2018</a:t>
             </a:fld>
             <a:endParaRPr lang="en-GB"/>
           </a:p>
@@ -2779,7 +2779,7 @@
           <a:p>
             <a:fld id="{9C24F874-02A1-48BF-AE54-4A07EBAF6EA2}" type="datetimeFigureOut">
               <a:rPr lang="en-GB" smtClean="0"/>
-              <a:t>17/04/2018</a:t>
+              <a:t>22/04/2018</a:t>
             </a:fld>
             <a:endParaRPr lang="en-GB"/>
           </a:p>
@@ -2921,7 +2921,7 @@
           <a:p>
             <a:fld id="{9C24F874-02A1-48BF-AE54-4A07EBAF6EA2}" type="datetimeFigureOut">
               <a:rPr lang="en-GB" smtClean="0"/>
-              <a:t>17/04/2018</a:t>
+              <a:t>22/04/2018</a:t>
             </a:fld>
             <a:endParaRPr lang="en-GB"/>
           </a:p>
@@ -3034,7 +3034,7 @@
           <a:p>
             <a:fld id="{9C24F874-02A1-48BF-AE54-4A07EBAF6EA2}" type="datetimeFigureOut">
               <a:rPr lang="en-GB" smtClean="0"/>
-              <a:t>17/04/2018</a:t>
+              <a:t>22/04/2018</a:t>
             </a:fld>
             <a:endParaRPr lang="en-GB"/>
           </a:p>
@@ -3347,7 +3347,7 @@
           <a:p>
             <a:fld id="{9C24F874-02A1-48BF-AE54-4A07EBAF6EA2}" type="datetimeFigureOut">
               <a:rPr lang="en-GB" smtClean="0"/>
-              <a:t>17/04/2018</a:t>
+              <a:t>22/04/2018</a:t>
             </a:fld>
             <a:endParaRPr lang="en-GB"/>
           </a:p>
@@ -3547,7 +3547,7 @@
           <a:p>
             <a:fld id="{F999EE6D-E52B-45B7-B943-4C650C77E21B}" type="datetimeFigureOut">
               <a:rPr lang="en-GB" smtClean="0"/>
-              <a:t>17/04/2018</a:t>
+              <a:t>22/04/2018</a:t>
             </a:fld>
             <a:endParaRPr lang="en-GB"/>
           </a:p>
@@ -3836,7 +3836,7 @@
           <a:p>
             <a:fld id="{9C24F874-02A1-48BF-AE54-4A07EBAF6EA2}" type="datetimeFigureOut">
               <a:rPr lang="en-GB" smtClean="0"/>
-              <a:t>17/04/2018</a:t>
+              <a:t>22/04/2018</a:t>
             </a:fld>
             <a:endParaRPr lang="en-GB"/>
           </a:p>
@@ -4036,7 +4036,7 @@
           <a:p>
             <a:fld id="{9C24F874-02A1-48BF-AE54-4A07EBAF6EA2}" type="datetimeFigureOut">
               <a:rPr lang="en-GB" smtClean="0"/>
-              <a:t>17/04/2018</a:t>
+              <a:t>22/04/2018</a:t>
             </a:fld>
             <a:endParaRPr lang="en-GB"/>
           </a:p>
@@ -4246,7 +4246,7 @@
           <a:p>
             <a:fld id="{9C24F874-02A1-48BF-AE54-4A07EBAF6EA2}" type="datetimeFigureOut">
               <a:rPr lang="en-GB" smtClean="0"/>
-              <a:t>17/04/2018</a:t>
+              <a:t>22/04/2018</a:t>
             </a:fld>
             <a:endParaRPr lang="en-GB"/>
           </a:p>
@@ -4522,7 +4522,7 @@
           <a:p>
             <a:fld id="{F999EE6D-E52B-45B7-B943-4C650C77E21B}" type="datetimeFigureOut">
               <a:rPr lang="en-GB" smtClean="0"/>
-              <a:t>17/04/2018</a:t>
+              <a:t>22/04/2018</a:t>
             </a:fld>
             <a:endParaRPr lang="en-GB"/>
           </a:p>
@@ -4790,7 +4790,7 @@
           <a:p>
             <a:fld id="{F999EE6D-E52B-45B7-B943-4C650C77E21B}" type="datetimeFigureOut">
               <a:rPr lang="en-GB" smtClean="0"/>
-              <a:t>17/04/2018</a:t>
+              <a:t>22/04/2018</a:t>
             </a:fld>
             <a:endParaRPr lang="en-GB"/>
           </a:p>
@@ -5205,7 +5205,7 @@
           <a:p>
             <a:fld id="{F999EE6D-E52B-45B7-B943-4C650C77E21B}" type="datetimeFigureOut">
               <a:rPr lang="en-GB" smtClean="0"/>
-              <a:t>17/04/2018</a:t>
+              <a:t>22/04/2018</a:t>
             </a:fld>
             <a:endParaRPr lang="en-GB"/>
           </a:p>
@@ -5347,7 +5347,7 @@
           <a:p>
             <a:fld id="{F999EE6D-E52B-45B7-B943-4C650C77E21B}" type="datetimeFigureOut">
               <a:rPr lang="en-GB" smtClean="0"/>
-              <a:t>17/04/2018</a:t>
+              <a:t>22/04/2018</a:t>
             </a:fld>
             <a:endParaRPr lang="en-GB"/>
           </a:p>
@@ -5460,7 +5460,7 @@
           <a:p>
             <a:fld id="{F999EE6D-E52B-45B7-B943-4C650C77E21B}" type="datetimeFigureOut">
               <a:rPr lang="en-GB" smtClean="0"/>
-              <a:t>17/04/2018</a:t>
+              <a:t>22/04/2018</a:t>
             </a:fld>
             <a:endParaRPr lang="en-GB"/>
           </a:p>
@@ -5773,7 +5773,7 @@
           <a:p>
             <a:fld id="{F999EE6D-E52B-45B7-B943-4C650C77E21B}" type="datetimeFigureOut">
               <a:rPr lang="en-GB" smtClean="0"/>
-              <a:t>17/04/2018</a:t>
+              <a:t>22/04/2018</a:t>
             </a:fld>
             <a:endParaRPr lang="en-GB"/>
           </a:p>
@@ -6062,7 +6062,7 @@
           <a:p>
             <a:fld id="{F999EE6D-E52B-45B7-B943-4C650C77E21B}" type="datetimeFigureOut">
               <a:rPr lang="en-GB" smtClean="0"/>
-              <a:t>17/04/2018</a:t>
+              <a:t>22/04/2018</a:t>
             </a:fld>
             <a:endParaRPr lang="en-GB"/>
           </a:p>
@@ -6305,7 +6305,7 @@
           <a:p>
             <a:fld id="{F999EE6D-E52B-45B7-B943-4C650C77E21B}" type="datetimeFigureOut">
               <a:rPr lang="en-GB" smtClean="0"/>
-              <a:t>17/04/2018</a:t>
+              <a:t>22/04/2018</a:t>
             </a:fld>
             <a:endParaRPr lang="en-GB"/>
           </a:p>
@@ -6875,7 +6875,7 @@
           <a:p>
             <a:fld id="{9C24F874-02A1-48BF-AE54-4A07EBAF6EA2}" type="datetimeFigureOut">
               <a:rPr lang="en-GB" smtClean="0"/>
-              <a:t>17/04/2018</a:t>
+              <a:t>22/04/2018</a:t>
             </a:fld>
             <a:endParaRPr lang="en-GB"/>
           </a:p>
@@ -12299,76 +12299,6 @@
           <a:chExt cx="0" cy="0"/>
         </a:xfrm>
       </p:grpSpPr>
-      <p:pic>
-        <p:nvPicPr>
-          <p:cNvPr id="11" name="Picture 10">
-            <a:extLst>
-              <a:ext uri="{FF2B5EF4-FFF2-40B4-BE49-F238E27FC236}">
-                <a16:creationId xmlns:a16="http://schemas.microsoft.com/office/drawing/2014/main" id="{DF2C51A2-FAE5-4156-BF1F-960AA8CEAEE8}"/>
-              </a:ext>
-            </a:extLst>
-          </p:cNvPr>
-          <p:cNvPicPr>
-            <a:picLocks noChangeAspect="1"/>
-          </p:cNvPicPr>
-          <p:nvPr/>
-        </p:nvPicPr>
-        <p:blipFill rotWithShape="1">
-          <a:blip r:embed="rId2">
-            <a:extLst>
-              <a:ext uri="{28A0092B-C50C-407E-A947-70E740481C1C}">
-                <a14:useLocalDpi xmlns:a14="http://schemas.microsoft.com/office/drawing/2010/main" val="0"/>
-              </a:ext>
-            </a:extLst>
-          </a:blip>
-          <a:srcRect l="6516" t="6460" r="8136" b="52302"/>
-          <a:stretch/>
-        </p:blipFill>
-        <p:spPr>
-          <a:xfrm>
-            <a:off x="195511" y="153918"/>
-            <a:ext cx="5751488" cy="3930402"/>
-          </a:xfrm>
-          <a:prstGeom prst="rect">
-            <a:avLst/>
-          </a:prstGeom>
-        </p:spPr>
-      </p:pic>
-      <p:pic>
-        <p:nvPicPr>
-          <p:cNvPr id="13" name="Picture 12">
-            <a:extLst>
-              <a:ext uri="{FF2B5EF4-FFF2-40B4-BE49-F238E27FC236}">
-                <a16:creationId xmlns:a16="http://schemas.microsoft.com/office/drawing/2014/main" id="{4701718B-EE51-4310-8101-8C6B94DAE845}"/>
-              </a:ext>
-            </a:extLst>
-          </p:cNvPr>
-          <p:cNvPicPr>
-            <a:picLocks noChangeAspect="1"/>
-          </p:cNvPicPr>
-          <p:nvPr/>
-        </p:nvPicPr>
-        <p:blipFill rotWithShape="1">
-          <a:blip r:embed="rId3">
-            <a:extLst>
-              <a:ext uri="{28A0092B-C50C-407E-A947-70E740481C1C}">
-                <a14:useLocalDpi xmlns:a14="http://schemas.microsoft.com/office/drawing/2010/main" val="0"/>
-              </a:ext>
-            </a:extLst>
-          </a:blip>
-          <a:srcRect l="4883" t="6240" r="9770" b="52524"/>
-          <a:stretch/>
-        </p:blipFill>
-        <p:spPr>
-          <a:xfrm>
-            <a:off x="6245003" y="287524"/>
-            <a:ext cx="5555978" cy="3796796"/>
-          </a:xfrm>
-          <a:prstGeom prst="rect">
-            <a:avLst/>
-          </a:prstGeom>
-        </p:spPr>
-      </p:pic>
       <p:sp>
         <p:nvSpPr>
           <p:cNvPr id="14" name="TextBox 13">
@@ -12451,6 +12381,167 @@
           </a:p>
         </p:txBody>
       </p:sp>
+      <p:grpSp>
+        <p:nvGrpSpPr>
+          <p:cNvPr id="8" name="Group 7">
+            <a:extLst>
+              <a:ext uri="{FF2B5EF4-FFF2-40B4-BE49-F238E27FC236}">
+                <a16:creationId xmlns:a16="http://schemas.microsoft.com/office/drawing/2014/main" id="{1811691B-9130-40CE-B4DA-6635031CEBB8}"/>
+              </a:ext>
+            </a:extLst>
+          </p:cNvPr>
+          <p:cNvGrpSpPr/>
+          <p:nvPr/>
+        </p:nvGrpSpPr>
+        <p:grpSpPr>
+          <a:xfrm>
+            <a:off x="1022473" y="563880"/>
+            <a:ext cx="8226578" cy="2865120"/>
+            <a:chOff x="1022473" y="563880"/>
+            <a:chExt cx="8226578" cy="2865120"/>
+          </a:xfrm>
+        </p:grpSpPr>
+        <p:pic>
+          <p:nvPicPr>
+            <p:cNvPr id="3" name="Picture 2">
+              <a:extLst>
+                <a:ext uri="{FF2B5EF4-FFF2-40B4-BE49-F238E27FC236}">
+                  <a16:creationId xmlns:a16="http://schemas.microsoft.com/office/drawing/2014/main" id="{CC59F2B4-6ED5-418E-AF1F-F4723D461072}"/>
+                </a:ext>
+              </a:extLst>
+            </p:cNvPr>
+            <p:cNvPicPr>
+              <a:picLocks noChangeAspect="1"/>
+            </p:cNvPicPr>
+            <p:nvPr/>
+          </p:nvPicPr>
+          <p:blipFill rotWithShape="1">
+            <a:blip r:embed="rId2">
+              <a:extLst>
+                <a:ext uri="{28A0092B-C50C-407E-A947-70E740481C1C}">
+                  <a14:useLocalDpi xmlns:a14="http://schemas.microsoft.com/office/drawing/2010/main" val="0"/>
+                </a:ext>
+              </a:extLst>
+            </a:blip>
+            <a:srcRect l="6969" t="6963" r="7674" b="51556"/>
+            <a:stretch/>
+          </p:blipFill>
+          <p:spPr>
+            <a:xfrm>
+              <a:off x="1022473" y="584200"/>
+              <a:ext cx="4138851" cy="2844800"/>
+            </a:xfrm>
+            <a:prstGeom prst="rect">
+              <a:avLst/>
+            </a:prstGeom>
+          </p:spPr>
+        </p:pic>
+        <p:pic>
+          <p:nvPicPr>
+            <p:cNvPr id="5" name="Picture 4">
+              <a:extLst>
+                <a:ext uri="{FF2B5EF4-FFF2-40B4-BE49-F238E27FC236}">
+                  <a16:creationId xmlns:a16="http://schemas.microsoft.com/office/drawing/2014/main" id="{B4DBECAB-AF69-4A35-A52D-5C9393EB0431}"/>
+                </a:ext>
+              </a:extLst>
+            </p:cNvPr>
+            <p:cNvPicPr>
+              <a:picLocks noChangeAspect="1"/>
+            </p:cNvPicPr>
+            <p:nvPr/>
+          </p:nvPicPr>
+          <p:blipFill rotWithShape="1">
+            <a:blip r:embed="rId3">
+              <a:extLst>
+                <a:ext uri="{28A0092B-C50C-407E-A947-70E740481C1C}">
+                  <a14:useLocalDpi xmlns:a14="http://schemas.microsoft.com/office/drawing/2010/main" val="0"/>
+                </a:ext>
+              </a:extLst>
+            </a:blip>
+            <a:srcRect l="5762" t="5334" r="9979" b="53185"/>
+            <a:stretch/>
+          </p:blipFill>
+          <p:spPr>
+            <a:xfrm>
+              <a:off x="5163503" y="563880"/>
+              <a:ext cx="4085548" cy="2844800"/>
+            </a:xfrm>
+            <a:prstGeom prst="rect">
+              <a:avLst/>
+            </a:prstGeom>
+          </p:spPr>
+        </p:pic>
+        <p:sp>
+          <p:nvSpPr>
+            <p:cNvPr id="6" name="TextBox 5">
+              <a:extLst>
+                <a:ext uri="{FF2B5EF4-FFF2-40B4-BE49-F238E27FC236}">
+                  <a16:creationId xmlns:a16="http://schemas.microsoft.com/office/drawing/2014/main" id="{CCEDEDE9-5819-4D8E-B1E3-77A80F467A60}"/>
+                </a:ext>
+              </a:extLst>
+            </p:cNvPr>
+            <p:cNvSpPr txBox="1"/>
+            <p:nvPr/>
+          </p:nvSpPr>
+          <p:spPr>
+            <a:xfrm>
+              <a:off x="1479550" y="692150"/>
+              <a:ext cx="391454" cy="400110"/>
+            </a:xfrm>
+            <a:prstGeom prst="rect">
+              <a:avLst/>
+            </a:prstGeom>
+            <a:noFill/>
+          </p:spPr>
+          <p:txBody>
+            <a:bodyPr wrap="none" rtlCol="0">
+              <a:spAutoFit/>
+            </a:bodyPr>
+            <a:lstStyle/>
+            <a:p>
+              <a:r>
+                <a:rPr lang="en-GB" sz="2000" b="1" dirty="0"/>
+                <a:t>a)</a:t>
+              </a:r>
+            </a:p>
+          </p:txBody>
+        </p:sp>
+        <p:sp>
+          <p:nvSpPr>
+            <p:cNvPr id="12" name="TextBox 11">
+              <a:extLst>
+                <a:ext uri="{FF2B5EF4-FFF2-40B4-BE49-F238E27FC236}">
+                  <a16:creationId xmlns:a16="http://schemas.microsoft.com/office/drawing/2014/main" id="{95829097-8723-4114-9307-7382941E4261}"/>
+                </a:ext>
+              </a:extLst>
+            </p:cNvPr>
+            <p:cNvSpPr txBox="1"/>
+            <p:nvPr/>
+          </p:nvSpPr>
+          <p:spPr>
+            <a:xfrm>
+              <a:off x="5618401" y="714405"/>
+              <a:ext cx="402674" cy="400110"/>
+            </a:xfrm>
+            <a:prstGeom prst="rect">
+              <a:avLst/>
+            </a:prstGeom>
+            <a:noFill/>
+          </p:spPr>
+          <p:txBody>
+            <a:bodyPr wrap="none" rtlCol="0">
+              <a:spAutoFit/>
+            </a:bodyPr>
+            <a:lstStyle/>
+            <a:p>
+              <a:r>
+                <a:rPr lang="en-GB" sz="2000" b="1" dirty="0"/>
+                <a:t>b)</a:t>
+              </a:r>
+            </a:p>
+          </p:txBody>
+        </p:sp>
+      </p:grpSp>
     </p:spTree>
     <p:extLst>
       <p:ext uri="{BB962C8B-B14F-4D97-AF65-F5344CB8AC3E}">

</xml_diff>

<commit_message>
slight change to a slide
</commit_message>
<xml_diff>
--- a/Compiled graphs.pptx
+++ b/Compiled graphs.pptx
@@ -16434,222 +16434,237 @@
           </a:p>
         </p:txBody>
       </p:sp>
-      <p:pic>
-        <p:nvPicPr>
-          <p:cNvPr id="28" name="Picture 27">
-            <a:extLst>
-              <a:ext uri="{FF2B5EF4-FFF2-40B4-BE49-F238E27FC236}">
-                <a16:creationId xmlns:a16="http://schemas.microsoft.com/office/drawing/2014/main" id="{2EF0C535-78A4-4A0F-83A1-8DBF589DE3CD}"/>
-              </a:ext>
-            </a:extLst>
-          </p:cNvPr>
-          <p:cNvPicPr>
-            <a:picLocks noChangeAspect="1"/>
-          </p:cNvPicPr>
+      <p:grpSp>
+        <p:nvGrpSpPr>
+          <p:cNvPr id="2" name="Group 1"/>
+          <p:cNvGrpSpPr/>
           <p:nvPr/>
-        </p:nvPicPr>
-        <p:blipFill>
-          <a:blip r:embed="rId2">
-            <a:extLst>
-              <a:ext uri="{28A0092B-C50C-407E-A947-70E740481C1C}">
-                <a14:useLocalDpi xmlns:a14="http://schemas.microsoft.com/office/drawing/2010/main" val="0"/>
-              </a:ext>
-            </a:extLst>
-          </a:blip>
-          <a:stretch>
-            <a:fillRect/>
-          </a:stretch>
-        </p:blipFill>
-        <p:spPr>
+        </p:nvGrpSpPr>
+        <p:grpSpPr>
           <a:xfrm>
-            <a:off x="7066170" y="3699569"/>
-            <a:ext cx="2743825" cy="2743825"/>
+            <a:off x="2115639" y="955745"/>
+            <a:ext cx="7694356" cy="5487651"/>
+            <a:chOff x="2115639" y="955745"/>
+            <a:chExt cx="7694356" cy="5487651"/>
           </a:xfrm>
-          <a:prstGeom prst="rect">
-            <a:avLst/>
-          </a:prstGeom>
-        </p:spPr>
-      </p:pic>
-      <p:pic>
-        <p:nvPicPr>
-          <p:cNvPr id="30" name="Picture 29">
-            <a:extLst>
-              <a:ext uri="{FF2B5EF4-FFF2-40B4-BE49-F238E27FC236}">
-                <a16:creationId xmlns:a16="http://schemas.microsoft.com/office/drawing/2014/main" id="{1B2789E2-26B1-483B-BD74-4C2F0C28869C}"/>
-              </a:ext>
-            </a:extLst>
-          </p:cNvPr>
-          <p:cNvPicPr>
-            <a:picLocks noChangeAspect="1"/>
-          </p:cNvPicPr>
-          <p:nvPr/>
-        </p:nvPicPr>
-        <p:blipFill>
-          <a:blip r:embed="rId3">
-            <a:extLst>
-              <a:ext uri="{28A0092B-C50C-407E-A947-70E740481C1C}">
-                <a14:useLocalDpi xmlns:a14="http://schemas.microsoft.com/office/drawing/2010/main" val="0"/>
-              </a:ext>
-            </a:extLst>
-          </a:blip>
-          <a:stretch>
-            <a:fillRect/>
-          </a:stretch>
-        </p:blipFill>
-        <p:spPr>
-          <a:xfrm>
-            <a:off x="4590905" y="3699571"/>
-            <a:ext cx="2743825" cy="2743825"/>
-          </a:xfrm>
-          <a:prstGeom prst="rect">
-            <a:avLst/>
-          </a:prstGeom>
-        </p:spPr>
-      </p:pic>
-      <p:pic>
-        <p:nvPicPr>
-          <p:cNvPr id="32" name="Picture 31">
-            <a:extLst>
-              <a:ext uri="{FF2B5EF4-FFF2-40B4-BE49-F238E27FC236}">
-                <a16:creationId xmlns:a16="http://schemas.microsoft.com/office/drawing/2014/main" id="{1B3921C4-0CD4-4BC8-A078-4F85F24CB333}"/>
-              </a:ext>
-            </a:extLst>
-          </p:cNvPr>
-          <p:cNvPicPr>
-            <a:picLocks noChangeAspect="1"/>
-          </p:cNvPicPr>
-          <p:nvPr/>
-        </p:nvPicPr>
-        <p:blipFill>
-          <a:blip r:embed="rId4">
-            <a:extLst>
-              <a:ext uri="{28A0092B-C50C-407E-A947-70E740481C1C}">
-                <a14:useLocalDpi xmlns:a14="http://schemas.microsoft.com/office/drawing/2010/main" val="0"/>
-              </a:ext>
-            </a:extLst>
-          </a:blip>
-          <a:stretch>
-            <a:fillRect/>
-          </a:stretch>
-        </p:blipFill>
-        <p:spPr>
-          <a:xfrm>
-            <a:off x="2115639" y="3699570"/>
-            <a:ext cx="2743825" cy="2743825"/>
-          </a:xfrm>
-          <a:prstGeom prst="rect">
-            <a:avLst/>
-          </a:prstGeom>
-        </p:spPr>
-      </p:pic>
-      <p:pic>
-        <p:nvPicPr>
-          <p:cNvPr id="34" name="Picture 33">
-            <a:extLst>
-              <a:ext uri="{FF2B5EF4-FFF2-40B4-BE49-F238E27FC236}">
-                <a16:creationId xmlns:a16="http://schemas.microsoft.com/office/drawing/2014/main" id="{45D6D687-F164-4EE2-9BD8-6A0247C33C58}"/>
-              </a:ext>
-            </a:extLst>
-          </p:cNvPr>
-          <p:cNvPicPr>
-            <a:picLocks noChangeAspect="1"/>
-          </p:cNvPicPr>
-          <p:nvPr/>
-        </p:nvPicPr>
-        <p:blipFill>
-          <a:blip r:embed="rId5">
-            <a:extLst>
-              <a:ext uri="{28A0092B-C50C-407E-A947-70E740481C1C}">
-                <a14:useLocalDpi xmlns:a14="http://schemas.microsoft.com/office/drawing/2010/main" val="0"/>
-              </a:ext>
-            </a:extLst>
-          </a:blip>
-          <a:stretch>
-            <a:fillRect/>
-          </a:stretch>
-        </p:blipFill>
-        <p:spPr>
-          <a:xfrm>
-            <a:off x="7066169" y="955745"/>
-            <a:ext cx="2743825" cy="2743825"/>
-          </a:xfrm>
-          <a:prstGeom prst="rect">
-            <a:avLst/>
-          </a:prstGeom>
-        </p:spPr>
-      </p:pic>
-      <p:pic>
-        <p:nvPicPr>
-          <p:cNvPr id="36" name="Picture 35">
-            <a:extLst>
-              <a:ext uri="{FF2B5EF4-FFF2-40B4-BE49-F238E27FC236}">
-                <a16:creationId xmlns:a16="http://schemas.microsoft.com/office/drawing/2014/main" id="{8211DED6-1CE3-4CD7-B775-98C448351BBE}"/>
-              </a:ext>
-            </a:extLst>
-          </p:cNvPr>
-          <p:cNvPicPr>
-            <a:picLocks noChangeAspect="1"/>
-          </p:cNvPicPr>
-          <p:nvPr/>
-        </p:nvPicPr>
-        <p:blipFill>
-          <a:blip r:embed="rId6">
-            <a:extLst>
-              <a:ext uri="{28A0092B-C50C-407E-A947-70E740481C1C}">
-                <a14:useLocalDpi xmlns:a14="http://schemas.microsoft.com/office/drawing/2010/main" val="0"/>
-              </a:ext>
-            </a:extLst>
-          </a:blip>
-          <a:stretch>
-            <a:fillRect/>
-          </a:stretch>
-        </p:blipFill>
-        <p:spPr>
-          <a:xfrm>
-            <a:off x="4590909" y="955747"/>
-            <a:ext cx="2743825" cy="2743825"/>
-          </a:xfrm>
-          <a:prstGeom prst="rect">
-            <a:avLst/>
-          </a:prstGeom>
-        </p:spPr>
-      </p:pic>
-      <p:pic>
-        <p:nvPicPr>
-          <p:cNvPr id="38" name="Picture 37">
-            <a:extLst>
-              <a:ext uri="{FF2B5EF4-FFF2-40B4-BE49-F238E27FC236}">
-                <a16:creationId xmlns:a16="http://schemas.microsoft.com/office/drawing/2014/main" id="{5A4F9160-7F29-45F1-B4BC-D8A4CA9CA7BA}"/>
-              </a:ext>
-            </a:extLst>
-          </p:cNvPr>
-          <p:cNvPicPr>
-            <a:picLocks noChangeAspect="1"/>
-          </p:cNvPicPr>
-          <p:nvPr/>
-        </p:nvPicPr>
-        <p:blipFill>
-          <a:blip r:embed="rId7">
-            <a:extLst>
-              <a:ext uri="{28A0092B-C50C-407E-A947-70E740481C1C}">
-                <a14:useLocalDpi xmlns:a14="http://schemas.microsoft.com/office/drawing/2010/main" val="0"/>
-              </a:ext>
-            </a:extLst>
-          </a:blip>
-          <a:stretch>
-            <a:fillRect/>
-          </a:stretch>
-        </p:blipFill>
-        <p:spPr>
-          <a:xfrm>
-            <a:off x="2115640" y="955746"/>
-            <a:ext cx="2743825" cy="2743825"/>
-          </a:xfrm>
-          <a:prstGeom prst="rect">
-            <a:avLst/>
-          </a:prstGeom>
-        </p:spPr>
-      </p:pic>
+        </p:grpSpPr>
+        <p:pic>
+          <p:nvPicPr>
+            <p:cNvPr id="28" name="Picture 27">
+              <a:extLst>
+                <a:ext uri="{FF2B5EF4-FFF2-40B4-BE49-F238E27FC236}">
+                  <a16:creationId xmlns:a16="http://schemas.microsoft.com/office/drawing/2014/main" id="{2EF0C535-78A4-4A0F-83A1-8DBF589DE3CD}"/>
+                </a:ext>
+              </a:extLst>
+            </p:cNvPr>
+            <p:cNvPicPr>
+              <a:picLocks noChangeAspect="1"/>
+            </p:cNvPicPr>
+            <p:nvPr/>
+          </p:nvPicPr>
+          <p:blipFill>
+            <a:blip r:embed="rId2">
+              <a:extLst>
+                <a:ext uri="{28A0092B-C50C-407E-A947-70E740481C1C}">
+                  <a14:useLocalDpi xmlns:a14="http://schemas.microsoft.com/office/drawing/2010/main" val="0"/>
+                </a:ext>
+              </a:extLst>
+            </a:blip>
+            <a:stretch>
+              <a:fillRect/>
+            </a:stretch>
+          </p:blipFill>
+          <p:spPr>
+            <a:xfrm>
+              <a:off x="7066170" y="3699569"/>
+              <a:ext cx="2743825" cy="2743825"/>
+            </a:xfrm>
+            <a:prstGeom prst="rect">
+              <a:avLst/>
+            </a:prstGeom>
+          </p:spPr>
+        </p:pic>
+        <p:pic>
+          <p:nvPicPr>
+            <p:cNvPr id="30" name="Picture 29">
+              <a:extLst>
+                <a:ext uri="{FF2B5EF4-FFF2-40B4-BE49-F238E27FC236}">
+                  <a16:creationId xmlns:a16="http://schemas.microsoft.com/office/drawing/2014/main" id="{1B2789E2-26B1-483B-BD74-4C2F0C28869C}"/>
+                </a:ext>
+              </a:extLst>
+            </p:cNvPr>
+            <p:cNvPicPr>
+              <a:picLocks noChangeAspect="1"/>
+            </p:cNvPicPr>
+            <p:nvPr/>
+          </p:nvPicPr>
+          <p:blipFill>
+            <a:blip r:embed="rId3">
+              <a:extLst>
+                <a:ext uri="{28A0092B-C50C-407E-A947-70E740481C1C}">
+                  <a14:useLocalDpi xmlns:a14="http://schemas.microsoft.com/office/drawing/2010/main" val="0"/>
+                </a:ext>
+              </a:extLst>
+            </a:blip>
+            <a:stretch>
+              <a:fillRect/>
+            </a:stretch>
+          </p:blipFill>
+          <p:spPr>
+            <a:xfrm>
+              <a:off x="4590905" y="3699571"/>
+              <a:ext cx="2743825" cy="2743825"/>
+            </a:xfrm>
+            <a:prstGeom prst="rect">
+              <a:avLst/>
+            </a:prstGeom>
+          </p:spPr>
+        </p:pic>
+        <p:pic>
+          <p:nvPicPr>
+            <p:cNvPr id="32" name="Picture 31">
+              <a:extLst>
+                <a:ext uri="{FF2B5EF4-FFF2-40B4-BE49-F238E27FC236}">
+                  <a16:creationId xmlns:a16="http://schemas.microsoft.com/office/drawing/2014/main" id="{1B3921C4-0CD4-4BC8-A078-4F85F24CB333}"/>
+                </a:ext>
+              </a:extLst>
+            </p:cNvPr>
+            <p:cNvPicPr>
+              <a:picLocks noChangeAspect="1"/>
+            </p:cNvPicPr>
+            <p:nvPr/>
+          </p:nvPicPr>
+          <p:blipFill>
+            <a:blip r:embed="rId4">
+              <a:extLst>
+                <a:ext uri="{28A0092B-C50C-407E-A947-70E740481C1C}">
+                  <a14:useLocalDpi xmlns:a14="http://schemas.microsoft.com/office/drawing/2010/main" val="0"/>
+                </a:ext>
+              </a:extLst>
+            </a:blip>
+            <a:stretch>
+              <a:fillRect/>
+            </a:stretch>
+          </p:blipFill>
+          <p:spPr>
+            <a:xfrm>
+              <a:off x="2115639" y="3699570"/>
+              <a:ext cx="2743825" cy="2743825"/>
+            </a:xfrm>
+            <a:prstGeom prst="rect">
+              <a:avLst/>
+            </a:prstGeom>
+          </p:spPr>
+        </p:pic>
+        <p:pic>
+          <p:nvPicPr>
+            <p:cNvPr id="34" name="Picture 33">
+              <a:extLst>
+                <a:ext uri="{FF2B5EF4-FFF2-40B4-BE49-F238E27FC236}">
+                  <a16:creationId xmlns:a16="http://schemas.microsoft.com/office/drawing/2014/main" id="{45D6D687-F164-4EE2-9BD8-6A0247C33C58}"/>
+                </a:ext>
+              </a:extLst>
+            </p:cNvPr>
+            <p:cNvPicPr>
+              <a:picLocks noChangeAspect="1"/>
+            </p:cNvPicPr>
+            <p:nvPr/>
+          </p:nvPicPr>
+          <p:blipFill>
+            <a:blip r:embed="rId5">
+              <a:extLst>
+                <a:ext uri="{28A0092B-C50C-407E-A947-70E740481C1C}">
+                  <a14:useLocalDpi xmlns:a14="http://schemas.microsoft.com/office/drawing/2010/main" val="0"/>
+                </a:ext>
+              </a:extLst>
+            </a:blip>
+            <a:stretch>
+              <a:fillRect/>
+            </a:stretch>
+          </p:blipFill>
+          <p:spPr>
+            <a:xfrm>
+              <a:off x="7066169" y="955745"/>
+              <a:ext cx="2743825" cy="2743825"/>
+            </a:xfrm>
+            <a:prstGeom prst="rect">
+              <a:avLst/>
+            </a:prstGeom>
+          </p:spPr>
+        </p:pic>
+        <p:pic>
+          <p:nvPicPr>
+            <p:cNvPr id="36" name="Picture 35">
+              <a:extLst>
+                <a:ext uri="{FF2B5EF4-FFF2-40B4-BE49-F238E27FC236}">
+                  <a16:creationId xmlns:a16="http://schemas.microsoft.com/office/drawing/2014/main" id="{8211DED6-1CE3-4CD7-B775-98C448351BBE}"/>
+                </a:ext>
+              </a:extLst>
+            </p:cNvPr>
+            <p:cNvPicPr>
+              <a:picLocks noChangeAspect="1"/>
+            </p:cNvPicPr>
+            <p:nvPr/>
+          </p:nvPicPr>
+          <p:blipFill>
+            <a:blip r:embed="rId6">
+              <a:extLst>
+                <a:ext uri="{28A0092B-C50C-407E-A947-70E740481C1C}">
+                  <a14:useLocalDpi xmlns:a14="http://schemas.microsoft.com/office/drawing/2010/main" val="0"/>
+                </a:ext>
+              </a:extLst>
+            </a:blip>
+            <a:stretch>
+              <a:fillRect/>
+            </a:stretch>
+          </p:blipFill>
+          <p:spPr>
+            <a:xfrm>
+              <a:off x="4590909" y="955747"/>
+              <a:ext cx="2743825" cy="2743825"/>
+            </a:xfrm>
+            <a:prstGeom prst="rect">
+              <a:avLst/>
+            </a:prstGeom>
+          </p:spPr>
+        </p:pic>
+        <p:pic>
+          <p:nvPicPr>
+            <p:cNvPr id="38" name="Picture 37">
+              <a:extLst>
+                <a:ext uri="{FF2B5EF4-FFF2-40B4-BE49-F238E27FC236}">
+                  <a16:creationId xmlns:a16="http://schemas.microsoft.com/office/drawing/2014/main" id="{5A4F9160-7F29-45F1-B4BC-D8A4CA9CA7BA}"/>
+                </a:ext>
+              </a:extLst>
+            </p:cNvPr>
+            <p:cNvPicPr>
+              <a:picLocks noChangeAspect="1"/>
+            </p:cNvPicPr>
+            <p:nvPr/>
+          </p:nvPicPr>
+          <p:blipFill>
+            <a:blip r:embed="rId7">
+              <a:extLst>
+                <a:ext uri="{28A0092B-C50C-407E-A947-70E740481C1C}">
+                  <a14:useLocalDpi xmlns:a14="http://schemas.microsoft.com/office/drawing/2010/main" val="0"/>
+                </a:ext>
+              </a:extLst>
+            </a:blip>
+            <a:stretch>
+              <a:fillRect/>
+            </a:stretch>
+          </p:blipFill>
+          <p:spPr>
+            <a:xfrm>
+              <a:off x="2115640" y="955746"/>
+              <a:ext cx="2743825" cy="2743825"/>
+            </a:xfrm>
+            <a:prstGeom prst="rect">
+              <a:avLst/>
+            </a:prstGeom>
+          </p:spPr>
+        </p:pic>
+      </p:grpSp>
     </p:spTree>
     <p:extLst>
       <p:ext uri="{BB962C8B-B14F-4D97-AF65-F5344CB8AC3E}">

</xml_diff>

<commit_message>
added a slide w. interesting predictions from net
</commit_message>
<xml_diff>
--- a/Compiled graphs.pptx
+++ b/Compiled graphs.pptx
@@ -6,10 +6,10 @@
     <p:sldMasterId id="2147483660" r:id="rId2"/>
   </p:sldMasterIdLst>
   <p:notesMasterIdLst>
-    <p:notesMasterId r:id="rId17"/>
+    <p:notesMasterId r:id="rId18"/>
   </p:notesMasterIdLst>
   <p:handoutMasterIdLst>
-    <p:handoutMasterId r:id="rId18"/>
+    <p:handoutMasterId r:id="rId19"/>
   </p:handoutMasterIdLst>
   <p:sldIdLst>
     <p:sldId id="257" r:id="rId3"/>
@@ -26,6 +26,7 @@
     <p:sldId id="270" r:id="rId14"/>
     <p:sldId id="272" r:id="rId15"/>
     <p:sldId id="275" r:id="rId16"/>
+    <p:sldId id="276" r:id="rId17"/>
   </p:sldIdLst>
   <p:sldSz cx="12192000" cy="6858000"/>
   <p:notesSz cx="6858000" cy="9144000"/>
@@ -14555,6 +14556,432 @@
 </p:sld>
 </file>
 
+<file path=ppt/slides/slide15.xml><?xml version="1.0" encoding="utf-8"?>
+<p:sld xmlns:a="http://schemas.openxmlformats.org/drawingml/2006/main" xmlns:r="http://schemas.openxmlformats.org/officeDocument/2006/relationships" xmlns:p="http://schemas.openxmlformats.org/presentationml/2006/main">
+  <p:cSld>
+    <p:spTree>
+      <p:nvGrpSpPr>
+        <p:cNvPr id="1" name=""/>
+        <p:cNvGrpSpPr/>
+        <p:nvPr/>
+      </p:nvGrpSpPr>
+      <p:grpSpPr>
+        <a:xfrm>
+          <a:off x="0" y="0"/>
+          <a:ext cx="0" cy="0"/>
+          <a:chOff x="0" y="0"/>
+          <a:chExt cx="0" cy="0"/>
+        </a:xfrm>
+      </p:grpSpPr>
+      <p:pic>
+        <p:nvPicPr>
+          <p:cNvPr id="3" name="Picture 2">
+            <a:extLst>
+              <a:ext uri="{FF2B5EF4-FFF2-40B4-BE49-F238E27FC236}">
+                <a16:creationId xmlns:a16="http://schemas.microsoft.com/office/drawing/2014/main" id="{B65E8B23-A135-46B8-AD38-6BE7DBE606BD}"/>
+              </a:ext>
+            </a:extLst>
+          </p:cNvPr>
+          <p:cNvPicPr>
+            <a:picLocks noChangeAspect="1"/>
+          </p:cNvPicPr>
+          <p:nvPr/>
+        </p:nvPicPr>
+        <p:blipFill>
+          <a:blip r:embed="rId2">
+            <a:extLst>
+              <a:ext uri="{28A0092B-C50C-407E-A947-70E740481C1C}">
+                <a14:useLocalDpi xmlns:a14="http://schemas.microsoft.com/office/drawing/2010/main" val="0"/>
+              </a:ext>
+            </a:extLst>
+          </a:blip>
+          <a:stretch>
+            <a:fillRect/>
+          </a:stretch>
+        </p:blipFill>
+        <p:spPr>
+          <a:xfrm>
+            <a:off x="5638800" y="3200400"/>
+            <a:ext cx="914400" cy="457200"/>
+          </a:xfrm>
+          <a:prstGeom prst="rect">
+            <a:avLst/>
+          </a:prstGeom>
+        </p:spPr>
+      </p:pic>
+      <p:pic>
+        <p:nvPicPr>
+          <p:cNvPr id="5" name="Picture 4">
+            <a:extLst>
+              <a:ext uri="{FF2B5EF4-FFF2-40B4-BE49-F238E27FC236}">
+                <a16:creationId xmlns:a16="http://schemas.microsoft.com/office/drawing/2014/main" id="{26D645F9-0F9E-4649-994E-9A27C5796E86}"/>
+              </a:ext>
+            </a:extLst>
+          </p:cNvPr>
+          <p:cNvPicPr>
+            <a:picLocks noChangeAspect="1"/>
+          </p:cNvPicPr>
+          <p:nvPr/>
+        </p:nvPicPr>
+        <p:blipFill>
+          <a:blip r:embed="rId3">
+            <a:extLst>
+              <a:ext uri="{28A0092B-C50C-407E-A947-70E740481C1C}">
+                <a14:useLocalDpi xmlns:a14="http://schemas.microsoft.com/office/drawing/2010/main" val="0"/>
+              </a:ext>
+            </a:extLst>
+          </a:blip>
+          <a:stretch>
+            <a:fillRect/>
+          </a:stretch>
+        </p:blipFill>
+        <p:spPr>
+          <a:xfrm>
+            <a:off x="7031501" y="3200400"/>
+            <a:ext cx="914400" cy="457200"/>
+          </a:xfrm>
+          <a:prstGeom prst="rect">
+            <a:avLst/>
+          </a:prstGeom>
+        </p:spPr>
+      </p:pic>
+      <p:pic>
+        <p:nvPicPr>
+          <p:cNvPr id="7" name="Picture 6">
+            <a:extLst>
+              <a:ext uri="{FF2B5EF4-FFF2-40B4-BE49-F238E27FC236}">
+                <a16:creationId xmlns:a16="http://schemas.microsoft.com/office/drawing/2014/main" id="{88C97E23-8DB3-42BC-914F-36BFBBBCAFE9}"/>
+              </a:ext>
+            </a:extLst>
+          </p:cNvPr>
+          <p:cNvPicPr>
+            <a:picLocks noChangeAspect="1"/>
+          </p:cNvPicPr>
+          <p:nvPr/>
+        </p:nvPicPr>
+        <p:blipFill>
+          <a:blip r:embed="rId4">
+            <a:extLst>
+              <a:ext uri="{28A0092B-C50C-407E-A947-70E740481C1C}">
+                <a14:useLocalDpi xmlns:a14="http://schemas.microsoft.com/office/drawing/2010/main" val="0"/>
+              </a:ext>
+            </a:extLst>
+          </a:blip>
+          <a:stretch>
+            <a:fillRect/>
+          </a:stretch>
+        </p:blipFill>
+        <p:spPr>
+          <a:xfrm>
+            <a:off x="5807613" y="4677508"/>
+            <a:ext cx="914400" cy="457200"/>
+          </a:xfrm>
+          <a:prstGeom prst="rect">
+            <a:avLst/>
+          </a:prstGeom>
+        </p:spPr>
+      </p:pic>
+      <p:pic>
+        <p:nvPicPr>
+          <p:cNvPr id="9" name="Picture 8">
+            <a:extLst>
+              <a:ext uri="{FF2B5EF4-FFF2-40B4-BE49-F238E27FC236}">
+                <a16:creationId xmlns:a16="http://schemas.microsoft.com/office/drawing/2014/main" id="{020DE582-01F5-47D2-807E-71826E0D2827}"/>
+              </a:ext>
+            </a:extLst>
+          </p:cNvPr>
+          <p:cNvPicPr>
+            <a:picLocks noChangeAspect="1"/>
+          </p:cNvPicPr>
+          <p:nvPr/>
+        </p:nvPicPr>
+        <p:blipFill>
+          <a:blip r:embed="rId5">
+            <a:extLst>
+              <a:ext uri="{28A0092B-C50C-407E-A947-70E740481C1C}">
+                <a14:useLocalDpi xmlns:a14="http://schemas.microsoft.com/office/drawing/2010/main" val="0"/>
+              </a:ext>
+            </a:extLst>
+          </a:blip>
+          <a:stretch>
+            <a:fillRect/>
+          </a:stretch>
+        </p:blipFill>
+        <p:spPr>
+          <a:xfrm>
+            <a:off x="4499317" y="4677508"/>
+            <a:ext cx="914400" cy="457200"/>
+          </a:xfrm>
+          <a:prstGeom prst="rect">
+            <a:avLst/>
+          </a:prstGeom>
+        </p:spPr>
+      </p:pic>
+      <p:pic>
+        <p:nvPicPr>
+          <p:cNvPr id="11" name="Picture 10">
+            <a:extLst>
+              <a:ext uri="{FF2B5EF4-FFF2-40B4-BE49-F238E27FC236}">
+                <a16:creationId xmlns:a16="http://schemas.microsoft.com/office/drawing/2014/main" id="{6E0E5D2F-B656-40FA-BB46-B28274E0DC71}"/>
+              </a:ext>
+            </a:extLst>
+          </p:cNvPr>
+          <p:cNvPicPr>
+            <a:picLocks noChangeAspect="1"/>
+          </p:cNvPicPr>
+          <p:nvPr/>
+        </p:nvPicPr>
+        <p:blipFill>
+          <a:blip r:embed="rId6">
+            <a:extLst>
+              <a:ext uri="{28A0092B-C50C-407E-A947-70E740481C1C}">
+                <a14:useLocalDpi xmlns:a14="http://schemas.microsoft.com/office/drawing/2010/main" val="0"/>
+              </a:ext>
+            </a:extLst>
+          </a:blip>
+          <a:stretch>
+            <a:fillRect/>
+          </a:stretch>
+        </p:blipFill>
+        <p:spPr>
+          <a:xfrm>
+            <a:off x="1404425" y="1695157"/>
+            <a:ext cx="914400" cy="457200"/>
+          </a:xfrm>
+          <a:prstGeom prst="rect">
+            <a:avLst/>
+          </a:prstGeom>
+        </p:spPr>
+      </p:pic>
+      <p:pic>
+        <p:nvPicPr>
+          <p:cNvPr id="13" name="Picture 12">
+            <a:extLst>
+              <a:ext uri="{FF2B5EF4-FFF2-40B4-BE49-F238E27FC236}">
+                <a16:creationId xmlns:a16="http://schemas.microsoft.com/office/drawing/2014/main" id="{031F3BDC-1EC3-46D7-ABDB-46A9BA2FA2DD}"/>
+              </a:ext>
+            </a:extLst>
+          </p:cNvPr>
+          <p:cNvPicPr>
+            <a:picLocks noChangeAspect="1"/>
+          </p:cNvPicPr>
+          <p:nvPr/>
+        </p:nvPicPr>
+        <p:blipFill>
+          <a:blip r:embed="rId7">
+            <a:extLst>
+              <a:ext uri="{28A0092B-C50C-407E-A947-70E740481C1C}">
+                <a14:useLocalDpi xmlns:a14="http://schemas.microsoft.com/office/drawing/2010/main" val="0"/>
+              </a:ext>
+            </a:extLst>
+          </a:blip>
+          <a:stretch>
+            <a:fillRect/>
+          </a:stretch>
+        </p:blipFill>
+        <p:spPr>
+          <a:xfrm>
+            <a:off x="1366911" y="2342270"/>
+            <a:ext cx="914400" cy="457200"/>
+          </a:xfrm>
+          <a:prstGeom prst="rect">
+            <a:avLst/>
+          </a:prstGeom>
+        </p:spPr>
+      </p:pic>
+      <p:pic>
+        <p:nvPicPr>
+          <p:cNvPr id="15" name="Picture 14">
+            <a:extLst>
+              <a:ext uri="{FF2B5EF4-FFF2-40B4-BE49-F238E27FC236}">
+                <a16:creationId xmlns:a16="http://schemas.microsoft.com/office/drawing/2014/main" id="{5BACE0D3-87D2-42B3-A5AD-72783A1BB43E}"/>
+              </a:ext>
+            </a:extLst>
+          </p:cNvPr>
+          <p:cNvPicPr>
+            <a:picLocks noChangeAspect="1"/>
+          </p:cNvPicPr>
+          <p:nvPr/>
+        </p:nvPicPr>
+        <p:blipFill>
+          <a:blip r:embed="rId8">
+            <a:extLst>
+              <a:ext uri="{28A0092B-C50C-407E-A947-70E740481C1C}">
+                <a14:useLocalDpi xmlns:a14="http://schemas.microsoft.com/office/drawing/2010/main" val="0"/>
+              </a:ext>
+            </a:extLst>
+          </a:blip>
+          <a:stretch>
+            <a:fillRect/>
+          </a:stretch>
+        </p:blipFill>
+        <p:spPr>
+          <a:xfrm>
+            <a:off x="4485250" y="3200400"/>
+            <a:ext cx="914400" cy="457200"/>
+          </a:xfrm>
+          <a:prstGeom prst="rect">
+            <a:avLst/>
+          </a:prstGeom>
+        </p:spPr>
+      </p:pic>
+      <p:pic>
+        <p:nvPicPr>
+          <p:cNvPr id="17" name="Picture 16">
+            <a:extLst>
+              <a:ext uri="{FF2B5EF4-FFF2-40B4-BE49-F238E27FC236}">
+                <a16:creationId xmlns:a16="http://schemas.microsoft.com/office/drawing/2014/main" id="{E3D431BE-93AC-4512-AF15-DF3014AD5435}"/>
+              </a:ext>
+            </a:extLst>
+          </p:cNvPr>
+          <p:cNvPicPr>
+            <a:picLocks noChangeAspect="1"/>
+          </p:cNvPicPr>
+          <p:nvPr/>
+        </p:nvPicPr>
+        <p:blipFill>
+          <a:blip r:embed="rId9">
+            <a:extLst>
+              <a:ext uri="{28A0092B-C50C-407E-A947-70E740481C1C}">
+                <a14:useLocalDpi xmlns:a14="http://schemas.microsoft.com/office/drawing/2010/main" val="0"/>
+              </a:ext>
+            </a:extLst>
+          </a:blip>
+          <a:stretch>
+            <a:fillRect/>
+          </a:stretch>
+        </p:blipFill>
+        <p:spPr>
+          <a:xfrm>
+            <a:off x="8283526" y="3200400"/>
+            <a:ext cx="914400" cy="457200"/>
+          </a:xfrm>
+          <a:prstGeom prst="rect">
+            <a:avLst/>
+          </a:prstGeom>
+        </p:spPr>
+      </p:pic>
+      <p:pic>
+        <p:nvPicPr>
+          <p:cNvPr id="19" name="Picture 18">
+            <a:extLst>
+              <a:ext uri="{FF2B5EF4-FFF2-40B4-BE49-F238E27FC236}">
+                <a16:creationId xmlns:a16="http://schemas.microsoft.com/office/drawing/2014/main" id="{478336C2-E4FE-48C1-833D-379D7E789A06}"/>
+              </a:ext>
+            </a:extLst>
+          </p:cNvPr>
+          <p:cNvPicPr>
+            <a:picLocks noChangeAspect="1"/>
+          </p:cNvPicPr>
+          <p:nvPr/>
+        </p:nvPicPr>
+        <p:blipFill>
+          <a:blip r:embed="rId10">
+            <a:extLst>
+              <a:ext uri="{28A0092B-C50C-407E-A947-70E740481C1C}">
+                <a14:useLocalDpi xmlns:a14="http://schemas.microsoft.com/office/drawing/2010/main" val="0"/>
+              </a:ext>
+            </a:extLst>
+          </a:blip>
+          <a:stretch>
+            <a:fillRect/>
+          </a:stretch>
+        </p:blipFill>
+        <p:spPr>
+          <a:xfrm>
+            <a:off x="7242516" y="4677508"/>
+            <a:ext cx="914400" cy="457200"/>
+          </a:xfrm>
+          <a:prstGeom prst="rect">
+            <a:avLst/>
+          </a:prstGeom>
+        </p:spPr>
+      </p:pic>
+      <p:pic>
+        <p:nvPicPr>
+          <p:cNvPr id="21" name="Picture 20">
+            <a:extLst>
+              <a:ext uri="{FF2B5EF4-FFF2-40B4-BE49-F238E27FC236}">
+                <a16:creationId xmlns:a16="http://schemas.microsoft.com/office/drawing/2014/main" id="{ADE78CE3-FFC5-4416-84B1-5A97E9650427}"/>
+              </a:ext>
+            </a:extLst>
+          </p:cNvPr>
+          <p:cNvPicPr>
+            <a:picLocks noChangeAspect="1"/>
+          </p:cNvPicPr>
+          <p:nvPr/>
+        </p:nvPicPr>
+        <p:blipFill>
+          <a:blip r:embed="rId11">
+            <a:extLst>
+              <a:ext uri="{28A0092B-C50C-407E-A947-70E740481C1C}">
+                <a14:useLocalDpi xmlns:a14="http://schemas.microsoft.com/office/drawing/2010/main" val="0"/>
+              </a:ext>
+            </a:extLst>
+          </a:blip>
+          <a:stretch>
+            <a:fillRect/>
+          </a:stretch>
+        </p:blipFill>
+        <p:spPr>
+          <a:xfrm>
+            <a:off x="9554309" y="3200400"/>
+            <a:ext cx="914400" cy="457200"/>
+          </a:xfrm>
+          <a:prstGeom prst="rect">
+            <a:avLst/>
+          </a:prstGeom>
+        </p:spPr>
+      </p:pic>
+      <p:pic>
+        <p:nvPicPr>
+          <p:cNvPr id="23" name="Picture 22">
+            <a:extLst>
+              <a:ext uri="{FF2B5EF4-FFF2-40B4-BE49-F238E27FC236}">
+                <a16:creationId xmlns:a16="http://schemas.microsoft.com/office/drawing/2014/main" id="{AD4F4235-221F-4644-AB48-D42978F41735}"/>
+              </a:ext>
+            </a:extLst>
+          </p:cNvPr>
+          <p:cNvPicPr>
+            <a:picLocks noChangeAspect="1"/>
+          </p:cNvPicPr>
+          <p:nvPr/>
+        </p:nvPicPr>
+        <p:blipFill>
+          <a:blip r:embed="rId12">
+            <a:extLst>
+              <a:ext uri="{28A0092B-C50C-407E-A947-70E740481C1C}">
+                <a14:useLocalDpi xmlns:a14="http://schemas.microsoft.com/office/drawing/2010/main" val="0"/>
+              </a:ext>
+            </a:extLst>
+          </a:blip>
+          <a:stretch>
+            <a:fillRect/>
+          </a:stretch>
+        </p:blipFill>
+        <p:spPr>
+          <a:xfrm>
+            <a:off x="8625843" y="4677508"/>
+            <a:ext cx="914400" cy="457200"/>
+          </a:xfrm>
+          <a:prstGeom prst="rect">
+            <a:avLst/>
+          </a:prstGeom>
+        </p:spPr>
+      </p:pic>
+    </p:spTree>
+    <p:extLst>
+      <p:ext uri="{BB962C8B-B14F-4D97-AF65-F5344CB8AC3E}">
+        <p14:creationId xmlns:p14="http://schemas.microsoft.com/office/powerpoint/2010/main" val="2027482871"/>
+      </p:ext>
+    </p:extLst>
+  </p:cSld>
+  <p:clrMapOvr>
+    <a:masterClrMapping/>
+  </p:clrMapOvr>
+</p:sld>
+</file>
+
 <file path=ppt/slides/slide2.xml><?xml version="1.0" encoding="utf-8"?>
 <p:sld xmlns:a="http://schemas.openxmlformats.org/drawingml/2006/main" xmlns:r="http://schemas.openxmlformats.org/officeDocument/2006/relationships" xmlns:p="http://schemas.openxmlformats.org/presentationml/2006/main">
   <p:cSld>

</xml_diff>